<commit_message>
Small Enhancement to Architecture Diagram
</commit_message>
<xml_diff>
--- a/Documentation/Architecture.pptx
+++ b/Documentation/Architecture.pptx
@@ -104,6 +104,11 @@
       </a:defRPr>
     </a:lvl9pPr>
   </p:defaultTextStyle>
+  <p:extLst>
+    <p:ext uri="{EFAFB233-063F-42B5-8137-9DF3F51BA10A}">
+      <p15:sldGuideLst xmlns:p15="http://schemas.microsoft.com/office/powerpoint/2012/main"/>
+    </p:ext>
+  </p:extLst>
 </p:presentation>
 </file>
 
@@ -256,7 +261,7 @@
           <a:p>
             <a:fld id="{DC2BF6E6-F863-479F-A057-0F7FF047E296}" type="datetimeFigureOut">
               <a:rPr lang="en-IN" smtClean="0"/>
-              <a:t>26-02-2022</a:t>
+              <a:t>13-03-2022</a:t>
             </a:fld>
             <a:endParaRPr lang="en-IN"/>
           </a:p>
@@ -456,7 +461,7 @@
           <a:p>
             <a:fld id="{DC2BF6E6-F863-479F-A057-0F7FF047E296}" type="datetimeFigureOut">
               <a:rPr lang="en-IN" smtClean="0"/>
-              <a:t>26-02-2022</a:t>
+              <a:t>13-03-2022</a:t>
             </a:fld>
             <a:endParaRPr lang="en-IN"/>
           </a:p>
@@ -666,7 +671,7 @@
           <a:p>
             <a:fld id="{DC2BF6E6-F863-479F-A057-0F7FF047E296}" type="datetimeFigureOut">
               <a:rPr lang="en-IN" smtClean="0"/>
-              <a:t>26-02-2022</a:t>
+              <a:t>13-03-2022</a:t>
             </a:fld>
             <a:endParaRPr lang="en-IN"/>
           </a:p>
@@ -866,7 +871,7 @@
           <a:p>
             <a:fld id="{DC2BF6E6-F863-479F-A057-0F7FF047E296}" type="datetimeFigureOut">
               <a:rPr lang="en-IN" smtClean="0"/>
-              <a:t>26-02-2022</a:t>
+              <a:t>13-03-2022</a:t>
             </a:fld>
             <a:endParaRPr lang="en-IN"/>
           </a:p>
@@ -1142,7 +1147,7 @@
           <a:p>
             <a:fld id="{DC2BF6E6-F863-479F-A057-0F7FF047E296}" type="datetimeFigureOut">
               <a:rPr lang="en-IN" smtClean="0"/>
-              <a:t>26-02-2022</a:t>
+              <a:t>13-03-2022</a:t>
             </a:fld>
             <a:endParaRPr lang="en-IN"/>
           </a:p>
@@ -1410,7 +1415,7 @@
           <a:p>
             <a:fld id="{DC2BF6E6-F863-479F-A057-0F7FF047E296}" type="datetimeFigureOut">
               <a:rPr lang="en-IN" smtClean="0"/>
-              <a:t>26-02-2022</a:t>
+              <a:t>13-03-2022</a:t>
             </a:fld>
             <a:endParaRPr lang="en-IN"/>
           </a:p>
@@ -1825,7 +1830,7 @@
           <a:p>
             <a:fld id="{DC2BF6E6-F863-479F-A057-0F7FF047E296}" type="datetimeFigureOut">
               <a:rPr lang="en-IN" smtClean="0"/>
-              <a:t>26-02-2022</a:t>
+              <a:t>13-03-2022</a:t>
             </a:fld>
             <a:endParaRPr lang="en-IN"/>
           </a:p>
@@ -1967,7 +1972,7 @@
           <a:p>
             <a:fld id="{DC2BF6E6-F863-479F-A057-0F7FF047E296}" type="datetimeFigureOut">
               <a:rPr lang="en-IN" smtClean="0"/>
-              <a:t>26-02-2022</a:t>
+              <a:t>13-03-2022</a:t>
             </a:fld>
             <a:endParaRPr lang="en-IN"/>
           </a:p>
@@ -2080,7 +2085,7 @@
           <a:p>
             <a:fld id="{DC2BF6E6-F863-479F-A057-0F7FF047E296}" type="datetimeFigureOut">
               <a:rPr lang="en-IN" smtClean="0"/>
-              <a:t>26-02-2022</a:t>
+              <a:t>13-03-2022</a:t>
             </a:fld>
             <a:endParaRPr lang="en-IN"/>
           </a:p>
@@ -2393,7 +2398,7 @@
           <a:p>
             <a:fld id="{DC2BF6E6-F863-479F-A057-0F7FF047E296}" type="datetimeFigureOut">
               <a:rPr lang="en-IN" smtClean="0"/>
-              <a:t>26-02-2022</a:t>
+              <a:t>13-03-2022</a:t>
             </a:fld>
             <a:endParaRPr lang="en-IN"/>
           </a:p>
@@ -2682,7 +2687,7 @@
           <a:p>
             <a:fld id="{DC2BF6E6-F863-479F-A057-0F7FF047E296}" type="datetimeFigureOut">
               <a:rPr lang="en-IN" smtClean="0"/>
-              <a:t>26-02-2022</a:t>
+              <a:t>13-03-2022</a:t>
             </a:fld>
             <a:endParaRPr lang="en-IN"/>
           </a:p>
@@ -2925,7 +2930,7 @@
           <a:p>
             <a:fld id="{DC2BF6E6-F863-479F-A057-0F7FF047E296}" type="datetimeFigureOut">
               <a:rPr lang="en-IN" smtClean="0"/>
-              <a:t>26-02-2022</a:t>
+              <a:t>13-03-2022</a:t>
             </a:fld>
             <a:endParaRPr lang="en-IN"/>
           </a:p>
@@ -3344,71 +3349,6 @@
       </p:grpSpPr>
       <p:sp>
         <p:nvSpPr>
-          <p:cNvPr id="6" name="Rectangle 5">
-            <a:extLst>
-              <a:ext uri="{FF2B5EF4-FFF2-40B4-BE49-F238E27FC236}">
-                <a16:creationId xmlns:a16="http://schemas.microsoft.com/office/drawing/2014/main" id="{E681EEBF-DED0-49C3-82BA-C359A5D505B5}"/>
-              </a:ext>
-            </a:extLst>
-          </p:cNvPr>
-          <p:cNvSpPr/>
-          <p:nvPr/>
-        </p:nvSpPr>
-        <p:spPr>
-          <a:xfrm>
-            <a:off x="3310837" y="688217"/>
-            <a:ext cx="1748242" cy="3211237"/>
-          </a:xfrm>
-          <a:prstGeom prst="rect">
-            <a:avLst/>
-          </a:prstGeom>
-          <a:solidFill>
-            <a:srgbClr val="FFF6D9"/>
-          </a:solidFill>
-        </p:spPr>
-        <p:style>
-          <a:lnRef idx="2">
-            <a:schemeClr val="accent1">
-              <a:shade val="50000"/>
-            </a:schemeClr>
-          </a:lnRef>
-          <a:fillRef idx="1">
-            <a:schemeClr val="accent1"/>
-          </a:fillRef>
-          <a:effectRef idx="0">
-            <a:schemeClr val="accent1"/>
-          </a:effectRef>
-          <a:fontRef idx="minor">
-            <a:schemeClr val="lt1"/>
-          </a:fontRef>
-        </p:style>
-        <p:txBody>
-          <a:bodyPr rtlCol="0" anchor="t" anchorCtr="0"/>
-          <a:lstStyle/>
-          <a:p>
-            <a:pPr algn="ctr"/>
-            <a:r>
-              <a:rPr lang="en-US" sz="1200" dirty="0">
-                <a:solidFill>
-                  <a:srgbClr val="002060"/>
-                </a:solidFill>
-                <a:latin typeface="Verdana" panose="020B0604030504040204" pitchFamily="34" charset="0"/>
-                <a:ea typeface="Verdana" panose="020B0604030504040204" pitchFamily="34" charset="0"/>
-              </a:rPr>
-              <a:t>Client Apps</a:t>
-            </a:r>
-            <a:endParaRPr lang="en-IN" sz="1200" dirty="0">
-              <a:solidFill>
-                <a:srgbClr val="002060"/>
-              </a:solidFill>
-              <a:latin typeface="Verdana" panose="020B0604030504040204" pitchFamily="34" charset="0"/>
-              <a:ea typeface="Verdana" panose="020B0604030504040204" pitchFamily="34" charset="0"/>
-            </a:endParaRPr>
-          </a:p>
-        </p:txBody>
-      </p:sp>
-      <p:sp>
-        <p:nvSpPr>
           <p:cNvPr id="11" name="Cylinder 10">
             <a:extLst>
               <a:ext uri="{FF2B5EF4-FFF2-40B4-BE49-F238E27FC236}">
@@ -5239,7 +5179,7 @@
         </p:nvGrpSpPr>
         <p:grpSpPr>
           <a:xfrm>
-            <a:off x="5797691" y="659031"/>
+            <a:off x="5797691" y="395078"/>
             <a:ext cx="1838771" cy="3240423"/>
             <a:chOff x="4863833" y="688216"/>
             <a:chExt cx="1838771" cy="3240423"/>
@@ -5298,7 +5238,7 @@
                   <a:latin typeface="Verdana" panose="020B0604030504040204" pitchFamily="34" charset="0"/>
                   <a:ea typeface="Verdana" panose="020B0604030504040204" pitchFamily="34" charset="0"/>
                 </a:rPr>
-                <a:t>API Gateways / BBF</a:t>
+                <a:t>API Gateways / BFF</a:t>
               </a:r>
               <a:endParaRPr lang="en-IN" sz="1200" dirty="0">
                 <a:solidFill>
@@ -5441,470 +5381,577 @@
           </p:txBody>
         </p:sp>
       </p:grpSp>
-      <p:sp>
-        <p:nvSpPr>
-          <p:cNvPr id="66" name="Rectangle 65">
-            <a:extLst>
-              <a:ext uri="{FF2B5EF4-FFF2-40B4-BE49-F238E27FC236}">
-                <a16:creationId xmlns:a16="http://schemas.microsoft.com/office/drawing/2014/main" id="{AD566606-C53C-4FC1-A923-3589748D9D4F}"/>
-              </a:ext>
-            </a:extLst>
-          </p:cNvPr>
-          <p:cNvSpPr/>
+      <p:grpSp>
+        <p:nvGrpSpPr>
+          <p:cNvPr id="7" name="Group 6">
+            <a:extLst>
+              <a:ext uri="{FF2B5EF4-FFF2-40B4-BE49-F238E27FC236}">
+                <a16:creationId xmlns:a16="http://schemas.microsoft.com/office/drawing/2014/main" id="{5596928F-27CA-41A9-B524-6E31188B6C52}"/>
+              </a:ext>
+            </a:extLst>
+          </p:cNvPr>
+          <p:cNvGrpSpPr/>
           <p:nvPr/>
-        </p:nvSpPr>
-        <p:spPr>
+        </p:nvGrpSpPr>
+        <p:grpSpPr>
           <a:xfrm>
-            <a:off x="3299854" y="5067453"/>
+            <a:off x="3299854" y="5359686"/>
             <a:ext cx="4334117" cy="1193032"/>
+            <a:chOff x="3299854" y="5067453"/>
+            <a:chExt cx="4334117" cy="1193032"/>
           </a:xfrm>
-          <a:prstGeom prst="rect">
-            <a:avLst/>
-          </a:prstGeom>
-          <a:solidFill>
-            <a:srgbClr val="D9F2FF"/>
-          </a:solidFill>
-        </p:spPr>
-        <p:style>
-          <a:lnRef idx="2">
-            <a:schemeClr val="accent1">
-              <a:shade val="50000"/>
-            </a:schemeClr>
-          </a:lnRef>
-          <a:fillRef idx="1">
-            <a:schemeClr val="accent1"/>
-          </a:fillRef>
-          <a:effectRef idx="0">
-            <a:schemeClr val="accent1"/>
-          </a:effectRef>
-          <a:fontRef idx="minor">
-            <a:schemeClr val="lt1"/>
-          </a:fontRef>
-        </p:style>
-        <p:txBody>
-          <a:bodyPr rtlCol="0" anchor="t" anchorCtr="0"/>
-          <a:lstStyle/>
-          <a:p>
-            <a:pPr algn="ctr"/>
-            <a:r>
-              <a:rPr lang="en-US" sz="1200" dirty="0">
+        </p:grpSpPr>
+        <p:sp>
+          <p:nvSpPr>
+            <p:cNvPr id="66" name="Rectangle 65">
+              <a:extLst>
+                <a:ext uri="{FF2B5EF4-FFF2-40B4-BE49-F238E27FC236}">
+                  <a16:creationId xmlns:a16="http://schemas.microsoft.com/office/drawing/2014/main" id="{AD566606-C53C-4FC1-A923-3589748D9D4F}"/>
+                </a:ext>
+              </a:extLst>
+            </p:cNvPr>
+            <p:cNvSpPr/>
+            <p:nvPr/>
+          </p:nvSpPr>
+          <p:spPr>
+            <a:xfrm>
+              <a:off x="3299854" y="5067453"/>
+              <a:ext cx="4334117" cy="1193032"/>
+            </a:xfrm>
+            <a:prstGeom prst="rect">
+              <a:avLst/>
+            </a:prstGeom>
+            <a:solidFill>
+              <a:srgbClr val="D9F2FF"/>
+            </a:solidFill>
+          </p:spPr>
+          <p:style>
+            <a:lnRef idx="2">
+              <a:schemeClr val="accent1">
+                <a:shade val="50000"/>
+              </a:schemeClr>
+            </a:lnRef>
+            <a:fillRef idx="1">
+              <a:schemeClr val="accent1"/>
+            </a:fillRef>
+            <a:effectRef idx="0">
+              <a:schemeClr val="accent1"/>
+            </a:effectRef>
+            <a:fontRef idx="minor">
+              <a:schemeClr val="lt1"/>
+            </a:fontRef>
+          </p:style>
+          <p:txBody>
+            <a:bodyPr rtlCol="0" anchor="t" anchorCtr="0"/>
+            <a:lstStyle/>
+            <a:p>
+              <a:pPr algn="ctr"/>
+              <a:r>
+                <a:rPr lang="en-US" sz="1200" dirty="0">
+                  <a:solidFill>
+                    <a:srgbClr val="002060"/>
+                  </a:solidFill>
+                  <a:latin typeface="Verdana" panose="020B0604030504040204" pitchFamily="34" charset="0"/>
+                  <a:ea typeface="Verdana" panose="020B0604030504040204" pitchFamily="34" charset="0"/>
+                </a:rPr>
+                <a:t>Admin Services</a:t>
+              </a:r>
+              <a:endParaRPr lang="en-IN" sz="1200" dirty="0">
                 <a:solidFill>
                   <a:srgbClr val="002060"/>
                 </a:solidFill>
                 <a:latin typeface="Verdana" panose="020B0604030504040204" pitchFamily="34" charset="0"/>
                 <a:ea typeface="Verdana" panose="020B0604030504040204" pitchFamily="34" charset="0"/>
-              </a:rPr>
-              <a:t>Admin Services</a:t>
-            </a:r>
-            <a:endParaRPr lang="en-IN" sz="1200" dirty="0">
-              <a:solidFill>
-                <a:srgbClr val="002060"/>
-              </a:solidFill>
-              <a:latin typeface="Verdana" panose="020B0604030504040204" pitchFamily="34" charset="0"/>
-              <a:ea typeface="Verdana" panose="020B0604030504040204" pitchFamily="34" charset="0"/>
-            </a:endParaRPr>
-          </a:p>
-        </p:txBody>
-      </p:sp>
-      <p:sp>
-        <p:nvSpPr>
-          <p:cNvPr id="37" name="Rectangle: Rounded Corners 36">
-            <a:extLst>
-              <a:ext uri="{FF2B5EF4-FFF2-40B4-BE49-F238E27FC236}">
-                <a16:creationId xmlns:a16="http://schemas.microsoft.com/office/drawing/2014/main" id="{E45EF9D9-D928-42AF-8A79-B4C3DBEB95E1}"/>
-              </a:ext>
-            </a:extLst>
-          </p:cNvPr>
-          <p:cNvSpPr/>
-          <p:nvPr/>
-        </p:nvSpPr>
-        <p:spPr>
-          <a:xfrm>
-            <a:off x="3379240" y="5663968"/>
-            <a:ext cx="1234936" cy="504665"/>
-          </a:xfrm>
-          <a:prstGeom prst="roundRect">
-            <a:avLst/>
-          </a:prstGeom>
-          <a:solidFill>
-            <a:srgbClr val="EFFAFF"/>
-          </a:solidFill>
-        </p:spPr>
-        <p:style>
-          <a:lnRef idx="2">
-            <a:schemeClr val="accent1">
-              <a:shade val="50000"/>
-            </a:schemeClr>
-          </a:lnRef>
-          <a:fillRef idx="1">
-            <a:schemeClr val="accent1"/>
-          </a:fillRef>
-          <a:effectRef idx="0">
-            <a:schemeClr val="accent1"/>
-          </a:effectRef>
-          <a:fontRef idx="minor">
-            <a:schemeClr val="lt1"/>
-          </a:fontRef>
-        </p:style>
-        <p:txBody>
-          <a:bodyPr rtlCol="0" anchor="ctr"/>
-          <a:lstStyle/>
-          <a:p>
-            <a:pPr algn="ctr"/>
-            <a:r>
-              <a:rPr lang="en-US" sz="1200" b="1" dirty="0">
+              </a:endParaRPr>
+            </a:p>
+          </p:txBody>
+        </p:sp>
+        <p:sp>
+          <p:nvSpPr>
+            <p:cNvPr id="37" name="Rectangle: Rounded Corners 36">
+              <a:extLst>
+                <a:ext uri="{FF2B5EF4-FFF2-40B4-BE49-F238E27FC236}">
+                  <a16:creationId xmlns:a16="http://schemas.microsoft.com/office/drawing/2014/main" id="{E45EF9D9-D928-42AF-8A79-B4C3DBEB95E1}"/>
+                </a:ext>
+              </a:extLst>
+            </p:cNvPr>
+            <p:cNvSpPr/>
+            <p:nvPr/>
+          </p:nvSpPr>
+          <p:spPr>
+            <a:xfrm>
+              <a:off x="3379240" y="5663968"/>
+              <a:ext cx="1234936" cy="504665"/>
+            </a:xfrm>
+            <a:prstGeom prst="roundRect">
+              <a:avLst/>
+            </a:prstGeom>
+            <a:solidFill>
+              <a:srgbClr val="EFFAFF"/>
+            </a:solidFill>
+          </p:spPr>
+          <p:style>
+            <a:lnRef idx="2">
+              <a:schemeClr val="accent1">
+                <a:shade val="50000"/>
+              </a:schemeClr>
+            </a:lnRef>
+            <a:fillRef idx="1">
+              <a:schemeClr val="accent1"/>
+            </a:fillRef>
+            <a:effectRef idx="0">
+              <a:schemeClr val="accent1"/>
+            </a:effectRef>
+            <a:fontRef idx="minor">
+              <a:schemeClr val="lt1"/>
+            </a:fontRef>
+          </p:style>
+          <p:txBody>
+            <a:bodyPr rtlCol="0" anchor="ctr"/>
+            <a:lstStyle/>
+            <a:p>
+              <a:pPr algn="ctr"/>
+              <a:r>
+                <a:rPr lang="en-US" sz="1200" b="1" dirty="0">
+                  <a:solidFill>
+                    <a:srgbClr val="002060"/>
+                  </a:solidFill>
+                </a:rPr>
+                <a:t>Health Check</a:t>
+              </a:r>
+              <a:endParaRPr lang="en-IN" sz="1200" b="1" dirty="0">
                 <a:solidFill>
                   <a:srgbClr val="002060"/>
                 </a:solidFill>
-              </a:rPr>
-              <a:t>Health Check</a:t>
-            </a:r>
-            <a:endParaRPr lang="en-IN" sz="1200" b="1" dirty="0">
-              <a:solidFill>
-                <a:srgbClr val="002060"/>
-              </a:solidFill>
-            </a:endParaRPr>
-          </a:p>
-        </p:txBody>
-      </p:sp>
-      <p:sp>
-        <p:nvSpPr>
-          <p:cNvPr id="69" name="Rectangle: Rounded Corners 68">
-            <a:extLst>
-              <a:ext uri="{FF2B5EF4-FFF2-40B4-BE49-F238E27FC236}">
-                <a16:creationId xmlns:a16="http://schemas.microsoft.com/office/drawing/2014/main" id="{B0EDFA10-D167-4497-A206-2282E8F110AE}"/>
-              </a:ext>
-            </a:extLst>
-          </p:cNvPr>
-          <p:cNvSpPr/>
-          <p:nvPr/>
-        </p:nvSpPr>
-        <p:spPr>
-          <a:xfrm>
-            <a:off x="4870568" y="5663968"/>
-            <a:ext cx="1234936" cy="504665"/>
-          </a:xfrm>
-          <a:prstGeom prst="roundRect">
-            <a:avLst/>
-          </a:prstGeom>
-          <a:solidFill>
-            <a:srgbClr val="EFFAFF"/>
-          </a:solidFill>
-        </p:spPr>
-        <p:style>
-          <a:lnRef idx="2">
-            <a:schemeClr val="accent1">
-              <a:shade val="50000"/>
-            </a:schemeClr>
-          </a:lnRef>
-          <a:fillRef idx="1">
-            <a:schemeClr val="accent1"/>
-          </a:fillRef>
-          <a:effectRef idx="0">
-            <a:schemeClr val="accent1"/>
-          </a:effectRef>
-          <a:fontRef idx="minor">
-            <a:schemeClr val="lt1"/>
-          </a:fontRef>
-        </p:style>
-        <p:txBody>
-          <a:bodyPr rtlCol="0" anchor="ctr"/>
-          <a:lstStyle/>
-          <a:p>
-            <a:pPr algn="ctr"/>
-            <a:r>
-              <a:rPr lang="en-US" sz="1200" b="1" dirty="0">
+              </a:endParaRPr>
+            </a:p>
+          </p:txBody>
+        </p:sp>
+        <p:sp>
+          <p:nvSpPr>
+            <p:cNvPr id="69" name="Rectangle: Rounded Corners 68">
+              <a:extLst>
+                <a:ext uri="{FF2B5EF4-FFF2-40B4-BE49-F238E27FC236}">
+                  <a16:creationId xmlns:a16="http://schemas.microsoft.com/office/drawing/2014/main" id="{B0EDFA10-D167-4497-A206-2282E8F110AE}"/>
+                </a:ext>
+              </a:extLst>
+            </p:cNvPr>
+            <p:cNvSpPr/>
+            <p:nvPr/>
+          </p:nvSpPr>
+          <p:spPr>
+            <a:xfrm>
+              <a:off x="4870568" y="5663968"/>
+              <a:ext cx="1234936" cy="504665"/>
+            </a:xfrm>
+            <a:prstGeom prst="roundRect">
+              <a:avLst/>
+            </a:prstGeom>
+            <a:solidFill>
+              <a:srgbClr val="EFFAFF"/>
+            </a:solidFill>
+          </p:spPr>
+          <p:style>
+            <a:lnRef idx="2">
+              <a:schemeClr val="accent1">
+                <a:shade val="50000"/>
+              </a:schemeClr>
+            </a:lnRef>
+            <a:fillRef idx="1">
+              <a:schemeClr val="accent1"/>
+            </a:fillRef>
+            <a:effectRef idx="0">
+              <a:schemeClr val="accent1"/>
+            </a:effectRef>
+            <a:fontRef idx="minor">
+              <a:schemeClr val="lt1"/>
+            </a:fontRef>
+          </p:style>
+          <p:txBody>
+            <a:bodyPr rtlCol="0" anchor="ctr"/>
+            <a:lstStyle/>
+            <a:p>
+              <a:pPr algn="ctr"/>
+              <a:r>
+                <a:rPr lang="en-US" sz="1200" b="1" dirty="0">
+                  <a:solidFill>
+                    <a:srgbClr val="002060"/>
+                  </a:solidFill>
+                </a:rPr>
+                <a:t>Webhooks</a:t>
+              </a:r>
+              <a:endParaRPr lang="en-IN" sz="1200" b="1" dirty="0">
                 <a:solidFill>
                   <a:srgbClr val="002060"/>
                 </a:solidFill>
-              </a:rPr>
-              <a:t>Webhooks</a:t>
-            </a:r>
-            <a:endParaRPr lang="en-IN" sz="1200" b="1" dirty="0">
-              <a:solidFill>
-                <a:srgbClr val="002060"/>
-              </a:solidFill>
-            </a:endParaRPr>
-          </a:p>
-        </p:txBody>
-      </p:sp>
-      <p:sp>
-        <p:nvSpPr>
-          <p:cNvPr id="70" name="Rectangle: Rounded Corners 69">
-            <a:extLst>
-              <a:ext uri="{FF2B5EF4-FFF2-40B4-BE49-F238E27FC236}">
-                <a16:creationId xmlns:a16="http://schemas.microsoft.com/office/drawing/2014/main" id="{A074D1DD-3FE8-438B-88C5-DC151937405C}"/>
-              </a:ext>
-            </a:extLst>
-          </p:cNvPr>
-          <p:cNvSpPr/>
-          <p:nvPr/>
-        </p:nvSpPr>
-        <p:spPr>
-          <a:xfrm>
-            <a:off x="6294393" y="5643621"/>
-            <a:ext cx="1234936" cy="504665"/>
-          </a:xfrm>
-          <a:prstGeom prst="roundRect">
-            <a:avLst/>
-          </a:prstGeom>
-          <a:solidFill>
-            <a:srgbClr val="EFFAFF"/>
-          </a:solidFill>
-        </p:spPr>
-        <p:style>
-          <a:lnRef idx="2">
-            <a:schemeClr val="accent1">
-              <a:shade val="50000"/>
-            </a:schemeClr>
-          </a:lnRef>
-          <a:fillRef idx="1">
-            <a:schemeClr val="accent1"/>
-          </a:fillRef>
-          <a:effectRef idx="0">
-            <a:schemeClr val="accent1"/>
-          </a:effectRef>
-          <a:fontRef idx="minor">
-            <a:schemeClr val="lt1"/>
-          </a:fontRef>
-        </p:style>
-        <p:txBody>
-          <a:bodyPr rtlCol="0" anchor="ctr"/>
-          <a:lstStyle/>
-          <a:p>
-            <a:pPr algn="ctr"/>
-            <a:r>
-              <a:rPr lang="en-US" sz="1200" b="1" dirty="0">
+              </a:endParaRPr>
+            </a:p>
+          </p:txBody>
+        </p:sp>
+        <p:sp>
+          <p:nvSpPr>
+            <p:cNvPr id="70" name="Rectangle: Rounded Corners 69">
+              <a:extLst>
+                <a:ext uri="{FF2B5EF4-FFF2-40B4-BE49-F238E27FC236}">
+                  <a16:creationId xmlns:a16="http://schemas.microsoft.com/office/drawing/2014/main" id="{A074D1DD-3FE8-438B-88C5-DC151937405C}"/>
+                </a:ext>
+              </a:extLst>
+            </p:cNvPr>
+            <p:cNvSpPr/>
+            <p:nvPr/>
+          </p:nvSpPr>
+          <p:spPr>
+            <a:xfrm>
+              <a:off x="6294393" y="5643621"/>
+              <a:ext cx="1234936" cy="504665"/>
+            </a:xfrm>
+            <a:prstGeom prst="roundRect">
+              <a:avLst/>
+            </a:prstGeom>
+            <a:solidFill>
+              <a:srgbClr val="EFFAFF"/>
+            </a:solidFill>
+          </p:spPr>
+          <p:style>
+            <a:lnRef idx="2">
+              <a:schemeClr val="accent1">
+                <a:shade val="50000"/>
+              </a:schemeClr>
+            </a:lnRef>
+            <a:fillRef idx="1">
+              <a:schemeClr val="accent1"/>
+            </a:fillRef>
+            <a:effectRef idx="0">
+              <a:schemeClr val="accent1"/>
+            </a:effectRef>
+            <a:fontRef idx="minor">
+              <a:schemeClr val="lt1"/>
+            </a:fontRef>
+          </p:style>
+          <p:txBody>
+            <a:bodyPr rtlCol="0" anchor="ctr"/>
+            <a:lstStyle/>
+            <a:p>
+              <a:pPr algn="ctr"/>
+              <a:r>
+                <a:rPr lang="en-US" sz="1200" b="1" dirty="0">
+                  <a:solidFill>
+                    <a:srgbClr val="002060"/>
+                  </a:solidFill>
+                </a:rPr>
+                <a:t>Alerts / Monitoring</a:t>
+              </a:r>
+              <a:endParaRPr lang="en-IN" sz="1200" b="1" dirty="0">
                 <a:solidFill>
                   <a:srgbClr val="002060"/>
                 </a:solidFill>
-              </a:rPr>
-              <a:t>Alerts / Monitoring</a:t>
-            </a:r>
-            <a:endParaRPr lang="en-IN" sz="1200" b="1" dirty="0">
-              <a:solidFill>
-                <a:srgbClr val="002060"/>
-              </a:solidFill>
-            </a:endParaRPr>
-          </a:p>
-        </p:txBody>
-      </p:sp>
-      <p:sp>
-        <p:nvSpPr>
-          <p:cNvPr id="71" name="Rectangle: Rounded Corners 70">
-            <a:extLst>
-              <a:ext uri="{FF2B5EF4-FFF2-40B4-BE49-F238E27FC236}">
-                <a16:creationId xmlns:a16="http://schemas.microsoft.com/office/drawing/2014/main" id="{65492792-062B-42D9-AAD9-D351DD94A3FE}"/>
-              </a:ext>
-            </a:extLst>
-          </p:cNvPr>
-          <p:cNvSpPr/>
+              </a:endParaRPr>
+            </a:p>
+          </p:txBody>
+        </p:sp>
+      </p:grpSp>
+      <p:grpSp>
+        <p:nvGrpSpPr>
+          <p:cNvPr id="2" name="Group 1">
+            <a:extLst>
+              <a:ext uri="{FF2B5EF4-FFF2-40B4-BE49-F238E27FC236}">
+                <a16:creationId xmlns:a16="http://schemas.microsoft.com/office/drawing/2014/main" id="{A426053A-9D45-4D0C-BAB3-75C54A73D477}"/>
+              </a:ext>
+            </a:extLst>
+          </p:cNvPr>
+          <p:cNvGrpSpPr/>
           <p:nvPr/>
-        </p:nvSpPr>
-        <p:spPr>
+        </p:nvGrpSpPr>
+        <p:grpSpPr>
           <a:xfrm>
-            <a:off x="3561294" y="1146872"/>
-            <a:ext cx="1234936" cy="504665"/>
+            <a:off x="3310837" y="395986"/>
+            <a:ext cx="1748242" cy="3211237"/>
+            <a:chOff x="3310837" y="707071"/>
+            <a:chExt cx="1748242" cy="3211237"/>
           </a:xfrm>
-          <a:prstGeom prst="roundRect">
-            <a:avLst/>
-          </a:prstGeom>
-          <a:solidFill>
-            <a:srgbClr val="FFFAEB"/>
-          </a:solidFill>
-        </p:spPr>
-        <p:style>
-          <a:lnRef idx="2">
-            <a:schemeClr val="accent1">
-              <a:shade val="50000"/>
-            </a:schemeClr>
-          </a:lnRef>
-          <a:fillRef idx="1">
-            <a:schemeClr val="accent1"/>
-          </a:fillRef>
-          <a:effectRef idx="0">
-            <a:schemeClr val="accent1"/>
-          </a:effectRef>
-          <a:fontRef idx="minor">
-            <a:schemeClr val="lt1"/>
-          </a:fontRef>
-        </p:style>
-        <p:txBody>
-          <a:bodyPr rtlCol="0" anchor="ctr"/>
-          <a:lstStyle/>
-          <a:p>
-            <a:pPr algn="ctr"/>
-            <a:r>
-              <a:rPr lang="en-US" sz="1200" b="1" dirty="0">
+        </p:grpSpPr>
+        <p:sp>
+          <p:nvSpPr>
+            <p:cNvPr id="6" name="Rectangle 5">
+              <a:extLst>
+                <a:ext uri="{FF2B5EF4-FFF2-40B4-BE49-F238E27FC236}">
+                  <a16:creationId xmlns:a16="http://schemas.microsoft.com/office/drawing/2014/main" id="{E681EEBF-DED0-49C3-82BA-C359A5D505B5}"/>
+                </a:ext>
+              </a:extLst>
+            </p:cNvPr>
+            <p:cNvSpPr/>
+            <p:nvPr/>
+          </p:nvSpPr>
+          <p:spPr>
+            <a:xfrm>
+              <a:off x="3310837" y="707071"/>
+              <a:ext cx="1748242" cy="3211237"/>
+            </a:xfrm>
+            <a:prstGeom prst="rect">
+              <a:avLst/>
+            </a:prstGeom>
+            <a:solidFill>
+              <a:srgbClr val="FFF6D9"/>
+            </a:solidFill>
+          </p:spPr>
+          <p:style>
+            <a:lnRef idx="2">
+              <a:schemeClr val="accent1">
+                <a:shade val="50000"/>
+              </a:schemeClr>
+            </a:lnRef>
+            <a:fillRef idx="1">
+              <a:schemeClr val="accent1"/>
+            </a:fillRef>
+            <a:effectRef idx="0">
+              <a:schemeClr val="accent1"/>
+            </a:effectRef>
+            <a:fontRef idx="minor">
+              <a:schemeClr val="lt1"/>
+            </a:fontRef>
+          </p:style>
+          <p:txBody>
+            <a:bodyPr rtlCol="0" anchor="t" anchorCtr="0"/>
+            <a:lstStyle/>
+            <a:p>
+              <a:pPr algn="ctr"/>
+              <a:r>
+                <a:rPr lang="en-US" sz="1200" dirty="0">
+                  <a:solidFill>
+                    <a:srgbClr val="002060"/>
+                  </a:solidFill>
+                  <a:latin typeface="Verdana" panose="020B0604030504040204" pitchFamily="34" charset="0"/>
+                  <a:ea typeface="Verdana" panose="020B0604030504040204" pitchFamily="34" charset="0"/>
+                </a:rPr>
+                <a:t>Client Apps</a:t>
+              </a:r>
+              <a:endParaRPr lang="en-IN" sz="1200" dirty="0">
                 <a:solidFill>
                   <a:srgbClr val="002060"/>
                 </a:solidFill>
-              </a:rPr>
-              <a:t>Mobile</a:t>
-            </a:r>
-            <a:endParaRPr lang="en-IN" sz="1200" b="1" dirty="0">
-              <a:solidFill>
-                <a:srgbClr val="002060"/>
-              </a:solidFill>
-            </a:endParaRPr>
-          </a:p>
-        </p:txBody>
-      </p:sp>
-      <p:sp>
-        <p:nvSpPr>
-          <p:cNvPr id="72" name="Rectangle: Rounded Corners 71">
-            <a:extLst>
-              <a:ext uri="{FF2B5EF4-FFF2-40B4-BE49-F238E27FC236}">
-                <a16:creationId xmlns:a16="http://schemas.microsoft.com/office/drawing/2014/main" id="{B3AB54A0-7094-41F3-9079-07C5826687CA}"/>
-              </a:ext>
-            </a:extLst>
-          </p:cNvPr>
-          <p:cNvSpPr/>
-          <p:nvPr/>
-        </p:nvSpPr>
-        <p:spPr>
-          <a:xfrm>
-            <a:off x="3561294" y="1945403"/>
-            <a:ext cx="1234936" cy="504665"/>
-          </a:xfrm>
-          <a:prstGeom prst="roundRect">
-            <a:avLst/>
-          </a:prstGeom>
-          <a:solidFill>
-            <a:srgbClr val="FFFAEB"/>
-          </a:solidFill>
-        </p:spPr>
-        <p:style>
-          <a:lnRef idx="2">
-            <a:schemeClr val="accent1">
-              <a:shade val="50000"/>
-            </a:schemeClr>
-          </a:lnRef>
-          <a:fillRef idx="1">
-            <a:schemeClr val="accent1"/>
-          </a:fillRef>
-          <a:effectRef idx="0">
-            <a:schemeClr val="accent1"/>
-          </a:effectRef>
-          <a:fontRef idx="minor">
-            <a:schemeClr val="lt1"/>
-          </a:fontRef>
-        </p:style>
-        <p:txBody>
-          <a:bodyPr rtlCol="0" anchor="ctr"/>
-          <a:lstStyle/>
-          <a:p>
-            <a:pPr algn="ctr"/>
-            <a:r>
-              <a:rPr lang="en-US" sz="1200" b="1" dirty="0">
+                <a:latin typeface="Verdana" panose="020B0604030504040204" pitchFamily="34" charset="0"/>
+                <a:ea typeface="Verdana" panose="020B0604030504040204" pitchFamily="34" charset="0"/>
+              </a:endParaRPr>
+            </a:p>
+          </p:txBody>
+        </p:sp>
+        <p:sp>
+          <p:nvSpPr>
+            <p:cNvPr id="71" name="Rectangle: Rounded Corners 70">
+              <a:extLst>
+                <a:ext uri="{FF2B5EF4-FFF2-40B4-BE49-F238E27FC236}">
+                  <a16:creationId xmlns:a16="http://schemas.microsoft.com/office/drawing/2014/main" id="{65492792-062B-42D9-AAD9-D351DD94A3FE}"/>
+                </a:ext>
+              </a:extLst>
+            </p:cNvPr>
+            <p:cNvSpPr/>
+            <p:nvPr/>
+          </p:nvSpPr>
+          <p:spPr>
+            <a:xfrm>
+              <a:off x="3561294" y="1146872"/>
+              <a:ext cx="1234936" cy="504665"/>
+            </a:xfrm>
+            <a:prstGeom prst="roundRect">
+              <a:avLst/>
+            </a:prstGeom>
+            <a:solidFill>
+              <a:srgbClr val="FFFAEB"/>
+            </a:solidFill>
+          </p:spPr>
+          <p:style>
+            <a:lnRef idx="2">
+              <a:schemeClr val="accent1">
+                <a:shade val="50000"/>
+              </a:schemeClr>
+            </a:lnRef>
+            <a:fillRef idx="1">
+              <a:schemeClr val="accent1"/>
+            </a:fillRef>
+            <a:effectRef idx="0">
+              <a:schemeClr val="accent1"/>
+            </a:effectRef>
+            <a:fontRef idx="minor">
+              <a:schemeClr val="lt1"/>
+            </a:fontRef>
+          </p:style>
+          <p:txBody>
+            <a:bodyPr rtlCol="0" anchor="ctr"/>
+            <a:lstStyle/>
+            <a:p>
+              <a:pPr algn="ctr"/>
+              <a:r>
+                <a:rPr lang="en-US" sz="1200" b="1" dirty="0">
+                  <a:solidFill>
+                    <a:srgbClr val="002060"/>
+                  </a:solidFill>
+                </a:rPr>
+                <a:t>Mobile</a:t>
+              </a:r>
+              <a:endParaRPr lang="en-IN" sz="1200" b="1" dirty="0">
                 <a:solidFill>
                   <a:srgbClr val="002060"/>
                 </a:solidFill>
-              </a:rPr>
-              <a:t>MVC / Razor / Blazor Server</a:t>
-            </a:r>
-            <a:endParaRPr lang="en-IN" sz="1200" b="1" dirty="0">
-              <a:solidFill>
-                <a:srgbClr val="002060"/>
-              </a:solidFill>
-            </a:endParaRPr>
-          </a:p>
-        </p:txBody>
-      </p:sp>
-      <p:sp>
-        <p:nvSpPr>
-          <p:cNvPr id="73" name="Rectangle: Rounded Corners 72">
-            <a:extLst>
-              <a:ext uri="{FF2B5EF4-FFF2-40B4-BE49-F238E27FC236}">
-                <a16:creationId xmlns:a16="http://schemas.microsoft.com/office/drawing/2014/main" id="{1ACB994B-1530-426B-8A1A-F7414FFFC74C}"/>
-              </a:ext>
-            </a:extLst>
-          </p:cNvPr>
-          <p:cNvSpPr/>
-          <p:nvPr/>
-        </p:nvSpPr>
-        <p:spPr>
-          <a:xfrm>
-            <a:off x="3561294" y="2785306"/>
-            <a:ext cx="1234936" cy="736107"/>
-          </a:xfrm>
-          <a:prstGeom prst="roundRect">
-            <a:avLst/>
-          </a:prstGeom>
-          <a:solidFill>
-            <a:srgbClr val="FFFAEB"/>
-          </a:solidFill>
-        </p:spPr>
-        <p:style>
-          <a:lnRef idx="2">
-            <a:schemeClr val="accent1">
-              <a:shade val="50000"/>
-            </a:schemeClr>
-          </a:lnRef>
-          <a:fillRef idx="1">
-            <a:schemeClr val="accent1"/>
-          </a:fillRef>
-          <a:effectRef idx="0">
-            <a:schemeClr val="accent1"/>
-          </a:effectRef>
-          <a:fontRef idx="minor">
-            <a:schemeClr val="lt1"/>
-          </a:fontRef>
-        </p:style>
-        <p:txBody>
-          <a:bodyPr rtlCol="0" anchor="ctr"/>
-          <a:lstStyle/>
-          <a:p>
-            <a:pPr algn="ctr"/>
-            <a:r>
-              <a:rPr lang="en-US" sz="1200" b="1" dirty="0">
+              </a:endParaRPr>
+            </a:p>
+          </p:txBody>
+        </p:sp>
+        <p:sp>
+          <p:nvSpPr>
+            <p:cNvPr id="72" name="Rectangle: Rounded Corners 71">
+              <a:extLst>
+                <a:ext uri="{FF2B5EF4-FFF2-40B4-BE49-F238E27FC236}">
+                  <a16:creationId xmlns:a16="http://schemas.microsoft.com/office/drawing/2014/main" id="{B3AB54A0-7094-41F3-9079-07C5826687CA}"/>
+                </a:ext>
+              </a:extLst>
+            </p:cNvPr>
+            <p:cNvSpPr/>
+            <p:nvPr/>
+          </p:nvSpPr>
+          <p:spPr>
+            <a:xfrm>
+              <a:off x="3561294" y="1945403"/>
+              <a:ext cx="1234936" cy="504665"/>
+            </a:xfrm>
+            <a:prstGeom prst="roundRect">
+              <a:avLst/>
+            </a:prstGeom>
+            <a:solidFill>
+              <a:srgbClr val="FFFAEB"/>
+            </a:solidFill>
+          </p:spPr>
+          <p:style>
+            <a:lnRef idx="2">
+              <a:schemeClr val="accent1">
+                <a:shade val="50000"/>
+              </a:schemeClr>
+            </a:lnRef>
+            <a:fillRef idx="1">
+              <a:schemeClr val="accent1"/>
+            </a:fillRef>
+            <a:effectRef idx="0">
+              <a:schemeClr val="accent1"/>
+            </a:effectRef>
+            <a:fontRef idx="minor">
+              <a:schemeClr val="lt1"/>
+            </a:fontRef>
+          </p:style>
+          <p:txBody>
+            <a:bodyPr rtlCol="0" anchor="ctr"/>
+            <a:lstStyle/>
+            <a:p>
+              <a:pPr algn="ctr"/>
+              <a:r>
+                <a:rPr lang="en-US" sz="1200" b="1" dirty="0">
+                  <a:solidFill>
+                    <a:srgbClr val="002060"/>
+                  </a:solidFill>
+                </a:rPr>
+                <a:t>MVC / Razor / Blazor Server</a:t>
+              </a:r>
+              <a:endParaRPr lang="en-IN" sz="1200" b="1" dirty="0">
                 <a:solidFill>
                   <a:srgbClr val="002060"/>
                 </a:solidFill>
-              </a:rPr>
-              <a:t>Blazor WASM</a:t>
-            </a:r>
-          </a:p>
-          <a:p>
-            <a:pPr algn="ctr"/>
-            <a:r>
-              <a:rPr lang="en-US" sz="1200" b="1" dirty="0">
+              </a:endParaRPr>
+            </a:p>
+          </p:txBody>
+        </p:sp>
+        <p:sp>
+          <p:nvSpPr>
+            <p:cNvPr id="73" name="Rectangle: Rounded Corners 72">
+              <a:extLst>
+                <a:ext uri="{FF2B5EF4-FFF2-40B4-BE49-F238E27FC236}">
+                  <a16:creationId xmlns:a16="http://schemas.microsoft.com/office/drawing/2014/main" id="{1ACB994B-1530-426B-8A1A-F7414FFFC74C}"/>
+                </a:ext>
+              </a:extLst>
+            </p:cNvPr>
+            <p:cNvSpPr/>
+            <p:nvPr/>
+          </p:nvSpPr>
+          <p:spPr>
+            <a:xfrm>
+              <a:off x="3561294" y="2785306"/>
+              <a:ext cx="1234936" cy="736107"/>
+            </a:xfrm>
+            <a:prstGeom prst="roundRect">
+              <a:avLst/>
+            </a:prstGeom>
+            <a:solidFill>
+              <a:srgbClr val="FFFAEB"/>
+            </a:solidFill>
+          </p:spPr>
+          <p:style>
+            <a:lnRef idx="2">
+              <a:schemeClr val="accent1">
+                <a:shade val="50000"/>
+              </a:schemeClr>
+            </a:lnRef>
+            <a:fillRef idx="1">
+              <a:schemeClr val="accent1"/>
+            </a:fillRef>
+            <a:effectRef idx="0">
+              <a:schemeClr val="accent1"/>
+            </a:effectRef>
+            <a:fontRef idx="minor">
+              <a:schemeClr val="lt1"/>
+            </a:fontRef>
+          </p:style>
+          <p:txBody>
+            <a:bodyPr rtlCol="0" anchor="ctr"/>
+            <a:lstStyle/>
+            <a:p>
+              <a:pPr algn="ctr"/>
+              <a:r>
+                <a:rPr lang="en-US" sz="1200" b="1" dirty="0">
+                  <a:solidFill>
+                    <a:srgbClr val="002060"/>
+                  </a:solidFill>
+                </a:rPr>
+                <a:t>Blazor WASM</a:t>
+              </a:r>
+            </a:p>
+            <a:p>
+              <a:pPr algn="ctr"/>
+              <a:r>
+                <a:rPr lang="en-US" sz="1200" b="1" dirty="0">
+                  <a:solidFill>
+                    <a:srgbClr val="002060"/>
+                  </a:solidFill>
+                </a:rPr>
+                <a:t>Angular</a:t>
+              </a:r>
+            </a:p>
+            <a:p>
+              <a:pPr algn="ctr"/>
+              <a:r>
+                <a:rPr lang="en-US" sz="1200" b="1" dirty="0">
+                  <a:solidFill>
+                    <a:srgbClr val="002060"/>
+                  </a:solidFill>
+                </a:rPr>
+                <a:t>ReactJS</a:t>
+              </a:r>
+            </a:p>
+            <a:p>
+              <a:pPr algn="ctr"/>
+              <a:r>
+                <a:rPr lang="en-US" sz="1200" b="1" dirty="0">
+                  <a:solidFill>
+                    <a:srgbClr val="002060"/>
+                  </a:solidFill>
+                </a:rPr>
+                <a:t>Vue JS</a:t>
+              </a:r>
+              <a:endParaRPr lang="en-IN" sz="1200" b="1" dirty="0">
                 <a:solidFill>
                   <a:srgbClr val="002060"/>
                 </a:solidFill>
-              </a:rPr>
-              <a:t>Angular</a:t>
-            </a:r>
-          </a:p>
-          <a:p>
-            <a:pPr algn="ctr"/>
-            <a:r>
-              <a:rPr lang="en-US" sz="1200" b="1" dirty="0">
-                <a:solidFill>
-                  <a:srgbClr val="002060"/>
-                </a:solidFill>
-              </a:rPr>
-              <a:t>ReactJS</a:t>
-            </a:r>
-          </a:p>
-          <a:p>
-            <a:pPr algn="ctr"/>
-            <a:r>
-              <a:rPr lang="en-US" sz="1200" b="1" dirty="0">
-                <a:solidFill>
-                  <a:srgbClr val="002060"/>
-                </a:solidFill>
-              </a:rPr>
-              <a:t>Vue JS</a:t>
-            </a:r>
-            <a:endParaRPr lang="en-IN" sz="1200" b="1" dirty="0">
-              <a:solidFill>
-                <a:srgbClr val="002060"/>
-              </a:solidFill>
-            </a:endParaRPr>
-          </a:p>
-        </p:txBody>
-      </p:sp>
+              </a:endParaRPr>
+            </a:p>
+          </p:txBody>
+        </p:sp>
+      </p:grpSp>
     </p:spTree>
     <p:extLst>
       <p:ext uri="{BB962C8B-B14F-4D97-AF65-F5344CB8AC3E}">

</xml_diff>

<commit_message>
Swamy/15may2022 architecturediagram other updates (#22)
* Architecture Diagram Updates

* Update OverAllArchitecture.PNG

* Few Changes
</commit_message>
<xml_diff>
--- a/Documentation/Architecture.pptx
+++ b/Documentation/Architecture.pptx
@@ -6,6 +6,8 @@
   </p:sldMasterIdLst>
   <p:sldIdLst>
     <p:sldId id="333" r:id="rId2"/>
+    <p:sldId id="334" r:id="rId3"/>
+    <p:sldId id="335" r:id="rId4"/>
   </p:sldIdLst>
   <p:sldSz cx="12192000" cy="6858000"/>
   <p:notesSz cx="6858000" cy="9144000"/>
@@ -261,7 +263,7 @@
           <a:p>
             <a:fld id="{DC2BF6E6-F863-479F-A057-0F7FF047E296}" type="datetimeFigureOut">
               <a:rPr lang="en-IN" smtClean="0"/>
-              <a:t>09-04-2022</a:t>
+              <a:t>29-06-2022</a:t>
             </a:fld>
             <a:endParaRPr lang="en-IN"/>
           </a:p>
@@ -461,7 +463,7 @@
           <a:p>
             <a:fld id="{DC2BF6E6-F863-479F-A057-0F7FF047E296}" type="datetimeFigureOut">
               <a:rPr lang="en-IN" smtClean="0"/>
-              <a:t>09-04-2022</a:t>
+              <a:t>29-06-2022</a:t>
             </a:fld>
             <a:endParaRPr lang="en-IN"/>
           </a:p>
@@ -671,7 +673,7 @@
           <a:p>
             <a:fld id="{DC2BF6E6-F863-479F-A057-0F7FF047E296}" type="datetimeFigureOut">
               <a:rPr lang="en-IN" smtClean="0"/>
-              <a:t>09-04-2022</a:t>
+              <a:t>29-06-2022</a:t>
             </a:fld>
             <a:endParaRPr lang="en-IN"/>
           </a:p>
@@ -871,7 +873,7 @@
           <a:p>
             <a:fld id="{DC2BF6E6-F863-479F-A057-0F7FF047E296}" type="datetimeFigureOut">
               <a:rPr lang="en-IN" smtClean="0"/>
-              <a:t>09-04-2022</a:t>
+              <a:t>29-06-2022</a:t>
             </a:fld>
             <a:endParaRPr lang="en-IN"/>
           </a:p>
@@ -1147,7 +1149,7 @@
           <a:p>
             <a:fld id="{DC2BF6E6-F863-479F-A057-0F7FF047E296}" type="datetimeFigureOut">
               <a:rPr lang="en-IN" smtClean="0"/>
-              <a:t>09-04-2022</a:t>
+              <a:t>29-06-2022</a:t>
             </a:fld>
             <a:endParaRPr lang="en-IN"/>
           </a:p>
@@ -1415,7 +1417,7 @@
           <a:p>
             <a:fld id="{DC2BF6E6-F863-479F-A057-0F7FF047E296}" type="datetimeFigureOut">
               <a:rPr lang="en-IN" smtClean="0"/>
-              <a:t>09-04-2022</a:t>
+              <a:t>29-06-2022</a:t>
             </a:fld>
             <a:endParaRPr lang="en-IN"/>
           </a:p>
@@ -1830,7 +1832,7 @@
           <a:p>
             <a:fld id="{DC2BF6E6-F863-479F-A057-0F7FF047E296}" type="datetimeFigureOut">
               <a:rPr lang="en-IN" smtClean="0"/>
-              <a:t>09-04-2022</a:t>
+              <a:t>29-06-2022</a:t>
             </a:fld>
             <a:endParaRPr lang="en-IN"/>
           </a:p>
@@ -1972,7 +1974,7 @@
           <a:p>
             <a:fld id="{DC2BF6E6-F863-479F-A057-0F7FF047E296}" type="datetimeFigureOut">
               <a:rPr lang="en-IN" smtClean="0"/>
-              <a:t>09-04-2022</a:t>
+              <a:t>29-06-2022</a:t>
             </a:fld>
             <a:endParaRPr lang="en-IN"/>
           </a:p>
@@ -2085,7 +2087,7 @@
           <a:p>
             <a:fld id="{DC2BF6E6-F863-479F-A057-0F7FF047E296}" type="datetimeFigureOut">
               <a:rPr lang="en-IN" smtClean="0"/>
-              <a:t>09-04-2022</a:t>
+              <a:t>29-06-2022</a:t>
             </a:fld>
             <a:endParaRPr lang="en-IN"/>
           </a:p>
@@ -2398,7 +2400,7 @@
           <a:p>
             <a:fld id="{DC2BF6E6-F863-479F-A057-0F7FF047E296}" type="datetimeFigureOut">
               <a:rPr lang="en-IN" smtClean="0"/>
-              <a:t>09-04-2022</a:t>
+              <a:t>29-06-2022</a:t>
             </a:fld>
             <a:endParaRPr lang="en-IN"/>
           </a:p>
@@ -2687,7 +2689,7 @@
           <a:p>
             <a:fld id="{DC2BF6E6-F863-479F-A057-0F7FF047E296}" type="datetimeFigureOut">
               <a:rPr lang="en-IN" smtClean="0"/>
-              <a:t>09-04-2022</a:t>
+              <a:t>29-06-2022</a:t>
             </a:fld>
             <a:endParaRPr lang="en-IN"/>
           </a:p>
@@ -2930,7 +2932,7 @@
           <a:p>
             <a:fld id="{DC2BF6E6-F863-479F-A057-0F7FF047E296}" type="datetimeFigureOut">
               <a:rPr lang="en-IN" smtClean="0"/>
-              <a:t>09-04-2022</a:t>
+              <a:t>29-06-2022</a:t>
             </a:fld>
             <a:endParaRPr lang="en-IN"/>
           </a:p>
@@ -3697,305 +3699,6 @@
       </p:pic>
       <p:grpSp>
         <p:nvGrpSpPr>
-          <p:cNvPr id="21" name="Group 20">
-            <a:extLst>
-              <a:ext uri="{FF2B5EF4-FFF2-40B4-BE49-F238E27FC236}">
-                <a16:creationId xmlns:a16="http://schemas.microsoft.com/office/drawing/2014/main" id="{DB5415C4-01F6-402B-9A1D-E275DCDDDE43}"/>
-              </a:ext>
-            </a:extLst>
-          </p:cNvPr>
-          <p:cNvGrpSpPr>
-            <a:grpSpLocks noChangeAspect="1"/>
-          </p:cNvGrpSpPr>
-          <p:nvPr/>
-        </p:nvGrpSpPr>
-        <p:grpSpPr>
-          <a:xfrm>
-            <a:off x="7975694" y="5936421"/>
-            <a:ext cx="1969193" cy="619491"/>
-            <a:chOff x="7928042" y="5716128"/>
-            <a:chExt cx="1969193" cy="619491"/>
-          </a:xfrm>
-        </p:grpSpPr>
-        <p:grpSp>
-          <p:nvGrpSpPr>
-            <p:cNvPr id="10" name="Group 9">
-              <a:extLst>
-                <a:ext uri="{FF2B5EF4-FFF2-40B4-BE49-F238E27FC236}">
-                  <a16:creationId xmlns:a16="http://schemas.microsoft.com/office/drawing/2014/main" id="{CFA7722F-3C3B-4B14-B0D6-2D5EBB7FC7A0}"/>
-                </a:ext>
-              </a:extLst>
-            </p:cNvPr>
-            <p:cNvGrpSpPr>
-              <a:grpSpLocks noChangeAspect="1"/>
-            </p:cNvGrpSpPr>
-            <p:nvPr/>
-          </p:nvGrpSpPr>
-          <p:grpSpPr>
-            <a:xfrm>
-              <a:off x="9195519" y="5963156"/>
-              <a:ext cx="360000" cy="360000"/>
-              <a:chOff x="5509093" y="4986775"/>
-              <a:chExt cx="543194" cy="807799"/>
-            </a:xfrm>
-          </p:grpSpPr>
-          <p:pic>
-            <p:nvPicPr>
-              <p:cNvPr id="1032" name="Picture 8">
-                <a:extLst>
-                  <a:ext uri="{FF2B5EF4-FFF2-40B4-BE49-F238E27FC236}">
-                    <a16:creationId xmlns:a16="http://schemas.microsoft.com/office/drawing/2014/main" id="{65323FB3-3161-4FCA-A41F-74777B67FFD1}"/>
-                  </a:ext>
-                </a:extLst>
-              </p:cNvPr>
-              <p:cNvPicPr>
-                <a:picLocks noChangeAspect="1" noChangeArrowheads="1"/>
-              </p:cNvPicPr>
-              <p:nvPr/>
-            </p:nvPicPr>
-            <p:blipFill>
-              <a:blip r:embed="rId6">
-                <a:extLst>
-                  <a:ext uri="{28A0092B-C50C-407E-A947-70E740481C1C}">
-                    <a14:useLocalDpi xmlns:a14="http://schemas.microsoft.com/office/drawing/2010/main" val="0"/>
-                  </a:ext>
-                </a:extLst>
-              </a:blip>
-              <a:srcRect/>
-              <a:stretch>
-                <a:fillRect/>
-              </a:stretch>
-            </p:blipFill>
-            <p:spPr bwMode="auto">
-              <a:xfrm>
-                <a:off x="5509093" y="4986775"/>
-                <a:ext cx="543194" cy="807799"/>
-              </a:xfrm>
-              <a:prstGeom prst="rect">
-                <a:avLst/>
-              </a:prstGeom>
-              <a:noFill/>
-              <a:extLst>
-                <a:ext uri="{909E8E84-426E-40DD-AFC4-6F175D3DCCD1}">
-                  <a14:hiddenFill xmlns:a14="http://schemas.microsoft.com/office/drawing/2010/main">
-                    <a:solidFill>
-                      <a:srgbClr val="FFFFFF"/>
-                    </a:solidFill>
-                  </a14:hiddenFill>
-                </a:ext>
-              </a:extLst>
-            </p:spPr>
-          </p:pic>
-          <p:pic>
-            <p:nvPicPr>
-              <p:cNvPr id="15" name="Picture 6" descr="Icon Mongodb Logo, HD Png Download , Transparent Png Image - PNGitem">
-                <a:extLst>
-                  <a:ext uri="{FF2B5EF4-FFF2-40B4-BE49-F238E27FC236}">
-                    <a16:creationId xmlns:a16="http://schemas.microsoft.com/office/drawing/2014/main" id="{0F60B27C-3D89-4A33-9BE9-FA5CF6F9B0DA}"/>
-                  </a:ext>
-                </a:extLst>
-              </p:cNvPr>
-              <p:cNvPicPr>
-                <a:picLocks noChangeAspect="1" noChangeArrowheads="1"/>
-              </p:cNvPicPr>
-              <p:nvPr/>
-            </p:nvPicPr>
-            <p:blipFill>
-              <a:blip r:embed="rId7">
-                <a:extLst>
-                  <a:ext uri="{28A0092B-C50C-407E-A947-70E740481C1C}">
-                    <a14:useLocalDpi xmlns:a14="http://schemas.microsoft.com/office/drawing/2010/main" val="0"/>
-                  </a:ext>
-                </a:extLst>
-              </a:blip>
-              <a:srcRect/>
-              <a:stretch>
-                <a:fillRect/>
-              </a:stretch>
-            </p:blipFill>
-            <p:spPr bwMode="auto">
-              <a:xfrm>
-                <a:off x="5604555" y="5231877"/>
-                <a:ext cx="371124" cy="433633"/>
-              </a:xfrm>
-              <a:prstGeom prst="rect">
-                <a:avLst/>
-              </a:prstGeom>
-              <a:noFill/>
-              <a:extLst>
-                <a:ext uri="{909E8E84-426E-40DD-AFC4-6F175D3DCCD1}">
-                  <a14:hiddenFill xmlns:a14="http://schemas.microsoft.com/office/drawing/2010/main">
-                    <a:solidFill>
-                      <a:srgbClr val="FFFFFF"/>
-                    </a:solidFill>
-                  </a14:hiddenFill>
-                </a:ext>
-              </a:extLst>
-            </p:spPr>
-          </p:pic>
-        </p:grpSp>
-        <p:sp>
-          <p:nvSpPr>
-            <p:cNvPr id="26" name="Rectangle: Rounded Corners 25">
-              <a:extLst>
-                <a:ext uri="{FF2B5EF4-FFF2-40B4-BE49-F238E27FC236}">
-                  <a16:creationId xmlns:a16="http://schemas.microsoft.com/office/drawing/2014/main" id="{70E55D40-F807-4535-AFC7-97777C23A1A4}"/>
-                </a:ext>
-              </a:extLst>
-            </p:cNvPr>
-            <p:cNvSpPr/>
-            <p:nvPr/>
-          </p:nvSpPr>
-          <p:spPr>
-            <a:xfrm>
-              <a:off x="7928042" y="5716128"/>
-              <a:ext cx="1969193" cy="619491"/>
-            </a:xfrm>
-            <a:prstGeom prst="roundRect">
-              <a:avLst/>
-            </a:prstGeom>
-            <a:noFill/>
-          </p:spPr>
-          <p:style>
-            <a:lnRef idx="2">
-              <a:schemeClr val="accent1">
-                <a:shade val="50000"/>
-              </a:schemeClr>
-            </a:lnRef>
-            <a:fillRef idx="1">
-              <a:schemeClr val="accent1"/>
-            </a:fillRef>
-            <a:effectRef idx="0">
-              <a:schemeClr val="accent1"/>
-            </a:effectRef>
-            <a:fontRef idx="minor">
-              <a:schemeClr val="lt1"/>
-            </a:fontRef>
-          </p:style>
-          <p:txBody>
-            <a:bodyPr tIns="0" rtlCol="0" anchor="t" anchorCtr="0"/>
-            <a:lstStyle/>
-            <a:p>
-              <a:pPr algn="ctr"/>
-              <a:r>
-                <a:rPr lang="en-US" sz="1100" b="1" dirty="0">
-                  <a:solidFill>
-                    <a:srgbClr val="002060"/>
-                  </a:solidFill>
-                  <a:latin typeface="Verdana" panose="020B0604030504040204" pitchFamily="34" charset="0"/>
-                  <a:ea typeface="Verdana" panose="020B0604030504040204" pitchFamily="34" charset="0"/>
-                </a:rPr>
-                <a:t>Products</a:t>
-              </a:r>
-              <a:r>
-                <a:rPr lang="en-US" sz="1100" dirty="0">
-                  <a:solidFill>
-                    <a:srgbClr val="002060"/>
-                  </a:solidFill>
-                  <a:latin typeface="Verdana" panose="020B0604030504040204" pitchFamily="34" charset="0"/>
-                  <a:ea typeface="Verdana" panose="020B0604030504040204" pitchFamily="34" charset="0"/>
-                </a:rPr>
-                <a:t> Microservices</a:t>
-              </a:r>
-              <a:endParaRPr lang="en-IN" sz="1100" dirty="0">
-                <a:solidFill>
-                  <a:srgbClr val="002060"/>
-                </a:solidFill>
-                <a:latin typeface="Verdana" panose="020B0604030504040204" pitchFamily="34" charset="0"/>
-                <a:ea typeface="Verdana" panose="020B0604030504040204" pitchFamily="34" charset="0"/>
-              </a:endParaRPr>
-            </a:p>
-          </p:txBody>
-        </p:sp>
-        <p:pic>
-          <p:nvPicPr>
-            <p:cNvPr id="27" name="Picture 16">
-              <a:extLst>
-                <a:ext uri="{FF2B5EF4-FFF2-40B4-BE49-F238E27FC236}">
-                  <a16:creationId xmlns:a16="http://schemas.microsoft.com/office/drawing/2014/main" id="{8E5E390B-01CA-4585-8914-CDBA43B6A291}"/>
-                </a:ext>
-              </a:extLst>
-            </p:cNvPr>
-            <p:cNvPicPr>
-              <a:picLocks noChangeAspect="1" noChangeArrowheads="1"/>
-            </p:cNvPicPr>
-            <p:nvPr/>
-          </p:nvPicPr>
-          <p:blipFill>
-            <a:blip r:embed="rId8">
-              <a:extLst>
-                <a:ext uri="{28A0092B-C50C-407E-A947-70E740481C1C}">
-                  <a14:useLocalDpi xmlns:a14="http://schemas.microsoft.com/office/drawing/2010/main" val="0"/>
-                </a:ext>
-              </a:extLst>
-            </a:blip>
-            <a:srcRect/>
-            <a:stretch>
-              <a:fillRect/>
-            </a:stretch>
-          </p:blipFill>
-          <p:spPr bwMode="auto">
-            <a:xfrm>
-              <a:off x="8310366" y="5963156"/>
-              <a:ext cx="360000" cy="360000"/>
-            </a:xfrm>
-            <a:prstGeom prst="rect">
-              <a:avLst/>
-            </a:prstGeom>
-            <a:noFill/>
-            <a:extLst>
-              <a:ext uri="{909E8E84-426E-40DD-AFC4-6F175D3DCCD1}">
-                <a14:hiddenFill xmlns:a14="http://schemas.microsoft.com/office/drawing/2010/main">
-                  <a:solidFill>
-                    <a:srgbClr val="FFFFFF"/>
-                  </a:solidFill>
-                </a14:hiddenFill>
-              </a:ext>
-            </a:extLst>
-          </p:spPr>
-        </p:pic>
-        <p:cxnSp>
-          <p:nvCxnSpPr>
-            <p:cNvPr id="36" name="Straight Arrow Connector 35">
-              <a:extLst>
-                <a:ext uri="{FF2B5EF4-FFF2-40B4-BE49-F238E27FC236}">
-                  <a16:creationId xmlns:a16="http://schemas.microsoft.com/office/drawing/2014/main" id="{F6E7DF90-7FEF-491E-8015-5BA1941123FC}"/>
-                </a:ext>
-              </a:extLst>
-            </p:cNvPr>
-            <p:cNvCxnSpPr/>
-            <p:nvPr/>
-          </p:nvCxnSpPr>
-          <p:spPr>
-            <a:xfrm>
-              <a:off x="8588638" y="6143156"/>
-              <a:ext cx="648000" cy="0"/>
-            </a:xfrm>
-            <a:prstGeom prst="straightConnector1">
-              <a:avLst/>
-            </a:prstGeom>
-            <a:ln>
-              <a:tailEnd type="triangle"/>
-            </a:ln>
-          </p:spPr>
-          <p:style>
-            <a:lnRef idx="2">
-              <a:schemeClr val="accent1"/>
-            </a:lnRef>
-            <a:fillRef idx="0">
-              <a:schemeClr val="accent1"/>
-            </a:fillRef>
-            <a:effectRef idx="1">
-              <a:schemeClr val="accent1"/>
-            </a:effectRef>
-            <a:fontRef idx="minor">
-              <a:schemeClr val="tx1"/>
-            </a:fontRef>
-          </p:style>
-        </p:cxnSp>
-      </p:grpSp>
-      <p:grpSp>
-        <p:nvGrpSpPr>
           <p:cNvPr id="29" name="Group 28">
             <a:extLst>
               <a:ext uri="{FF2B5EF4-FFF2-40B4-BE49-F238E27FC236}">
@@ -4104,7 +3807,7 @@
             <p:nvPr/>
           </p:nvPicPr>
           <p:blipFill>
-            <a:blip r:embed="rId8">
+            <a:blip r:embed="rId6">
               <a:extLst>
                 <a:ext uri="{28A0092B-C50C-407E-A947-70E740481C1C}">
                   <a14:useLocalDpi xmlns:a14="http://schemas.microsoft.com/office/drawing/2010/main" val="0"/>
@@ -4295,7 +3998,7 @@
             <p:nvPr/>
           </p:nvPicPr>
           <p:blipFill>
-            <a:blip r:embed="rId8">
+            <a:blip r:embed="rId6">
               <a:extLst>
                 <a:ext uri="{28A0092B-C50C-407E-A947-70E740481C1C}">
                   <a14:useLocalDpi xmlns:a14="http://schemas.microsoft.com/office/drawing/2010/main" val="0"/>
@@ -4486,7 +4189,7 @@
             <p:nvPr/>
           </p:nvPicPr>
           <p:blipFill>
-            <a:blip r:embed="rId8">
+            <a:blip r:embed="rId6">
               <a:extLst>
                 <a:ext uri="{28A0092B-C50C-407E-A947-70E740481C1C}">
                   <a14:useLocalDpi xmlns:a14="http://schemas.microsoft.com/office/drawing/2010/main" val="0"/>
@@ -4677,7 +4380,7 @@
             <p:nvPr/>
           </p:nvPicPr>
           <p:blipFill>
-            <a:blip r:embed="rId8">
+            <a:blip r:embed="rId6">
               <a:extLst>
                 <a:ext uri="{28A0092B-C50C-407E-A947-70E740481C1C}">
                   <a14:useLocalDpi xmlns:a14="http://schemas.microsoft.com/office/drawing/2010/main" val="0"/>
@@ -4868,7 +4571,7 @@
             <p:nvPr/>
           </p:nvPicPr>
           <p:blipFill>
-            <a:blip r:embed="rId8">
+            <a:blip r:embed="rId6">
               <a:extLst>
                 <a:ext uri="{28A0092B-C50C-407E-A947-70E740481C1C}">
                   <a14:useLocalDpi xmlns:a14="http://schemas.microsoft.com/office/drawing/2010/main" val="0"/>
@@ -6074,10 +5777,3445 @@
           </p:txBody>
         </p:sp>
       </p:grpSp>
+      <p:grpSp>
+        <p:nvGrpSpPr>
+          <p:cNvPr id="7" name="Group 6">
+            <a:extLst>
+              <a:ext uri="{FF2B5EF4-FFF2-40B4-BE49-F238E27FC236}">
+                <a16:creationId xmlns:a16="http://schemas.microsoft.com/office/drawing/2014/main" id="{89A437BF-B9F4-4E33-B1E6-F4A4A6788C78}"/>
+              </a:ext>
+            </a:extLst>
+          </p:cNvPr>
+          <p:cNvGrpSpPr/>
+          <p:nvPr/>
+        </p:nvGrpSpPr>
+        <p:grpSpPr>
+          <a:xfrm>
+            <a:off x="7975694" y="5936421"/>
+            <a:ext cx="1969193" cy="619491"/>
+            <a:chOff x="7975694" y="5936421"/>
+            <a:chExt cx="1969193" cy="619491"/>
+          </a:xfrm>
+        </p:grpSpPr>
+        <p:sp>
+          <p:nvSpPr>
+            <p:cNvPr id="26" name="Rectangle: Rounded Corners 25">
+              <a:extLst>
+                <a:ext uri="{FF2B5EF4-FFF2-40B4-BE49-F238E27FC236}">
+                  <a16:creationId xmlns:a16="http://schemas.microsoft.com/office/drawing/2014/main" id="{70E55D40-F807-4535-AFC7-97777C23A1A4}"/>
+                </a:ext>
+              </a:extLst>
+            </p:cNvPr>
+            <p:cNvSpPr/>
+            <p:nvPr/>
+          </p:nvSpPr>
+          <p:spPr>
+            <a:xfrm>
+              <a:off x="7975694" y="5936421"/>
+              <a:ext cx="1969193" cy="619491"/>
+            </a:xfrm>
+            <a:prstGeom prst="roundRect">
+              <a:avLst/>
+            </a:prstGeom>
+            <a:noFill/>
+          </p:spPr>
+          <p:style>
+            <a:lnRef idx="2">
+              <a:schemeClr val="accent1">
+                <a:shade val="50000"/>
+              </a:schemeClr>
+            </a:lnRef>
+            <a:fillRef idx="1">
+              <a:schemeClr val="accent1"/>
+            </a:fillRef>
+            <a:effectRef idx="0">
+              <a:schemeClr val="accent1"/>
+            </a:effectRef>
+            <a:fontRef idx="minor">
+              <a:schemeClr val="lt1"/>
+            </a:fontRef>
+          </p:style>
+          <p:txBody>
+            <a:bodyPr tIns="0" rtlCol="0" anchor="t" anchorCtr="0"/>
+            <a:lstStyle/>
+            <a:p>
+              <a:pPr algn="ctr"/>
+              <a:r>
+                <a:rPr lang="en-US" sz="1100" b="1" dirty="0">
+                  <a:solidFill>
+                    <a:srgbClr val="002060"/>
+                  </a:solidFill>
+                  <a:latin typeface="Verdana" panose="020B0604030504040204" pitchFamily="34" charset="0"/>
+                  <a:ea typeface="Verdana" panose="020B0604030504040204" pitchFamily="34" charset="0"/>
+                </a:rPr>
+                <a:t>Products</a:t>
+              </a:r>
+              <a:r>
+                <a:rPr lang="en-US" sz="1100" dirty="0">
+                  <a:solidFill>
+                    <a:srgbClr val="002060"/>
+                  </a:solidFill>
+                  <a:latin typeface="Verdana" panose="020B0604030504040204" pitchFamily="34" charset="0"/>
+                  <a:ea typeface="Verdana" panose="020B0604030504040204" pitchFamily="34" charset="0"/>
+                </a:rPr>
+                <a:t> Microservices</a:t>
+              </a:r>
+              <a:endParaRPr lang="en-IN" sz="1100" dirty="0">
+                <a:solidFill>
+                  <a:srgbClr val="002060"/>
+                </a:solidFill>
+                <a:latin typeface="Verdana" panose="020B0604030504040204" pitchFamily="34" charset="0"/>
+                <a:ea typeface="Verdana" panose="020B0604030504040204" pitchFamily="34" charset="0"/>
+              </a:endParaRPr>
+            </a:p>
+          </p:txBody>
+        </p:sp>
+        <p:pic>
+          <p:nvPicPr>
+            <p:cNvPr id="27" name="Picture 16">
+              <a:extLst>
+                <a:ext uri="{FF2B5EF4-FFF2-40B4-BE49-F238E27FC236}">
+                  <a16:creationId xmlns:a16="http://schemas.microsoft.com/office/drawing/2014/main" id="{8E5E390B-01CA-4585-8914-CDBA43B6A291}"/>
+                </a:ext>
+              </a:extLst>
+            </p:cNvPr>
+            <p:cNvPicPr>
+              <a:picLocks noChangeAspect="1" noChangeArrowheads="1"/>
+            </p:cNvPicPr>
+            <p:nvPr/>
+          </p:nvPicPr>
+          <p:blipFill>
+            <a:blip r:embed="rId6">
+              <a:extLst>
+                <a:ext uri="{28A0092B-C50C-407E-A947-70E740481C1C}">
+                  <a14:useLocalDpi xmlns:a14="http://schemas.microsoft.com/office/drawing/2010/main" val="0"/>
+                </a:ext>
+              </a:extLst>
+            </a:blip>
+            <a:srcRect/>
+            <a:stretch>
+              <a:fillRect/>
+            </a:stretch>
+          </p:blipFill>
+          <p:spPr bwMode="auto">
+            <a:xfrm>
+              <a:off x="8358018" y="6183449"/>
+              <a:ext cx="360000" cy="360000"/>
+            </a:xfrm>
+            <a:prstGeom prst="rect">
+              <a:avLst/>
+            </a:prstGeom>
+            <a:noFill/>
+            <a:extLst>
+              <a:ext uri="{909E8E84-426E-40DD-AFC4-6F175D3DCCD1}">
+                <a14:hiddenFill xmlns:a14="http://schemas.microsoft.com/office/drawing/2010/main">
+                  <a:solidFill>
+                    <a:srgbClr val="FFFFFF"/>
+                  </a:solidFill>
+                </a14:hiddenFill>
+              </a:ext>
+            </a:extLst>
+          </p:spPr>
+        </p:pic>
+        <p:cxnSp>
+          <p:nvCxnSpPr>
+            <p:cNvPr id="36" name="Straight Arrow Connector 35">
+              <a:extLst>
+                <a:ext uri="{FF2B5EF4-FFF2-40B4-BE49-F238E27FC236}">
+                  <a16:creationId xmlns:a16="http://schemas.microsoft.com/office/drawing/2014/main" id="{F6E7DF90-7FEF-491E-8015-5BA1941123FC}"/>
+                </a:ext>
+              </a:extLst>
+            </p:cNvPr>
+            <p:cNvCxnSpPr/>
+            <p:nvPr/>
+          </p:nvCxnSpPr>
+          <p:spPr>
+            <a:xfrm>
+              <a:off x="8636290" y="6363449"/>
+              <a:ext cx="648000" cy="0"/>
+            </a:xfrm>
+            <a:prstGeom prst="straightConnector1">
+              <a:avLst/>
+            </a:prstGeom>
+            <a:ln>
+              <a:tailEnd type="triangle"/>
+            </a:ln>
+          </p:spPr>
+          <p:style>
+            <a:lnRef idx="2">
+              <a:schemeClr val="accent1"/>
+            </a:lnRef>
+            <a:fillRef idx="0">
+              <a:schemeClr val="accent1"/>
+            </a:fillRef>
+            <a:effectRef idx="1">
+              <a:schemeClr val="accent1"/>
+            </a:effectRef>
+            <a:fontRef idx="minor">
+              <a:schemeClr val="tx1"/>
+            </a:fontRef>
+          </p:style>
+        </p:cxnSp>
+        <p:sp>
+          <p:nvSpPr>
+            <p:cNvPr id="58" name="TextBox 57">
+              <a:extLst>
+                <a:ext uri="{FF2B5EF4-FFF2-40B4-BE49-F238E27FC236}">
+                  <a16:creationId xmlns:a16="http://schemas.microsoft.com/office/drawing/2014/main" id="{8BE7DFDF-9042-4D41-AAB8-71E578F98892}"/>
+                </a:ext>
+              </a:extLst>
+            </p:cNvPr>
+            <p:cNvSpPr txBox="1"/>
+            <p:nvPr/>
+          </p:nvSpPr>
+          <p:spPr>
+            <a:xfrm>
+              <a:off x="9196437" y="6233810"/>
+              <a:ext cx="698409" cy="246221"/>
+            </a:xfrm>
+            <a:prstGeom prst="rect">
+              <a:avLst/>
+            </a:prstGeom>
+            <a:noFill/>
+          </p:spPr>
+          <p:txBody>
+            <a:bodyPr wrap="square" rtlCol="0">
+              <a:spAutoFit/>
+            </a:bodyPr>
+            <a:lstStyle/>
+            <a:p>
+              <a:r>
+                <a:rPr lang="en-US" sz="1000" b="1" dirty="0">
+                  <a:solidFill>
+                    <a:srgbClr val="0070C0"/>
+                  </a:solidFill>
+                  <a:latin typeface="Verdana" panose="020B0604030504040204" pitchFamily="34" charset="0"/>
+                  <a:ea typeface="Verdana" panose="020B0604030504040204" pitchFamily="34" charset="0"/>
+                </a:rPr>
+                <a:t>Mongo</a:t>
+              </a:r>
+              <a:endParaRPr lang="en-IN" sz="1000" b="1" dirty="0">
+                <a:solidFill>
+                  <a:srgbClr val="0070C0"/>
+                </a:solidFill>
+                <a:latin typeface="Verdana" panose="020B0604030504040204" pitchFamily="34" charset="0"/>
+                <a:ea typeface="Verdana" panose="020B0604030504040204" pitchFamily="34" charset="0"/>
+              </a:endParaRPr>
+            </a:p>
+          </p:txBody>
+        </p:sp>
+      </p:grpSp>
+      <p:sp>
+        <p:nvSpPr>
+          <p:cNvPr id="2" name="TextBox 1">
+            <a:extLst>
+              <a:ext uri="{FF2B5EF4-FFF2-40B4-BE49-F238E27FC236}">
+                <a16:creationId xmlns:a16="http://schemas.microsoft.com/office/drawing/2014/main" id="{6F902A5D-40E9-4AA1-9C54-ED72203D820C}"/>
+              </a:ext>
+            </a:extLst>
+          </p:cNvPr>
+          <p:cNvSpPr txBox="1"/>
+          <p:nvPr/>
+        </p:nvSpPr>
+        <p:spPr>
+          <a:xfrm>
+            <a:off x="480767" y="403670"/>
+            <a:ext cx="2682073" cy="646331"/>
+          </a:xfrm>
+          <a:prstGeom prst="rect">
+            <a:avLst/>
+          </a:prstGeom>
+          <a:noFill/>
+          <a:ln w="12700">
+            <a:solidFill>
+              <a:srgbClr val="00B0F0"/>
+            </a:solidFill>
+          </a:ln>
+        </p:spPr>
+        <p:txBody>
+          <a:bodyPr wrap="square" rtlCol="0">
+            <a:spAutoFit/>
+          </a:bodyPr>
+          <a:lstStyle/>
+          <a:p>
+            <a:pPr algn="ctr"/>
+            <a:r>
+              <a:rPr lang="en-US" b="1" dirty="0">
+                <a:solidFill>
+                  <a:srgbClr val="0070C0"/>
+                </a:solidFill>
+                <a:latin typeface="Verdana" panose="020B0604030504040204" pitchFamily="34" charset="0"/>
+                <a:ea typeface="Verdana" panose="020B0604030504040204" pitchFamily="34" charset="0"/>
+              </a:rPr>
+              <a:t>Planned/Proposed</a:t>
+            </a:r>
+          </a:p>
+          <a:p>
+            <a:pPr algn="ctr"/>
+            <a:r>
+              <a:rPr lang="en-US" b="1" dirty="0">
+                <a:solidFill>
+                  <a:srgbClr val="0070C0"/>
+                </a:solidFill>
+                <a:latin typeface="Verdana" panose="020B0604030504040204" pitchFamily="34" charset="0"/>
+                <a:ea typeface="Verdana" panose="020B0604030504040204" pitchFamily="34" charset="0"/>
+              </a:rPr>
+              <a:t>Architecture</a:t>
+            </a:r>
+            <a:endParaRPr lang="en-IN" b="1" dirty="0">
+              <a:solidFill>
+                <a:srgbClr val="0070C0"/>
+              </a:solidFill>
+              <a:latin typeface="Verdana" panose="020B0604030504040204" pitchFamily="34" charset="0"/>
+              <a:ea typeface="Verdana" panose="020B0604030504040204" pitchFamily="34" charset="0"/>
+            </a:endParaRPr>
+          </a:p>
+        </p:txBody>
+      </p:sp>
     </p:spTree>
     <p:extLst>
       <p:ext uri="{BB962C8B-B14F-4D97-AF65-F5344CB8AC3E}">
         <p14:creationId xmlns:p14="http://schemas.microsoft.com/office/powerpoint/2010/main" val="1464617685"/>
+      </p:ext>
+    </p:extLst>
+  </p:cSld>
+  <p:clrMapOvr>
+    <a:masterClrMapping/>
+  </p:clrMapOvr>
+</p:sld>
+</file>
+
+<file path=ppt/slides/slide2.xml><?xml version="1.0" encoding="utf-8"?>
+<p:sld xmlns:a="http://schemas.openxmlformats.org/drawingml/2006/main" xmlns:r="http://schemas.openxmlformats.org/officeDocument/2006/relationships" xmlns:p="http://schemas.openxmlformats.org/presentationml/2006/main">
+  <p:cSld>
+    <p:spTree>
+      <p:nvGrpSpPr>
+        <p:cNvPr id="1" name=""/>
+        <p:cNvGrpSpPr/>
+        <p:nvPr/>
+      </p:nvGrpSpPr>
+      <p:grpSpPr>
+        <a:xfrm>
+          <a:off x="0" y="0"/>
+          <a:ext cx="0" cy="0"/>
+          <a:chOff x="0" y="0"/>
+          <a:chExt cx="0" cy="0"/>
+        </a:xfrm>
+      </p:grpSpPr>
+      <p:sp>
+        <p:nvSpPr>
+          <p:cNvPr id="11" name="Cylinder 10">
+            <a:extLst>
+              <a:ext uri="{FF2B5EF4-FFF2-40B4-BE49-F238E27FC236}">
+                <a16:creationId xmlns:a16="http://schemas.microsoft.com/office/drawing/2014/main" id="{C1C527D6-06B1-401E-942E-627E0DF4C45F}"/>
+              </a:ext>
+            </a:extLst>
+          </p:cNvPr>
+          <p:cNvSpPr/>
+          <p:nvPr/>
+        </p:nvSpPr>
+        <p:spPr>
+          <a:xfrm>
+            <a:off x="11237625" y="309536"/>
+            <a:ext cx="288000" cy="6264000"/>
+          </a:xfrm>
+          <a:prstGeom prst="can">
+            <a:avLst/>
+          </a:prstGeom>
+          <a:solidFill>
+            <a:srgbClr val="F5F6D6"/>
+          </a:solidFill>
+        </p:spPr>
+        <p:style>
+          <a:lnRef idx="2">
+            <a:schemeClr val="accent1">
+              <a:shade val="50000"/>
+            </a:schemeClr>
+          </a:lnRef>
+          <a:fillRef idx="1">
+            <a:schemeClr val="accent1"/>
+          </a:fillRef>
+          <a:effectRef idx="0">
+            <a:schemeClr val="accent1"/>
+          </a:effectRef>
+          <a:fontRef idx="minor">
+            <a:schemeClr val="lt1"/>
+          </a:fontRef>
+        </p:style>
+        <p:txBody>
+          <a:bodyPr vert="vert" rtlCol="0" anchor="ctr"/>
+          <a:lstStyle/>
+          <a:p>
+            <a:pPr algn="ctr"/>
+            <a:r>
+              <a:rPr lang="en-US" sz="1400" b="1" dirty="0">
+                <a:solidFill>
+                  <a:srgbClr val="002060"/>
+                </a:solidFill>
+                <a:latin typeface="Verdana" panose="020B0604030504040204" pitchFamily="34" charset="0"/>
+                <a:ea typeface="Verdana" panose="020B0604030504040204" pitchFamily="34" charset="0"/>
+              </a:rPr>
+              <a:t>Event Bus (</a:t>
+            </a:r>
+            <a:r>
+              <a:rPr lang="en-US" sz="1400" dirty="0">
+                <a:solidFill>
+                  <a:srgbClr val="002060"/>
+                </a:solidFill>
+                <a:latin typeface="Verdana" panose="020B0604030504040204" pitchFamily="34" charset="0"/>
+                <a:ea typeface="Verdana" panose="020B0604030504040204" pitchFamily="34" charset="0"/>
+              </a:rPr>
+              <a:t>RabbitMQ / Kafka / Service Bus</a:t>
+            </a:r>
+            <a:r>
+              <a:rPr lang="en-US" sz="1400" b="1" dirty="0">
+                <a:solidFill>
+                  <a:srgbClr val="002060"/>
+                </a:solidFill>
+                <a:latin typeface="Verdana" panose="020B0604030504040204" pitchFamily="34" charset="0"/>
+                <a:ea typeface="Verdana" panose="020B0604030504040204" pitchFamily="34" charset="0"/>
+              </a:rPr>
+              <a:t>)</a:t>
+            </a:r>
+            <a:endParaRPr lang="en-IN" sz="1400" b="1" dirty="0">
+              <a:solidFill>
+                <a:srgbClr val="002060"/>
+              </a:solidFill>
+              <a:latin typeface="Verdana" panose="020B0604030504040204" pitchFamily="34" charset="0"/>
+              <a:ea typeface="Verdana" panose="020B0604030504040204" pitchFamily="34" charset="0"/>
+            </a:endParaRPr>
+          </a:p>
+        </p:txBody>
+      </p:sp>
+      <p:pic>
+        <p:nvPicPr>
+          <p:cNvPr id="1034" name="Picture 10">
+            <a:extLst>
+              <a:ext uri="{FF2B5EF4-FFF2-40B4-BE49-F238E27FC236}">
+                <a16:creationId xmlns:a16="http://schemas.microsoft.com/office/drawing/2014/main" id="{63ADE3E1-7C0F-4A66-AA75-3AD2AE3D7D7B}"/>
+              </a:ext>
+            </a:extLst>
+          </p:cNvPr>
+          <p:cNvPicPr>
+            <a:picLocks noChangeAspect="1" noChangeArrowheads="1"/>
+          </p:cNvPicPr>
+          <p:nvPr/>
+        </p:nvPicPr>
+        <p:blipFill>
+          <a:blip r:embed="rId2">
+            <a:extLst>
+              <a:ext uri="{28A0092B-C50C-407E-A947-70E740481C1C}">
+                <a14:useLocalDpi xmlns:a14="http://schemas.microsoft.com/office/drawing/2010/main" val="0"/>
+              </a:ext>
+            </a:extLst>
+          </a:blip>
+          <a:srcRect/>
+          <a:stretch>
+            <a:fillRect/>
+          </a:stretch>
+        </p:blipFill>
+        <p:spPr bwMode="auto">
+          <a:xfrm>
+            <a:off x="11589702" y="4859853"/>
+            <a:ext cx="360000" cy="360000"/>
+          </a:xfrm>
+          <a:prstGeom prst="rect">
+            <a:avLst/>
+          </a:prstGeom>
+          <a:noFill/>
+          <a:extLst>
+            <a:ext uri="{909E8E84-426E-40DD-AFC4-6F175D3DCCD1}">
+              <a14:hiddenFill xmlns:a14="http://schemas.microsoft.com/office/drawing/2010/main">
+                <a:solidFill>
+                  <a:srgbClr val="FFFFFF"/>
+                </a:solidFill>
+              </a14:hiddenFill>
+            </a:ext>
+          </a:extLst>
+        </p:spPr>
+      </p:pic>
+      <p:pic>
+        <p:nvPicPr>
+          <p:cNvPr id="1036" name="Picture 12" descr="RabbitMQ Logo PNG Transparent &amp; SVG Vector - Freebie Supply">
+            <a:extLst>
+              <a:ext uri="{FF2B5EF4-FFF2-40B4-BE49-F238E27FC236}">
+                <a16:creationId xmlns:a16="http://schemas.microsoft.com/office/drawing/2014/main" id="{A7E07EE2-DDFE-44E0-85DE-E0447AB174FB}"/>
+              </a:ext>
+            </a:extLst>
+          </p:cNvPr>
+          <p:cNvPicPr>
+            <a:picLocks noChangeAspect="1" noChangeArrowheads="1"/>
+          </p:cNvPicPr>
+          <p:nvPr/>
+        </p:nvPicPr>
+        <p:blipFill>
+          <a:blip r:embed="rId3">
+            <a:extLst>
+              <a:ext uri="{28A0092B-C50C-407E-A947-70E740481C1C}">
+                <a14:useLocalDpi xmlns:a14="http://schemas.microsoft.com/office/drawing/2010/main" val="0"/>
+              </a:ext>
+            </a:extLst>
+          </a:blip>
+          <a:srcRect/>
+          <a:stretch>
+            <a:fillRect/>
+          </a:stretch>
+        </p:blipFill>
+        <p:spPr bwMode="auto">
+          <a:xfrm>
+            <a:off x="11594164" y="2857497"/>
+            <a:ext cx="360000" cy="360000"/>
+          </a:xfrm>
+          <a:prstGeom prst="rect">
+            <a:avLst/>
+          </a:prstGeom>
+          <a:noFill/>
+          <a:extLst>
+            <a:ext uri="{909E8E84-426E-40DD-AFC4-6F175D3DCCD1}">
+              <a14:hiddenFill xmlns:a14="http://schemas.microsoft.com/office/drawing/2010/main">
+                <a:solidFill>
+                  <a:srgbClr val="FFFFFF"/>
+                </a:solidFill>
+              </a14:hiddenFill>
+            </a:ext>
+          </a:extLst>
+        </p:spPr>
+      </p:pic>
+      <p:pic>
+        <p:nvPicPr>
+          <p:cNvPr id="1038" name="Picture 14">
+            <a:extLst>
+              <a:ext uri="{FF2B5EF4-FFF2-40B4-BE49-F238E27FC236}">
+                <a16:creationId xmlns:a16="http://schemas.microsoft.com/office/drawing/2014/main" id="{7B0BD928-5C72-446C-B511-0AE89A27B7EC}"/>
+              </a:ext>
+            </a:extLst>
+          </p:cNvPr>
+          <p:cNvPicPr>
+            <a:picLocks noChangeAspect="1" noChangeArrowheads="1"/>
+          </p:cNvPicPr>
+          <p:nvPr/>
+        </p:nvPicPr>
+        <p:blipFill>
+          <a:blip r:embed="rId4">
+            <a:extLst>
+              <a:ext uri="{28A0092B-C50C-407E-A947-70E740481C1C}">
+                <a14:useLocalDpi xmlns:a14="http://schemas.microsoft.com/office/drawing/2010/main" val="0"/>
+              </a:ext>
+            </a:extLst>
+          </a:blip>
+          <a:srcRect/>
+          <a:stretch>
+            <a:fillRect/>
+          </a:stretch>
+        </p:blipFill>
+        <p:spPr bwMode="auto">
+          <a:xfrm>
+            <a:off x="11590085" y="3789651"/>
+            <a:ext cx="360000" cy="360000"/>
+          </a:xfrm>
+          <a:prstGeom prst="rect">
+            <a:avLst/>
+          </a:prstGeom>
+          <a:noFill/>
+          <a:extLst>
+            <a:ext uri="{909E8E84-426E-40DD-AFC4-6F175D3DCCD1}">
+              <a14:hiddenFill xmlns:a14="http://schemas.microsoft.com/office/drawing/2010/main">
+                <a:solidFill>
+                  <a:srgbClr val="FFFFFF"/>
+                </a:solidFill>
+              </a14:hiddenFill>
+            </a:ext>
+          </a:extLst>
+        </p:spPr>
+      </p:pic>
+      <p:cxnSp>
+        <p:nvCxnSpPr>
+          <p:cNvPr id="17" name="Straight Arrow Connector 16">
+            <a:extLst>
+              <a:ext uri="{FF2B5EF4-FFF2-40B4-BE49-F238E27FC236}">
+                <a16:creationId xmlns:a16="http://schemas.microsoft.com/office/drawing/2014/main" id="{605713C4-99D7-4E4C-BD49-1759D32DB6BE}"/>
+              </a:ext>
+            </a:extLst>
+          </p:cNvPr>
+          <p:cNvCxnSpPr/>
+          <p:nvPr/>
+        </p:nvCxnSpPr>
+        <p:spPr>
+          <a:xfrm>
+            <a:off x="10585872" y="3362259"/>
+            <a:ext cx="648000" cy="0"/>
+          </a:xfrm>
+          <a:prstGeom prst="straightConnector1">
+            <a:avLst/>
+          </a:prstGeom>
+          <a:ln>
+            <a:tailEnd type="triangle"/>
+          </a:ln>
+        </p:spPr>
+        <p:style>
+          <a:lnRef idx="2">
+            <a:schemeClr val="accent1"/>
+          </a:lnRef>
+          <a:fillRef idx="0">
+            <a:schemeClr val="accent1"/>
+          </a:fillRef>
+          <a:effectRef idx="1">
+            <a:schemeClr val="accent1"/>
+          </a:effectRef>
+          <a:fontRef idx="minor">
+            <a:schemeClr val="tx1"/>
+          </a:fontRef>
+        </p:style>
+      </p:cxnSp>
+      <p:cxnSp>
+        <p:nvCxnSpPr>
+          <p:cNvPr id="20" name="Straight Connector 19">
+            <a:extLst>
+              <a:ext uri="{FF2B5EF4-FFF2-40B4-BE49-F238E27FC236}">
+                <a16:creationId xmlns:a16="http://schemas.microsoft.com/office/drawing/2014/main" id="{D24FA6FE-7FCF-4C7D-A2E0-454B6742A59E}"/>
+              </a:ext>
+            </a:extLst>
+          </p:cNvPr>
+          <p:cNvCxnSpPr/>
+          <p:nvPr/>
+        </p:nvCxnSpPr>
+        <p:spPr>
+          <a:xfrm>
+            <a:off x="10585874" y="688216"/>
+            <a:ext cx="0" cy="5577422"/>
+          </a:xfrm>
+          <a:prstGeom prst="line">
+            <a:avLst/>
+          </a:prstGeom>
+        </p:spPr>
+        <p:style>
+          <a:lnRef idx="2">
+            <a:schemeClr val="accent1"/>
+          </a:lnRef>
+          <a:fillRef idx="0">
+            <a:schemeClr val="accent1"/>
+          </a:fillRef>
+          <a:effectRef idx="1">
+            <a:schemeClr val="accent1"/>
+          </a:effectRef>
+          <a:fontRef idx="minor">
+            <a:schemeClr val="tx1"/>
+          </a:fontRef>
+        </p:style>
+      </p:cxnSp>
+      <p:pic>
+        <p:nvPicPr>
+          <p:cNvPr id="1042" name="Picture 18">
+            <a:extLst>
+              <a:ext uri="{FF2B5EF4-FFF2-40B4-BE49-F238E27FC236}">
+                <a16:creationId xmlns:a16="http://schemas.microsoft.com/office/drawing/2014/main" id="{21575FF3-65F7-4FE7-9E4A-E2C49761EE42}"/>
+              </a:ext>
+            </a:extLst>
+          </p:cNvPr>
+          <p:cNvPicPr>
+            <a:picLocks noChangeAspect="1" noChangeArrowheads="1"/>
+          </p:cNvPicPr>
+          <p:nvPr/>
+        </p:nvPicPr>
+        <p:blipFill>
+          <a:blip r:embed="rId5">
+            <a:extLst>
+              <a:ext uri="{28A0092B-C50C-407E-A947-70E740481C1C}">
+                <a14:useLocalDpi xmlns:a14="http://schemas.microsoft.com/office/drawing/2010/main" val="0"/>
+              </a:ext>
+            </a:extLst>
+          </a:blip>
+          <a:srcRect/>
+          <a:stretch>
+            <a:fillRect/>
+          </a:stretch>
+        </p:blipFill>
+        <p:spPr bwMode="auto">
+          <a:xfrm>
+            <a:off x="10670855" y="3001247"/>
+            <a:ext cx="478033" cy="360000"/>
+          </a:xfrm>
+          <a:prstGeom prst="rect">
+            <a:avLst/>
+          </a:prstGeom>
+          <a:noFill/>
+          <a:extLst>
+            <a:ext uri="{909E8E84-426E-40DD-AFC4-6F175D3DCCD1}">
+              <a14:hiddenFill xmlns:a14="http://schemas.microsoft.com/office/drawing/2010/main">
+                <a:solidFill>
+                  <a:srgbClr val="FFFFFF"/>
+                </a:solidFill>
+              </a14:hiddenFill>
+            </a:ext>
+          </a:extLst>
+        </p:spPr>
+      </p:pic>
+      <p:grpSp>
+        <p:nvGrpSpPr>
+          <p:cNvPr id="21" name="Group 20">
+            <a:extLst>
+              <a:ext uri="{FF2B5EF4-FFF2-40B4-BE49-F238E27FC236}">
+                <a16:creationId xmlns:a16="http://schemas.microsoft.com/office/drawing/2014/main" id="{DB5415C4-01F6-402B-9A1D-E275DCDDDE43}"/>
+              </a:ext>
+            </a:extLst>
+          </p:cNvPr>
+          <p:cNvGrpSpPr>
+            <a:grpSpLocks noChangeAspect="1"/>
+          </p:cNvGrpSpPr>
+          <p:nvPr/>
+        </p:nvGrpSpPr>
+        <p:grpSpPr>
+          <a:xfrm>
+            <a:off x="7975694" y="5936421"/>
+            <a:ext cx="1969193" cy="619491"/>
+            <a:chOff x="7928042" y="5716128"/>
+            <a:chExt cx="1969193" cy="619491"/>
+          </a:xfrm>
+        </p:grpSpPr>
+        <p:grpSp>
+          <p:nvGrpSpPr>
+            <p:cNvPr id="10" name="Group 9">
+              <a:extLst>
+                <a:ext uri="{FF2B5EF4-FFF2-40B4-BE49-F238E27FC236}">
+                  <a16:creationId xmlns:a16="http://schemas.microsoft.com/office/drawing/2014/main" id="{CFA7722F-3C3B-4B14-B0D6-2D5EBB7FC7A0}"/>
+                </a:ext>
+              </a:extLst>
+            </p:cNvPr>
+            <p:cNvGrpSpPr>
+              <a:grpSpLocks noChangeAspect="1"/>
+            </p:cNvGrpSpPr>
+            <p:nvPr/>
+          </p:nvGrpSpPr>
+          <p:grpSpPr>
+            <a:xfrm>
+              <a:off x="9195519" y="5963156"/>
+              <a:ext cx="360000" cy="360000"/>
+              <a:chOff x="5509093" y="4986775"/>
+              <a:chExt cx="543194" cy="807799"/>
+            </a:xfrm>
+          </p:grpSpPr>
+          <p:pic>
+            <p:nvPicPr>
+              <p:cNvPr id="1032" name="Picture 8">
+                <a:extLst>
+                  <a:ext uri="{FF2B5EF4-FFF2-40B4-BE49-F238E27FC236}">
+                    <a16:creationId xmlns:a16="http://schemas.microsoft.com/office/drawing/2014/main" id="{65323FB3-3161-4FCA-A41F-74777B67FFD1}"/>
+                  </a:ext>
+                </a:extLst>
+              </p:cNvPr>
+              <p:cNvPicPr>
+                <a:picLocks noChangeAspect="1" noChangeArrowheads="1"/>
+              </p:cNvPicPr>
+              <p:nvPr/>
+            </p:nvPicPr>
+            <p:blipFill>
+              <a:blip r:embed="rId6">
+                <a:extLst>
+                  <a:ext uri="{28A0092B-C50C-407E-A947-70E740481C1C}">
+                    <a14:useLocalDpi xmlns:a14="http://schemas.microsoft.com/office/drawing/2010/main" val="0"/>
+                  </a:ext>
+                </a:extLst>
+              </a:blip>
+              <a:srcRect/>
+              <a:stretch>
+                <a:fillRect/>
+              </a:stretch>
+            </p:blipFill>
+            <p:spPr bwMode="auto">
+              <a:xfrm>
+                <a:off x="5509093" y="4986775"/>
+                <a:ext cx="543194" cy="807799"/>
+              </a:xfrm>
+              <a:prstGeom prst="rect">
+                <a:avLst/>
+              </a:prstGeom>
+              <a:noFill/>
+              <a:extLst>
+                <a:ext uri="{909E8E84-426E-40DD-AFC4-6F175D3DCCD1}">
+                  <a14:hiddenFill xmlns:a14="http://schemas.microsoft.com/office/drawing/2010/main">
+                    <a:solidFill>
+                      <a:srgbClr val="FFFFFF"/>
+                    </a:solidFill>
+                  </a14:hiddenFill>
+                </a:ext>
+              </a:extLst>
+            </p:spPr>
+          </p:pic>
+          <p:pic>
+            <p:nvPicPr>
+              <p:cNvPr id="15" name="Picture 6" descr="Icon Mongodb Logo, HD Png Download , Transparent Png Image - PNGitem">
+                <a:extLst>
+                  <a:ext uri="{FF2B5EF4-FFF2-40B4-BE49-F238E27FC236}">
+                    <a16:creationId xmlns:a16="http://schemas.microsoft.com/office/drawing/2014/main" id="{0F60B27C-3D89-4A33-9BE9-FA5CF6F9B0DA}"/>
+                  </a:ext>
+                </a:extLst>
+              </p:cNvPr>
+              <p:cNvPicPr>
+                <a:picLocks noChangeAspect="1" noChangeArrowheads="1"/>
+              </p:cNvPicPr>
+              <p:nvPr/>
+            </p:nvPicPr>
+            <p:blipFill>
+              <a:blip r:embed="rId7">
+                <a:extLst>
+                  <a:ext uri="{28A0092B-C50C-407E-A947-70E740481C1C}">
+                    <a14:useLocalDpi xmlns:a14="http://schemas.microsoft.com/office/drawing/2010/main" val="0"/>
+                  </a:ext>
+                </a:extLst>
+              </a:blip>
+              <a:srcRect/>
+              <a:stretch>
+                <a:fillRect/>
+              </a:stretch>
+            </p:blipFill>
+            <p:spPr bwMode="auto">
+              <a:xfrm>
+                <a:off x="5604555" y="5231877"/>
+                <a:ext cx="371124" cy="433633"/>
+              </a:xfrm>
+              <a:prstGeom prst="rect">
+                <a:avLst/>
+              </a:prstGeom>
+              <a:noFill/>
+              <a:extLst>
+                <a:ext uri="{909E8E84-426E-40DD-AFC4-6F175D3DCCD1}">
+                  <a14:hiddenFill xmlns:a14="http://schemas.microsoft.com/office/drawing/2010/main">
+                    <a:solidFill>
+                      <a:srgbClr val="FFFFFF"/>
+                    </a:solidFill>
+                  </a14:hiddenFill>
+                </a:ext>
+              </a:extLst>
+            </p:spPr>
+          </p:pic>
+        </p:grpSp>
+        <p:sp>
+          <p:nvSpPr>
+            <p:cNvPr id="26" name="Rectangle: Rounded Corners 25">
+              <a:extLst>
+                <a:ext uri="{FF2B5EF4-FFF2-40B4-BE49-F238E27FC236}">
+                  <a16:creationId xmlns:a16="http://schemas.microsoft.com/office/drawing/2014/main" id="{70E55D40-F807-4535-AFC7-97777C23A1A4}"/>
+                </a:ext>
+              </a:extLst>
+            </p:cNvPr>
+            <p:cNvSpPr/>
+            <p:nvPr/>
+          </p:nvSpPr>
+          <p:spPr>
+            <a:xfrm>
+              <a:off x="7928042" y="5716128"/>
+              <a:ext cx="1969193" cy="619491"/>
+            </a:xfrm>
+            <a:prstGeom prst="roundRect">
+              <a:avLst/>
+            </a:prstGeom>
+            <a:noFill/>
+          </p:spPr>
+          <p:style>
+            <a:lnRef idx="2">
+              <a:schemeClr val="accent1">
+                <a:shade val="50000"/>
+              </a:schemeClr>
+            </a:lnRef>
+            <a:fillRef idx="1">
+              <a:schemeClr val="accent1"/>
+            </a:fillRef>
+            <a:effectRef idx="0">
+              <a:schemeClr val="accent1"/>
+            </a:effectRef>
+            <a:fontRef idx="minor">
+              <a:schemeClr val="lt1"/>
+            </a:fontRef>
+          </p:style>
+          <p:txBody>
+            <a:bodyPr tIns="0" rtlCol="0" anchor="t" anchorCtr="0"/>
+            <a:lstStyle/>
+            <a:p>
+              <a:pPr algn="ctr"/>
+              <a:r>
+                <a:rPr lang="en-US" sz="1100" b="1" dirty="0">
+                  <a:solidFill>
+                    <a:srgbClr val="002060"/>
+                  </a:solidFill>
+                  <a:latin typeface="Verdana" panose="020B0604030504040204" pitchFamily="34" charset="0"/>
+                  <a:ea typeface="Verdana" panose="020B0604030504040204" pitchFamily="34" charset="0"/>
+                </a:rPr>
+                <a:t>Products</a:t>
+              </a:r>
+              <a:r>
+                <a:rPr lang="en-US" sz="1100" dirty="0">
+                  <a:solidFill>
+                    <a:srgbClr val="002060"/>
+                  </a:solidFill>
+                  <a:latin typeface="Verdana" panose="020B0604030504040204" pitchFamily="34" charset="0"/>
+                  <a:ea typeface="Verdana" panose="020B0604030504040204" pitchFamily="34" charset="0"/>
+                </a:rPr>
+                <a:t> Microservices</a:t>
+              </a:r>
+              <a:endParaRPr lang="en-IN" sz="1100" dirty="0">
+                <a:solidFill>
+                  <a:srgbClr val="002060"/>
+                </a:solidFill>
+                <a:latin typeface="Verdana" panose="020B0604030504040204" pitchFamily="34" charset="0"/>
+                <a:ea typeface="Verdana" panose="020B0604030504040204" pitchFamily="34" charset="0"/>
+              </a:endParaRPr>
+            </a:p>
+          </p:txBody>
+        </p:sp>
+        <p:pic>
+          <p:nvPicPr>
+            <p:cNvPr id="27" name="Picture 16">
+              <a:extLst>
+                <a:ext uri="{FF2B5EF4-FFF2-40B4-BE49-F238E27FC236}">
+                  <a16:creationId xmlns:a16="http://schemas.microsoft.com/office/drawing/2014/main" id="{8E5E390B-01CA-4585-8914-CDBA43B6A291}"/>
+                </a:ext>
+              </a:extLst>
+            </p:cNvPr>
+            <p:cNvPicPr>
+              <a:picLocks noChangeAspect="1" noChangeArrowheads="1"/>
+            </p:cNvPicPr>
+            <p:nvPr/>
+          </p:nvPicPr>
+          <p:blipFill>
+            <a:blip r:embed="rId8">
+              <a:extLst>
+                <a:ext uri="{28A0092B-C50C-407E-A947-70E740481C1C}">
+                  <a14:useLocalDpi xmlns:a14="http://schemas.microsoft.com/office/drawing/2010/main" val="0"/>
+                </a:ext>
+              </a:extLst>
+            </a:blip>
+            <a:srcRect/>
+            <a:stretch>
+              <a:fillRect/>
+            </a:stretch>
+          </p:blipFill>
+          <p:spPr bwMode="auto">
+            <a:xfrm>
+              <a:off x="8310366" y="5963156"/>
+              <a:ext cx="360000" cy="360000"/>
+            </a:xfrm>
+            <a:prstGeom prst="rect">
+              <a:avLst/>
+            </a:prstGeom>
+            <a:noFill/>
+            <a:extLst>
+              <a:ext uri="{909E8E84-426E-40DD-AFC4-6F175D3DCCD1}">
+                <a14:hiddenFill xmlns:a14="http://schemas.microsoft.com/office/drawing/2010/main">
+                  <a:solidFill>
+                    <a:srgbClr val="FFFFFF"/>
+                  </a:solidFill>
+                </a14:hiddenFill>
+              </a:ext>
+            </a:extLst>
+          </p:spPr>
+        </p:pic>
+        <p:cxnSp>
+          <p:nvCxnSpPr>
+            <p:cNvPr id="36" name="Straight Arrow Connector 35">
+              <a:extLst>
+                <a:ext uri="{FF2B5EF4-FFF2-40B4-BE49-F238E27FC236}">
+                  <a16:creationId xmlns:a16="http://schemas.microsoft.com/office/drawing/2014/main" id="{F6E7DF90-7FEF-491E-8015-5BA1941123FC}"/>
+                </a:ext>
+              </a:extLst>
+            </p:cNvPr>
+            <p:cNvCxnSpPr/>
+            <p:nvPr/>
+          </p:nvCxnSpPr>
+          <p:spPr>
+            <a:xfrm>
+              <a:off x="8588638" y="6143156"/>
+              <a:ext cx="648000" cy="0"/>
+            </a:xfrm>
+            <a:prstGeom prst="straightConnector1">
+              <a:avLst/>
+            </a:prstGeom>
+            <a:ln>
+              <a:tailEnd type="triangle"/>
+            </a:ln>
+          </p:spPr>
+          <p:style>
+            <a:lnRef idx="2">
+              <a:schemeClr val="accent1"/>
+            </a:lnRef>
+            <a:fillRef idx="0">
+              <a:schemeClr val="accent1"/>
+            </a:fillRef>
+            <a:effectRef idx="1">
+              <a:schemeClr val="accent1"/>
+            </a:effectRef>
+            <a:fontRef idx="minor">
+              <a:schemeClr val="tx1"/>
+            </a:fontRef>
+          </p:style>
+        </p:cxnSp>
+      </p:grpSp>
+      <p:grpSp>
+        <p:nvGrpSpPr>
+          <p:cNvPr id="29" name="Group 28">
+            <a:extLst>
+              <a:ext uri="{FF2B5EF4-FFF2-40B4-BE49-F238E27FC236}">
+                <a16:creationId xmlns:a16="http://schemas.microsoft.com/office/drawing/2014/main" id="{F26EB1A2-7FA2-4F2E-9FCA-D445C671088A}"/>
+              </a:ext>
+            </a:extLst>
+          </p:cNvPr>
+          <p:cNvGrpSpPr/>
+          <p:nvPr/>
+        </p:nvGrpSpPr>
+        <p:grpSpPr>
+          <a:xfrm>
+            <a:off x="7985416" y="4858400"/>
+            <a:ext cx="1969200" cy="619200"/>
+            <a:chOff x="7772112" y="4420653"/>
+            <a:chExt cx="1969200" cy="619200"/>
+          </a:xfrm>
+        </p:grpSpPr>
+        <p:sp>
+          <p:nvSpPr>
+            <p:cNvPr id="25" name="Rectangle: Rounded Corners 24">
+              <a:extLst>
+                <a:ext uri="{FF2B5EF4-FFF2-40B4-BE49-F238E27FC236}">
+                  <a16:creationId xmlns:a16="http://schemas.microsoft.com/office/drawing/2014/main" id="{0CDDA88B-9F6D-47DC-8475-CAB16AF927EE}"/>
+                </a:ext>
+              </a:extLst>
+            </p:cNvPr>
+            <p:cNvSpPr>
+              <a:spLocks noChangeAspect="1"/>
+            </p:cNvSpPr>
+            <p:nvPr/>
+          </p:nvSpPr>
+          <p:spPr>
+            <a:xfrm>
+              <a:off x="7772112" y="4420653"/>
+              <a:ext cx="1969200" cy="619200"/>
+            </a:xfrm>
+            <a:prstGeom prst="roundRect">
+              <a:avLst/>
+            </a:prstGeom>
+            <a:noFill/>
+          </p:spPr>
+          <p:style>
+            <a:lnRef idx="2">
+              <a:schemeClr val="accent1">
+                <a:shade val="50000"/>
+              </a:schemeClr>
+            </a:lnRef>
+            <a:fillRef idx="1">
+              <a:schemeClr val="accent1"/>
+            </a:fillRef>
+            <a:effectRef idx="0">
+              <a:schemeClr val="accent1"/>
+            </a:effectRef>
+            <a:fontRef idx="minor">
+              <a:schemeClr val="lt1"/>
+            </a:fontRef>
+          </p:style>
+          <p:txBody>
+            <a:bodyPr tIns="0" rtlCol="0" anchor="t" anchorCtr="0"/>
+            <a:lstStyle/>
+            <a:p>
+              <a:pPr algn="ctr"/>
+              <a:r>
+                <a:rPr lang="en-US" sz="1100" b="1" dirty="0">
+                  <a:solidFill>
+                    <a:srgbClr val="002060"/>
+                  </a:solidFill>
+                  <a:latin typeface="Verdana" panose="020B0604030504040204" pitchFamily="34" charset="0"/>
+                  <a:ea typeface="Verdana" panose="020B0604030504040204" pitchFamily="34" charset="0"/>
+                </a:rPr>
+                <a:t>Basket</a:t>
+              </a:r>
+              <a:r>
+                <a:rPr lang="en-US" sz="1100" dirty="0">
+                  <a:solidFill>
+                    <a:srgbClr val="002060"/>
+                  </a:solidFill>
+                  <a:latin typeface="Verdana" panose="020B0604030504040204" pitchFamily="34" charset="0"/>
+                  <a:ea typeface="Verdana" panose="020B0604030504040204" pitchFamily="34" charset="0"/>
+                </a:rPr>
+                <a:t> Microservices</a:t>
+              </a:r>
+              <a:endParaRPr lang="en-IN" sz="1100" dirty="0">
+                <a:solidFill>
+                  <a:srgbClr val="002060"/>
+                </a:solidFill>
+                <a:latin typeface="Verdana" panose="020B0604030504040204" pitchFamily="34" charset="0"/>
+                <a:ea typeface="Verdana" panose="020B0604030504040204" pitchFamily="34" charset="0"/>
+              </a:endParaRPr>
+            </a:p>
+          </p:txBody>
+        </p:sp>
+        <p:pic>
+          <p:nvPicPr>
+            <p:cNvPr id="1044" name="Picture 20">
+              <a:extLst>
+                <a:ext uri="{FF2B5EF4-FFF2-40B4-BE49-F238E27FC236}">
+                  <a16:creationId xmlns:a16="http://schemas.microsoft.com/office/drawing/2014/main" id="{A5384A2C-F51F-4EC0-8751-CE62F03D43F9}"/>
+                </a:ext>
+              </a:extLst>
+            </p:cNvPr>
+            <p:cNvPicPr>
+              <a:picLocks noChangeAspect="1" noChangeArrowheads="1"/>
+            </p:cNvPicPr>
+            <p:nvPr/>
+          </p:nvPicPr>
+          <p:blipFill>
+            <a:blip r:embed="rId8">
+              <a:extLst>
+                <a:ext uri="{28A0092B-C50C-407E-A947-70E740481C1C}">
+                  <a14:useLocalDpi xmlns:a14="http://schemas.microsoft.com/office/drawing/2010/main" val="0"/>
+                </a:ext>
+              </a:extLst>
+            </a:blip>
+            <a:srcRect/>
+            <a:stretch>
+              <a:fillRect/>
+            </a:stretch>
+          </p:blipFill>
+          <p:spPr bwMode="auto">
+            <a:xfrm>
+              <a:off x="8072715" y="4662670"/>
+              <a:ext cx="360000" cy="360000"/>
+            </a:xfrm>
+            <a:prstGeom prst="rect">
+              <a:avLst/>
+            </a:prstGeom>
+            <a:noFill/>
+            <a:extLst>
+              <a:ext uri="{909E8E84-426E-40DD-AFC4-6F175D3DCCD1}">
+                <a14:hiddenFill xmlns:a14="http://schemas.microsoft.com/office/drawing/2010/main">
+                  <a:solidFill>
+                    <a:srgbClr val="FFFFFF"/>
+                  </a:solidFill>
+                </a14:hiddenFill>
+              </a:ext>
+            </a:extLst>
+          </p:spPr>
+        </p:pic>
+        <p:sp>
+          <p:nvSpPr>
+            <p:cNvPr id="28" name="TextBox 27">
+              <a:extLst>
+                <a:ext uri="{FF2B5EF4-FFF2-40B4-BE49-F238E27FC236}">
+                  <a16:creationId xmlns:a16="http://schemas.microsoft.com/office/drawing/2014/main" id="{5014A2A4-C5B7-4009-A38D-95ABCEC8699D}"/>
+                </a:ext>
+              </a:extLst>
+            </p:cNvPr>
+            <p:cNvSpPr txBox="1"/>
+            <p:nvPr/>
+          </p:nvSpPr>
+          <p:spPr>
+            <a:xfrm>
+              <a:off x="8925003" y="4682127"/>
+              <a:ext cx="610780" cy="246221"/>
+            </a:xfrm>
+            <a:prstGeom prst="rect">
+              <a:avLst/>
+            </a:prstGeom>
+            <a:noFill/>
+          </p:spPr>
+          <p:txBody>
+            <a:bodyPr wrap="square" rtlCol="0">
+              <a:spAutoFit/>
+            </a:bodyPr>
+            <a:lstStyle/>
+            <a:p>
+              <a:r>
+                <a:rPr lang="en-US" sz="1000" b="1" dirty="0">
+                  <a:solidFill>
+                    <a:srgbClr val="0070C0"/>
+                  </a:solidFill>
+                  <a:latin typeface="Verdana" panose="020B0604030504040204" pitchFamily="34" charset="0"/>
+                  <a:ea typeface="Verdana" panose="020B0604030504040204" pitchFamily="34" charset="0"/>
+                </a:rPr>
+                <a:t>Redis</a:t>
+              </a:r>
+              <a:endParaRPr lang="en-IN" sz="1000" b="1" dirty="0">
+                <a:solidFill>
+                  <a:srgbClr val="0070C0"/>
+                </a:solidFill>
+                <a:latin typeface="Verdana" panose="020B0604030504040204" pitchFamily="34" charset="0"/>
+                <a:ea typeface="Verdana" panose="020B0604030504040204" pitchFamily="34" charset="0"/>
+              </a:endParaRPr>
+            </a:p>
+          </p:txBody>
+        </p:sp>
+      </p:grpSp>
+      <p:grpSp>
+        <p:nvGrpSpPr>
+          <p:cNvPr id="30" name="Group 29">
+            <a:extLst>
+              <a:ext uri="{FF2B5EF4-FFF2-40B4-BE49-F238E27FC236}">
+                <a16:creationId xmlns:a16="http://schemas.microsoft.com/office/drawing/2014/main" id="{1EFA9AB7-8B67-4154-8829-F024DD95A930}"/>
+              </a:ext>
+            </a:extLst>
+          </p:cNvPr>
+          <p:cNvGrpSpPr/>
+          <p:nvPr/>
+        </p:nvGrpSpPr>
+        <p:grpSpPr>
+          <a:xfrm>
+            <a:off x="7964716" y="3726804"/>
+            <a:ext cx="1969200" cy="619200"/>
+            <a:chOff x="7798052" y="3425188"/>
+            <a:chExt cx="1969200" cy="619200"/>
+          </a:xfrm>
+        </p:grpSpPr>
+        <p:sp>
+          <p:nvSpPr>
+            <p:cNvPr id="40" name="Rectangle: Rounded Corners 39">
+              <a:extLst>
+                <a:ext uri="{FF2B5EF4-FFF2-40B4-BE49-F238E27FC236}">
+                  <a16:creationId xmlns:a16="http://schemas.microsoft.com/office/drawing/2014/main" id="{3CAEF075-E167-437D-BFF4-9A6287CA92C9}"/>
+                </a:ext>
+              </a:extLst>
+            </p:cNvPr>
+            <p:cNvSpPr>
+              <a:spLocks noChangeAspect="1"/>
+            </p:cNvSpPr>
+            <p:nvPr/>
+          </p:nvSpPr>
+          <p:spPr>
+            <a:xfrm>
+              <a:off x="7798052" y="3425188"/>
+              <a:ext cx="1969200" cy="619200"/>
+            </a:xfrm>
+            <a:prstGeom prst="roundRect">
+              <a:avLst/>
+            </a:prstGeom>
+            <a:noFill/>
+          </p:spPr>
+          <p:style>
+            <a:lnRef idx="2">
+              <a:schemeClr val="accent1">
+                <a:shade val="50000"/>
+              </a:schemeClr>
+            </a:lnRef>
+            <a:fillRef idx="1">
+              <a:schemeClr val="accent1"/>
+            </a:fillRef>
+            <a:effectRef idx="0">
+              <a:schemeClr val="accent1"/>
+            </a:effectRef>
+            <a:fontRef idx="minor">
+              <a:schemeClr val="lt1"/>
+            </a:fontRef>
+          </p:style>
+          <p:txBody>
+            <a:bodyPr tIns="0" rtlCol="0" anchor="t" anchorCtr="0"/>
+            <a:lstStyle/>
+            <a:p>
+              <a:pPr algn="ctr"/>
+              <a:r>
+                <a:rPr lang="en-US" sz="1100" b="1" dirty="0">
+                  <a:solidFill>
+                    <a:srgbClr val="002060"/>
+                  </a:solidFill>
+                  <a:latin typeface="Verdana" panose="020B0604030504040204" pitchFamily="34" charset="0"/>
+                  <a:ea typeface="Verdana" panose="020B0604030504040204" pitchFamily="34" charset="0"/>
+                </a:rPr>
+                <a:t>Discount</a:t>
+              </a:r>
+              <a:r>
+                <a:rPr lang="en-US" sz="1100" dirty="0">
+                  <a:solidFill>
+                    <a:srgbClr val="002060"/>
+                  </a:solidFill>
+                  <a:latin typeface="Verdana" panose="020B0604030504040204" pitchFamily="34" charset="0"/>
+                  <a:ea typeface="Verdana" panose="020B0604030504040204" pitchFamily="34" charset="0"/>
+                </a:rPr>
+                <a:t> Microservices</a:t>
+              </a:r>
+              <a:endParaRPr lang="en-IN" sz="1100" dirty="0">
+                <a:solidFill>
+                  <a:srgbClr val="002060"/>
+                </a:solidFill>
+                <a:latin typeface="Verdana" panose="020B0604030504040204" pitchFamily="34" charset="0"/>
+                <a:ea typeface="Verdana" panose="020B0604030504040204" pitchFamily="34" charset="0"/>
+              </a:endParaRPr>
+            </a:p>
+          </p:txBody>
+        </p:sp>
+        <p:pic>
+          <p:nvPicPr>
+            <p:cNvPr id="41" name="Picture 20">
+              <a:extLst>
+                <a:ext uri="{FF2B5EF4-FFF2-40B4-BE49-F238E27FC236}">
+                  <a16:creationId xmlns:a16="http://schemas.microsoft.com/office/drawing/2014/main" id="{3DB0514E-3F9C-476F-A639-F1516243636B}"/>
+                </a:ext>
+              </a:extLst>
+            </p:cNvPr>
+            <p:cNvPicPr>
+              <a:picLocks noChangeAspect="1" noChangeArrowheads="1"/>
+            </p:cNvPicPr>
+            <p:nvPr/>
+          </p:nvPicPr>
+          <p:blipFill>
+            <a:blip r:embed="rId8">
+              <a:extLst>
+                <a:ext uri="{28A0092B-C50C-407E-A947-70E740481C1C}">
+                  <a14:useLocalDpi xmlns:a14="http://schemas.microsoft.com/office/drawing/2010/main" val="0"/>
+                </a:ext>
+              </a:extLst>
+            </a:blip>
+            <a:srcRect/>
+            <a:stretch>
+              <a:fillRect/>
+            </a:stretch>
+          </p:blipFill>
+          <p:spPr bwMode="auto">
+            <a:xfrm>
+              <a:off x="8098655" y="3667205"/>
+              <a:ext cx="360000" cy="360000"/>
+            </a:xfrm>
+            <a:prstGeom prst="rect">
+              <a:avLst/>
+            </a:prstGeom>
+            <a:noFill/>
+            <a:extLst>
+              <a:ext uri="{909E8E84-426E-40DD-AFC4-6F175D3DCCD1}">
+                <a14:hiddenFill xmlns:a14="http://schemas.microsoft.com/office/drawing/2010/main">
+                  <a:solidFill>
+                    <a:srgbClr val="FFFFFF"/>
+                  </a:solidFill>
+                </a14:hiddenFill>
+              </a:ext>
+            </a:extLst>
+          </p:spPr>
+        </p:pic>
+        <p:sp>
+          <p:nvSpPr>
+            <p:cNvPr id="42" name="TextBox 41">
+              <a:extLst>
+                <a:ext uri="{FF2B5EF4-FFF2-40B4-BE49-F238E27FC236}">
+                  <a16:creationId xmlns:a16="http://schemas.microsoft.com/office/drawing/2014/main" id="{F63D8927-F81D-48CB-8D6C-C6AD264E4E3A}"/>
+                </a:ext>
+              </a:extLst>
+            </p:cNvPr>
+            <p:cNvSpPr txBox="1"/>
+            <p:nvPr/>
+          </p:nvSpPr>
+          <p:spPr>
+            <a:xfrm>
+              <a:off x="8693308" y="3667205"/>
+              <a:ext cx="1014331" cy="246221"/>
+            </a:xfrm>
+            <a:prstGeom prst="rect">
+              <a:avLst/>
+            </a:prstGeom>
+            <a:noFill/>
+          </p:spPr>
+          <p:txBody>
+            <a:bodyPr wrap="square" rtlCol="0">
+              <a:spAutoFit/>
+            </a:bodyPr>
+            <a:lstStyle/>
+            <a:p>
+              <a:r>
+                <a:rPr lang="en-US" sz="1000" b="1" dirty="0">
+                  <a:solidFill>
+                    <a:srgbClr val="0070C0"/>
+                  </a:solidFill>
+                  <a:latin typeface="Verdana" panose="020B0604030504040204" pitchFamily="34" charset="0"/>
+                  <a:ea typeface="Verdana" panose="020B0604030504040204" pitchFamily="34" charset="0"/>
+                </a:rPr>
+                <a:t>PostgreSQL</a:t>
+              </a:r>
+              <a:endParaRPr lang="en-IN" sz="1000" b="1" dirty="0">
+                <a:solidFill>
+                  <a:srgbClr val="0070C0"/>
+                </a:solidFill>
+                <a:latin typeface="Verdana" panose="020B0604030504040204" pitchFamily="34" charset="0"/>
+                <a:ea typeface="Verdana" panose="020B0604030504040204" pitchFamily="34" charset="0"/>
+              </a:endParaRPr>
+            </a:p>
+          </p:txBody>
+        </p:sp>
+      </p:grpSp>
+      <p:grpSp>
+        <p:nvGrpSpPr>
+          <p:cNvPr id="31" name="Group 30">
+            <a:extLst>
+              <a:ext uri="{FF2B5EF4-FFF2-40B4-BE49-F238E27FC236}">
+                <a16:creationId xmlns:a16="http://schemas.microsoft.com/office/drawing/2014/main" id="{A5DC677F-5694-4BF6-AF09-A492B9987CD7}"/>
+              </a:ext>
+            </a:extLst>
+          </p:cNvPr>
+          <p:cNvGrpSpPr/>
+          <p:nvPr/>
+        </p:nvGrpSpPr>
+        <p:grpSpPr>
+          <a:xfrm>
+            <a:off x="7956368" y="2600856"/>
+            <a:ext cx="1969200" cy="619200"/>
+            <a:chOff x="7823992" y="2497818"/>
+            <a:chExt cx="1969200" cy="619200"/>
+          </a:xfrm>
+        </p:grpSpPr>
+        <p:sp>
+          <p:nvSpPr>
+            <p:cNvPr id="43" name="Rectangle: Rounded Corners 42">
+              <a:extLst>
+                <a:ext uri="{FF2B5EF4-FFF2-40B4-BE49-F238E27FC236}">
+                  <a16:creationId xmlns:a16="http://schemas.microsoft.com/office/drawing/2014/main" id="{7A79C8E0-9E26-4A4B-9470-4C8B5F3500C7}"/>
+                </a:ext>
+              </a:extLst>
+            </p:cNvPr>
+            <p:cNvSpPr>
+              <a:spLocks noChangeAspect="1"/>
+            </p:cNvSpPr>
+            <p:nvPr/>
+          </p:nvSpPr>
+          <p:spPr>
+            <a:xfrm>
+              <a:off x="7823992" y="2497818"/>
+              <a:ext cx="1969200" cy="619200"/>
+            </a:xfrm>
+            <a:prstGeom prst="roundRect">
+              <a:avLst/>
+            </a:prstGeom>
+            <a:noFill/>
+          </p:spPr>
+          <p:style>
+            <a:lnRef idx="2">
+              <a:schemeClr val="accent1">
+                <a:shade val="50000"/>
+              </a:schemeClr>
+            </a:lnRef>
+            <a:fillRef idx="1">
+              <a:schemeClr val="accent1"/>
+            </a:fillRef>
+            <a:effectRef idx="0">
+              <a:schemeClr val="accent1"/>
+            </a:effectRef>
+            <a:fontRef idx="minor">
+              <a:schemeClr val="lt1"/>
+            </a:fontRef>
+          </p:style>
+          <p:txBody>
+            <a:bodyPr tIns="0" rtlCol="0" anchor="t" anchorCtr="0"/>
+            <a:lstStyle/>
+            <a:p>
+              <a:pPr algn="ctr"/>
+              <a:r>
+                <a:rPr lang="en-US" sz="1100" b="1" dirty="0">
+                  <a:solidFill>
+                    <a:srgbClr val="002060"/>
+                  </a:solidFill>
+                  <a:latin typeface="Verdana" panose="020B0604030504040204" pitchFamily="34" charset="0"/>
+                  <a:ea typeface="Verdana" panose="020B0604030504040204" pitchFamily="34" charset="0"/>
+                </a:rPr>
+                <a:t>Orders</a:t>
+              </a:r>
+              <a:r>
+                <a:rPr lang="en-US" sz="1100" dirty="0">
+                  <a:solidFill>
+                    <a:srgbClr val="002060"/>
+                  </a:solidFill>
+                  <a:latin typeface="Verdana" panose="020B0604030504040204" pitchFamily="34" charset="0"/>
+                  <a:ea typeface="Verdana" panose="020B0604030504040204" pitchFamily="34" charset="0"/>
+                </a:rPr>
+                <a:t> Microservices</a:t>
+              </a:r>
+              <a:endParaRPr lang="en-IN" sz="1100" dirty="0">
+                <a:solidFill>
+                  <a:srgbClr val="002060"/>
+                </a:solidFill>
+                <a:latin typeface="Verdana" panose="020B0604030504040204" pitchFamily="34" charset="0"/>
+                <a:ea typeface="Verdana" panose="020B0604030504040204" pitchFamily="34" charset="0"/>
+              </a:endParaRPr>
+            </a:p>
+          </p:txBody>
+        </p:sp>
+        <p:pic>
+          <p:nvPicPr>
+            <p:cNvPr id="44" name="Picture 20">
+              <a:extLst>
+                <a:ext uri="{FF2B5EF4-FFF2-40B4-BE49-F238E27FC236}">
+                  <a16:creationId xmlns:a16="http://schemas.microsoft.com/office/drawing/2014/main" id="{E3098846-212C-4321-9C0E-A9B19533EDEE}"/>
+                </a:ext>
+              </a:extLst>
+            </p:cNvPr>
+            <p:cNvPicPr>
+              <a:picLocks noChangeAspect="1" noChangeArrowheads="1"/>
+            </p:cNvPicPr>
+            <p:nvPr/>
+          </p:nvPicPr>
+          <p:blipFill>
+            <a:blip r:embed="rId8">
+              <a:extLst>
+                <a:ext uri="{28A0092B-C50C-407E-A947-70E740481C1C}">
+                  <a14:useLocalDpi xmlns:a14="http://schemas.microsoft.com/office/drawing/2010/main" val="0"/>
+                </a:ext>
+              </a:extLst>
+            </a:blip>
+            <a:srcRect/>
+            <a:stretch>
+              <a:fillRect/>
+            </a:stretch>
+          </p:blipFill>
+          <p:spPr bwMode="auto">
+            <a:xfrm>
+              <a:off x="8124595" y="2739835"/>
+              <a:ext cx="360000" cy="360000"/>
+            </a:xfrm>
+            <a:prstGeom prst="rect">
+              <a:avLst/>
+            </a:prstGeom>
+            <a:noFill/>
+            <a:extLst>
+              <a:ext uri="{909E8E84-426E-40DD-AFC4-6F175D3DCCD1}">
+                <a14:hiddenFill xmlns:a14="http://schemas.microsoft.com/office/drawing/2010/main">
+                  <a:solidFill>
+                    <a:srgbClr val="FFFFFF"/>
+                  </a:solidFill>
+                </a14:hiddenFill>
+              </a:ext>
+            </a:extLst>
+          </p:spPr>
+        </p:pic>
+        <p:sp>
+          <p:nvSpPr>
+            <p:cNvPr id="45" name="TextBox 44">
+              <a:extLst>
+                <a:ext uri="{FF2B5EF4-FFF2-40B4-BE49-F238E27FC236}">
+                  <a16:creationId xmlns:a16="http://schemas.microsoft.com/office/drawing/2014/main" id="{9D88C785-EC31-41DD-98F4-1056A4A64BF9}"/>
+                </a:ext>
+              </a:extLst>
+            </p:cNvPr>
+            <p:cNvSpPr txBox="1"/>
+            <p:nvPr/>
+          </p:nvSpPr>
+          <p:spPr>
+            <a:xfrm>
+              <a:off x="8719248" y="2739835"/>
+              <a:ext cx="1014331" cy="246221"/>
+            </a:xfrm>
+            <a:prstGeom prst="rect">
+              <a:avLst/>
+            </a:prstGeom>
+            <a:noFill/>
+          </p:spPr>
+          <p:txBody>
+            <a:bodyPr wrap="square" rtlCol="0">
+              <a:spAutoFit/>
+            </a:bodyPr>
+            <a:lstStyle/>
+            <a:p>
+              <a:r>
+                <a:rPr lang="en-US" sz="1000" b="1" dirty="0">
+                  <a:solidFill>
+                    <a:srgbClr val="0070C0"/>
+                  </a:solidFill>
+                  <a:latin typeface="Verdana" panose="020B0604030504040204" pitchFamily="34" charset="0"/>
+                  <a:ea typeface="Verdana" panose="020B0604030504040204" pitchFamily="34" charset="0"/>
+                </a:rPr>
+                <a:t>MySQL</a:t>
+              </a:r>
+              <a:endParaRPr lang="en-IN" sz="1000" b="1" dirty="0">
+                <a:solidFill>
+                  <a:srgbClr val="0070C0"/>
+                </a:solidFill>
+                <a:latin typeface="Verdana" panose="020B0604030504040204" pitchFamily="34" charset="0"/>
+                <a:ea typeface="Verdana" panose="020B0604030504040204" pitchFamily="34" charset="0"/>
+              </a:endParaRPr>
+            </a:p>
+          </p:txBody>
+        </p:sp>
+      </p:grpSp>
+      <p:grpSp>
+        <p:nvGrpSpPr>
+          <p:cNvPr id="49" name="Group 48">
+            <a:extLst>
+              <a:ext uri="{FF2B5EF4-FFF2-40B4-BE49-F238E27FC236}">
+                <a16:creationId xmlns:a16="http://schemas.microsoft.com/office/drawing/2014/main" id="{4F03BC2D-6615-4557-A773-47DBF8E1D1E4}"/>
+              </a:ext>
+            </a:extLst>
+          </p:cNvPr>
+          <p:cNvGrpSpPr/>
+          <p:nvPr/>
+        </p:nvGrpSpPr>
+        <p:grpSpPr>
+          <a:xfrm>
+            <a:off x="7985260" y="1506212"/>
+            <a:ext cx="1969200" cy="619200"/>
+            <a:chOff x="7823992" y="2497818"/>
+            <a:chExt cx="1969200" cy="619200"/>
+          </a:xfrm>
+        </p:grpSpPr>
+        <p:sp>
+          <p:nvSpPr>
+            <p:cNvPr id="50" name="Rectangle: Rounded Corners 49">
+              <a:extLst>
+                <a:ext uri="{FF2B5EF4-FFF2-40B4-BE49-F238E27FC236}">
+                  <a16:creationId xmlns:a16="http://schemas.microsoft.com/office/drawing/2014/main" id="{1B211F49-1B79-4F8F-9E75-ECA4387E7EB4}"/>
+                </a:ext>
+              </a:extLst>
+            </p:cNvPr>
+            <p:cNvSpPr>
+              <a:spLocks noChangeAspect="1"/>
+            </p:cNvSpPr>
+            <p:nvPr/>
+          </p:nvSpPr>
+          <p:spPr>
+            <a:xfrm>
+              <a:off x="7823992" y="2497818"/>
+              <a:ext cx="1969200" cy="619200"/>
+            </a:xfrm>
+            <a:prstGeom prst="roundRect">
+              <a:avLst/>
+            </a:prstGeom>
+            <a:noFill/>
+          </p:spPr>
+          <p:style>
+            <a:lnRef idx="2">
+              <a:schemeClr val="accent1">
+                <a:shade val="50000"/>
+              </a:schemeClr>
+            </a:lnRef>
+            <a:fillRef idx="1">
+              <a:schemeClr val="accent1"/>
+            </a:fillRef>
+            <a:effectRef idx="0">
+              <a:schemeClr val="accent1"/>
+            </a:effectRef>
+            <a:fontRef idx="minor">
+              <a:schemeClr val="lt1"/>
+            </a:fontRef>
+          </p:style>
+          <p:txBody>
+            <a:bodyPr tIns="0" rtlCol="0" anchor="t" anchorCtr="0"/>
+            <a:lstStyle/>
+            <a:p>
+              <a:pPr algn="ctr"/>
+              <a:r>
+                <a:rPr lang="en-US" sz="1100" b="1" dirty="0">
+                  <a:solidFill>
+                    <a:srgbClr val="002060"/>
+                  </a:solidFill>
+                  <a:latin typeface="Verdana" panose="020B0604030504040204" pitchFamily="34" charset="0"/>
+                  <a:ea typeface="Verdana" panose="020B0604030504040204" pitchFamily="34" charset="0"/>
+                </a:rPr>
+                <a:t>Payment</a:t>
+              </a:r>
+              <a:r>
+                <a:rPr lang="en-US" sz="1100" dirty="0">
+                  <a:solidFill>
+                    <a:srgbClr val="002060"/>
+                  </a:solidFill>
+                  <a:latin typeface="Verdana" panose="020B0604030504040204" pitchFamily="34" charset="0"/>
+                  <a:ea typeface="Verdana" panose="020B0604030504040204" pitchFamily="34" charset="0"/>
+                </a:rPr>
+                <a:t> Microservices</a:t>
+              </a:r>
+              <a:endParaRPr lang="en-IN" sz="1100" dirty="0">
+                <a:solidFill>
+                  <a:srgbClr val="002060"/>
+                </a:solidFill>
+                <a:latin typeface="Verdana" panose="020B0604030504040204" pitchFamily="34" charset="0"/>
+                <a:ea typeface="Verdana" panose="020B0604030504040204" pitchFamily="34" charset="0"/>
+              </a:endParaRPr>
+            </a:p>
+          </p:txBody>
+        </p:sp>
+        <p:pic>
+          <p:nvPicPr>
+            <p:cNvPr id="51" name="Picture 20">
+              <a:extLst>
+                <a:ext uri="{FF2B5EF4-FFF2-40B4-BE49-F238E27FC236}">
+                  <a16:creationId xmlns:a16="http://schemas.microsoft.com/office/drawing/2014/main" id="{5C7AA196-9FA6-4187-891B-2CFBDB24AD04}"/>
+                </a:ext>
+              </a:extLst>
+            </p:cNvPr>
+            <p:cNvPicPr>
+              <a:picLocks noChangeAspect="1" noChangeArrowheads="1"/>
+            </p:cNvPicPr>
+            <p:nvPr/>
+          </p:nvPicPr>
+          <p:blipFill>
+            <a:blip r:embed="rId8">
+              <a:extLst>
+                <a:ext uri="{28A0092B-C50C-407E-A947-70E740481C1C}">
+                  <a14:useLocalDpi xmlns:a14="http://schemas.microsoft.com/office/drawing/2010/main" val="0"/>
+                </a:ext>
+              </a:extLst>
+            </a:blip>
+            <a:srcRect/>
+            <a:stretch>
+              <a:fillRect/>
+            </a:stretch>
+          </p:blipFill>
+          <p:spPr bwMode="auto">
+            <a:xfrm>
+              <a:off x="8124595" y="2739835"/>
+              <a:ext cx="360000" cy="360000"/>
+            </a:xfrm>
+            <a:prstGeom prst="rect">
+              <a:avLst/>
+            </a:prstGeom>
+            <a:noFill/>
+            <a:extLst>
+              <a:ext uri="{909E8E84-426E-40DD-AFC4-6F175D3DCCD1}">
+                <a14:hiddenFill xmlns:a14="http://schemas.microsoft.com/office/drawing/2010/main">
+                  <a:solidFill>
+                    <a:srgbClr val="FFFFFF"/>
+                  </a:solidFill>
+                </a14:hiddenFill>
+              </a:ext>
+            </a:extLst>
+          </p:spPr>
+        </p:pic>
+        <p:sp>
+          <p:nvSpPr>
+            <p:cNvPr id="52" name="TextBox 51">
+              <a:extLst>
+                <a:ext uri="{FF2B5EF4-FFF2-40B4-BE49-F238E27FC236}">
+                  <a16:creationId xmlns:a16="http://schemas.microsoft.com/office/drawing/2014/main" id="{3E1C3DCD-0CFF-4649-AEC1-1F4F0202DCDC}"/>
+                </a:ext>
+              </a:extLst>
+            </p:cNvPr>
+            <p:cNvSpPr txBox="1"/>
+            <p:nvPr/>
+          </p:nvSpPr>
+          <p:spPr>
+            <a:xfrm>
+              <a:off x="8719248" y="2739835"/>
+              <a:ext cx="1014331" cy="246221"/>
+            </a:xfrm>
+            <a:prstGeom prst="rect">
+              <a:avLst/>
+            </a:prstGeom>
+            <a:noFill/>
+          </p:spPr>
+          <p:txBody>
+            <a:bodyPr wrap="square" rtlCol="0">
+              <a:spAutoFit/>
+            </a:bodyPr>
+            <a:lstStyle/>
+            <a:p>
+              <a:r>
+                <a:rPr lang="en-US" sz="1000" b="1" dirty="0">
+                  <a:solidFill>
+                    <a:srgbClr val="0070C0"/>
+                  </a:solidFill>
+                  <a:latin typeface="Verdana" panose="020B0604030504040204" pitchFamily="34" charset="0"/>
+                  <a:ea typeface="Verdana" panose="020B0604030504040204" pitchFamily="34" charset="0"/>
+                </a:rPr>
+                <a:t>Event Bus</a:t>
+              </a:r>
+              <a:endParaRPr lang="en-IN" sz="1000" b="1" dirty="0">
+                <a:solidFill>
+                  <a:srgbClr val="0070C0"/>
+                </a:solidFill>
+                <a:latin typeface="Verdana" panose="020B0604030504040204" pitchFamily="34" charset="0"/>
+                <a:ea typeface="Verdana" panose="020B0604030504040204" pitchFamily="34" charset="0"/>
+              </a:endParaRPr>
+            </a:p>
+          </p:txBody>
+        </p:sp>
+      </p:grpSp>
+      <p:grpSp>
+        <p:nvGrpSpPr>
+          <p:cNvPr id="53" name="Group 52">
+            <a:extLst>
+              <a:ext uri="{FF2B5EF4-FFF2-40B4-BE49-F238E27FC236}">
+                <a16:creationId xmlns:a16="http://schemas.microsoft.com/office/drawing/2014/main" id="{9A12A845-E314-48C2-9F0A-740E025F4F3B}"/>
+              </a:ext>
+            </a:extLst>
+          </p:cNvPr>
+          <p:cNvGrpSpPr/>
+          <p:nvPr/>
+        </p:nvGrpSpPr>
+        <p:grpSpPr>
+          <a:xfrm>
+            <a:off x="7959481" y="396473"/>
+            <a:ext cx="1969200" cy="619200"/>
+            <a:chOff x="7823992" y="2497818"/>
+            <a:chExt cx="1969200" cy="619200"/>
+          </a:xfrm>
+        </p:grpSpPr>
+        <p:sp>
+          <p:nvSpPr>
+            <p:cNvPr id="54" name="Rectangle: Rounded Corners 53">
+              <a:extLst>
+                <a:ext uri="{FF2B5EF4-FFF2-40B4-BE49-F238E27FC236}">
+                  <a16:creationId xmlns:a16="http://schemas.microsoft.com/office/drawing/2014/main" id="{FFCECE9B-E32A-49A9-B3E0-F338108852F7}"/>
+                </a:ext>
+              </a:extLst>
+            </p:cNvPr>
+            <p:cNvSpPr>
+              <a:spLocks noChangeAspect="1"/>
+            </p:cNvSpPr>
+            <p:nvPr/>
+          </p:nvSpPr>
+          <p:spPr>
+            <a:xfrm>
+              <a:off x="7823992" y="2497818"/>
+              <a:ext cx="1969200" cy="619200"/>
+            </a:xfrm>
+            <a:prstGeom prst="roundRect">
+              <a:avLst/>
+            </a:prstGeom>
+            <a:noFill/>
+          </p:spPr>
+          <p:style>
+            <a:lnRef idx="2">
+              <a:schemeClr val="accent1">
+                <a:shade val="50000"/>
+              </a:schemeClr>
+            </a:lnRef>
+            <a:fillRef idx="1">
+              <a:schemeClr val="accent1"/>
+            </a:fillRef>
+            <a:effectRef idx="0">
+              <a:schemeClr val="accent1"/>
+            </a:effectRef>
+            <a:fontRef idx="minor">
+              <a:schemeClr val="lt1"/>
+            </a:fontRef>
+          </p:style>
+          <p:txBody>
+            <a:bodyPr tIns="0" rtlCol="0" anchor="t" anchorCtr="0"/>
+            <a:lstStyle/>
+            <a:p>
+              <a:pPr algn="ctr"/>
+              <a:r>
+                <a:rPr lang="en-US" sz="1100" b="1" dirty="0">
+                  <a:solidFill>
+                    <a:srgbClr val="002060"/>
+                  </a:solidFill>
+                  <a:latin typeface="Verdana" panose="020B0604030504040204" pitchFamily="34" charset="0"/>
+                  <a:ea typeface="Verdana" panose="020B0604030504040204" pitchFamily="34" charset="0"/>
+                </a:rPr>
+                <a:t>Identity</a:t>
+              </a:r>
+              <a:r>
+                <a:rPr lang="en-US" sz="1100" dirty="0">
+                  <a:solidFill>
+                    <a:srgbClr val="002060"/>
+                  </a:solidFill>
+                  <a:latin typeface="Verdana" panose="020B0604030504040204" pitchFamily="34" charset="0"/>
+                  <a:ea typeface="Verdana" panose="020B0604030504040204" pitchFamily="34" charset="0"/>
+                </a:rPr>
+                <a:t> Microservices</a:t>
+              </a:r>
+              <a:endParaRPr lang="en-IN" sz="1100" dirty="0">
+                <a:solidFill>
+                  <a:srgbClr val="002060"/>
+                </a:solidFill>
+                <a:latin typeface="Verdana" panose="020B0604030504040204" pitchFamily="34" charset="0"/>
+                <a:ea typeface="Verdana" panose="020B0604030504040204" pitchFamily="34" charset="0"/>
+              </a:endParaRPr>
+            </a:p>
+          </p:txBody>
+        </p:sp>
+        <p:pic>
+          <p:nvPicPr>
+            <p:cNvPr id="55" name="Picture 20">
+              <a:extLst>
+                <a:ext uri="{FF2B5EF4-FFF2-40B4-BE49-F238E27FC236}">
+                  <a16:creationId xmlns:a16="http://schemas.microsoft.com/office/drawing/2014/main" id="{BC72CEB6-BA9C-4238-9953-7F6BEC162749}"/>
+                </a:ext>
+              </a:extLst>
+            </p:cNvPr>
+            <p:cNvPicPr>
+              <a:picLocks noChangeAspect="1" noChangeArrowheads="1"/>
+            </p:cNvPicPr>
+            <p:nvPr/>
+          </p:nvPicPr>
+          <p:blipFill>
+            <a:blip r:embed="rId8">
+              <a:extLst>
+                <a:ext uri="{28A0092B-C50C-407E-A947-70E740481C1C}">
+                  <a14:useLocalDpi xmlns:a14="http://schemas.microsoft.com/office/drawing/2010/main" val="0"/>
+                </a:ext>
+              </a:extLst>
+            </a:blip>
+            <a:srcRect/>
+            <a:stretch>
+              <a:fillRect/>
+            </a:stretch>
+          </p:blipFill>
+          <p:spPr bwMode="auto">
+            <a:xfrm>
+              <a:off x="8124595" y="2739835"/>
+              <a:ext cx="360000" cy="360000"/>
+            </a:xfrm>
+            <a:prstGeom prst="rect">
+              <a:avLst/>
+            </a:prstGeom>
+            <a:noFill/>
+            <a:extLst>
+              <a:ext uri="{909E8E84-426E-40DD-AFC4-6F175D3DCCD1}">
+                <a14:hiddenFill xmlns:a14="http://schemas.microsoft.com/office/drawing/2010/main">
+                  <a:solidFill>
+                    <a:srgbClr val="FFFFFF"/>
+                  </a:solidFill>
+                </a14:hiddenFill>
+              </a:ext>
+            </a:extLst>
+          </p:spPr>
+        </p:pic>
+        <p:sp>
+          <p:nvSpPr>
+            <p:cNvPr id="56" name="TextBox 55">
+              <a:extLst>
+                <a:ext uri="{FF2B5EF4-FFF2-40B4-BE49-F238E27FC236}">
+                  <a16:creationId xmlns:a16="http://schemas.microsoft.com/office/drawing/2014/main" id="{31EA22C6-08EA-4C68-ADC0-92E2F7BEF97B}"/>
+                </a:ext>
+              </a:extLst>
+            </p:cNvPr>
+            <p:cNvSpPr txBox="1"/>
+            <p:nvPr/>
+          </p:nvSpPr>
+          <p:spPr>
+            <a:xfrm>
+              <a:off x="8719248" y="2739835"/>
+              <a:ext cx="1014331" cy="246221"/>
+            </a:xfrm>
+            <a:prstGeom prst="rect">
+              <a:avLst/>
+            </a:prstGeom>
+            <a:noFill/>
+          </p:spPr>
+          <p:txBody>
+            <a:bodyPr wrap="square" rtlCol="0">
+              <a:spAutoFit/>
+            </a:bodyPr>
+            <a:lstStyle/>
+            <a:p>
+              <a:r>
+                <a:rPr lang="en-US" sz="1000" b="1" dirty="0">
+                  <a:solidFill>
+                    <a:srgbClr val="0070C0"/>
+                  </a:solidFill>
+                  <a:latin typeface="Verdana" panose="020B0604030504040204" pitchFamily="34" charset="0"/>
+                  <a:ea typeface="Verdana" panose="020B0604030504040204" pitchFamily="34" charset="0"/>
+                </a:rPr>
+                <a:t>SQL Server</a:t>
+              </a:r>
+              <a:endParaRPr lang="en-IN" sz="1000" b="1" dirty="0">
+                <a:solidFill>
+                  <a:srgbClr val="0070C0"/>
+                </a:solidFill>
+                <a:latin typeface="Verdana" panose="020B0604030504040204" pitchFamily="34" charset="0"/>
+                <a:ea typeface="Verdana" panose="020B0604030504040204" pitchFamily="34" charset="0"/>
+              </a:endParaRPr>
+            </a:p>
+          </p:txBody>
+        </p:sp>
+      </p:grpSp>
+      <p:cxnSp>
+        <p:nvCxnSpPr>
+          <p:cNvPr id="33" name="Straight Connector 32">
+            <a:extLst>
+              <a:ext uri="{FF2B5EF4-FFF2-40B4-BE49-F238E27FC236}">
+                <a16:creationId xmlns:a16="http://schemas.microsoft.com/office/drawing/2014/main" id="{56781F03-9507-4681-B192-5667BCCEAE3D}"/>
+              </a:ext>
+            </a:extLst>
+          </p:cNvPr>
+          <p:cNvCxnSpPr/>
+          <p:nvPr/>
+        </p:nvCxnSpPr>
+        <p:spPr>
+          <a:xfrm>
+            <a:off x="9943845" y="6260485"/>
+            <a:ext cx="648000" cy="0"/>
+          </a:xfrm>
+          <a:prstGeom prst="line">
+            <a:avLst/>
+          </a:prstGeom>
+        </p:spPr>
+        <p:style>
+          <a:lnRef idx="2">
+            <a:schemeClr val="accent1"/>
+          </a:lnRef>
+          <a:fillRef idx="0">
+            <a:schemeClr val="accent1"/>
+          </a:fillRef>
+          <a:effectRef idx="1">
+            <a:schemeClr val="accent1"/>
+          </a:effectRef>
+          <a:fontRef idx="minor">
+            <a:schemeClr val="tx1"/>
+          </a:fontRef>
+        </p:style>
+      </p:cxnSp>
+      <p:cxnSp>
+        <p:nvCxnSpPr>
+          <p:cNvPr id="59" name="Straight Connector 58">
+            <a:extLst>
+              <a:ext uri="{FF2B5EF4-FFF2-40B4-BE49-F238E27FC236}">
+                <a16:creationId xmlns:a16="http://schemas.microsoft.com/office/drawing/2014/main" id="{F4B8C494-65F0-434E-895D-ADDA5F888D9C}"/>
+              </a:ext>
+            </a:extLst>
+          </p:cNvPr>
+          <p:cNvCxnSpPr/>
+          <p:nvPr/>
+        </p:nvCxnSpPr>
+        <p:spPr>
+          <a:xfrm>
+            <a:off x="9935159" y="688216"/>
+            <a:ext cx="648000" cy="0"/>
+          </a:xfrm>
+          <a:prstGeom prst="line">
+            <a:avLst/>
+          </a:prstGeom>
+        </p:spPr>
+        <p:style>
+          <a:lnRef idx="2">
+            <a:schemeClr val="accent1"/>
+          </a:lnRef>
+          <a:fillRef idx="0">
+            <a:schemeClr val="accent1"/>
+          </a:fillRef>
+          <a:effectRef idx="1">
+            <a:schemeClr val="accent1"/>
+          </a:effectRef>
+          <a:fontRef idx="minor">
+            <a:schemeClr val="tx1"/>
+          </a:fontRef>
+        </p:style>
+      </p:cxnSp>
+      <p:cxnSp>
+        <p:nvCxnSpPr>
+          <p:cNvPr id="60" name="Straight Connector 59">
+            <a:extLst>
+              <a:ext uri="{FF2B5EF4-FFF2-40B4-BE49-F238E27FC236}">
+                <a16:creationId xmlns:a16="http://schemas.microsoft.com/office/drawing/2014/main" id="{2F60FC1B-F234-4E03-812D-98F6541BE01C}"/>
+              </a:ext>
+            </a:extLst>
+          </p:cNvPr>
+          <p:cNvCxnSpPr/>
+          <p:nvPr/>
+        </p:nvCxnSpPr>
+        <p:spPr>
+          <a:xfrm>
+            <a:off x="9940600" y="5177468"/>
+            <a:ext cx="648000" cy="0"/>
+          </a:xfrm>
+          <a:prstGeom prst="line">
+            <a:avLst/>
+          </a:prstGeom>
+        </p:spPr>
+        <p:style>
+          <a:lnRef idx="2">
+            <a:schemeClr val="accent1"/>
+          </a:lnRef>
+          <a:fillRef idx="0">
+            <a:schemeClr val="accent1"/>
+          </a:fillRef>
+          <a:effectRef idx="1">
+            <a:schemeClr val="accent1"/>
+          </a:effectRef>
+          <a:fontRef idx="minor">
+            <a:schemeClr val="tx1"/>
+          </a:fontRef>
+        </p:style>
+      </p:cxnSp>
+      <p:cxnSp>
+        <p:nvCxnSpPr>
+          <p:cNvPr id="61" name="Straight Connector 60">
+            <a:extLst>
+              <a:ext uri="{FF2B5EF4-FFF2-40B4-BE49-F238E27FC236}">
+                <a16:creationId xmlns:a16="http://schemas.microsoft.com/office/drawing/2014/main" id="{556ACF82-FA6E-4DCE-A939-4478A7509041}"/>
+              </a:ext>
+            </a:extLst>
+          </p:cNvPr>
+          <p:cNvCxnSpPr/>
+          <p:nvPr/>
+        </p:nvCxnSpPr>
+        <p:spPr>
+          <a:xfrm>
+            <a:off x="9937358" y="4036088"/>
+            <a:ext cx="648000" cy="0"/>
+          </a:xfrm>
+          <a:prstGeom prst="line">
+            <a:avLst/>
+          </a:prstGeom>
+        </p:spPr>
+        <p:style>
+          <a:lnRef idx="2">
+            <a:schemeClr val="accent1"/>
+          </a:lnRef>
+          <a:fillRef idx="0">
+            <a:schemeClr val="accent1"/>
+          </a:fillRef>
+          <a:effectRef idx="1">
+            <a:schemeClr val="accent1"/>
+          </a:effectRef>
+          <a:fontRef idx="minor">
+            <a:schemeClr val="tx1"/>
+          </a:fontRef>
+        </p:style>
+      </p:cxnSp>
+      <p:cxnSp>
+        <p:nvCxnSpPr>
+          <p:cNvPr id="62" name="Straight Connector 61">
+            <a:extLst>
+              <a:ext uri="{FF2B5EF4-FFF2-40B4-BE49-F238E27FC236}">
+                <a16:creationId xmlns:a16="http://schemas.microsoft.com/office/drawing/2014/main" id="{A7D250E4-8E5C-433E-8101-DD46A9ABD6AB}"/>
+              </a:ext>
+            </a:extLst>
+          </p:cNvPr>
+          <p:cNvCxnSpPr/>
+          <p:nvPr/>
+        </p:nvCxnSpPr>
+        <p:spPr>
+          <a:xfrm>
+            <a:off x="9927631" y="2917401"/>
+            <a:ext cx="648000" cy="0"/>
+          </a:xfrm>
+          <a:prstGeom prst="line">
+            <a:avLst/>
+          </a:prstGeom>
+        </p:spPr>
+        <p:style>
+          <a:lnRef idx="2">
+            <a:schemeClr val="accent1"/>
+          </a:lnRef>
+          <a:fillRef idx="0">
+            <a:schemeClr val="accent1"/>
+          </a:fillRef>
+          <a:effectRef idx="1">
+            <a:schemeClr val="accent1"/>
+          </a:effectRef>
+          <a:fontRef idx="minor">
+            <a:schemeClr val="tx1"/>
+          </a:fontRef>
+        </p:style>
+      </p:cxnSp>
+      <p:cxnSp>
+        <p:nvCxnSpPr>
+          <p:cNvPr id="63" name="Straight Connector 62">
+            <a:extLst>
+              <a:ext uri="{FF2B5EF4-FFF2-40B4-BE49-F238E27FC236}">
+                <a16:creationId xmlns:a16="http://schemas.microsoft.com/office/drawing/2014/main" id="{A2727CDA-B6F7-4F37-8202-C935ABAA0219}"/>
+              </a:ext>
+            </a:extLst>
+          </p:cNvPr>
+          <p:cNvCxnSpPr/>
+          <p:nvPr/>
+        </p:nvCxnSpPr>
+        <p:spPr>
+          <a:xfrm>
+            <a:off x="9947087" y="1818173"/>
+            <a:ext cx="648000" cy="0"/>
+          </a:xfrm>
+          <a:prstGeom prst="line">
+            <a:avLst/>
+          </a:prstGeom>
+        </p:spPr>
+        <p:style>
+          <a:lnRef idx="2">
+            <a:schemeClr val="accent1"/>
+          </a:lnRef>
+          <a:fillRef idx="0">
+            <a:schemeClr val="accent1"/>
+          </a:fillRef>
+          <a:effectRef idx="1">
+            <a:schemeClr val="accent1"/>
+          </a:effectRef>
+          <a:fontRef idx="minor">
+            <a:schemeClr val="tx1"/>
+          </a:fontRef>
+        </p:style>
+      </p:cxnSp>
+      <p:grpSp>
+        <p:nvGrpSpPr>
+          <p:cNvPr id="35" name="Group 34">
+            <a:extLst>
+              <a:ext uri="{FF2B5EF4-FFF2-40B4-BE49-F238E27FC236}">
+                <a16:creationId xmlns:a16="http://schemas.microsoft.com/office/drawing/2014/main" id="{4B839612-4D75-4914-B5FB-2F9F26A14222}"/>
+              </a:ext>
+            </a:extLst>
+          </p:cNvPr>
+          <p:cNvGrpSpPr/>
+          <p:nvPr/>
+        </p:nvGrpSpPr>
+        <p:grpSpPr>
+          <a:xfrm>
+            <a:off x="5797691" y="395078"/>
+            <a:ext cx="1838771" cy="3240423"/>
+            <a:chOff x="4863833" y="688216"/>
+            <a:chExt cx="1838771" cy="3240423"/>
+          </a:xfrm>
+        </p:grpSpPr>
+        <p:sp>
+          <p:nvSpPr>
+            <p:cNvPr id="5" name="Rectangle 4">
+              <a:extLst>
+                <a:ext uri="{FF2B5EF4-FFF2-40B4-BE49-F238E27FC236}">
+                  <a16:creationId xmlns:a16="http://schemas.microsoft.com/office/drawing/2014/main" id="{B5B283AE-04A1-4B80-939C-21B7C975E533}"/>
+                </a:ext>
+              </a:extLst>
+            </p:cNvPr>
+            <p:cNvSpPr/>
+            <p:nvPr/>
+          </p:nvSpPr>
+          <p:spPr>
+            <a:xfrm>
+              <a:off x="4863833" y="688216"/>
+              <a:ext cx="1838771" cy="3240423"/>
+            </a:xfrm>
+            <a:prstGeom prst="rect">
+              <a:avLst/>
+            </a:prstGeom>
+            <a:solidFill>
+              <a:srgbClr val="CDFFEB"/>
+            </a:solidFill>
+          </p:spPr>
+          <p:style>
+            <a:lnRef idx="2">
+              <a:schemeClr val="accent1">
+                <a:shade val="50000"/>
+              </a:schemeClr>
+            </a:lnRef>
+            <a:fillRef idx="1">
+              <a:schemeClr val="accent1"/>
+            </a:fillRef>
+            <a:effectRef idx="0">
+              <a:schemeClr val="accent1"/>
+            </a:effectRef>
+            <a:fontRef idx="minor">
+              <a:schemeClr val="lt1"/>
+            </a:fontRef>
+          </p:style>
+          <p:txBody>
+            <a:bodyPr rtlCol="0" anchor="t" anchorCtr="0"/>
+            <a:lstStyle/>
+            <a:p>
+              <a:pPr algn="ctr"/>
+              <a:r>
+                <a:rPr lang="en-US" sz="1200" dirty="0">
+                  <a:solidFill>
+                    <a:srgbClr val="002060"/>
+                  </a:solidFill>
+                  <a:latin typeface="Verdana" panose="020B0604030504040204" pitchFamily="34" charset="0"/>
+                  <a:ea typeface="Verdana" panose="020B0604030504040204" pitchFamily="34" charset="0"/>
+                </a:rPr>
+                <a:t>API Gateways / BFF</a:t>
+              </a:r>
+              <a:endParaRPr lang="en-IN" sz="1200" dirty="0">
+                <a:solidFill>
+                  <a:srgbClr val="002060"/>
+                </a:solidFill>
+                <a:latin typeface="Verdana" panose="020B0604030504040204" pitchFamily="34" charset="0"/>
+                <a:ea typeface="Verdana" panose="020B0604030504040204" pitchFamily="34" charset="0"/>
+              </a:endParaRPr>
+            </a:p>
+          </p:txBody>
+        </p:sp>
+        <p:sp>
+          <p:nvSpPr>
+            <p:cNvPr id="34" name="Rectangle: Rounded Corners 33">
+              <a:extLst>
+                <a:ext uri="{FF2B5EF4-FFF2-40B4-BE49-F238E27FC236}">
+                  <a16:creationId xmlns:a16="http://schemas.microsoft.com/office/drawing/2014/main" id="{5E23C091-B119-4FBE-B5B9-657199CF3DC5}"/>
+                </a:ext>
+              </a:extLst>
+            </p:cNvPr>
+            <p:cNvSpPr/>
+            <p:nvPr/>
+          </p:nvSpPr>
+          <p:spPr>
+            <a:xfrm>
+              <a:off x="5005419" y="1243564"/>
+              <a:ext cx="1541296" cy="504665"/>
+            </a:xfrm>
+            <a:prstGeom prst="roundRect">
+              <a:avLst/>
+            </a:prstGeom>
+            <a:solidFill>
+              <a:srgbClr val="E5FFF4"/>
+            </a:solidFill>
+          </p:spPr>
+          <p:style>
+            <a:lnRef idx="2">
+              <a:schemeClr val="accent1">
+                <a:shade val="50000"/>
+              </a:schemeClr>
+            </a:lnRef>
+            <a:fillRef idx="1">
+              <a:schemeClr val="accent1"/>
+            </a:fillRef>
+            <a:effectRef idx="0">
+              <a:schemeClr val="accent1"/>
+            </a:effectRef>
+            <a:fontRef idx="minor">
+              <a:schemeClr val="lt1"/>
+            </a:fontRef>
+          </p:style>
+          <p:txBody>
+            <a:bodyPr rtlCol="0" anchor="ctr"/>
+            <a:lstStyle/>
+            <a:p>
+              <a:pPr algn="ctr"/>
+              <a:r>
+                <a:rPr lang="en-US" sz="1100" dirty="0">
+                  <a:solidFill>
+                    <a:srgbClr val="002060"/>
+                  </a:solidFill>
+                  <a:latin typeface="Verdana" panose="020B0604030504040204" pitchFamily="34" charset="0"/>
+                  <a:ea typeface="Verdana" panose="020B0604030504040204" pitchFamily="34" charset="0"/>
+                </a:rPr>
+                <a:t>Aggregator Web</a:t>
+              </a:r>
+              <a:endParaRPr lang="en-IN" sz="1100" dirty="0">
+                <a:solidFill>
+                  <a:srgbClr val="002060"/>
+                </a:solidFill>
+                <a:latin typeface="Verdana" panose="020B0604030504040204" pitchFamily="34" charset="0"/>
+                <a:ea typeface="Verdana" panose="020B0604030504040204" pitchFamily="34" charset="0"/>
+              </a:endParaRPr>
+            </a:p>
+          </p:txBody>
+        </p:sp>
+        <p:sp>
+          <p:nvSpPr>
+            <p:cNvPr id="65" name="Rectangle: Rounded Corners 64">
+              <a:extLst>
+                <a:ext uri="{FF2B5EF4-FFF2-40B4-BE49-F238E27FC236}">
+                  <a16:creationId xmlns:a16="http://schemas.microsoft.com/office/drawing/2014/main" id="{7FAFEAAF-69EF-4F42-BD84-98FDAC764CBC}"/>
+                </a:ext>
+              </a:extLst>
+            </p:cNvPr>
+            <p:cNvSpPr/>
+            <p:nvPr/>
+          </p:nvSpPr>
+          <p:spPr>
+            <a:xfrm>
+              <a:off x="4999125" y="2096191"/>
+              <a:ext cx="1541296" cy="504665"/>
+            </a:xfrm>
+            <a:prstGeom prst="roundRect">
+              <a:avLst/>
+            </a:prstGeom>
+            <a:solidFill>
+              <a:srgbClr val="E5FFF4"/>
+            </a:solidFill>
+          </p:spPr>
+          <p:style>
+            <a:lnRef idx="2">
+              <a:schemeClr val="accent1">
+                <a:shade val="50000"/>
+              </a:schemeClr>
+            </a:lnRef>
+            <a:fillRef idx="1">
+              <a:schemeClr val="accent1"/>
+            </a:fillRef>
+            <a:effectRef idx="0">
+              <a:schemeClr val="accent1"/>
+            </a:effectRef>
+            <a:fontRef idx="minor">
+              <a:schemeClr val="lt1"/>
+            </a:fontRef>
+          </p:style>
+          <p:txBody>
+            <a:bodyPr rtlCol="0" anchor="ctr"/>
+            <a:lstStyle/>
+            <a:p>
+              <a:pPr algn="ctr"/>
+              <a:r>
+                <a:rPr lang="en-US" sz="1100" dirty="0">
+                  <a:solidFill>
+                    <a:srgbClr val="002060"/>
+                  </a:solidFill>
+                  <a:latin typeface="Verdana" panose="020B0604030504040204" pitchFamily="34" charset="0"/>
+                  <a:ea typeface="Verdana" panose="020B0604030504040204" pitchFamily="34" charset="0"/>
+                </a:rPr>
+                <a:t>Aggregator Mobile</a:t>
+              </a:r>
+              <a:endParaRPr lang="en-IN" sz="1100" dirty="0">
+                <a:solidFill>
+                  <a:srgbClr val="002060"/>
+                </a:solidFill>
+                <a:latin typeface="Verdana" panose="020B0604030504040204" pitchFamily="34" charset="0"/>
+                <a:ea typeface="Verdana" panose="020B0604030504040204" pitchFamily="34" charset="0"/>
+              </a:endParaRPr>
+            </a:p>
+          </p:txBody>
+        </p:sp>
+      </p:grpSp>
+      <p:grpSp>
+        <p:nvGrpSpPr>
+          <p:cNvPr id="4" name="Group 3">
+            <a:extLst>
+              <a:ext uri="{FF2B5EF4-FFF2-40B4-BE49-F238E27FC236}">
+                <a16:creationId xmlns:a16="http://schemas.microsoft.com/office/drawing/2014/main" id="{C0A23858-A376-44FD-AFBB-9416D4D59532}"/>
+              </a:ext>
+            </a:extLst>
+          </p:cNvPr>
+          <p:cNvGrpSpPr/>
+          <p:nvPr/>
+        </p:nvGrpSpPr>
+        <p:grpSpPr>
+          <a:xfrm>
+            <a:off x="3370236" y="398022"/>
+            <a:ext cx="1748242" cy="3211237"/>
+            <a:chOff x="3313675" y="322610"/>
+            <a:chExt cx="1748242" cy="3211237"/>
+          </a:xfrm>
+        </p:grpSpPr>
+        <p:sp>
+          <p:nvSpPr>
+            <p:cNvPr id="6" name="Rectangle 5">
+              <a:extLst>
+                <a:ext uri="{FF2B5EF4-FFF2-40B4-BE49-F238E27FC236}">
+                  <a16:creationId xmlns:a16="http://schemas.microsoft.com/office/drawing/2014/main" id="{E681EEBF-DED0-49C3-82BA-C359A5D505B5}"/>
+                </a:ext>
+              </a:extLst>
+            </p:cNvPr>
+            <p:cNvSpPr/>
+            <p:nvPr/>
+          </p:nvSpPr>
+          <p:spPr>
+            <a:xfrm>
+              <a:off x="3313675" y="322610"/>
+              <a:ext cx="1748242" cy="3211237"/>
+            </a:xfrm>
+            <a:prstGeom prst="rect">
+              <a:avLst/>
+            </a:prstGeom>
+            <a:solidFill>
+              <a:srgbClr val="FFF6D9"/>
+            </a:solidFill>
+          </p:spPr>
+          <p:style>
+            <a:lnRef idx="2">
+              <a:schemeClr val="accent1">
+                <a:shade val="50000"/>
+              </a:schemeClr>
+            </a:lnRef>
+            <a:fillRef idx="1">
+              <a:schemeClr val="accent1"/>
+            </a:fillRef>
+            <a:effectRef idx="0">
+              <a:schemeClr val="accent1"/>
+            </a:effectRef>
+            <a:fontRef idx="minor">
+              <a:schemeClr val="lt1"/>
+            </a:fontRef>
+          </p:style>
+          <p:txBody>
+            <a:bodyPr rtlCol="0" anchor="t" anchorCtr="0"/>
+            <a:lstStyle/>
+            <a:p>
+              <a:pPr algn="ctr"/>
+              <a:r>
+                <a:rPr lang="en-US" sz="1200" dirty="0">
+                  <a:solidFill>
+                    <a:srgbClr val="002060"/>
+                  </a:solidFill>
+                  <a:latin typeface="Verdana" panose="020B0604030504040204" pitchFamily="34" charset="0"/>
+                  <a:ea typeface="Verdana" panose="020B0604030504040204" pitchFamily="34" charset="0"/>
+                </a:rPr>
+                <a:t>Client Apps</a:t>
+              </a:r>
+              <a:endParaRPr lang="en-IN" sz="1200" dirty="0">
+                <a:solidFill>
+                  <a:srgbClr val="002060"/>
+                </a:solidFill>
+                <a:latin typeface="Verdana" panose="020B0604030504040204" pitchFamily="34" charset="0"/>
+                <a:ea typeface="Verdana" panose="020B0604030504040204" pitchFamily="34" charset="0"/>
+              </a:endParaRPr>
+            </a:p>
+          </p:txBody>
+        </p:sp>
+        <p:sp>
+          <p:nvSpPr>
+            <p:cNvPr id="71" name="Rectangle: Rounded Corners 70">
+              <a:extLst>
+                <a:ext uri="{FF2B5EF4-FFF2-40B4-BE49-F238E27FC236}">
+                  <a16:creationId xmlns:a16="http://schemas.microsoft.com/office/drawing/2014/main" id="{65492792-062B-42D9-AAD9-D351DD94A3FE}"/>
+                </a:ext>
+              </a:extLst>
+            </p:cNvPr>
+            <p:cNvSpPr/>
+            <p:nvPr/>
+          </p:nvSpPr>
+          <p:spPr>
+            <a:xfrm>
+              <a:off x="3564132" y="762411"/>
+              <a:ext cx="1234936" cy="504665"/>
+            </a:xfrm>
+            <a:prstGeom prst="roundRect">
+              <a:avLst/>
+            </a:prstGeom>
+            <a:solidFill>
+              <a:srgbClr val="FFFAEB"/>
+            </a:solidFill>
+          </p:spPr>
+          <p:style>
+            <a:lnRef idx="2">
+              <a:schemeClr val="accent1">
+                <a:shade val="50000"/>
+              </a:schemeClr>
+            </a:lnRef>
+            <a:fillRef idx="1">
+              <a:schemeClr val="accent1"/>
+            </a:fillRef>
+            <a:effectRef idx="0">
+              <a:schemeClr val="accent1"/>
+            </a:effectRef>
+            <a:fontRef idx="minor">
+              <a:schemeClr val="lt1"/>
+            </a:fontRef>
+          </p:style>
+          <p:txBody>
+            <a:bodyPr rtlCol="0" anchor="ctr"/>
+            <a:lstStyle/>
+            <a:p>
+              <a:pPr algn="ctr"/>
+              <a:r>
+                <a:rPr lang="en-US" sz="1200" b="1" dirty="0">
+                  <a:solidFill>
+                    <a:srgbClr val="002060"/>
+                  </a:solidFill>
+                </a:rPr>
+                <a:t>Mobile</a:t>
+              </a:r>
+            </a:p>
+            <a:p>
+              <a:pPr algn="ctr"/>
+              <a:r>
+                <a:rPr lang="en-US" sz="1200" dirty="0">
+                  <a:solidFill>
+                    <a:srgbClr val="002060"/>
+                  </a:solidFill>
+                </a:rPr>
+                <a:t>React Native</a:t>
+              </a:r>
+              <a:endParaRPr lang="en-IN" sz="1200" dirty="0">
+                <a:solidFill>
+                  <a:srgbClr val="002060"/>
+                </a:solidFill>
+              </a:endParaRPr>
+            </a:p>
+          </p:txBody>
+        </p:sp>
+        <p:sp>
+          <p:nvSpPr>
+            <p:cNvPr id="72" name="Rectangle: Rounded Corners 71">
+              <a:extLst>
+                <a:ext uri="{FF2B5EF4-FFF2-40B4-BE49-F238E27FC236}">
+                  <a16:creationId xmlns:a16="http://schemas.microsoft.com/office/drawing/2014/main" id="{B3AB54A0-7094-41F3-9079-07C5826687CA}"/>
+                </a:ext>
+              </a:extLst>
+            </p:cNvPr>
+            <p:cNvSpPr/>
+            <p:nvPr/>
+          </p:nvSpPr>
+          <p:spPr>
+            <a:xfrm>
+              <a:off x="3564132" y="1476099"/>
+              <a:ext cx="1234936" cy="748051"/>
+            </a:xfrm>
+            <a:prstGeom prst="roundRect">
+              <a:avLst/>
+            </a:prstGeom>
+            <a:solidFill>
+              <a:srgbClr val="FFFAEB"/>
+            </a:solidFill>
+          </p:spPr>
+          <p:style>
+            <a:lnRef idx="2">
+              <a:schemeClr val="accent1">
+                <a:shade val="50000"/>
+              </a:schemeClr>
+            </a:lnRef>
+            <a:fillRef idx="1">
+              <a:schemeClr val="accent1"/>
+            </a:fillRef>
+            <a:effectRef idx="0">
+              <a:schemeClr val="accent1"/>
+            </a:effectRef>
+            <a:fontRef idx="minor">
+              <a:schemeClr val="lt1"/>
+            </a:fontRef>
+          </p:style>
+          <p:txBody>
+            <a:bodyPr rtlCol="0" anchor="ctr"/>
+            <a:lstStyle/>
+            <a:p>
+              <a:pPr algn="ctr"/>
+              <a:r>
+                <a:rPr lang="en-US" sz="1200" b="1" dirty="0">
+                  <a:solidFill>
+                    <a:srgbClr val="002060"/>
+                  </a:solidFill>
+                </a:rPr>
+                <a:t>Server Side</a:t>
+              </a:r>
+            </a:p>
+            <a:p>
+              <a:pPr algn="ctr"/>
+              <a:r>
+                <a:rPr lang="en-US" sz="1200" dirty="0">
+                  <a:solidFill>
+                    <a:srgbClr val="002060"/>
+                  </a:solidFill>
+                </a:rPr>
+                <a:t>MVC </a:t>
+              </a:r>
+            </a:p>
+            <a:p>
+              <a:pPr algn="ctr"/>
+              <a:r>
+                <a:rPr lang="en-US" sz="1200" dirty="0">
+                  <a:solidFill>
+                    <a:srgbClr val="002060"/>
+                  </a:solidFill>
+                </a:rPr>
+                <a:t>Razor </a:t>
+              </a:r>
+            </a:p>
+            <a:p>
+              <a:pPr algn="ctr"/>
+              <a:r>
+                <a:rPr lang="en-US" sz="1200" dirty="0">
+                  <a:solidFill>
+                    <a:srgbClr val="002060"/>
+                  </a:solidFill>
+                </a:rPr>
+                <a:t>Blazor Server</a:t>
+              </a:r>
+              <a:endParaRPr lang="en-IN" sz="1200" dirty="0">
+                <a:solidFill>
+                  <a:srgbClr val="002060"/>
+                </a:solidFill>
+              </a:endParaRPr>
+            </a:p>
+          </p:txBody>
+        </p:sp>
+        <p:sp>
+          <p:nvSpPr>
+            <p:cNvPr id="73" name="Rectangle: Rounded Corners 72">
+              <a:extLst>
+                <a:ext uri="{FF2B5EF4-FFF2-40B4-BE49-F238E27FC236}">
+                  <a16:creationId xmlns:a16="http://schemas.microsoft.com/office/drawing/2014/main" id="{1ACB994B-1530-426B-8A1A-F7414FFFC74C}"/>
+                </a:ext>
+              </a:extLst>
+            </p:cNvPr>
+            <p:cNvSpPr/>
+            <p:nvPr/>
+          </p:nvSpPr>
+          <p:spPr>
+            <a:xfrm>
+              <a:off x="3564132" y="2400845"/>
+              <a:ext cx="1234936" cy="1032550"/>
+            </a:xfrm>
+            <a:prstGeom prst="roundRect">
+              <a:avLst/>
+            </a:prstGeom>
+            <a:solidFill>
+              <a:srgbClr val="FFFAEB"/>
+            </a:solidFill>
+          </p:spPr>
+          <p:style>
+            <a:lnRef idx="2">
+              <a:schemeClr val="accent1">
+                <a:shade val="50000"/>
+              </a:schemeClr>
+            </a:lnRef>
+            <a:fillRef idx="1">
+              <a:schemeClr val="accent1"/>
+            </a:fillRef>
+            <a:effectRef idx="0">
+              <a:schemeClr val="accent1"/>
+            </a:effectRef>
+            <a:fontRef idx="minor">
+              <a:schemeClr val="lt1"/>
+            </a:fontRef>
+          </p:style>
+          <p:txBody>
+            <a:bodyPr rtlCol="0" anchor="ctr"/>
+            <a:lstStyle/>
+            <a:p>
+              <a:pPr algn="ctr"/>
+              <a:r>
+                <a:rPr lang="en-US" sz="1200" b="1" dirty="0">
+                  <a:solidFill>
+                    <a:srgbClr val="002060"/>
+                  </a:solidFill>
+                </a:rPr>
+                <a:t>SPA</a:t>
+              </a:r>
+            </a:p>
+            <a:p>
+              <a:pPr algn="ctr"/>
+              <a:r>
+                <a:rPr lang="en-US" sz="1200" dirty="0">
+                  <a:solidFill>
+                    <a:srgbClr val="002060"/>
+                  </a:solidFill>
+                </a:rPr>
+                <a:t>Angular</a:t>
+              </a:r>
+            </a:p>
+            <a:p>
+              <a:pPr algn="ctr"/>
+              <a:r>
+                <a:rPr lang="en-US" sz="1200" dirty="0">
+                  <a:solidFill>
+                    <a:srgbClr val="002060"/>
+                  </a:solidFill>
+                </a:rPr>
+                <a:t>ReactJS</a:t>
+              </a:r>
+            </a:p>
+            <a:p>
+              <a:pPr algn="ctr"/>
+              <a:r>
+                <a:rPr lang="en-US" sz="1200" dirty="0">
+                  <a:solidFill>
+                    <a:srgbClr val="002060"/>
+                  </a:solidFill>
+                </a:rPr>
+                <a:t>Vue JS</a:t>
+              </a:r>
+            </a:p>
+            <a:p>
+              <a:pPr algn="ctr"/>
+              <a:r>
+                <a:rPr lang="en-US" sz="1200" dirty="0">
+                  <a:solidFill>
+                    <a:srgbClr val="002060"/>
+                  </a:solidFill>
+                </a:rPr>
+                <a:t>Blazor WASM</a:t>
+              </a:r>
+            </a:p>
+          </p:txBody>
+        </p:sp>
+      </p:grpSp>
+      <p:grpSp>
+        <p:nvGrpSpPr>
+          <p:cNvPr id="3" name="Group 2">
+            <a:extLst>
+              <a:ext uri="{FF2B5EF4-FFF2-40B4-BE49-F238E27FC236}">
+                <a16:creationId xmlns:a16="http://schemas.microsoft.com/office/drawing/2014/main" id="{EF408990-FCA9-4CC3-97FB-20F0A7B43F30}"/>
+              </a:ext>
+            </a:extLst>
+          </p:cNvPr>
+          <p:cNvGrpSpPr/>
+          <p:nvPr/>
+        </p:nvGrpSpPr>
+        <p:grpSpPr>
+          <a:xfrm>
+            <a:off x="3299854" y="5177468"/>
+            <a:ext cx="4334117" cy="1375250"/>
+            <a:chOff x="3299854" y="5177468"/>
+            <a:chExt cx="4334117" cy="1375250"/>
+          </a:xfrm>
+        </p:grpSpPr>
+        <p:sp>
+          <p:nvSpPr>
+            <p:cNvPr id="66" name="Rectangle 65">
+              <a:extLst>
+                <a:ext uri="{FF2B5EF4-FFF2-40B4-BE49-F238E27FC236}">
+                  <a16:creationId xmlns:a16="http://schemas.microsoft.com/office/drawing/2014/main" id="{AD566606-C53C-4FC1-A923-3589748D9D4F}"/>
+                </a:ext>
+              </a:extLst>
+            </p:cNvPr>
+            <p:cNvSpPr/>
+            <p:nvPr/>
+          </p:nvSpPr>
+          <p:spPr>
+            <a:xfrm>
+              <a:off x="3299854" y="5177468"/>
+              <a:ext cx="4334117" cy="1375250"/>
+            </a:xfrm>
+            <a:prstGeom prst="rect">
+              <a:avLst/>
+            </a:prstGeom>
+            <a:solidFill>
+              <a:srgbClr val="D9F2FF"/>
+            </a:solidFill>
+          </p:spPr>
+          <p:style>
+            <a:lnRef idx="2">
+              <a:schemeClr val="accent1">
+                <a:shade val="50000"/>
+              </a:schemeClr>
+            </a:lnRef>
+            <a:fillRef idx="1">
+              <a:schemeClr val="accent1"/>
+            </a:fillRef>
+            <a:effectRef idx="0">
+              <a:schemeClr val="accent1"/>
+            </a:effectRef>
+            <a:fontRef idx="minor">
+              <a:schemeClr val="lt1"/>
+            </a:fontRef>
+          </p:style>
+          <p:txBody>
+            <a:bodyPr rtlCol="0" anchor="t" anchorCtr="0"/>
+            <a:lstStyle/>
+            <a:p>
+              <a:pPr algn="ctr"/>
+              <a:r>
+                <a:rPr lang="en-US" sz="1200" dirty="0">
+                  <a:solidFill>
+                    <a:srgbClr val="002060"/>
+                  </a:solidFill>
+                  <a:latin typeface="Verdana" panose="020B0604030504040204" pitchFamily="34" charset="0"/>
+                  <a:ea typeface="Verdana" panose="020B0604030504040204" pitchFamily="34" charset="0"/>
+                </a:rPr>
+                <a:t>Admin Services</a:t>
+              </a:r>
+              <a:endParaRPr lang="en-IN" sz="1200" dirty="0">
+                <a:solidFill>
+                  <a:srgbClr val="002060"/>
+                </a:solidFill>
+                <a:latin typeface="Verdana" panose="020B0604030504040204" pitchFamily="34" charset="0"/>
+                <a:ea typeface="Verdana" panose="020B0604030504040204" pitchFamily="34" charset="0"/>
+              </a:endParaRPr>
+            </a:p>
+          </p:txBody>
+        </p:sp>
+        <p:sp>
+          <p:nvSpPr>
+            <p:cNvPr id="37" name="Rectangle: Rounded Corners 36">
+              <a:extLst>
+                <a:ext uri="{FF2B5EF4-FFF2-40B4-BE49-F238E27FC236}">
+                  <a16:creationId xmlns:a16="http://schemas.microsoft.com/office/drawing/2014/main" id="{E45EF9D9-D928-42AF-8A79-B4C3DBEB95E1}"/>
+                </a:ext>
+              </a:extLst>
+            </p:cNvPr>
+            <p:cNvSpPr/>
+            <p:nvPr/>
+          </p:nvSpPr>
+          <p:spPr>
+            <a:xfrm>
+              <a:off x="3379240" y="5956201"/>
+              <a:ext cx="1234936" cy="504665"/>
+            </a:xfrm>
+            <a:prstGeom prst="roundRect">
+              <a:avLst/>
+            </a:prstGeom>
+            <a:solidFill>
+              <a:srgbClr val="EFFAFF"/>
+            </a:solidFill>
+          </p:spPr>
+          <p:style>
+            <a:lnRef idx="2">
+              <a:schemeClr val="accent1">
+                <a:shade val="50000"/>
+              </a:schemeClr>
+            </a:lnRef>
+            <a:fillRef idx="1">
+              <a:schemeClr val="accent1"/>
+            </a:fillRef>
+            <a:effectRef idx="0">
+              <a:schemeClr val="accent1"/>
+            </a:effectRef>
+            <a:fontRef idx="minor">
+              <a:schemeClr val="lt1"/>
+            </a:fontRef>
+          </p:style>
+          <p:txBody>
+            <a:bodyPr rtlCol="0" anchor="ctr"/>
+            <a:lstStyle/>
+            <a:p>
+              <a:pPr algn="ctr"/>
+              <a:r>
+                <a:rPr lang="en-US" sz="1200" b="1" dirty="0">
+                  <a:solidFill>
+                    <a:srgbClr val="002060"/>
+                  </a:solidFill>
+                </a:rPr>
+                <a:t>Health Check</a:t>
+              </a:r>
+              <a:endParaRPr lang="en-IN" sz="1200" b="1" dirty="0">
+                <a:solidFill>
+                  <a:srgbClr val="002060"/>
+                </a:solidFill>
+              </a:endParaRPr>
+            </a:p>
+          </p:txBody>
+        </p:sp>
+        <p:sp>
+          <p:nvSpPr>
+            <p:cNvPr id="69" name="Rectangle: Rounded Corners 68">
+              <a:extLst>
+                <a:ext uri="{FF2B5EF4-FFF2-40B4-BE49-F238E27FC236}">
+                  <a16:creationId xmlns:a16="http://schemas.microsoft.com/office/drawing/2014/main" id="{B0EDFA10-D167-4497-A206-2282E8F110AE}"/>
+                </a:ext>
+              </a:extLst>
+            </p:cNvPr>
+            <p:cNvSpPr/>
+            <p:nvPr/>
+          </p:nvSpPr>
+          <p:spPr>
+            <a:xfrm>
+              <a:off x="4842287" y="5956201"/>
+              <a:ext cx="1234936" cy="504665"/>
+            </a:xfrm>
+            <a:prstGeom prst="roundRect">
+              <a:avLst/>
+            </a:prstGeom>
+            <a:solidFill>
+              <a:srgbClr val="EFFAFF"/>
+            </a:solidFill>
+          </p:spPr>
+          <p:style>
+            <a:lnRef idx="2">
+              <a:schemeClr val="accent1">
+                <a:shade val="50000"/>
+              </a:schemeClr>
+            </a:lnRef>
+            <a:fillRef idx="1">
+              <a:schemeClr val="accent1"/>
+            </a:fillRef>
+            <a:effectRef idx="0">
+              <a:schemeClr val="accent1"/>
+            </a:effectRef>
+            <a:fontRef idx="minor">
+              <a:schemeClr val="lt1"/>
+            </a:fontRef>
+          </p:style>
+          <p:txBody>
+            <a:bodyPr rtlCol="0" anchor="ctr"/>
+            <a:lstStyle/>
+            <a:p>
+              <a:pPr algn="ctr"/>
+              <a:r>
+                <a:rPr lang="en-US" sz="1200" b="1" dirty="0">
+                  <a:solidFill>
+                    <a:srgbClr val="002060"/>
+                  </a:solidFill>
+                </a:rPr>
+                <a:t>Webhooks</a:t>
+              </a:r>
+              <a:endParaRPr lang="en-IN" sz="1200" b="1" dirty="0">
+                <a:solidFill>
+                  <a:srgbClr val="002060"/>
+                </a:solidFill>
+              </a:endParaRPr>
+            </a:p>
+          </p:txBody>
+        </p:sp>
+        <p:sp>
+          <p:nvSpPr>
+            <p:cNvPr id="70" name="Rectangle: Rounded Corners 69">
+              <a:extLst>
+                <a:ext uri="{FF2B5EF4-FFF2-40B4-BE49-F238E27FC236}">
+                  <a16:creationId xmlns:a16="http://schemas.microsoft.com/office/drawing/2014/main" id="{A074D1DD-3FE8-438B-88C5-DC151937405C}"/>
+                </a:ext>
+              </a:extLst>
+            </p:cNvPr>
+            <p:cNvSpPr/>
+            <p:nvPr/>
+          </p:nvSpPr>
+          <p:spPr>
+            <a:xfrm>
+              <a:off x="6294393" y="5935854"/>
+              <a:ext cx="1234936" cy="504665"/>
+            </a:xfrm>
+            <a:prstGeom prst="roundRect">
+              <a:avLst/>
+            </a:prstGeom>
+            <a:solidFill>
+              <a:srgbClr val="EFFAFF"/>
+            </a:solidFill>
+          </p:spPr>
+          <p:style>
+            <a:lnRef idx="2">
+              <a:schemeClr val="accent1">
+                <a:shade val="50000"/>
+              </a:schemeClr>
+            </a:lnRef>
+            <a:fillRef idx="1">
+              <a:schemeClr val="accent1"/>
+            </a:fillRef>
+            <a:effectRef idx="0">
+              <a:schemeClr val="accent1"/>
+            </a:effectRef>
+            <a:fontRef idx="minor">
+              <a:schemeClr val="lt1"/>
+            </a:fontRef>
+          </p:style>
+          <p:txBody>
+            <a:bodyPr rtlCol="0" anchor="ctr"/>
+            <a:lstStyle/>
+            <a:p>
+              <a:pPr algn="ctr"/>
+              <a:r>
+                <a:rPr lang="en-US" sz="1200" b="1" dirty="0">
+                  <a:solidFill>
+                    <a:srgbClr val="002060"/>
+                  </a:solidFill>
+                </a:rPr>
+                <a:t>Alerts / Monitoring</a:t>
+              </a:r>
+              <a:endParaRPr lang="en-IN" sz="1200" b="1" dirty="0">
+                <a:solidFill>
+                  <a:srgbClr val="002060"/>
+                </a:solidFill>
+              </a:endParaRPr>
+            </a:p>
+          </p:txBody>
+        </p:sp>
+        <p:sp>
+          <p:nvSpPr>
+            <p:cNvPr id="57" name="Rectangle: Rounded Corners 56">
+              <a:extLst>
+                <a:ext uri="{FF2B5EF4-FFF2-40B4-BE49-F238E27FC236}">
+                  <a16:creationId xmlns:a16="http://schemas.microsoft.com/office/drawing/2014/main" id="{067FBA5F-63F6-4044-A857-AE0BC37E6962}"/>
+                </a:ext>
+              </a:extLst>
+            </p:cNvPr>
+            <p:cNvSpPr/>
+            <p:nvPr/>
+          </p:nvSpPr>
+          <p:spPr>
+            <a:xfrm>
+              <a:off x="3370040" y="5365200"/>
+              <a:ext cx="1234936" cy="504665"/>
+            </a:xfrm>
+            <a:prstGeom prst="roundRect">
+              <a:avLst/>
+            </a:prstGeom>
+            <a:solidFill>
+              <a:srgbClr val="EFFAFF"/>
+            </a:solidFill>
+          </p:spPr>
+          <p:style>
+            <a:lnRef idx="2">
+              <a:schemeClr val="accent1">
+                <a:shade val="50000"/>
+              </a:schemeClr>
+            </a:lnRef>
+            <a:fillRef idx="1">
+              <a:schemeClr val="accent1"/>
+            </a:fillRef>
+            <a:effectRef idx="0">
+              <a:schemeClr val="accent1"/>
+            </a:effectRef>
+            <a:fontRef idx="minor">
+              <a:schemeClr val="lt1"/>
+            </a:fontRef>
+          </p:style>
+          <p:txBody>
+            <a:bodyPr rtlCol="0" anchor="ctr"/>
+            <a:lstStyle/>
+            <a:p>
+              <a:pPr algn="ctr"/>
+              <a:r>
+                <a:rPr lang="en-US" sz="1200" b="1" dirty="0">
+                  <a:solidFill>
+                    <a:srgbClr val="002060"/>
+                  </a:solidFill>
+                </a:rPr>
+                <a:t>SPA</a:t>
+              </a:r>
+            </a:p>
+            <a:p>
+              <a:pPr algn="ctr"/>
+              <a:r>
+                <a:rPr lang="en-US" sz="1200" dirty="0">
+                  <a:solidFill>
+                    <a:srgbClr val="002060"/>
+                  </a:solidFill>
+                </a:rPr>
+                <a:t>Admin UI</a:t>
+              </a:r>
+              <a:endParaRPr lang="en-IN" sz="1200" dirty="0">
+                <a:solidFill>
+                  <a:srgbClr val="002060"/>
+                </a:solidFill>
+              </a:endParaRPr>
+            </a:p>
+          </p:txBody>
+        </p:sp>
+      </p:grpSp>
+    </p:spTree>
+    <p:extLst>
+      <p:ext uri="{BB962C8B-B14F-4D97-AF65-F5344CB8AC3E}">
+        <p14:creationId xmlns:p14="http://schemas.microsoft.com/office/powerpoint/2010/main" val="1195627866"/>
+      </p:ext>
+    </p:extLst>
+  </p:cSld>
+  <p:clrMapOvr>
+    <a:masterClrMapping/>
+  </p:clrMapOvr>
+</p:sld>
+</file>
+
+<file path=ppt/slides/slide3.xml><?xml version="1.0" encoding="utf-8"?>
+<p:sld xmlns:a="http://schemas.openxmlformats.org/drawingml/2006/main" xmlns:r="http://schemas.openxmlformats.org/officeDocument/2006/relationships" xmlns:p="http://schemas.openxmlformats.org/presentationml/2006/main">
+  <p:cSld>
+    <p:bg>
+      <p:bgPr>
+        <a:solidFill>
+          <a:schemeClr val="bg1"/>
+        </a:solidFill>
+        <a:effectLst/>
+      </p:bgPr>
+    </p:bg>
+    <p:spTree>
+      <p:nvGrpSpPr>
+        <p:cNvPr id="1" name=""/>
+        <p:cNvGrpSpPr/>
+        <p:nvPr/>
+      </p:nvGrpSpPr>
+      <p:grpSpPr>
+        <a:xfrm>
+          <a:off x="0" y="0"/>
+          <a:ext cx="0" cy="0"/>
+          <a:chOff x="0" y="0"/>
+          <a:chExt cx="0" cy="0"/>
+        </a:xfrm>
+      </p:grpSpPr>
+      <p:sp useBgFill="1">
+        <p:nvSpPr>
+          <p:cNvPr id="1031" name="Rectangle 1030">
+            <a:extLst>
+              <a:ext uri="{FF2B5EF4-FFF2-40B4-BE49-F238E27FC236}">
+                <a16:creationId xmlns:a16="http://schemas.microsoft.com/office/drawing/2014/main" id="{AB8C311F-7253-4AED-9701-7FC0708C41C7}"/>
+              </a:ext>
+              <a:ext uri="{C183D7F6-B498-43B3-948B-1728B52AA6E4}">
+                <adec:decorative xmlns:adec="http://schemas.microsoft.com/office/drawing/2017/decorative" val="1"/>
+              </a:ext>
+            </a:extLst>
+          </p:cNvPr>
+          <p:cNvSpPr>
+            <a:spLocks noGrp="1" noRot="1" noChangeAspect="1" noMove="1" noResize="1" noEditPoints="1" noAdjustHandles="1" noChangeArrowheads="1" noChangeShapeType="1" noTextEdit="1"/>
+          </p:cNvSpPr>
+          <p:nvPr>
+            <p:extLst>
+              <p:ext uri="{386F3935-93C4-4BCD-93E2-E3B085C9AB24}">
+                <p16:designElem xmlns:p16="http://schemas.microsoft.com/office/powerpoint/2015/main" val="1"/>
+              </p:ext>
+            </p:extLst>
+          </p:nvPr>
+        </p:nvSpPr>
+        <p:spPr>
+          <a:xfrm>
+            <a:off x="0" y="0"/>
+            <a:ext cx="12192000" cy="6858000"/>
+          </a:xfrm>
+          <a:prstGeom prst="rect">
+            <a:avLst/>
+          </a:prstGeom>
+          <a:ln w="12700" cap="flat" cmpd="sng" algn="ctr">
+            <a:noFill/>
+            <a:prstDash val="solid"/>
+            <a:miter lim="800000"/>
+          </a:ln>
+          <a:effectLst/>
+          <a:extLst>
+            <a:ext uri="{91240B29-F687-4F45-9708-019B960494DF}">
+              <a14:hiddenLine xmlns:a14="http://schemas.microsoft.com/office/drawing/2010/main" w="12700" cap="flat" cmpd="sng" algn="ctr">
+                <a:solidFill>
+                  <a:schemeClr val="accent1">
+                    <a:shade val="50000"/>
+                  </a:schemeClr>
+                </a:solidFill>
+                <a:prstDash val="solid"/>
+                <a:miter lim="800000"/>
+              </a14:hiddenLine>
+            </a:ext>
+          </a:extLst>
+        </p:spPr>
+        <p:style>
+          <a:lnRef idx="2">
+            <a:schemeClr val="accent1">
+              <a:shade val="50000"/>
+            </a:schemeClr>
+          </a:lnRef>
+          <a:fillRef idx="1">
+            <a:schemeClr val="accent1"/>
+          </a:fillRef>
+          <a:effectRef idx="0">
+            <a:schemeClr val="accent1"/>
+          </a:effectRef>
+          <a:fontRef idx="minor">
+            <a:schemeClr val="lt1"/>
+          </a:fontRef>
+        </p:style>
+        <p:txBody>
+          <a:bodyPr rtlCol="0" anchor="ctr"/>
+          <a:lstStyle/>
+          <a:p>
+            <a:pPr algn="ctr"/>
+            <a:endParaRPr lang="en-US"/>
+          </a:p>
+        </p:txBody>
+      </p:sp>
+      <p:sp>
+        <p:nvSpPr>
+          <p:cNvPr id="1033" name="Rectangle 1032">
+            <a:extLst>
+              <a:ext uri="{FF2B5EF4-FFF2-40B4-BE49-F238E27FC236}">
+                <a16:creationId xmlns:a16="http://schemas.microsoft.com/office/drawing/2014/main" id="{E2384209-CB15-4CDF-9D31-C44FD9A3F20D}"/>
+              </a:ext>
+              <a:ext uri="{C183D7F6-B498-43B3-948B-1728B52AA6E4}">
+                <adec:decorative xmlns:adec="http://schemas.microsoft.com/office/drawing/2017/decorative" val="1"/>
+              </a:ext>
+            </a:extLst>
+          </p:cNvPr>
+          <p:cNvSpPr>
+            <a:spLocks noGrp="1" noRot="1" noChangeAspect="1" noMove="1" noResize="1" noEditPoints="1" noAdjustHandles="1" noChangeArrowheads="1" noChangeShapeType="1" noTextEdit="1"/>
+          </p:cNvSpPr>
+          <p:nvPr>
+            <p:extLst>
+              <p:ext uri="{386F3935-93C4-4BCD-93E2-E3B085C9AB24}">
+                <p16:designElem xmlns:p16="http://schemas.microsoft.com/office/powerpoint/2015/main" val="1"/>
+              </p:ext>
+            </p:extLst>
+          </p:nvPr>
+        </p:nvSpPr>
+        <p:spPr>
+          <a:xfrm rot="16200000" flipH="1">
+            <a:off x="2666617" y="-2666188"/>
+            <a:ext cx="6858000" cy="12191233"/>
+          </a:xfrm>
+          <a:prstGeom prst="rect">
+            <a:avLst/>
+          </a:prstGeom>
+          <a:gradFill>
+            <a:gsLst>
+              <a:gs pos="8000">
+                <a:schemeClr val="accent1"/>
+              </a:gs>
+              <a:gs pos="100000">
+                <a:schemeClr val="accent1">
+                  <a:lumMod val="50000"/>
+                </a:schemeClr>
+              </a:gs>
+            </a:gsLst>
+            <a:lin ang="12000000" scaled="0"/>
+          </a:gradFill>
+          <a:ln>
+            <a:noFill/>
+          </a:ln>
+        </p:spPr>
+        <p:style>
+          <a:lnRef idx="2">
+            <a:schemeClr val="accent1">
+              <a:shade val="50000"/>
+            </a:schemeClr>
+          </a:lnRef>
+          <a:fillRef idx="1">
+            <a:schemeClr val="accent1"/>
+          </a:fillRef>
+          <a:effectRef idx="0">
+            <a:schemeClr val="accent1"/>
+          </a:effectRef>
+          <a:fontRef idx="minor">
+            <a:schemeClr val="lt1"/>
+          </a:fontRef>
+        </p:style>
+        <p:txBody>
+          <a:bodyPr rtlCol="0" anchor="ctr"/>
+          <a:lstStyle/>
+          <a:p>
+            <a:pPr algn="ctr"/>
+            <a:endParaRPr lang="en-US"/>
+          </a:p>
+        </p:txBody>
+      </p:sp>
+      <p:sp>
+        <p:nvSpPr>
+          <p:cNvPr id="1035" name="Rectangle 1034">
+            <a:extLst>
+              <a:ext uri="{FF2B5EF4-FFF2-40B4-BE49-F238E27FC236}">
+                <a16:creationId xmlns:a16="http://schemas.microsoft.com/office/drawing/2014/main" id="{2633B3B5-CC90-43F0-8714-D31D1F3F0209}"/>
+              </a:ext>
+              <a:ext uri="{C183D7F6-B498-43B3-948B-1728B52AA6E4}">
+                <adec:decorative xmlns:adec="http://schemas.microsoft.com/office/drawing/2017/decorative" val="1"/>
+              </a:ext>
+            </a:extLst>
+          </p:cNvPr>
+          <p:cNvSpPr>
+            <a:spLocks noGrp="1" noRot="1" noChangeAspect="1" noMove="1" noResize="1" noEditPoints="1" noAdjustHandles="1" noChangeArrowheads="1" noChangeShapeType="1" noTextEdit="1"/>
+          </p:cNvSpPr>
+          <p:nvPr>
+            <p:extLst>
+              <p:ext uri="{386F3935-93C4-4BCD-93E2-E3B085C9AB24}">
+                <p16:designElem xmlns:p16="http://schemas.microsoft.com/office/powerpoint/2015/main" val="1"/>
+              </p:ext>
+            </p:extLst>
+          </p:nvPr>
+        </p:nvSpPr>
+        <p:spPr>
+          <a:xfrm rot="10800000" flipH="1">
+            <a:off x="-2311" y="0"/>
+            <a:ext cx="9070846" cy="6857572"/>
+          </a:xfrm>
+          <a:prstGeom prst="rect">
+            <a:avLst/>
+          </a:prstGeom>
+          <a:gradFill>
+            <a:gsLst>
+              <a:gs pos="8000">
+                <a:srgbClr val="000000">
+                  <a:alpha val="52000"/>
+                </a:srgbClr>
+              </a:gs>
+              <a:gs pos="100000">
+                <a:schemeClr val="accent1"/>
+              </a:gs>
+            </a:gsLst>
+            <a:lin ang="4800000" scaled="0"/>
+          </a:gradFill>
+          <a:ln>
+            <a:noFill/>
+          </a:ln>
+        </p:spPr>
+        <p:style>
+          <a:lnRef idx="2">
+            <a:schemeClr val="accent1">
+              <a:shade val="50000"/>
+            </a:schemeClr>
+          </a:lnRef>
+          <a:fillRef idx="1">
+            <a:schemeClr val="accent1"/>
+          </a:fillRef>
+          <a:effectRef idx="0">
+            <a:schemeClr val="accent1"/>
+          </a:effectRef>
+          <a:fontRef idx="minor">
+            <a:schemeClr val="lt1"/>
+          </a:fontRef>
+        </p:style>
+        <p:txBody>
+          <a:bodyPr rtlCol="0" anchor="ctr"/>
+          <a:lstStyle/>
+          <a:p>
+            <a:pPr algn="ctr"/>
+            <a:endParaRPr lang="en-US"/>
+          </a:p>
+        </p:txBody>
+      </p:sp>
+      <p:sp>
+        <p:nvSpPr>
+          <p:cNvPr id="1037" name="Rectangle 1036">
+            <a:extLst>
+              <a:ext uri="{FF2B5EF4-FFF2-40B4-BE49-F238E27FC236}">
+                <a16:creationId xmlns:a16="http://schemas.microsoft.com/office/drawing/2014/main" id="{A8D57A06-A426-446D-B02C-A2DC6B62E45E}"/>
+              </a:ext>
+              <a:ext uri="{C183D7F6-B498-43B3-948B-1728B52AA6E4}">
+                <adec:decorative xmlns:adec="http://schemas.microsoft.com/office/drawing/2017/decorative" val="1"/>
+              </a:ext>
+            </a:extLst>
+          </p:cNvPr>
+          <p:cNvSpPr>
+            <a:spLocks noGrp="1" noRot="1" noChangeAspect="1" noMove="1" noResize="1" noEditPoints="1" noAdjustHandles="1" noChangeArrowheads="1" noChangeShapeType="1" noTextEdit="1"/>
+          </p:cNvSpPr>
+          <p:nvPr>
+            <p:extLst>
+              <p:ext uri="{386F3935-93C4-4BCD-93E2-E3B085C9AB24}">
+                <p16:designElem xmlns:p16="http://schemas.microsoft.com/office/powerpoint/2015/main" val="1"/>
+              </p:ext>
+            </p:extLst>
+          </p:nvPr>
+        </p:nvSpPr>
+        <p:spPr>
+          <a:xfrm rot="16200000" flipH="1">
+            <a:off x="3649491" y="-1685840"/>
+            <a:ext cx="4894564" cy="12193546"/>
+          </a:xfrm>
+          <a:prstGeom prst="rect">
+            <a:avLst/>
+          </a:prstGeom>
+          <a:gradFill>
+            <a:gsLst>
+              <a:gs pos="0">
+                <a:schemeClr val="accent5">
+                  <a:lumMod val="60000"/>
+                  <a:lumOff val="40000"/>
+                  <a:alpha val="0"/>
+                </a:schemeClr>
+              </a:gs>
+              <a:gs pos="100000">
+                <a:srgbClr val="000000">
+                  <a:alpha val="46000"/>
+                </a:srgbClr>
+              </a:gs>
+            </a:gsLst>
+            <a:lin ang="1200000" scaled="0"/>
+          </a:gradFill>
+          <a:ln>
+            <a:noFill/>
+          </a:ln>
+        </p:spPr>
+        <p:style>
+          <a:lnRef idx="2">
+            <a:schemeClr val="accent1">
+              <a:shade val="50000"/>
+            </a:schemeClr>
+          </a:lnRef>
+          <a:fillRef idx="1">
+            <a:schemeClr val="accent1"/>
+          </a:fillRef>
+          <a:effectRef idx="0">
+            <a:schemeClr val="accent1"/>
+          </a:effectRef>
+          <a:fontRef idx="minor">
+            <a:schemeClr val="lt1"/>
+          </a:fontRef>
+        </p:style>
+        <p:txBody>
+          <a:bodyPr rtlCol="0" anchor="ctr"/>
+          <a:lstStyle/>
+          <a:p>
+            <a:pPr algn="ctr"/>
+            <a:endParaRPr lang="en-US"/>
+          </a:p>
+        </p:txBody>
+      </p:sp>
+      <p:pic>
+        <p:nvPicPr>
+          <p:cNvPr id="1026" name="Picture 2" descr="Deployment of Products API |150x150">
+            <a:extLst>
+              <a:ext uri="{FF2B5EF4-FFF2-40B4-BE49-F238E27FC236}">
+                <a16:creationId xmlns:a16="http://schemas.microsoft.com/office/drawing/2014/main" id="{C3FE78D8-EC31-9F43-65FC-991C55AF8A11}"/>
+              </a:ext>
+            </a:extLst>
+          </p:cNvPr>
+          <p:cNvPicPr>
+            <a:picLocks noChangeAspect="1" noChangeArrowheads="1"/>
+          </p:cNvPicPr>
+          <p:nvPr/>
+        </p:nvPicPr>
+        <p:blipFill>
+          <a:blip r:embed="rId2">
+            <a:extLst>
+              <a:ext uri="{28A0092B-C50C-407E-A947-70E740481C1C}">
+                <a14:useLocalDpi xmlns:a14="http://schemas.microsoft.com/office/drawing/2010/main" val="0"/>
+              </a:ext>
+            </a:extLst>
+          </a:blip>
+          <a:stretch>
+            <a:fillRect/>
+          </a:stretch>
+        </p:blipFill>
+        <p:spPr bwMode="auto">
+          <a:xfrm>
+            <a:off x="122548" y="113121"/>
+            <a:ext cx="11934334" cy="6579909"/>
+          </a:xfrm>
+          <a:prstGeom prst="rect">
+            <a:avLst/>
+          </a:prstGeom>
+          <a:noFill/>
+          <a:extLst>
+            <a:ext uri="{909E8E84-426E-40DD-AFC4-6F175D3DCCD1}">
+              <a14:hiddenFill xmlns:a14="http://schemas.microsoft.com/office/drawing/2010/main">
+                <a:solidFill>
+                  <a:srgbClr val="FFFFFF"/>
+                </a:solidFill>
+              </a14:hiddenFill>
+            </a:ext>
+          </a:extLst>
+        </p:spPr>
+      </p:pic>
+    </p:spTree>
+    <p:extLst>
+      <p:ext uri="{BB962C8B-B14F-4D97-AF65-F5344CB8AC3E}">
+        <p14:creationId xmlns:p14="http://schemas.microsoft.com/office/powerpoint/2010/main" val="1344205117"/>
       </p:ext>
     </p:extLst>
   </p:cSld>

</xml_diff>

<commit_message>
Swamy/13aug2022 session8 updates (#61)
* PPT Updates

* Update Architecture.pptx

* Postman Collections

* Update README.md

* S8 First Look

* Update Architecture.pptx
</commit_message>
<xml_diff>
--- a/Documentation/Architecture.pptx
+++ b/Documentation/Architecture.pptx
@@ -34283,9 +34283,8 @@
                 <a:effectLst/>
                 <a:uLnTx/>
                 <a:uFillTx/>
-                <a:latin typeface="Calibri" panose="020F0502020204030204"/>
-                <a:ea typeface="+mn-ea"/>
-                <a:cs typeface="+mn-cs"/>
+                <a:latin typeface="Verdana" panose="020B0604030504040204" pitchFamily="34" charset="0"/>
+                <a:ea typeface="Verdana" panose="020B0604030504040204" pitchFamily="34" charset="0"/>
               </a:rPr>
               <a:t>Data Stores</a:t>
             </a:r>
@@ -34319,9 +34318,8 @@
                 <a:effectLst/>
                 <a:uLnTx/>
                 <a:uFillTx/>
-                <a:latin typeface="Calibri" panose="020F0502020204030204"/>
-                <a:ea typeface="+mn-ea"/>
-                <a:cs typeface="+mn-cs"/>
+                <a:latin typeface="Verdana" panose="020B0604030504040204" pitchFamily="34" charset="0"/>
+                <a:ea typeface="Verdana" panose="020B0604030504040204" pitchFamily="34" charset="0"/>
               </a:rPr>
               <a:t>SQL</a:t>
             </a:r>
@@ -34355,9 +34353,8 @@
                 <a:effectLst/>
                 <a:uLnTx/>
                 <a:uFillTx/>
-                <a:latin typeface="Calibri" panose="020F0502020204030204"/>
-                <a:ea typeface="+mn-ea"/>
-                <a:cs typeface="+mn-cs"/>
+                <a:latin typeface="Verdana" panose="020B0604030504040204" pitchFamily="34" charset="0"/>
+                <a:ea typeface="Verdana" panose="020B0604030504040204" pitchFamily="34" charset="0"/>
               </a:rPr>
               <a:t>Mongo</a:t>
             </a:r>
@@ -34391,9 +34388,8 @@
                 <a:effectLst/>
                 <a:uLnTx/>
                 <a:uFillTx/>
-                <a:latin typeface="Calibri" panose="020F0502020204030204"/>
-                <a:ea typeface="+mn-ea"/>
-                <a:cs typeface="+mn-cs"/>
+                <a:latin typeface="Verdana" panose="020B0604030504040204" pitchFamily="34" charset="0"/>
+                <a:ea typeface="Verdana" panose="020B0604030504040204" pitchFamily="34" charset="0"/>
               </a:rPr>
               <a:t>PostgreSQL</a:t>
             </a:r>
@@ -34407,9 +34403,8 @@
               <a:effectLst/>
               <a:uLnTx/>
               <a:uFillTx/>
-              <a:latin typeface="Calibri" panose="020F0502020204030204"/>
-              <a:ea typeface="+mn-ea"/>
-              <a:cs typeface="+mn-cs"/>
+              <a:latin typeface="Verdana" panose="020B0604030504040204" pitchFamily="34" charset="0"/>
+              <a:ea typeface="Verdana" panose="020B0604030504040204" pitchFamily="34" charset="0"/>
             </a:endParaRPr>
           </a:p>
         </p:txBody>
@@ -34483,9 +34478,8 @@
                 <a:effectLst/>
                 <a:uLnTx/>
                 <a:uFillTx/>
-                <a:latin typeface="Calibri" panose="020F0502020204030204"/>
-                <a:ea typeface="+mn-ea"/>
-                <a:cs typeface="+mn-cs"/>
+                <a:latin typeface="Verdana" panose="020B0604030504040204" pitchFamily="34" charset="0"/>
+                <a:ea typeface="Verdana" panose="020B0604030504040204" pitchFamily="34" charset="0"/>
               </a:rPr>
               <a:t>Middle Tiers</a:t>
             </a:r>
@@ -34519,9 +34513,8 @@
                 <a:effectLst/>
                 <a:uLnTx/>
                 <a:uFillTx/>
-                <a:latin typeface="Calibri" panose="020F0502020204030204"/>
-                <a:ea typeface="+mn-ea"/>
-                <a:cs typeface="+mn-cs"/>
+                <a:latin typeface="Verdana" panose="020B0604030504040204" pitchFamily="34" charset="0"/>
+                <a:ea typeface="Verdana" panose="020B0604030504040204" pitchFamily="34" charset="0"/>
               </a:rPr>
               <a:t>Products</a:t>
             </a:r>
@@ -34555,9 +34548,8 @@
                 <a:effectLst/>
                 <a:uLnTx/>
                 <a:uFillTx/>
-                <a:latin typeface="Calibri" panose="020F0502020204030204"/>
-                <a:ea typeface="+mn-ea"/>
-                <a:cs typeface="+mn-cs"/>
+                <a:latin typeface="Verdana" panose="020B0604030504040204" pitchFamily="34" charset="0"/>
+                <a:ea typeface="Verdana" panose="020B0604030504040204" pitchFamily="34" charset="0"/>
               </a:rPr>
               <a:t>Identity</a:t>
             </a:r>
@@ -34591,9 +34583,8 @@
                 <a:effectLst/>
                 <a:uLnTx/>
                 <a:uFillTx/>
-                <a:latin typeface="Calibri" panose="020F0502020204030204"/>
-                <a:ea typeface="+mn-ea"/>
-                <a:cs typeface="+mn-cs"/>
+                <a:latin typeface="Verdana" panose="020B0604030504040204" pitchFamily="34" charset="0"/>
+                <a:ea typeface="Verdana" panose="020B0604030504040204" pitchFamily="34" charset="0"/>
               </a:rPr>
               <a:t>Basket</a:t>
             </a:r>
@@ -34607,9 +34598,8 @@
               <a:effectLst/>
               <a:uLnTx/>
               <a:uFillTx/>
-              <a:latin typeface="Calibri" panose="020F0502020204030204"/>
-              <a:ea typeface="+mn-ea"/>
-              <a:cs typeface="+mn-cs"/>
+              <a:latin typeface="Verdana" panose="020B0604030504040204" pitchFamily="34" charset="0"/>
+              <a:ea typeface="Verdana" panose="020B0604030504040204" pitchFamily="34" charset="0"/>
             </a:endParaRPr>
           </a:p>
         </p:txBody>
@@ -34683,9 +34673,8 @@
                 <a:effectLst/>
                 <a:uLnTx/>
                 <a:uFillTx/>
-                <a:latin typeface="Calibri" panose="020F0502020204030204"/>
-                <a:ea typeface="+mn-ea"/>
-                <a:cs typeface="+mn-cs"/>
+                <a:latin typeface="Verdana" panose="020B0604030504040204" pitchFamily="34" charset="0"/>
+                <a:ea typeface="Verdana" panose="020B0604030504040204" pitchFamily="34" charset="0"/>
               </a:rPr>
               <a:t>BFF / </a:t>
             </a:r>
@@ -34719,9 +34708,8 @@
                 <a:effectLst/>
                 <a:uLnTx/>
                 <a:uFillTx/>
-                <a:latin typeface="Calibri" panose="020F0502020204030204"/>
-                <a:ea typeface="+mn-ea"/>
-                <a:cs typeface="+mn-cs"/>
+                <a:latin typeface="Verdana" panose="020B0604030504040204" pitchFamily="34" charset="0"/>
+                <a:ea typeface="Verdana" panose="020B0604030504040204" pitchFamily="34" charset="0"/>
               </a:rPr>
               <a:t>API Gateways</a:t>
             </a:r>
@@ -34735,9 +34723,8 @@
               <a:effectLst/>
               <a:uLnTx/>
               <a:uFillTx/>
-              <a:latin typeface="Calibri" panose="020F0502020204030204"/>
-              <a:ea typeface="+mn-ea"/>
-              <a:cs typeface="+mn-cs"/>
+              <a:latin typeface="Verdana" panose="020B0604030504040204" pitchFamily="34" charset="0"/>
+              <a:ea typeface="Verdana" panose="020B0604030504040204" pitchFamily="34" charset="0"/>
             </a:endParaRPr>
           </a:p>
         </p:txBody>
@@ -34811,9 +34798,8 @@
                 <a:effectLst/>
                 <a:uLnTx/>
                 <a:uFillTx/>
-                <a:latin typeface="Calibri" panose="020F0502020204030204"/>
-                <a:ea typeface="+mn-ea"/>
-                <a:cs typeface="+mn-cs"/>
+                <a:latin typeface="Verdana" panose="020B0604030504040204" pitchFamily="34" charset="0"/>
+                <a:ea typeface="Verdana" panose="020B0604030504040204" pitchFamily="34" charset="0"/>
               </a:rPr>
               <a:t>Frontends</a:t>
             </a:r>
@@ -34847,9 +34833,8 @@
                 <a:effectLst/>
                 <a:uLnTx/>
                 <a:uFillTx/>
-                <a:latin typeface="Calibri" panose="020F0502020204030204"/>
-                <a:ea typeface="+mn-ea"/>
-                <a:cs typeface="+mn-cs"/>
+                <a:latin typeface="Verdana" panose="020B0604030504040204" pitchFamily="34" charset="0"/>
+                <a:ea typeface="Verdana" panose="020B0604030504040204" pitchFamily="34" charset="0"/>
               </a:rPr>
               <a:t>Static Websites</a:t>
             </a:r>
@@ -34883,9 +34868,8 @@
                 <a:effectLst/>
                 <a:uLnTx/>
                 <a:uFillTx/>
-                <a:latin typeface="Calibri" panose="020F0502020204030204"/>
-                <a:ea typeface="+mn-ea"/>
-                <a:cs typeface="+mn-cs"/>
+                <a:latin typeface="Verdana" panose="020B0604030504040204" pitchFamily="34" charset="0"/>
+                <a:ea typeface="Verdana" panose="020B0604030504040204" pitchFamily="34" charset="0"/>
               </a:rPr>
               <a:t>CDN content</a:t>
             </a:r>
@@ -34984,9 +34968,8 @@
                 <a:effectLst/>
                 <a:uLnTx/>
                 <a:uFillTx/>
-                <a:latin typeface="Calibri" panose="020F0502020204030204"/>
-                <a:ea typeface="+mn-ea"/>
-                <a:cs typeface="+mn-cs"/>
+                <a:latin typeface="Verdana" panose="020B0604030504040204" pitchFamily="34" charset="0"/>
+                <a:ea typeface="Verdana" panose="020B0604030504040204" pitchFamily="34" charset="0"/>
               </a:rPr>
               <a:t>DMZ</a:t>
             </a:r>
@@ -35000,9 +34983,8 @@
               <a:effectLst/>
               <a:uLnTx/>
               <a:uFillTx/>
-              <a:latin typeface="Calibri" panose="020F0502020204030204"/>
-              <a:ea typeface="+mn-ea"/>
-              <a:cs typeface="+mn-cs"/>
+              <a:latin typeface="Verdana" panose="020B0604030504040204" pitchFamily="34" charset="0"/>
+              <a:ea typeface="Verdana" panose="020B0604030504040204" pitchFamily="34" charset="0"/>
             </a:endParaRPr>
           </a:p>
         </p:txBody>

</xml_diff>

<commit_message>
Swamy/01sep2022 changesto terraformconfigurationfiles (#64)
* Image Updates

* Delete Readme.md

* Refactoring the files

* Few Changes

* Few Changes

* Few Changes

* Few Updates

* Few Changes
</commit_message>
<xml_diff>
--- a/Documentation/Architecture.pptx
+++ b/Documentation/Architecture.pptx
@@ -10,16 +10,17 @@
     <p:sldId id="344" r:id="rId4"/>
     <p:sldId id="256" r:id="rId5"/>
     <p:sldId id="343" r:id="rId6"/>
-    <p:sldId id="345" r:id="rId7"/>
-    <p:sldId id="282" r:id="rId8"/>
-    <p:sldId id="342" r:id="rId9"/>
-    <p:sldId id="341" r:id="rId10"/>
-    <p:sldId id="335" r:id="rId11"/>
-    <p:sldId id="336" r:id="rId12"/>
-    <p:sldId id="338" r:id="rId13"/>
-    <p:sldId id="337" r:id="rId14"/>
-    <p:sldId id="339" r:id="rId15"/>
-    <p:sldId id="334" r:id="rId16"/>
+    <p:sldId id="346" r:id="rId7"/>
+    <p:sldId id="345" r:id="rId8"/>
+    <p:sldId id="282" r:id="rId9"/>
+    <p:sldId id="342" r:id="rId10"/>
+    <p:sldId id="341" r:id="rId11"/>
+    <p:sldId id="335" r:id="rId12"/>
+    <p:sldId id="336" r:id="rId13"/>
+    <p:sldId id="338" r:id="rId14"/>
+    <p:sldId id="337" r:id="rId15"/>
+    <p:sldId id="339" r:id="rId16"/>
+    <p:sldId id="334" r:id="rId17"/>
   </p:sldIdLst>
   <p:sldSz cx="12192000" cy="6858000"/>
   <p:notesSz cx="6858000" cy="9144000"/>
@@ -281,7 +282,7 @@
           <a:p>
             <a:fld id="{DC2BF6E6-F863-479F-A057-0F7FF047E296}" type="datetimeFigureOut">
               <a:rPr lang="en-IN" smtClean="0"/>
-              <a:t>14-08-2022</a:t>
+              <a:t>21-08-2022</a:t>
             </a:fld>
             <a:endParaRPr lang="en-IN"/>
           </a:p>
@@ -481,7 +482,7 @@
           <a:p>
             <a:fld id="{DC2BF6E6-F863-479F-A057-0F7FF047E296}" type="datetimeFigureOut">
               <a:rPr lang="en-IN" smtClean="0"/>
-              <a:t>14-08-2022</a:t>
+              <a:t>21-08-2022</a:t>
             </a:fld>
             <a:endParaRPr lang="en-IN"/>
           </a:p>
@@ -691,7 +692,7 @@
           <a:p>
             <a:fld id="{DC2BF6E6-F863-479F-A057-0F7FF047E296}" type="datetimeFigureOut">
               <a:rPr lang="en-IN" smtClean="0"/>
-              <a:t>14-08-2022</a:t>
+              <a:t>21-08-2022</a:t>
             </a:fld>
             <a:endParaRPr lang="en-IN"/>
           </a:p>
@@ -891,7 +892,7 @@
           <a:p>
             <a:fld id="{DC2BF6E6-F863-479F-A057-0F7FF047E296}" type="datetimeFigureOut">
               <a:rPr lang="en-IN" smtClean="0"/>
-              <a:t>14-08-2022</a:t>
+              <a:t>21-08-2022</a:t>
             </a:fld>
             <a:endParaRPr lang="en-IN"/>
           </a:p>
@@ -1167,7 +1168,7 @@
           <a:p>
             <a:fld id="{DC2BF6E6-F863-479F-A057-0F7FF047E296}" type="datetimeFigureOut">
               <a:rPr lang="en-IN" smtClean="0"/>
-              <a:t>14-08-2022</a:t>
+              <a:t>21-08-2022</a:t>
             </a:fld>
             <a:endParaRPr lang="en-IN"/>
           </a:p>
@@ -1435,7 +1436,7 @@
           <a:p>
             <a:fld id="{DC2BF6E6-F863-479F-A057-0F7FF047E296}" type="datetimeFigureOut">
               <a:rPr lang="en-IN" smtClean="0"/>
-              <a:t>14-08-2022</a:t>
+              <a:t>21-08-2022</a:t>
             </a:fld>
             <a:endParaRPr lang="en-IN"/>
           </a:p>
@@ -1850,7 +1851,7 @@
           <a:p>
             <a:fld id="{DC2BF6E6-F863-479F-A057-0F7FF047E296}" type="datetimeFigureOut">
               <a:rPr lang="en-IN" smtClean="0"/>
-              <a:t>14-08-2022</a:t>
+              <a:t>21-08-2022</a:t>
             </a:fld>
             <a:endParaRPr lang="en-IN"/>
           </a:p>
@@ -1992,7 +1993,7 @@
           <a:p>
             <a:fld id="{DC2BF6E6-F863-479F-A057-0F7FF047E296}" type="datetimeFigureOut">
               <a:rPr lang="en-IN" smtClean="0"/>
-              <a:t>14-08-2022</a:t>
+              <a:t>21-08-2022</a:t>
             </a:fld>
             <a:endParaRPr lang="en-IN"/>
           </a:p>
@@ -2105,7 +2106,7 @@
           <a:p>
             <a:fld id="{DC2BF6E6-F863-479F-A057-0F7FF047E296}" type="datetimeFigureOut">
               <a:rPr lang="en-IN" smtClean="0"/>
-              <a:t>14-08-2022</a:t>
+              <a:t>21-08-2022</a:t>
             </a:fld>
             <a:endParaRPr lang="en-IN"/>
           </a:p>
@@ -2418,7 +2419,7 @@
           <a:p>
             <a:fld id="{DC2BF6E6-F863-479F-A057-0F7FF047E296}" type="datetimeFigureOut">
               <a:rPr lang="en-IN" smtClean="0"/>
-              <a:t>14-08-2022</a:t>
+              <a:t>21-08-2022</a:t>
             </a:fld>
             <a:endParaRPr lang="en-IN"/>
           </a:p>
@@ -2707,7 +2708,7 @@
           <a:p>
             <a:fld id="{DC2BF6E6-F863-479F-A057-0F7FF047E296}" type="datetimeFigureOut">
               <a:rPr lang="en-IN" smtClean="0"/>
-              <a:t>14-08-2022</a:t>
+              <a:t>21-08-2022</a:t>
             </a:fld>
             <a:endParaRPr lang="en-IN"/>
           </a:p>
@@ -2950,7 +2951,7 @@
           <a:p>
             <a:fld id="{DC2BF6E6-F863-479F-A057-0F7FF047E296}" type="datetimeFigureOut">
               <a:rPr lang="en-IN" smtClean="0"/>
-              <a:t>14-08-2022</a:t>
+              <a:t>21-08-2022</a:t>
             </a:fld>
             <a:endParaRPr lang="en-IN"/>
           </a:p>
@@ -6128,6 +6129,234 @@
           <a:chExt cx="0" cy="0"/>
         </a:xfrm>
       </p:grpSpPr>
+      <p:sp>
+        <p:nvSpPr>
+          <p:cNvPr id="10" name="Rectangle 9">
+            <a:extLst>
+              <a:ext uri="{FF2B5EF4-FFF2-40B4-BE49-F238E27FC236}">
+                <a16:creationId xmlns:a16="http://schemas.microsoft.com/office/drawing/2014/main" id="{42A4FC2C-047E-45A5-965D-8E1E3BF09BC6}"/>
+              </a:ext>
+              <a:ext uri="{C183D7F6-B498-43B3-948B-1728B52AA6E4}">
+                <adec:decorative xmlns:adec="http://schemas.microsoft.com/office/drawing/2017/decorative" val="1"/>
+              </a:ext>
+            </a:extLst>
+          </p:cNvPr>
+          <p:cNvSpPr>
+            <a:spLocks noGrp="1" noRot="1" noChangeAspect="1" noMove="1" noResize="1" noEditPoints="1" noAdjustHandles="1" noChangeArrowheads="1" noChangeShapeType="1" noTextEdit="1"/>
+          </p:cNvSpPr>
+          <p:nvPr>
+            <p:extLst>
+              <p:ext uri="{386F3935-93C4-4BCD-93E2-E3B085C9AB24}">
+                <p16:designElem xmlns:p16="http://schemas.microsoft.com/office/powerpoint/2015/main" val="1"/>
+              </p:ext>
+            </p:extLst>
+          </p:nvPr>
+        </p:nvSpPr>
+        <p:spPr bwMode="white">
+          <a:xfrm>
+            <a:off x="1524" y="0"/>
+            <a:ext cx="12188952" cy="6858000"/>
+          </a:xfrm>
+          <a:prstGeom prst="rect">
+            <a:avLst/>
+          </a:prstGeom>
+          <a:noFill/>
+          <a:ln>
+            <a:noFill/>
+          </a:ln>
+        </p:spPr>
+        <p:style>
+          <a:lnRef idx="2">
+            <a:schemeClr val="accent1">
+              <a:shade val="50000"/>
+            </a:schemeClr>
+          </a:lnRef>
+          <a:fillRef idx="1">
+            <a:schemeClr val="accent1"/>
+          </a:fillRef>
+          <a:effectRef idx="0">
+            <a:schemeClr val="accent1"/>
+          </a:effectRef>
+          <a:fontRef idx="minor">
+            <a:schemeClr val="lt1"/>
+          </a:fontRef>
+        </p:style>
+        <p:txBody>
+          <a:bodyPr rtlCol="0" anchor="ctr"/>
+          <a:lstStyle>
+            <a:defPPr>
+              <a:defRPr lang="en-US"/>
+            </a:defPPr>
+            <a:lvl1pPr marL="0" algn="l" defTabSz="914400" rtl="0" eaLnBrk="1" latinLnBrk="0" hangingPunct="1">
+              <a:defRPr sz="1800" kern="1200">
+                <a:solidFill>
+                  <a:schemeClr val="lt1"/>
+                </a:solidFill>
+                <a:latin typeface="+mn-lt"/>
+                <a:ea typeface="+mn-ea"/>
+                <a:cs typeface="+mn-cs"/>
+              </a:defRPr>
+            </a:lvl1pPr>
+            <a:lvl2pPr marL="457200" algn="l" defTabSz="914400" rtl="0" eaLnBrk="1" latinLnBrk="0" hangingPunct="1">
+              <a:defRPr sz="1800" kern="1200">
+                <a:solidFill>
+                  <a:schemeClr val="lt1"/>
+                </a:solidFill>
+                <a:latin typeface="+mn-lt"/>
+                <a:ea typeface="+mn-ea"/>
+                <a:cs typeface="+mn-cs"/>
+              </a:defRPr>
+            </a:lvl2pPr>
+            <a:lvl3pPr marL="914400" algn="l" defTabSz="914400" rtl="0" eaLnBrk="1" latinLnBrk="0" hangingPunct="1">
+              <a:defRPr sz="1800" kern="1200">
+                <a:solidFill>
+                  <a:schemeClr val="lt1"/>
+                </a:solidFill>
+                <a:latin typeface="+mn-lt"/>
+                <a:ea typeface="+mn-ea"/>
+                <a:cs typeface="+mn-cs"/>
+              </a:defRPr>
+            </a:lvl3pPr>
+            <a:lvl4pPr marL="1371600" algn="l" defTabSz="914400" rtl="0" eaLnBrk="1" latinLnBrk="0" hangingPunct="1">
+              <a:defRPr sz="1800" kern="1200">
+                <a:solidFill>
+                  <a:schemeClr val="lt1"/>
+                </a:solidFill>
+                <a:latin typeface="+mn-lt"/>
+                <a:ea typeface="+mn-ea"/>
+                <a:cs typeface="+mn-cs"/>
+              </a:defRPr>
+            </a:lvl4pPr>
+            <a:lvl5pPr marL="1828800" algn="l" defTabSz="914400" rtl="0" eaLnBrk="1" latinLnBrk="0" hangingPunct="1">
+              <a:defRPr sz="1800" kern="1200">
+                <a:solidFill>
+                  <a:schemeClr val="lt1"/>
+                </a:solidFill>
+                <a:latin typeface="+mn-lt"/>
+                <a:ea typeface="+mn-ea"/>
+                <a:cs typeface="+mn-cs"/>
+              </a:defRPr>
+            </a:lvl5pPr>
+            <a:lvl6pPr marL="2286000" algn="l" defTabSz="914400" rtl="0" eaLnBrk="1" latinLnBrk="0" hangingPunct="1">
+              <a:defRPr sz="1800" kern="1200">
+                <a:solidFill>
+                  <a:schemeClr val="lt1"/>
+                </a:solidFill>
+                <a:latin typeface="+mn-lt"/>
+                <a:ea typeface="+mn-ea"/>
+                <a:cs typeface="+mn-cs"/>
+              </a:defRPr>
+            </a:lvl6pPr>
+            <a:lvl7pPr marL="2743200" algn="l" defTabSz="914400" rtl="0" eaLnBrk="1" latinLnBrk="0" hangingPunct="1">
+              <a:defRPr sz="1800" kern="1200">
+                <a:solidFill>
+                  <a:schemeClr val="lt1"/>
+                </a:solidFill>
+                <a:latin typeface="+mn-lt"/>
+                <a:ea typeface="+mn-ea"/>
+                <a:cs typeface="+mn-cs"/>
+              </a:defRPr>
+            </a:lvl7pPr>
+            <a:lvl8pPr marL="3200400" algn="l" defTabSz="914400" rtl="0" eaLnBrk="1" latinLnBrk="0" hangingPunct="1">
+              <a:defRPr sz="1800" kern="1200">
+                <a:solidFill>
+                  <a:schemeClr val="lt1"/>
+                </a:solidFill>
+                <a:latin typeface="+mn-lt"/>
+                <a:ea typeface="+mn-ea"/>
+                <a:cs typeface="+mn-cs"/>
+              </a:defRPr>
+            </a:lvl8pPr>
+            <a:lvl9pPr marL="3657600" algn="l" defTabSz="914400" rtl="0" eaLnBrk="1" latinLnBrk="0" hangingPunct="1">
+              <a:defRPr sz="1800" kern="1200">
+                <a:solidFill>
+                  <a:schemeClr val="lt1"/>
+                </a:solidFill>
+                <a:latin typeface="+mn-lt"/>
+                <a:ea typeface="+mn-ea"/>
+                <a:cs typeface="+mn-cs"/>
+              </a:defRPr>
+            </a:lvl9pPr>
+          </a:lstStyle>
+          <a:p>
+            <a:pPr algn="ctr"/>
+            <a:endParaRPr lang="en-US"/>
+          </a:p>
+        </p:txBody>
+      </p:sp>
+      <p:pic>
+        <p:nvPicPr>
+          <p:cNvPr id="5" name="Picture 4" descr="Text, application&#10;&#10;Description automatically generated">
+            <a:extLst>
+              <a:ext uri="{FF2B5EF4-FFF2-40B4-BE49-F238E27FC236}">
+                <a16:creationId xmlns:a16="http://schemas.microsoft.com/office/drawing/2014/main" id="{AEA2A85B-C49A-E958-5C6B-11E0C0654DD5}"/>
+              </a:ext>
+            </a:extLst>
+          </p:cNvPr>
+          <p:cNvPicPr>
+            <a:picLocks noChangeAspect="1"/>
+          </p:cNvPicPr>
+          <p:nvPr/>
+        </p:nvPicPr>
+        <p:blipFill rotWithShape="1">
+          <a:blip r:embed="rId2">
+            <a:extLst>
+              <a:ext uri="{28A0092B-C50C-407E-A947-70E740481C1C}">
+                <a14:useLocalDpi xmlns:a14="http://schemas.microsoft.com/office/drawing/2010/main" val="0"/>
+              </a:ext>
+            </a:extLst>
+          </a:blip>
+          <a:srcRect t="7425"/>
+          <a:stretch/>
+        </p:blipFill>
+        <p:spPr>
+          <a:xfrm>
+            <a:off x="20" y="1282"/>
+            <a:ext cx="12191980" cy="6856718"/>
+          </a:xfrm>
+          <a:prstGeom prst="rect">
+            <a:avLst/>
+          </a:prstGeom>
+        </p:spPr>
+      </p:pic>
+    </p:spTree>
+    <p:extLst>
+      <p:ext uri="{BB962C8B-B14F-4D97-AF65-F5344CB8AC3E}">
+        <p14:creationId xmlns:p14="http://schemas.microsoft.com/office/powerpoint/2010/main" val="538514940"/>
+      </p:ext>
+    </p:extLst>
+  </p:cSld>
+  <p:clrMapOvr>
+    <a:masterClrMapping/>
+  </p:clrMapOvr>
+</p:sld>
+</file>
+
+<file path=ppt/slides/slide11.xml><?xml version="1.0" encoding="utf-8"?>
+<p:sld xmlns:a="http://schemas.openxmlformats.org/drawingml/2006/main" xmlns:r="http://schemas.openxmlformats.org/officeDocument/2006/relationships" xmlns:p="http://schemas.openxmlformats.org/presentationml/2006/main">
+  <p:cSld>
+    <p:bg>
+      <p:bgPr>
+        <a:solidFill>
+          <a:schemeClr val="bg1"/>
+        </a:solidFill>
+        <a:effectLst/>
+      </p:bgPr>
+    </p:bg>
+    <p:spTree>
+      <p:nvGrpSpPr>
+        <p:cNvPr id="1" name=""/>
+        <p:cNvGrpSpPr/>
+        <p:nvPr/>
+      </p:nvGrpSpPr>
+      <p:grpSpPr>
+        <a:xfrm>
+          <a:off x="0" y="0"/>
+          <a:ext cx="0" cy="0"/>
+          <a:chOff x="0" y="0"/>
+          <a:chExt cx="0" cy="0"/>
+        </a:xfrm>
+      </p:grpSpPr>
       <p:sp useBgFill="1">
         <p:nvSpPr>
           <p:cNvPr id="1031" name="Rectangle 1030">
@@ -6486,7 +6715,7 @@
 </p:sld>
 </file>
 
-<file path=ppt/slides/slide11.xml><?xml version="1.0" encoding="utf-8"?>
+<file path=ppt/slides/slide12.xml><?xml version="1.0" encoding="utf-8"?>
 <p:sld xmlns:a="http://schemas.openxmlformats.org/drawingml/2006/main" xmlns:r="http://schemas.openxmlformats.org/officeDocument/2006/relationships" xmlns:p="http://schemas.openxmlformats.org/presentationml/2006/main">
   <p:cSld>
     <p:spTree>
@@ -11360,7 +11589,7 @@
 </p:sld>
 </file>
 
-<file path=ppt/slides/slide12.xml><?xml version="1.0" encoding="utf-8"?>
+<file path=ppt/slides/slide13.xml><?xml version="1.0" encoding="utf-8"?>
 <p:sld xmlns:a="http://schemas.openxmlformats.org/drawingml/2006/main" xmlns:r="http://schemas.openxmlformats.org/officeDocument/2006/relationships" xmlns:p="http://schemas.openxmlformats.org/presentationml/2006/main">
   <p:cSld>
     <p:spTree>
@@ -17727,7 +17956,7 @@
 </p:sld>
 </file>
 
-<file path=ppt/slides/slide13.xml><?xml version="1.0" encoding="utf-8"?>
+<file path=ppt/slides/slide14.xml><?xml version="1.0" encoding="utf-8"?>
 <p:sld xmlns:a="http://schemas.openxmlformats.org/drawingml/2006/main" xmlns:r="http://schemas.openxmlformats.org/officeDocument/2006/relationships" xmlns:p="http://schemas.openxmlformats.org/presentationml/2006/main">
   <p:cSld>
     <p:spTree>
@@ -23480,7 +23709,7 @@
 </p:sld>
 </file>
 
-<file path=ppt/slides/slide14.xml><?xml version="1.0" encoding="utf-8"?>
+<file path=ppt/slides/slide15.xml><?xml version="1.0" encoding="utf-8"?>
 <p:sld xmlns:a="http://schemas.openxmlformats.org/drawingml/2006/main" xmlns:r="http://schemas.openxmlformats.org/officeDocument/2006/relationships" xmlns:p="http://schemas.openxmlformats.org/presentationml/2006/main">
   <p:cSld>
     <p:spTree>
@@ -23899,7 +24128,7 @@
 </p:sld>
 </file>
 
-<file path=ppt/slides/slide15.xml><?xml version="1.0" encoding="utf-8"?>
+<file path=ppt/slides/slide16.xml><?xml version="1.0" encoding="utf-8"?>
 <p:sld xmlns:a="http://schemas.openxmlformats.org/drawingml/2006/main" xmlns:r="http://schemas.openxmlformats.org/officeDocument/2006/relationships" xmlns:p="http://schemas.openxmlformats.org/presentationml/2006/main">
   <p:cSld>
     <p:spTree>
@@ -35021,6 +35250,118 @@
       </p:grpSpPr>
       <p:pic>
         <p:nvPicPr>
+          <p:cNvPr id="7" name="Picture 6" descr="Graphical user interface, text, application, website&#10;&#10;Description automatically generated">
+            <a:extLst>
+              <a:ext uri="{FF2B5EF4-FFF2-40B4-BE49-F238E27FC236}">
+                <a16:creationId xmlns:a16="http://schemas.microsoft.com/office/drawing/2014/main" id="{F7BE3A76-BBCA-C34D-3EFB-E1F5F764C4B3}"/>
+              </a:ext>
+            </a:extLst>
+          </p:cNvPr>
+          <p:cNvPicPr>
+            <a:picLocks noChangeAspect="1"/>
+          </p:cNvPicPr>
+          <p:nvPr/>
+        </p:nvPicPr>
+        <p:blipFill>
+          <a:blip r:embed="rId2">
+            <a:extLst>
+              <a:ext uri="{28A0092B-C50C-407E-A947-70E740481C1C}">
+                <a14:useLocalDpi xmlns:a14="http://schemas.microsoft.com/office/drawing/2010/main" val="0"/>
+              </a:ext>
+            </a:extLst>
+          </a:blip>
+          <a:stretch>
+            <a:fillRect/>
+          </a:stretch>
+        </p:blipFill>
+        <p:spPr>
+          <a:xfrm>
+            <a:off x="59303" y="4034672"/>
+            <a:ext cx="12073394" cy="2795047"/>
+          </a:xfrm>
+          <a:prstGeom prst="rect">
+            <a:avLst/>
+          </a:prstGeom>
+          <a:ln>
+            <a:solidFill>
+              <a:schemeClr val="accent1"/>
+            </a:solidFill>
+          </a:ln>
+        </p:spPr>
+      </p:pic>
+      <p:pic>
+        <p:nvPicPr>
+          <p:cNvPr id="11" name="Picture 10" descr="Text&#10;&#10;Description automatically generated">
+            <a:extLst>
+              <a:ext uri="{FF2B5EF4-FFF2-40B4-BE49-F238E27FC236}">
+                <a16:creationId xmlns:a16="http://schemas.microsoft.com/office/drawing/2014/main" id="{8C3514FA-6DEC-0D4D-BD0F-59806B7D3AC0}"/>
+              </a:ext>
+            </a:extLst>
+          </p:cNvPr>
+          <p:cNvPicPr>
+            <a:picLocks noChangeAspect="1"/>
+          </p:cNvPicPr>
+          <p:nvPr/>
+        </p:nvPicPr>
+        <p:blipFill>
+          <a:blip r:embed="rId3">
+            <a:extLst>
+              <a:ext uri="{28A0092B-C50C-407E-A947-70E740481C1C}">
+                <a14:useLocalDpi xmlns:a14="http://schemas.microsoft.com/office/drawing/2010/main" val="0"/>
+              </a:ext>
+            </a:extLst>
+          </a:blip>
+          <a:stretch>
+            <a:fillRect/>
+          </a:stretch>
+        </p:blipFill>
+        <p:spPr>
+          <a:xfrm>
+            <a:off x="49475" y="28281"/>
+            <a:ext cx="12099255" cy="3940404"/>
+          </a:xfrm>
+          <a:prstGeom prst="rect">
+            <a:avLst/>
+          </a:prstGeom>
+          <a:ln>
+            <a:solidFill>
+              <a:schemeClr val="accent1"/>
+            </a:solidFill>
+          </a:ln>
+        </p:spPr>
+      </p:pic>
+    </p:spTree>
+    <p:extLst>
+      <p:ext uri="{BB962C8B-B14F-4D97-AF65-F5344CB8AC3E}">
+        <p14:creationId xmlns:p14="http://schemas.microsoft.com/office/powerpoint/2010/main" val="1846930178"/>
+      </p:ext>
+    </p:extLst>
+  </p:cSld>
+  <p:clrMapOvr>
+    <a:masterClrMapping/>
+  </p:clrMapOvr>
+</p:sld>
+</file>
+
+<file path=ppt/slides/slide7.xml><?xml version="1.0" encoding="utf-8"?>
+<p:sld xmlns:a="http://schemas.openxmlformats.org/drawingml/2006/main" xmlns:r="http://schemas.openxmlformats.org/officeDocument/2006/relationships" xmlns:p="http://schemas.openxmlformats.org/presentationml/2006/main">
+  <p:cSld>
+    <p:spTree>
+      <p:nvGrpSpPr>
+        <p:cNvPr id="1" name=""/>
+        <p:cNvGrpSpPr/>
+        <p:nvPr/>
+      </p:nvGrpSpPr>
+      <p:grpSpPr>
+        <a:xfrm>
+          <a:off x="0" y="0"/>
+          <a:ext cx="0" cy="0"/>
+          <a:chOff x="0" y="0"/>
+          <a:chExt cx="0" cy="0"/>
+        </a:xfrm>
+      </p:grpSpPr>
+      <p:pic>
+        <p:nvPicPr>
           <p:cNvPr id="3" name="Picture 2" descr="Graphical user interface, text, application&#10;&#10;Description automatically generated">
             <a:extLst>
               <a:ext uri="{FF2B5EF4-FFF2-40B4-BE49-F238E27FC236}">
@@ -35114,7 +35455,7 @@
 </p:sld>
 </file>
 
-<file path=ppt/slides/slide7.xml><?xml version="1.0" encoding="utf-8"?>
+<file path=ppt/slides/slide8.xml><?xml version="1.0" encoding="utf-8"?>
 <p:sld xmlns:a="http://schemas.openxmlformats.org/drawingml/2006/main" xmlns:r="http://schemas.openxmlformats.org/officeDocument/2006/relationships" xmlns:p="http://schemas.openxmlformats.org/presentationml/2006/main">
   <p:cSld>
     <p:spTree>
@@ -35442,7 +35783,7 @@
                 <a:tabLst/>
                 <a:defRPr/>
               </a:pPr>
-              <a:t>7</a:t>
+              <a:t>8</a:t>
             </a:fld>
             <a:endParaRPr kumimoji="0" lang="en-IN" sz="1200" b="1" i="0" u="none" strike="noStrike" kern="1200" cap="none" spc="0" normalizeH="0" baseline="0" noProof="0" dirty="0">
               <a:ln>
@@ -37071,7 +37412,7 @@
 </p:sld>
 </file>
 
-<file path=ppt/slides/slide8.xml><?xml version="1.0" encoding="utf-8"?>
+<file path=ppt/slides/slide9.xml><?xml version="1.0" encoding="utf-8"?>
 <p:sld xmlns:a="http://schemas.openxmlformats.org/drawingml/2006/main" xmlns:r="http://schemas.openxmlformats.org/officeDocument/2006/relationships" xmlns:p="http://schemas.openxmlformats.org/presentationml/2006/main">
   <p:cSld>
     <p:bg>
@@ -37290,234 +37631,6 @@
     <p:extLst>
       <p:ext uri="{BB962C8B-B14F-4D97-AF65-F5344CB8AC3E}">
         <p14:creationId xmlns:p14="http://schemas.microsoft.com/office/powerpoint/2010/main" val="1191071956"/>
-      </p:ext>
-    </p:extLst>
-  </p:cSld>
-  <p:clrMapOvr>
-    <a:masterClrMapping/>
-  </p:clrMapOvr>
-</p:sld>
-</file>
-
-<file path=ppt/slides/slide9.xml><?xml version="1.0" encoding="utf-8"?>
-<p:sld xmlns:a="http://schemas.openxmlformats.org/drawingml/2006/main" xmlns:r="http://schemas.openxmlformats.org/officeDocument/2006/relationships" xmlns:p="http://schemas.openxmlformats.org/presentationml/2006/main">
-  <p:cSld>
-    <p:bg>
-      <p:bgPr>
-        <a:solidFill>
-          <a:schemeClr val="bg1"/>
-        </a:solidFill>
-        <a:effectLst/>
-      </p:bgPr>
-    </p:bg>
-    <p:spTree>
-      <p:nvGrpSpPr>
-        <p:cNvPr id="1" name=""/>
-        <p:cNvGrpSpPr/>
-        <p:nvPr/>
-      </p:nvGrpSpPr>
-      <p:grpSpPr>
-        <a:xfrm>
-          <a:off x="0" y="0"/>
-          <a:ext cx="0" cy="0"/>
-          <a:chOff x="0" y="0"/>
-          <a:chExt cx="0" cy="0"/>
-        </a:xfrm>
-      </p:grpSpPr>
-      <p:sp>
-        <p:nvSpPr>
-          <p:cNvPr id="10" name="Rectangle 9">
-            <a:extLst>
-              <a:ext uri="{FF2B5EF4-FFF2-40B4-BE49-F238E27FC236}">
-                <a16:creationId xmlns:a16="http://schemas.microsoft.com/office/drawing/2014/main" id="{42A4FC2C-047E-45A5-965D-8E1E3BF09BC6}"/>
-              </a:ext>
-              <a:ext uri="{C183D7F6-B498-43B3-948B-1728B52AA6E4}">
-                <adec:decorative xmlns:adec="http://schemas.microsoft.com/office/drawing/2017/decorative" val="1"/>
-              </a:ext>
-            </a:extLst>
-          </p:cNvPr>
-          <p:cNvSpPr>
-            <a:spLocks noGrp="1" noRot="1" noChangeAspect="1" noMove="1" noResize="1" noEditPoints="1" noAdjustHandles="1" noChangeArrowheads="1" noChangeShapeType="1" noTextEdit="1"/>
-          </p:cNvSpPr>
-          <p:nvPr>
-            <p:extLst>
-              <p:ext uri="{386F3935-93C4-4BCD-93E2-E3B085C9AB24}">
-                <p16:designElem xmlns:p16="http://schemas.microsoft.com/office/powerpoint/2015/main" val="1"/>
-              </p:ext>
-            </p:extLst>
-          </p:nvPr>
-        </p:nvSpPr>
-        <p:spPr bwMode="white">
-          <a:xfrm>
-            <a:off x="1524" y="0"/>
-            <a:ext cx="12188952" cy="6858000"/>
-          </a:xfrm>
-          <a:prstGeom prst="rect">
-            <a:avLst/>
-          </a:prstGeom>
-          <a:noFill/>
-          <a:ln>
-            <a:noFill/>
-          </a:ln>
-        </p:spPr>
-        <p:style>
-          <a:lnRef idx="2">
-            <a:schemeClr val="accent1">
-              <a:shade val="50000"/>
-            </a:schemeClr>
-          </a:lnRef>
-          <a:fillRef idx="1">
-            <a:schemeClr val="accent1"/>
-          </a:fillRef>
-          <a:effectRef idx="0">
-            <a:schemeClr val="accent1"/>
-          </a:effectRef>
-          <a:fontRef idx="minor">
-            <a:schemeClr val="lt1"/>
-          </a:fontRef>
-        </p:style>
-        <p:txBody>
-          <a:bodyPr rtlCol="0" anchor="ctr"/>
-          <a:lstStyle>
-            <a:defPPr>
-              <a:defRPr lang="en-US"/>
-            </a:defPPr>
-            <a:lvl1pPr marL="0" algn="l" defTabSz="914400" rtl="0" eaLnBrk="1" latinLnBrk="0" hangingPunct="1">
-              <a:defRPr sz="1800" kern="1200">
-                <a:solidFill>
-                  <a:schemeClr val="lt1"/>
-                </a:solidFill>
-                <a:latin typeface="+mn-lt"/>
-                <a:ea typeface="+mn-ea"/>
-                <a:cs typeface="+mn-cs"/>
-              </a:defRPr>
-            </a:lvl1pPr>
-            <a:lvl2pPr marL="457200" algn="l" defTabSz="914400" rtl="0" eaLnBrk="1" latinLnBrk="0" hangingPunct="1">
-              <a:defRPr sz="1800" kern="1200">
-                <a:solidFill>
-                  <a:schemeClr val="lt1"/>
-                </a:solidFill>
-                <a:latin typeface="+mn-lt"/>
-                <a:ea typeface="+mn-ea"/>
-                <a:cs typeface="+mn-cs"/>
-              </a:defRPr>
-            </a:lvl2pPr>
-            <a:lvl3pPr marL="914400" algn="l" defTabSz="914400" rtl="0" eaLnBrk="1" latinLnBrk="0" hangingPunct="1">
-              <a:defRPr sz="1800" kern="1200">
-                <a:solidFill>
-                  <a:schemeClr val="lt1"/>
-                </a:solidFill>
-                <a:latin typeface="+mn-lt"/>
-                <a:ea typeface="+mn-ea"/>
-                <a:cs typeface="+mn-cs"/>
-              </a:defRPr>
-            </a:lvl3pPr>
-            <a:lvl4pPr marL="1371600" algn="l" defTabSz="914400" rtl="0" eaLnBrk="1" latinLnBrk="0" hangingPunct="1">
-              <a:defRPr sz="1800" kern="1200">
-                <a:solidFill>
-                  <a:schemeClr val="lt1"/>
-                </a:solidFill>
-                <a:latin typeface="+mn-lt"/>
-                <a:ea typeface="+mn-ea"/>
-                <a:cs typeface="+mn-cs"/>
-              </a:defRPr>
-            </a:lvl4pPr>
-            <a:lvl5pPr marL="1828800" algn="l" defTabSz="914400" rtl="0" eaLnBrk="1" latinLnBrk="0" hangingPunct="1">
-              <a:defRPr sz="1800" kern="1200">
-                <a:solidFill>
-                  <a:schemeClr val="lt1"/>
-                </a:solidFill>
-                <a:latin typeface="+mn-lt"/>
-                <a:ea typeface="+mn-ea"/>
-                <a:cs typeface="+mn-cs"/>
-              </a:defRPr>
-            </a:lvl5pPr>
-            <a:lvl6pPr marL="2286000" algn="l" defTabSz="914400" rtl="0" eaLnBrk="1" latinLnBrk="0" hangingPunct="1">
-              <a:defRPr sz="1800" kern="1200">
-                <a:solidFill>
-                  <a:schemeClr val="lt1"/>
-                </a:solidFill>
-                <a:latin typeface="+mn-lt"/>
-                <a:ea typeface="+mn-ea"/>
-                <a:cs typeface="+mn-cs"/>
-              </a:defRPr>
-            </a:lvl6pPr>
-            <a:lvl7pPr marL="2743200" algn="l" defTabSz="914400" rtl="0" eaLnBrk="1" latinLnBrk="0" hangingPunct="1">
-              <a:defRPr sz="1800" kern="1200">
-                <a:solidFill>
-                  <a:schemeClr val="lt1"/>
-                </a:solidFill>
-                <a:latin typeface="+mn-lt"/>
-                <a:ea typeface="+mn-ea"/>
-                <a:cs typeface="+mn-cs"/>
-              </a:defRPr>
-            </a:lvl7pPr>
-            <a:lvl8pPr marL="3200400" algn="l" defTabSz="914400" rtl="0" eaLnBrk="1" latinLnBrk="0" hangingPunct="1">
-              <a:defRPr sz="1800" kern="1200">
-                <a:solidFill>
-                  <a:schemeClr val="lt1"/>
-                </a:solidFill>
-                <a:latin typeface="+mn-lt"/>
-                <a:ea typeface="+mn-ea"/>
-                <a:cs typeface="+mn-cs"/>
-              </a:defRPr>
-            </a:lvl8pPr>
-            <a:lvl9pPr marL="3657600" algn="l" defTabSz="914400" rtl="0" eaLnBrk="1" latinLnBrk="0" hangingPunct="1">
-              <a:defRPr sz="1800" kern="1200">
-                <a:solidFill>
-                  <a:schemeClr val="lt1"/>
-                </a:solidFill>
-                <a:latin typeface="+mn-lt"/>
-                <a:ea typeface="+mn-ea"/>
-                <a:cs typeface="+mn-cs"/>
-              </a:defRPr>
-            </a:lvl9pPr>
-          </a:lstStyle>
-          <a:p>
-            <a:pPr algn="ctr"/>
-            <a:endParaRPr lang="en-US"/>
-          </a:p>
-        </p:txBody>
-      </p:sp>
-      <p:pic>
-        <p:nvPicPr>
-          <p:cNvPr id="5" name="Picture 4" descr="Text, application&#10;&#10;Description automatically generated">
-            <a:extLst>
-              <a:ext uri="{FF2B5EF4-FFF2-40B4-BE49-F238E27FC236}">
-                <a16:creationId xmlns:a16="http://schemas.microsoft.com/office/drawing/2014/main" id="{AEA2A85B-C49A-E958-5C6B-11E0C0654DD5}"/>
-              </a:ext>
-            </a:extLst>
-          </p:cNvPr>
-          <p:cNvPicPr>
-            <a:picLocks noChangeAspect="1"/>
-          </p:cNvPicPr>
-          <p:nvPr/>
-        </p:nvPicPr>
-        <p:blipFill rotWithShape="1">
-          <a:blip r:embed="rId2">
-            <a:extLst>
-              <a:ext uri="{28A0092B-C50C-407E-A947-70E740481C1C}">
-                <a14:useLocalDpi xmlns:a14="http://schemas.microsoft.com/office/drawing/2010/main" val="0"/>
-              </a:ext>
-            </a:extLst>
-          </a:blip>
-          <a:srcRect t="7425"/>
-          <a:stretch/>
-        </p:blipFill>
-        <p:spPr>
-          <a:xfrm>
-            <a:off x="20" y="1282"/>
-            <a:ext cx="12191980" cy="6856718"/>
-          </a:xfrm>
-          <a:prstGeom prst="rect">
-            <a:avLst/>
-          </a:prstGeom>
-        </p:spPr>
-      </p:pic>
-    </p:spTree>
-    <p:extLst>
-      <p:ext uri="{BB962C8B-B14F-4D97-AF65-F5344CB8AC3E}">
-        <p14:creationId xmlns:p14="http://schemas.microsoft.com/office/powerpoint/2010/main" val="538514940"/>
       </p:ext>
     </p:extLst>
   </p:cSld>

</xml_diff>

<commit_message>
Session 10 First Look
</commit_message>
<xml_diff>
--- a/Documentation/Architecture.pptx
+++ b/Documentation/Architecture.pptx
@@ -10,17 +10,18 @@
     <p:sldId id="344" r:id="rId4"/>
     <p:sldId id="256" r:id="rId5"/>
     <p:sldId id="343" r:id="rId6"/>
-    <p:sldId id="346" r:id="rId7"/>
-    <p:sldId id="345" r:id="rId8"/>
-    <p:sldId id="282" r:id="rId9"/>
-    <p:sldId id="342" r:id="rId10"/>
-    <p:sldId id="341" r:id="rId11"/>
-    <p:sldId id="335" r:id="rId12"/>
-    <p:sldId id="336" r:id="rId13"/>
-    <p:sldId id="338" r:id="rId14"/>
-    <p:sldId id="337" r:id="rId15"/>
-    <p:sldId id="339" r:id="rId16"/>
-    <p:sldId id="334" r:id="rId17"/>
+    <p:sldId id="347" r:id="rId7"/>
+    <p:sldId id="346" r:id="rId8"/>
+    <p:sldId id="345" r:id="rId9"/>
+    <p:sldId id="282" r:id="rId10"/>
+    <p:sldId id="342" r:id="rId11"/>
+    <p:sldId id="341" r:id="rId12"/>
+    <p:sldId id="335" r:id="rId13"/>
+    <p:sldId id="336" r:id="rId14"/>
+    <p:sldId id="338" r:id="rId15"/>
+    <p:sldId id="337" r:id="rId16"/>
+    <p:sldId id="339" r:id="rId17"/>
+    <p:sldId id="334" r:id="rId18"/>
   </p:sldIdLst>
   <p:sldSz cx="12192000" cy="6858000"/>
   <p:notesSz cx="6858000" cy="9144000"/>
@@ -282,7 +283,7 @@
           <a:p>
             <a:fld id="{DC2BF6E6-F863-479F-A057-0F7FF047E296}" type="datetimeFigureOut">
               <a:rPr lang="en-IN" smtClean="0"/>
-              <a:t>21-08-2022</a:t>
+              <a:t>06-10-2022</a:t>
             </a:fld>
             <a:endParaRPr lang="en-IN"/>
           </a:p>
@@ -482,7 +483,7 @@
           <a:p>
             <a:fld id="{DC2BF6E6-F863-479F-A057-0F7FF047E296}" type="datetimeFigureOut">
               <a:rPr lang="en-IN" smtClean="0"/>
-              <a:t>21-08-2022</a:t>
+              <a:t>06-10-2022</a:t>
             </a:fld>
             <a:endParaRPr lang="en-IN"/>
           </a:p>
@@ -692,7 +693,7 @@
           <a:p>
             <a:fld id="{DC2BF6E6-F863-479F-A057-0F7FF047E296}" type="datetimeFigureOut">
               <a:rPr lang="en-IN" smtClean="0"/>
-              <a:t>21-08-2022</a:t>
+              <a:t>06-10-2022</a:t>
             </a:fld>
             <a:endParaRPr lang="en-IN"/>
           </a:p>
@@ -892,7 +893,7 @@
           <a:p>
             <a:fld id="{DC2BF6E6-F863-479F-A057-0F7FF047E296}" type="datetimeFigureOut">
               <a:rPr lang="en-IN" smtClean="0"/>
-              <a:t>21-08-2022</a:t>
+              <a:t>06-10-2022</a:t>
             </a:fld>
             <a:endParaRPr lang="en-IN"/>
           </a:p>
@@ -1168,7 +1169,7 @@
           <a:p>
             <a:fld id="{DC2BF6E6-F863-479F-A057-0F7FF047E296}" type="datetimeFigureOut">
               <a:rPr lang="en-IN" smtClean="0"/>
-              <a:t>21-08-2022</a:t>
+              <a:t>06-10-2022</a:t>
             </a:fld>
             <a:endParaRPr lang="en-IN"/>
           </a:p>
@@ -1436,7 +1437,7 @@
           <a:p>
             <a:fld id="{DC2BF6E6-F863-479F-A057-0F7FF047E296}" type="datetimeFigureOut">
               <a:rPr lang="en-IN" smtClean="0"/>
-              <a:t>21-08-2022</a:t>
+              <a:t>06-10-2022</a:t>
             </a:fld>
             <a:endParaRPr lang="en-IN"/>
           </a:p>
@@ -1851,7 +1852,7 @@
           <a:p>
             <a:fld id="{DC2BF6E6-F863-479F-A057-0F7FF047E296}" type="datetimeFigureOut">
               <a:rPr lang="en-IN" smtClean="0"/>
-              <a:t>21-08-2022</a:t>
+              <a:t>06-10-2022</a:t>
             </a:fld>
             <a:endParaRPr lang="en-IN"/>
           </a:p>
@@ -1993,7 +1994,7 @@
           <a:p>
             <a:fld id="{DC2BF6E6-F863-479F-A057-0F7FF047E296}" type="datetimeFigureOut">
               <a:rPr lang="en-IN" smtClean="0"/>
-              <a:t>21-08-2022</a:t>
+              <a:t>06-10-2022</a:t>
             </a:fld>
             <a:endParaRPr lang="en-IN"/>
           </a:p>
@@ -2106,7 +2107,7 @@
           <a:p>
             <a:fld id="{DC2BF6E6-F863-479F-A057-0F7FF047E296}" type="datetimeFigureOut">
               <a:rPr lang="en-IN" smtClean="0"/>
-              <a:t>21-08-2022</a:t>
+              <a:t>06-10-2022</a:t>
             </a:fld>
             <a:endParaRPr lang="en-IN"/>
           </a:p>
@@ -2419,7 +2420,7 @@
           <a:p>
             <a:fld id="{DC2BF6E6-F863-479F-A057-0F7FF047E296}" type="datetimeFigureOut">
               <a:rPr lang="en-IN" smtClean="0"/>
-              <a:t>21-08-2022</a:t>
+              <a:t>06-10-2022</a:t>
             </a:fld>
             <a:endParaRPr lang="en-IN"/>
           </a:p>
@@ -2708,7 +2709,7 @@
           <a:p>
             <a:fld id="{DC2BF6E6-F863-479F-A057-0F7FF047E296}" type="datetimeFigureOut">
               <a:rPr lang="en-IN" smtClean="0"/>
-              <a:t>21-08-2022</a:t>
+              <a:t>06-10-2022</a:t>
             </a:fld>
             <a:endParaRPr lang="en-IN"/>
           </a:p>
@@ -2951,7 +2952,7 @@
           <a:p>
             <a:fld id="{DC2BF6E6-F863-479F-A057-0F7FF047E296}" type="datetimeFigureOut">
               <a:rPr lang="en-IN" smtClean="0"/>
-              <a:t>21-08-2022</a:t>
+              <a:t>06-10-2022</a:t>
             </a:fld>
             <a:endParaRPr lang="en-IN"/>
           </a:p>
@@ -6286,6 +6287,234 @@
       </p:sp>
       <p:pic>
         <p:nvPicPr>
+          <p:cNvPr id="5" name="Picture 4" descr="Graphical user interface, text, application&#10;&#10;Description automatically generated">
+            <a:extLst>
+              <a:ext uri="{FF2B5EF4-FFF2-40B4-BE49-F238E27FC236}">
+                <a16:creationId xmlns:a16="http://schemas.microsoft.com/office/drawing/2014/main" id="{66118B14-D058-D561-D443-9AD6E24AC29F}"/>
+              </a:ext>
+            </a:extLst>
+          </p:cNvPr>
+          <p:cNvPicPr>
+            <a:picLocks noChangeAspect="1"/>
+          </p:cNvPicPr>
+          <p:nvPr/>
+        </p:nvPicPr>
+        <p:blipFill rotWithShape="1">
+          <a:blip r:embed="rId2">
+            <a:extLst>
+              <a:ext uri="{28A0092B-C50C-407E-A947-70E740481C1C}">
+                <a14:useLocalDpi xmlns:a14="http://schemas.microsoft.com/office/drawing/2010/main" val="0"/>
+              </a:ext>
+            </a:extLst>
+          </a:blip>
+          <a:srcRect t="8492" b="10296"/>
+          <a:stretch/>
+        </p:blipFill>
+        <p:spPr>
+          <a:xfrm>
+            <a:off x="37728" y="47131"/>
+            <a:ext cx="12113423" cy="6749595"/>
+          </a:xfrm>
+          <a:prstGeom prst="rect">
+            <a:avLst/>
+          </a:prstGeom>
+        </p:spPr>
+      </p:pic>
+    </p:spTree>
+    <p:extLst>
+      <p:ext uri="{BB962C8B-B14F-4D97-AF65-F5344CB8AC3E}">
+        <p14:creationId xmlns:p14="http://schemas.microsoft.com/office/powerpoint/2010/main" val="1191071956"/>
+      </p:ext>
+    </p:extLst>
+  </p:cSld>
+  <p:clrMapOvr>
+    <a:masterClrMapping/>
+  </p:clrMapOvr>
+</p:sld>
+</file>
+
+<file path=ppt/slides/slide11.xml><?xml version="1.0" encoding="utf-8"?>
+<p:sld xmlns:a="http://schemas.openxmlformats.org/drawingml/2006/main" xmlns:r="http://schemas.openxmlformats.org/officeDocument/2006/relationships" xmlns:p="http://schemas.openxmlformats.org/presentationml/2006/main">
+  <p:cSld>
+    <p:bg>
+      <p:bgPr>
+        <a:solidFill>
+          <a:schemeClr val="bg1"/>
+        </a:solidFill>
+        <a:effectLst/>
+      </p:bgPr>
+    </p:bg>
+    <p:spTree>
+      <p:nvGrpSpPr>
+        <p:cNvPr id="1" name=""/>
+        <p:cNvGrpSpPr/>
+        <p:nvPr/>
+      </p:nvGrpSpPr>
+      <p:grpSpPr>
+        <a:xfrm>
+          <a:off x="0" y="0"/>
+          <a:ext cx="0" cy="0"/>
+          <a:chOff x="0" y="0"/>
+          <a:chExt cx="0" cy="0"/>
+        </a:xfrm>
+      </p:grpSpPr>
+      <p:sp>
+        <p:nvSpPr>
+          <p:cNvPr id="10" name="Rectangle 9">
+            <a:extLst>
+              <a:ext uri="{FF2B5EF4-FFF2-40B4-BE49-F238E27FC236}">
+                <a16:creationId xmlns:a16="http://schemas.microsoft.com/office/drawing/2014/main" id="{42A4FC2C-047E-45A5-965D-8E1E3BF09BC6}"/>
+              </a:ext>
+              <a:ext uri="{C183D7F6-B498-43B3-948B-1728B52AA6E4}">
+                <adec:decorative xmlns:adec="http://schemas.microsoft.com/office/drawing/2017/decorative" val="1"/>
+              </a:ext>
+            </a:extLst>
+          </p:cNvPr>
+          <p:cNvSpPr>
+            <a:spLocks noGrp="1" noRot="1" noChangeAspect="1" noMove="1" noResize="1" noEditPoints="1" noAdjustHandles="1" noChangeArrowheads="1" noChangeShapeType="1" noTextEdit="1"/>
+          </p:cNvSpPr>
+          <p:nvPr>
+            <p:extLst>
+              <p:ext uri="{386F3935-93C4-4BCD-93E2-E3B085C9AB24}">
+                <p16:designElem xmlns:p16="http://schemas.microsoft.com/office/powerpoint/2015/main" val="1"/>
+              </p:ext>
+            </p:extLst>
+          </p:nvPr>
+        </p:nvSpPr>
+        <p:spPr bwMode="white">
+          <a:xfrm>
+            <a:off x="1524" y="0"/>
+            <a:ext cx="12188952" cy="6858000"/>
+          </a:xfrm>
+          <a:prstGeom prst="rect">
+            <a:avLst/>
+          </a:prstGeom>
+          <a:noFill/>
+          <a:ln>
+            <a:noFill/>
+          </a:ln>
+        </p:spPr>
+        <p:style>
+          <a:lnRef idx="2">
+            <a:schemeClr val="accent1">
+              <a:shade val="50000"/>
+            </a:schemeClr>
+          </a:lnRef>
+          <a:fillRef idx="1">
+            <a:schemeClr val="accent1"/>
+          </a:fillRef>
+          <a:effectRef idx="0">
+            <a:schemeClr val="accent1"/>
+          </a:effectRef>
+          <a:fontRef idx="minor">
+            <a:schemeClr val="lt1"/>
+          </a:fontRef>
+        </p:style>
+        <p:txBody>
+          <a:bodyPr rtlCol="0" anchor="ctr"/>
+          <a:lstStyle>
+            <a:defPPr>
+              <a:defRPr lang="en-US"/>
+            </a:defPPr>
+            <a:lvl1pPr marL="0" algn="l" defTabSz="914400" rtl="0" eaLnBrk="1" latinLnBrk="0" hangingPunct="1">
+              <a:defRPr sz="1800" kern="1200">
+                <a:solidFill>
+                  <a:schemeClr val="lt1"/>
+                </a:solidFill>
+                <a:latin typeface="+mn-lt"/>
+                <a:ea typeface="+mn-ea"/>
+                <a:cs typeface="+mn-cs"/>
+              </a:defRPr>
+            </a:lvl1pPr>
+            <a:lvl2pPr marL="457200" algn="l" defTabSz="914400" rtl="0" eaLnBrk="1" latinLnBrk="0" hangingPunct="1">
+              <a:defRPr sz="1800" kern="1200">
+                <a:solidFill>
+                  <a:schemeClr val="lt1"/>
+                </a:solidFill>
+                <a:latin typeface="+mn-lt"/>
+                <a:ea typeface="+mn-ea"/>
+                <a:cs typeface="+mn-cs"/>
+              </a:defRPr>
+            </a:lvl2pPr>
+            <a:lvl3pPr marL="914400" algn="l" defTabSz="914400" rtl="0" eaLnBrk="1" latinLnBrk="0" hangingPunct="1">
+              <a:defRPr sz="1800" kern="1200">
+                <a:solidFill>
+                  <a:schemeClr val="lt1"/>
+                </a:solidFill>
+                <a:latin typeface="+mn-lt"/>
+                <a:ea typeface="+mn-ea"/>
+                <a:cs typeface="+mn-cs"/>
+              </a:defRPr>
+            </a:lvl3pPr>
+            <a:lvl4pPr marL="1371600" algn="l" defTabSz="914400" rtl="0" eaLnBrk="1" latinLnBrk="0" hangingPunct="1">
+              <a:defRPr sz="1800" kern="1200">
+                <a:solidFill>
+                  <a:schemeClr val="lt1"/>
+                </a:solidFill>
+                <a:latin typeface="+mn-lt"/>
+                <a:ea typeface="+mn-ea"/>
+                <a:cs typeface="+mn-cs"/>
+              </a:defRPr>
+            </a:lvl4pPr>
+            <a:lvl5pPr marL="1828800" algn="l" defTabSz="914400" rtl="0" eaLnBrk="1" latinLnBrk="0" hangingPunct="1">
+              <a:defRPr sz="1800" kern="1200">
+                <a:solidFill>
+                  <a:schemeClr val="lt1"/>
+                </a:solidFill>
+                <a:latin typeface="+mn-lt"/>
+                <a:ea typeface="+mn-ea"/>
+                <a:cs typeface="+mn-cs"/>
+              </a:defRPr>
+            </a:lvl5pPr>
+            <a:lvl6pPr marL="2286000" algn="l" defTabSz="914400" rtl="0" eaLnBrk="1" latinLnBrk="0" hangingPunct="1">
+              <a:defRPr sz="1800" kern="1200">
+                <a:solidFill>
+                  <a:schemeClr val="lt1"/>
+                </a:solidFill>
+                <a:latin typeface="+mn-lt"/>
+                <a:ea typeface="+mn-ea"/>
+                <a:cs typeface="+mn-cs"/>
+              </a:defRPr>
+            </a:lvl6pPr>
+            <a:lvl7pPr marL="2743200" algn="l" defTabSz="914400" rtl="0" eaLnBrk="1" latinLnBrk="0" hangingPunct="1">
+              <a:defRPr sz="1800" kern="1200">
+                <a:solidFill>
+                  <a:schemeClr val="lt1"/>
+                </a:solidFill>
+                <a:latin typeface="+mn-lt"/>
+                <a:ea typeface="+mn-ea"/>
+                <a:cs typeface="+mn-cs"/>
+              </a:defRPr>
+            </a:lvl7pPr>
+            <a:lvl8pPr marL="3200400" algn="l" defTabSz="914400" rtl="0" eaLnBrk="1" latinLnBrk="0" hangingPunct="1">
+              <a:defRPr sz="1800" kern="1200">
+                <a:solidFill>
+                  <a:schemeClr val="lt1"/>
+                </a:solidFill>
+                <a:latin typeface="+mn-lt"/>
+                <a:ea typeface="+mn-ea"/>
+                <a:cs typeface="+mn-cs"/>
+              </a:defRPr>
+            </a:lvl8pPr>
+            <a:lvl9pPr marL="3657600" algn="l" defTabSz="914400" rtl="0" eaLnBrk="1" latinLnBrk="0" hangingPunct="1">
+              <a:defRPr sz="1800" kern="1200">
+                <a:solidFill>
+                  <a:schemeClr val="lt1"/>
+                </a:solidFill>
+                <a:latin typeface="+mn-lt"/>
+                <a:ea typeface="+mn-ea"/>
+                <a:cs typeface="+mn-cs"/>
+              </a:defRPr>
+            </a:lvl9pPr>
+          </a:lstStyle>
+          <a:p>
+            <a:pPr algn="ctr"/>
+            <a:endParaRPr lang="en-US"/>
+          </a:p>
+        </p:txBody>
+      </p:sp>
+      <p:pic>
+        <p:nvPicPr>
           <p:cNvPr id="5" name="Picture 4" descr="Text, application&#10;&#10;Description automatically generated">
             <a:extLst>
               <a:ext uri="{FF2B5EF4-FFF2-40B4-BE49-F238E27FC236}">
@@ -6332,7 +6561,7 @@
 </p:sld>
 </file>
 
-<file path=ppt/slides/slide11.xml><?xml version="1.0" encoding="utf-8"?>
+<file path=ppt/slides/slide12.xml><?xml version="1.0" encoding="utf-8"?>
 <p:sld xmlns:a="http://schemas.openxmlformats.org/drawingml/2006/main" xmlns:r="http://schemas.openxmlformats.org/officeDocument/2006/relationships" xmlns:p="http://schemas.openxmlformats.org/presentationml/2006/main">
   <p:cSld>
     <p:bg>
@@ -6715,7 +6944,7 @@
 </p:sld>
 </file>
 
-<file path=ppt/slides/slide12.xml><?xml version="1.0" encoding="utf-8"?>
+<file path=ppt/slides/slide13.xml><?xml version="1.0" encoding="utf-8"?>
 <p:sld xmlns:a="http://schemas.openxmlformats.org/drawingml/2006/main" xmlns:r="http://schemas.openxmlformats.org/officeDocument/2006/relationships" xmlns:p="http://schemas.openxmlformats.org/presentationml/2006/main">
   <p:cSld>
     <p:spTree>
@@ -11589,7 +11818,7 @@
 </p:sld>
 </file>
 
-<file path=ppt/slides/slide13.xml><?xml version="1.0" encoding="utf-8"?>
+<file path=ppt/slides/slide14.xml><?xml version="1.0" encoding="utf-8"?>
 <p:sld xmlns:a="http://schemas.openxmlformats.org/drawingml/2006/main" xmlns:r="http://schemas.openxmlformats.org/officeDocument/2006/relationships" xmlns:p="http://schemas.openxmlformats.org/presentationml/2006/main">
   <p:cSld>
     <p:spTree>
@@ -17956,7 +18185,7 @@
 </p:sld>
 </file>
 
-<file path=ppt/slides/slide14.xml><?xml version="1.0" encoding="utf-8"?>
+<file path=ppt/slides/slide15.xml><?xml version="1.0" encoding="utf-8"?>
 <p:sld xmlns:a="http://schemas.openxmlformats.org/drawingml/2006/main" xmlns:r="http://schemas.openxmlformats.org/officeDocument/2006/relationships" xmlns:p="http://schemas.openxmlformats.org/presentationml/2006/main">
   <p:cSld>
     <p:spTree>
@@ -23709,7 +23938,7 @@
 </p:sld>
 </file>
 
-<file path=ppt/slides/slide15.xml><?xml version="1.0" encoding="utf-8"?>
+<file path=ppt/slides/slide16.xml><?xml version="1.0" encoding="utf-8"?>
 <p:sld xmlns:a="http://schemas.openxmlformats.org/drawingml/2006/main" xmlns:r="http://schemas.openxmlformats.org/officeDocument/2006/relationships" xmlns:p="http://schemas.openxmlformats.org/presentationml/2006/main">
   <p:cSld>
     <p:spTree>
@@ -24128,7 +24357,7 @@
 </p:sld>
 </file>
 
-<file path=ppt/slides/slide16.xml><?xml version="1.0" encoding="utf-8"?>
+<file path=ppt/slides/slide17.xml><?xml version="1.0" encoding="utf-8"?>
 <p:sld xmlns:a="http://schemas.openxmlformats.org/drawingml/2006/main" xmlns:r="http://schemas.openxmlformats.org/officeDocument/2006/relationships" xmlns:p="http://schemas.openxmlformats.org/presentationml/2006/main">
   <p:cSld>
     <p:spTree>
@@ -35234,6 +35463,234 @@
 <file path=ppt/slides/slide6.xml><?xml version="1.0" encoding="utf-8"?>
 <p:sld xmlns:a="http://schemas.openxmlformats.org/drawingml/2006/main" xmlns:r="http://schemas.openxmlformats.org/officeDocument/2006/relationships" xmlns:p="http://schemas.openxmlformats.org/presentationml/2006/main">
   <p:cSld>
+    <p:bg>
+      <p:bgPr>
+        <a:solidFill>
+          <a:schemeClr val="bg1"/>
+        </a:solidFill>
+        <a:effectLst/>
+      </p:bgPr>
+    </p:bg>
+    <p:spTree>
+      <p:nvGrpSpPr>
+        <p:cNvPr id="1" name=""/>
+        <p:cNvGrpSpPr/>
+        <p:nvPr/>
+      </p:nvGrpSpPr>
+      <p:grpSpPr>
+        <a:xfrm>
+          <a:off x="0" y="0"/>
+          <a:ext cx="0" cy="0"/>
+          <a:chOff x="0" y="0"/>
+          <a:chExt cx="0" cy="0"/>
+        </a:xfrm>
+      </p:grpSpPr>
+      <p:sp>
+        <p:nvSpPr>
+          <p:cNvPr id="10" name="Rectangle 9">
+            <a:extLst>
+              <a:ext uri="{FF2B5EF4-FFF2-40B4-BE49-F238E27FC236}">
+                <a16:creationId xmlns:a16="http://schemas.microsoft.com/office/drawing/2014/main" id="{42A4FC2C-047E-45A5-965D-8E1E3BF09BC6}"/>
+              </a:ext>
+              <a:ext uri="{C183D7F6-B498-43B3-948B-1728B52AA6E4}">
+                <adec:decorative xmlns:adec="http://schemas.microsoft.com/office/drawing/2017/decorative" val="1"/>
+              </a:ext>
+            </a:extLst>
+          </p:cNvPr>
+          <p:cNvSpPr>
+            <a:spLocks noGrp="1" noRot="1" noChangeAspect="1" noMove="1" noResize="1" noEditPoints="1" noAdjustHandles="1" noChangeArrowheads="1" noChangeShapeType="1" noTextEdit="1"/>
+          </p:cNvSpPr>
+          <p:nvPr>
+            <p:extLst>
+              <p:ext uri="{386F3935-93C4-4BCD-93E2-E3B085C9AB24}">
+                <p16:designElem xmlns:p16="http://schemas.microsoft.com/office/powerpoint/2015/main" val="1"/>
+              </p:ext>
+            </p:extLst>
+          </p:nvPr>
+        </p:nvSpPr>
+        <p:spPr bwMode="white">
+          <a:xfrm>
+            <a:off x="1524" y="0"/>
+            <a:ext cx="12188952" cy="6858000"/>
+          </a:xfrm>
+          <a:prstGeom prst="rect">
+            <a:avLst/>
+          </a:prstGeom>
+          <a:noFill/>
+          <a:ln>
+            <a:noFill/>
+          </a:ln>
+        </p:spPr>
+        <p:style>
+          <a:lnRef idx="2">
+            <a:schemeClr val="accent1">
+              <a:shade val="50000"/>
+            </a:schemeClr>
+          </a:lnRef>
+          <a:fillRef idx="1">
+            <a:schemeClr val="accent1"/>
+          </a:fillRef>
+          <a:effectRef idx="0">
+            <a:schemeClr val="accent1"/>
+          </a:effectRef>
+          <a:fontRef idx="minor">
+            <a:schemeClr val="lt1"/>
+          </a:fontRef>
+        </p:style>
+        <p:txBody>
+          <a:bodyPr rtlCol="0" anchor="ctr"/>
+          <a:lstStyle>
+            <a:defPPr>
+              <a:defRPr lang="en-US"/>
+            </a:defPPr>
+            <a:lvl1pPr marL="0" algn="l" defTabSz="914400" rtl="0" eaLnBrk="1" latinLnBrk="0" hangingPunct="1">
+              <a:defRPr sz="1800" kern="1200">
+                <a:solidFill>
+                  <a:schemeClr val="lt1"/>
+                </a:solidFill>
+                <a:latin typeface="+mn-lt"/>
+                <a:ea typeface="+mn-ea"/>
+                <a:cs typeface="+mn-cs"/>
+              </a:defRPr>
+            </a:lvl1pPr>
+            <a:lvl2pPr marL="457200" algn="l" defTabSz="914400" rtl="0" eaLnBrk="1" latinLnBrk="0" hangingPunct="1">
+              <a:defRPr sz="1800" kern="1200">
+                <a:solidFill>
+                  <a:schemeClr val="lt1"/>
+                </a:solidFill>
+                <a:latin typeface="+mn-lt"/>
+                <a:ea typeface="+mn-ea"/>
+                <a:cs typeface="+mn-cs"/>
+              </a:defRPr>
+            </a:lvl2pPr>
+            <a:lvl3pPr marL="914400" algn="l" defTabSz="914400" rtl="0" eaLnBrk="1" latinLnBrk="0" hangingPunct="1">
+              <a:defRPr sz="1800" kern="1200">
+                <a:solidFill>
+                  <a:schemeClr val="lt1"/>
+                </a:solidFill>
+                <a:latin typeface="+mn-lt"/>
+                <a:ea typeface="+mn-ea"/>
+                <a:cs typeface="+mn-cs"/>
+              </a:defRPr>
+            </a:lvl3pPr>
+            <a:lvl4pPr marL="1371600" algn="l" defTabSz="914400" rtl="0" eaLnBrk="1" latinLnBrk="0" hangingPunct="1">
+              <a:defRPr sz="1800" kern="1200">
+                <a:solidFill>
+                  <a:schemeClr val="lt1"/>
+                </a:solidFill>
+                <a:latin typeface="+mn-lt"/>
+                <a:ea typeface="+mn-ea"/>
+                <a:cs typeface="+mn-cs"/>
+              </a:defRPr>
+            </a:lvl4pPr>
+            <a:lvl5pPr marL="1828800" algn="l" defTabSz="914400" rtl="0" eaLnBrk="1" latinLnBrk="0" hangingPunct="1">
+              <a:defRPr sz="1800" kern="1200">
+                <a:solidFill>
+                  <a:schemeClr val="lt1"/>
+                </a:solidFill>
+                <a:latin typeface="+mn-lt"/>
+                <a:ea typeface="+mn-ea"/>
+                <a:cs typeface="+mn-cs"/>
+              </a:defRPr>
+            </a:lvl5pPr>
+            <a:lvl6pPr marL="2286000" algn="l" defTabSz="914400" rtl="0" eaLnBrk="1" latinLnBrk="0" hangingPunct="1">
+              <a:defRPr sz="1800" kern="1200">
+                <a:solidFill>
+                  <a:schemeClr val="lt1"/>
+                </a:solidFill>
+                <a:latin typeface="+mn-lt"/>
+                <a:ea typeface="+mn-ea"/>
+                <a:cs typeface="+mn-cs"/>
+              </a:defRPr>
+            </a:lvl6pPr>
+            <a:lvl7pPr marL="2743200" algn="l" defTabSz="914400" rtl="0" eaLnBrk="1" latinLnBrk="0" hangingPunct="1">
+              <a:defRPr sz="1800" kern="1200">
+                <a:solidFill>
+                  <a:schemeClr val="lt1"/>
+                </a:solidFill>
+                <a:latin typeface="+mn-lt"/>
+                <a:ea typeface="+mn-ea"/>
+                <a:cs typeface="+mn-cs"/>
+              </a:defRPr>
+            </a:lvl7pPr>
+            <a:lvl8pPr marL="3200400" algn="l" defTabSz="914400" rtl="0" eaLnBrk="1" latinLnBrk="0" hangingPunct="1">
+              <a:defRPr sz="1800" kern="1200">
+                <a:solidFill>
+                  <a:schemeClr val="lt1"/>
+                </a:solidFill>
+                <a:latin typeface="+mn-lt"/>
+                <a:ea typeface="+mn-ea"/>
+                <a:cs typeface="+mn-cs"/>
+              </a:defRPr>
+            </a:lvl8pPr>
+            <a:lvl9pPr marL="3657600" algn="l" defTabSz="914400" rtl="0" eaLnBrk="1" latinLnBrk="0" hangingPunct="1">
+              <a:defRPr sz="1800" kern="1200">
+                <a:solidFill>
+                  <a:schemeClr val="lt1"/>
+                </a:solidFill>
+                <a:latin typeface="+mn-lt"/>
+                <a:ea typeface="+mn-ea"/>
+                <a:cs typeface="+mn-cs"/>
+              </a:defRPr>
+            </a:lvl9pPr>
+          </a:lstStyle>
+          <a:p>
+            <a:pPr algn="ctr"/>
+            <a:endParaRPr lang="en-US"/>
+          </a:p>
+        </p:txBody>
+      </p:sp>
+      <p:pic>
+        <p:nvPicPr>
+          <p:cNvPr id="5" name="Picture 4" descr="Graphical user interface&#10;&#10;Description automatically generated with medium confidence">
+            <a:extLst>
+              <a:ext uri="{FF2B5EF4-FFF2-40B4-BE49-F238E27FC236}">
+                <a16:creationId xmlns:a16="http://schemas.microsoft.com/office/drawing/2014/main" id="{5B7461A1-4E97-4DE5-DB6C-F56D45EBD1A0}"/>
+              </a:ext>
+            </a:extLst>
+          </p:cNvPr>
+          <p:cNvPicPr>
+            <a:picLocks noChangeAspect="1"/>
+          </p:cNvPicPr>
+          <p:nvPr/>
+        </p:nvPicPr>
+        <p:blipFill rotWithShape="1">
+          <a:blip r:embed="rId2">
+            <a:extLst>
+              <a:ext uri="{28A0092B-C50C-407E-A947-70E740481C1C}">
+                <a14:useLocalDpi xmlns:a14="http://schemas.microsoft.com/office/drawing/2010/main" val="0"/>
+              </a:ext>
+            </a:extLst>
+          </a:blip>
+          <a:srcRect r="20874"/>
+          <a:stretch/>
+        </p:blipFill>
+        <p:spPr>
+          <a:xfrm>
+            <a:off x="20" y="1282"/>
+            <a:ext cx="12191980" cy="6856718"/>
+          </a:xfrm>
+          <a:prstGeom prst="rect">
+            <a:avLst/>
+          </a:prstGeom>
+        </p:spPr>
+      </p:pic>
+    </p:spTree>
+    <p:extLst>
+      <p:ext uri="{BB962C8B-B14F-4D97-AF65-F5344CB8AC3E}">
+        <p14:creationId xmlns:p14="http://schemas.microsoft.com/office/powerpoint/2010/main" val="3083312806"/>
+      </p:ext>
+    </p:extLst>
+  </p:cSld>
+  <p:clrMapOvr>
+    <a:masterClrMapping/>
+  </p:clrMapOvr>
+</p:sld>
+</file>
+
+<file path=ppt/slides/slide7.xml><?xml version="1.0" encoding="utf-8"?>
+<p:sld xmlns:a="http://schemas.openxmlformats.org/drawingml/2006/main" xmlns:r="http://schemas.openxmlformats.org/officeDocument/2006/relationships" xmlns:p="http://schemas.openxmlformats.org/presentationml/2006/main">
+  <p:cSld>
     <p:spTree>
       <p:nvGrpSpPr>
         <p:cNvPr id="1" name=""/>
@@ -35343,7 +35800,7 @@
 </p:sld>
 </file>
 
-<file path=ppt/slides/slide7.xml><?xml version="1.0" encoding="utf-8"?>
+<file path=ppt/slides/slide8.xml><?xml version="1.0" encoding="utf-8"?>
 <p:sld xmlns:a="http://schemas.openxmlformats.org/drawingml/2006/main" xmlns:r="http://schemas.openxmlformats.org/officeDocument/2006/relationships" xmlns:p="http://schemas.openxmlformats.org/presentationml/2006/main">
   <p:cSld>
     <p:spTree>
@@ -35455,7 +35912,7 @@
 </p:sld>
 </file>
 
-<file path=ppt/slides/slide8.xml><?xml version="1.0" encoding="utf-8"?>
+<file path=ppt/slides/slide9.xml><?xml version="1.0" encoding="utf-8"?>
 <p:sld xmlns:a="http://schemas.openxmlformats.org/drawingml/2006/main" xmlns:r="http://schemas.openxmlformats.org/officeDocument/2006/relationships" xmlns:p="http://schemas.openxmlformats.org/presentationml/2006/main">
   <p:cSld>
     <p:spTree>
@@ -35783,7 +36240,7 @@
                 <a:tabLst/>
                 <a:defRPr/>
               </a:pPr>
-              <a:t>8</a:t>
+              <a:t>9</a:t>
             </a:fld>
             <a:endParaRPr kumimoji="0" lang="en-IN" sz="1200" b="1" i="0" u="none" strike="noStrike" kern="1200" cap="none" spc="0" normalizeH="0" baseline="0" noProof="0" dirty="0">
               <a:ln>
@@ -37412,234 +37869,6 @@
 </p:sld>
 </file>
 
-<file path=ppt/slides/slide9.xml><?xml version="1.0" encoding="utf-8"?>
-<p:sld xmlns:a="http://schemas.openxmlformats.org/drawingml/2006/main" xmlns:r="http://schemas.openxmlformats.org/officeDocument/2006/relationships" xmlns:p="http://schemas.openxmlformats.org/presentationml/2006/main">
-  <p:cSld>
-    <p:bg>
-      <p:bgPr>
-        <a:solidFill>
-          <a:schemeClr val="bg1"/>
-        </a:solidFill>
-        <a:effectLst/>
-      </p:bgPr>
-    </p:bg>
-    <p:spTree>
-      <p:nvGrpSpPr>
-        <p:cNvPr id="1" name=""/>
-        <p:cNvGrpSpPr/>
-        <p:nvPr/>
-      </p:nvGrpSpPr>
-      <p:grpSpPr>
-        <a:xfrm>
-          <a:off x="0" y="0"/>
-          <a:ext cx="0" cy="0"/>
-          <a:chOff x="0" y="0"/>
-          <a:chExt cx="0" cy="0"/>
-        </a:xfrm>
-      </p:grpSpPr>
-      <p:sp>
-        <p:nvSpPr>
-          <p:cNvPr id="10" name="Rectangle 9">
-            <a:extLst>
-              <a:ext uri="{FF2B5EF4-FFF2-40B4-BE49-F238E27FC236}">
-                <a16:creationId xmlns:a16="http://schemas.microsoft.com/office/drawing/2014/main" id="{42A4FC2C-047E-45A5-965D-8E1E3BF09BC6}"/>
-              </a:ext>
-              <a:ext uri="{C183D7F6-B498-43B3-948B-1728B52AA6E4}">
-                <adec:decorative xmlns:adec="http://schemas.microsoft.com/office/drawing/2017/decorative" val="1"/>
-              </a:ext>
-            </a:extLst>
-          </p:cNvPr>
-          <p:cNvSpPr>
-            <a:spLocks noGrp="1" noRot="1" noChangeAspect="1" noMove="1" noResize="1" noEditPoints="1" noAdjustHandles="1" noChangeArrowheads="1" noChangeShapeType="1" noTextEdit="1"/>
-          </p:cNvSpPr>
-          <p:nvPr>
-            <p:extLst>
-              <p:ext uri="{386F3935-93C4-4BCD-93E2-E3B085C9AB24}">
-                <p16:designElem xmlns:p16="http://schemas.microsoft.com/office/powerpoint/2015/main" val="1"/>
-              </p:ext>
-            </p:extLst>
-          </p:nvPr>
-        </p:nvSpPr>
-        <p:spPr bwMode="white">
-          <a:xfrm>
-            <a:off x="1524" y="0"/>
-            <a:ext cx="12188952" cy="6858000"/>
-          </a:xfrm>
-          <a:prstGeom prst="rect">
-            <a:avLst/>
-          </a:prstGeom>
-          <a:noFill/>
-          <a:ln>
-            <a:noFill/>
-          </a:ln>
-        </p:spPr>
-        <p:style>
-          <a:lnRef idx="2">
-            <a:schemeClr val="accent1">
-              <a:shade val="50000"/>
-            </a:schemeClr>
-          </a:lnRef>
-          <a:fillRef idx="1">
-            <a:schemeClr val="accent1"/>
-          </a:fillRef>
-          <a:effectRef idx="0">
-            <a:schemeClr val="accent1"/>
-          </a:effectRef>
-          <a:fontRef idx="minor">
-            <a:schemeClr val="lt1"/>
-          </a:fontRef>
-        </p:style>
-        <p:txBody>
-          <a:bodyPr rtlCol="0" anchor="ctr"/>
-          <a:lstStyle>
-            <a:defPPr>
-              <a:defRPr lang="en-US"/>
-            </a:defPPr>
-            <a:lvl1pPr marL="0" algn="l" defTabSz="914400" rtl="0" eaLnBrk="1" latinLnBrk="0" hangingPunct="1">
-              <a:defRPr sz="1800" kern="1200">
-                <a:solidFill>
-                  <a:schemeClr val="lt1"/>
-                </a:solidFill>
-                <a:latin typeface="+mn-lt"/>
-                <a:ea typeface="+mn-ea"/>
-                <a:cs typeface="+mn-cs"/>
-              </a:defRPr>
-            </a:lvl1pPr>
-            <a:lvl2pPr marL="457200" algn="l" defTabSz="914400" rtl="0" eaLnBrk="1" latinLnBrk="0" hangingPunct="1">
-              <a:defRPr sz="1800" kern="1200">
-                <a:solidFill>
-                  <a:schemeClr val="lt1"/>
-                </a:solidFill>
-                <a:latin typeface="+mn-lt"/>
-                <a:ea typeface="+mn-ea"/>
-                <a:cs typeface="+mn-cs"/>
-              </a:defRPr>
-            </a:lvl2pPr>
-            <a:lvl3pPr marL="914400" algn="l" defTabSz="914400" rtl="0" eaLnBrk="1" latinLnBrk="0" hangingPunct="1">
-              <a:defRPr sz="1800" kern="1200">
-                <a:solidFill>
-                  <a:schemeClr val="lt1"/>
-                </a:solidFill>
-                <a:latin typeface="+mn-lt"/>
-                <a:ea typeface="+mn-ea"/>
-                <a:cs typeface="+mn-cs"/>
-              </a:defRPr>
-            </a:lvl3pPr>
-            <a:lvl4pPr marL="1371600" algn="l" defTabSz="914400" rtl="0" eaLnBrk="1" latinLnBrk="0" hangingPunct="1">
-              <a:defRPr sz="1800" kern="1200">
-                <a:solidFill>
-                  <a:schemeClr val="lt1"/>
-                </a:solidFill>
-                <a:latin typeface="+mn-lt"/>
-                <a:ea typeface="+mn-ea"/>
-                <a:cs typeface="+mn-cs"/>
-              </a:defRPr>
-            </a:lvl4pPr>
-            <a:lvl5pPr marL="1828800" algn="l" defTabSz="914400" rtl="0" eaLnBrk="1" latinLnBrk="0" hangingPunct="1">
-              <a:defRPr sz="1800" kern="1200">
-                <a:solidFill>
-                  <a:schemeClr val="lt1"/>
-                </a:solidFill>
-                <a:latin typeface="+mn-lt"/>
-                <a:ea typeface="+mn-ea"/>
-                <a:cs typeface="+mn-cs"/>
-              </a:defRPr>
-            </a:lvl5pPr>
-            <a:lvl6pPr marL="2286000" algn="l" defTabSz="914400" rtl="0" eaLnBrk="1" latinLnBrk="0" hangingPunct="1">
-              <a:defRPr sz="1800" kern="1200">
-                <a:solidFill>
-                  <a:schemeClr val="lt1"/>
-                </a:solidFill>
-                <a:latin typeface="+mn-lt"/>
-                <a:ea typeface="+mn-ea"/>
-                <a:cs typeface="+mn-cs"/>
-              </a:defRPr>
-            </a:lvl6pPr>
-            <a:lvl7pPr marL="2743200" algn="l" defTabSz="914400" rtl="0" eaLnBrk="1" latinLnBrk="0" hangingPunct="1">
-              <a:defRPr sz="1800" kern="1200">
-                <a:solidFill>
-                  <a:schemeClr val="lt1"/>
-                </a:solidFill>
-                <a:latin typeface="+mn-lt"/>
-                <a:ea typeface="+mn-ea"/>
-                <a:cs typeface="+mn-cs"/>
-              </a:defRPr>
-            </a:lvl7pPr>
-            <a:lvl8pPr marL="3200400" algn="l" defTabSz="914400" rtl="0" eaLnBrk="1" latinLnBrk="0" hangingPunct="1">
-              <a:defRPr sz="1800" kern="1200">
-                <a:solidFill>
-                  <a:schemeClr val="lt1"/>
-                </a:solidFill>
-                <a:latin typeface="+mn-lt"/>
-                <a:ea typeface="+mn-ea"/>
-                <a:cs typeface="+mn-cs"/>
-              </a:defRPr>
-            </a:lvl8pPr>
-            <a:lvl9pPr marL="3657600" algn="l" defTabSz="914400" rtl="0" eaLnBrk="1" latinLnBrk="0" hangingPunct="1">
-              <a:defRPr sz="1800" kern="1200">
-                <a:solidFill>
-                  <a:schemeClr val="lt1"/>
-                </a:solidFill>
-                <a:latin typeface="+mn-lt"/>
-                <a:ea typeface="+mn-ea"/>
-                <a:cs typeface="+mn-cs"/>
-              </a:defRPr>
-            </a:lvl9pPr>
-          </a:lstStyle>
-          <a:p>
-            <a:pPr algn="ctr"/>
-            <a:endParaRPr lang="en-US"/>
-          </a:p>
-        </p:txBody>
-      </p:sp>
-      <p:pic>
-        <p:nvPicPr>
-          <p:cNvPr id="5" name="Picture 4" descr="Graphical user interface, text, application&#10;&#10;Description automatically generated">
-            <a:extLst>
-              <a:ext uri="{FF2B5EF4-FFF2-40B4-BE49-F238E27FC236}">
-                <a16:creationId xmlns:a16="http://schemas.microsoft.com/office/drawing/2014/main" id="{66118B14-D058-D561-D443-9AD6E24AC29F}"/>
-              </a:ext>
-            </a:extLst>
-          </p:cNvPr>
-          <p:cNvPicPr>
-            <a:picLocks noChangeAspect="1"/>
-          </p:cNvPicPr>
-          <p:nvPr/>
-        </p:nvPicPr>
-        <p:blipFill rotWithShape="1">
-          <a:blip r:embed="rId2">
-            <a:extLst>
-              <a:ext uri="{28A0092B-C50C-407E-A947-70E740481C1C}">
-                <a14:useLocalDpi xmlns:a14="http://schemas.microsoft.com/office/drawing/2010/main" val="0"/>
-              </a:ext>
-            </a:extLst>
-          </a:blip>
-          <a:srcRect t="8492" b="10296"/>
-          <a:stretch/>
-        </p:blipFill>
-        <p:spPr>
-          <a:xfrm>
-            <a:off x="37728" y="47131"/>
-            <a:ext cx="12113423" cy="6749595"/>
-          </a:xfrm>
-          <a:prstGeom prst="rect">
-            <a:avLst/>
-          </a:prstGeom>
-        </p:spPr>
-      </p:pic>
-    </p:spTree>
-    <p:extLst>
-      <p:ext uri="{BB962C8B-B14F-4D97-AF65-F5344CB8AC3E}">
-        <p14:creationId xmlns:p14="http://schemas.microsoft.com/office/powerpoint/2010/main" val="1191071956"/>
-      </p:ext>
-    </p:extLst>
-  </p:cSld>
-  <p:clrMapOvr>
-    <a:masterClrMapping/>
-  </p:clrMapOvr>
-</p:sld>
-</file>
-
 <file path=ppt/theme/theme1.xml><?xml version="1.0" encoding="utf-8"?>
 <a:theme xmlns:a="http://schemas.openxmlformats.org/drawingml/2006/main" name="Office Theme">
   <a:themeElements>

</xml_diff>

<commit_message>
Swamy/06oct2022 session10 updates (#77)
* Update README.md

* Update README.md

* Update README.md

* Session 10 First Look
</commit_message>
<xml_diff>
--- a/Documentation/Architecture.pptx
+++ b/Documentation/Architecture.pptx
@@ -10,17 +10,18 @@
     <p:sldId id="344" r:id="rId4"/>
     <p:sldId id="256" r:id="rId5"/>
     <p:sldId id="343" r:id="rId6"/>
-    <p:sldId id="346" r:id="rId7"/>
-    <p:sldId id="345" r:id="rId8"/>
-    <p:sldId id="282" r:id="rId9"/>
-    <p:sldId id="342" r:id="rId10"/>
-    <p:sldId id="341" r:id="rId11"/>
-    <p:sldId id="335" r:id="rId12"/>
-    <p:sldId id="336" r:id="rId13"/>
-    <p:sldId id="338" r:id="rId14"/>
-    <p:sldId id="337" r:id="rId15"/>
-    <p:sldId id="339" r:id="rId16"/>
-    <p:sldId id="334" r:id="rId17"/>
+    <p:sldId id="347" r:id="rId7"/>
+    <p:sldId id="346" r:id="rId8"/>
+    <p:sldId id="345" r:id="rId9"/>
+    <p:sldId id="282" r:id="rId10"/>
+    <p:sldId id="342" r:id="rId11"/>
+    <p:sldId id="341" r:id="rId12"/>
+    <p:sldId id="335" r:id="rId13"/>
+    <p:sldId id="336" r:id="rId14"/>
+    <p:sldId id="338" r:id="rId15"/>
+    <p:sldId id="337" r:id="rId16"/>
+    <p:sldId id="339" r:id="rId17"/>
+    <p:sldId id="334" r:id="rId18"/>
   </p:sldIdLst>
   <p:sldSz cx="12192000" cy="6858000"/>
   <p:notesSz cx="6858000" cy="9144000"/>
@@ -282,7 +283,7 @@
           <a:p>
             <a:fld id="{DC2BF6E6-F863-479F-A057-0F7FF047E296}" type="datetimeFigureOut">
               <a:rPr lang="en-IN" smtClean="0"/>
-              <a:t>21-08-2022</a:t>
+              <a:t>06-10-2022</a:t>
             </a:fld>
             <a:endParaRPr lang="en-IN"/>
           </a:p>
@@ -482,7 +483,7 @@
           <a:p>
             <a:fld id="{DC2BF6E6-F863-479F-A057-0F7FF047E296}" type="datetimeFigureOut">
               <a:rPr lang="en-IN" smtClean="0"/>
-              <a:t>21-08-2022</a:t>
+              <a:t>06-10-2022</a:t>
             </a:fld>
             <a:endParaRPr lang="en-IN"/>
           </a:p>
@@ -692,7 +693,7 @@
           <a:p>
             <a:fld id="{DC2BF6E6-F863-479F-A057-0F7FF047E296}" type="datetimeFigureOut">
               <a:rPr lang="en-IN" smtClean="0"/>
-              <a:t>21-08-2022</a:t>
+              <a:t>06-10-2022</a:t>
             </a:fld>
             <a:endParaRPr lang="en-IN"/>
           </a:p>
@@ -892,7 +893,7 @@
           <a:p>
             <a:fld id="{DC2BF6E6-F863-479F-A057-0F7FF047E296}" type="datetimeFigureOut">
               <a:rPr lang="en-IN" smtClean="0"/>
-              <a:t>21-08-2022</a:t>
+              <a:t>06-10-2022</a:t>
             </a:fld>
             <a:endParaRPr lang="en-IN"/>
           </a:p>
@@ -1168,7 +1169,7 @@
           <a:p>
             <a:fld id="{DC2BF6E6-F863-479F-A057-0F7FF047E296}" type="datetimeFigureOut">
               <a:rPr lang="en-IN" smtClean="0"/>
-              <a:t>21-08-2022</a:t>
+              <a:t>06-10-2022</a:t>
             </a:fld>
             <a:endParaRPr lang="en-IN"/>
           </a:p>
@@ -1436,7 +1437,7 @@
           <a:p>
             <a:fld id="{DC2BF6E6-F863-479F-A057-0F7FF047E296}" type="datetimeFigureOut">
               <a:rPr lang="en-IN" smtClean="0"/>
-              <a:t>21-08-2022</a:t>
+              <a:t>06-10-2022</a:t>
             </a:fld>
             <a:endParaRPr lang="en-IN"/>
           </a:p>
@@ -1851,7 +1852,7 @@
           <a:p>
             <a:fld id="{DC2BF6E6-F863-479F-A057-0F7FF047E296}" type="datetimeFigureOut">
               <a:rPr lang="en-IN" smtClean="0"/>
-              <a:t>21-08-2022</a:t>
+              <a:t>06-10-2022</a:t>
             </a:fld>
             <a:endParaRPr lang="en-IN"/>
           </a:p>
@@ -1993,7 +1994,7 @@
           <a:p>
             <a:fld id="{DC2BF6E6-F863-479F-A057-0F7FF047E296}" type="datetimeFigureOut">
               <a:rPr lang="en-IN" smtClean="0"/>
-              <a:t>21-08-2022</a:t>
+              <a:t>06-10-2022</a:t>
             </a:fld>
             <a:endParaRPr lang="en-IN"/>
           </a:p>
@@ -2106,7 +2107,7 @@
           <a:p>
             <a:fld id="{DC2BF6E6-F863-479F-A057-0F7FF047E296}" type="datetimeFigureOut">
               <a:rPr lang="en-IN" smtClean="0"/>
-              <a:t>21-08-2022</a:t>
+              <a:t>06-10-2022</a:t>
             </a:fld>
             <a:endParaRPr lang="en-IN"/>
           </a:p>
@@ -2419,7 +2420,7 @@
           <a:p>
             <a:fld id="{DC2BF6E6-F863-479F-A057-0F7FF047E296}" type="datetimeFigureOut">
               <a:rPr lang="en-IN" smtClean="0"/>
-              <a:t>21-08-2022</a:t>
+              <a:t>06-10-2022</a:t>
             </a:fld>
             <a:endParaRPr lang="en-IN"/>
           </a:p>
@@ -2708,7 +2709,7 @@
           <a:p>
             <a:fld id="{DC2BF6E6-F863-479F-A057-0F7FF047E296}" type="datetimeFigureOut">
               <a:rPr lang="en-IN" smtClean="0"/>
-              <a:t>21-08-2022</a:t>
+              <a:t>06-10-2022</a:t>
             </a:fld>
             <a:endParaRPr lang="en-IN"/>
           </a:p>
@@ -2951,7 +2952,7 @@
           <a:p>
             <a:fld id="{DC2BF6E6-F863-479F-A057-0F7FF047E296}" type="datetimeFigureOut">
               <a:rPr lang="en-IN" smtClean="0"/>
-              <a:t>21-08-2022</a:t>
+              <a:t>06-10-2022</a:t>
             </a:fld>
             <a:endParaRPr lang="en-IN"/>
           </a:p>
@@ -6286,6 +6287,234 @@
       </p:sp>
       <p:pic>
         <p:nvPicPr>
+          <p:cNvPr id="5" name="Picture 4" descr="Graphical user interface, text, application&#10;&#10;Description automatically generated">
+            <a:extLst>
+              <a:ext uri="{FF2B5EF4-FFF2-40B4-BE49-F238E27FC236}">
+                <a16:creationId xmlns:a16="http://schemas.microsoft.com/office/drawing/2014/main" id="{66118B14-D058-D561-D443-9AD6E24AC29F}"/>
+              </a:ext>
+            </a:extLst>
+          </p:cNvPr>
+          <p:cNvPicPr>
+            <a:picLocks noChangeAspect="1"/>
+          </p:cNvPicPr>
+          <p:nvPr/>
+        </p:nvPicPr>
+        <p:blipFill rotWithShape="1">
+          <a:blip r:embed="rId2">
+            <a:extLst>
+              <a:ext uri="{28A0092B-C50C-407E-A947-70E740481C1C}">
+                <a14:useLocalDpi xmlns:a14="http://schemas.microsoft.com/office/drawing/2010/main" val="0"/>
+              </a:ext>
+            </a:extLst>
+          </a:blip>
+          <a:srcRect t="8492" b="10296"/>
+          <a:stretch/>
+        </p:blipFill>
+        <p:spPr>
+          <a:xfrm>
+            <a:off x="37728" y="47131"/>
+            <a:ext cx="12113423" cy="6749595"/>
+          </a:xfrm>
+          <a:prstGeom prst="rect">
+            <a:avLst/>
+          </a:prstGeom>
+        </p:spPr>
+      </p:pic>
+    </p:spTree>
+    <p:extLst>
+      <p:ext uri="{BB962C8B-B14F-4D97-AF65-F5344CB8AC3E}">
+        <p14:creationId xmlns:p14="http://schemas.microsoft.com/office/powerpoint/2010/main" val="1191071956"/>
+      </p:ext>
+    </p:extLst>
+  </p:cSld>
+  <p:clrMapOvr>
+    <a:masterClrMapping/>
+  </p:clrMapOvr>
+</p:sld>
+</file>
+
+<file path=ppt/slides/slide11.xml><?xml version="1.0" encoding="utf-8"?>
+<p:sld xmlns:a="http://schemas.openxmlformats.org/drawingml/2006/main" xmlns:r="http://schemas.openxmlformats.org/officeDocument/2006/relationships" xmlns:p="http://schemas.openxmlformats.org/presentationml/2006/main">
+  <p:cSld>
+    <p:bg>
+      <p:bgPr>
+        <a:solidFill>
+          <a:schemeClr val="bg1"/>
+        </a:solidFill>
+        <a:effectLst/>
+      </p:bgPr>
+    </p:bg>
+    <p:spTree>
+      <p:nvGrpSpPr>
+        <p:cNvPr id="1" name=""/>
+        <p:cNvGrpSpPr/>
+        <p:nvPr/>
+      </p:nvGrpSpPr>
+      <p:grpSpPr>
+        <a:xfrm>
+          <a:off x="0" y="0"/>
+          <a:ext cx="0" cy="0"/>
+          <a:chOff x="0" y="0"/>
+          <a:chExt cx="0" cy="0"/>
+        </a:xfrm>
+      </p:grpSpPr>
+      <p:sp>
+        <p:nvSpPr>
+          <p:cNvPr id="10" name="Rectangle 9">
+            <a:extLst>
+              <a:ext uri="{FF2B5EF4-FFF2-40B4-BE49-F238E27FC236}">
+                <a16:creationId xmlns:a16="http://schemas.microsoft.com/office/drawing/2014/main" id="{42A4FC2C-047E-45A5-965D-8E1E3BF09BC6}"/>
+              </a:ext>
+              <a:ext uri="{C183D7F6-B498-43B3-948B-1728B52AA6E4}">
+                <adec:decorative xmlns:adec="http://schemas.microsoft.com/office/drawing/2017/decorative" val="1"/>
+              </a:ext>
+            </a:extLst>
+          </p:cNvPr>
+          <p:cNvSpPr>
+            <a:spLocks noGrp="1" noRot="1" noChangeAspect="1" noMove="1" noResize="1" noEditPoints="1" noAdjustHandles="1" noChangeArrowheads="1" noChangeShapeType="1" noTextEdit="1"/>
+          </p:cNvSpPr>
+          <p:nvPr>
+            <p:extLst>
+              <p:ext uri="{386F3935-93C4-4BCD-93E2-E3B085C9AB24}">
+                <p16:designElem xmlns:p16="http://schemas.microsoft.com/office/powerpoint/2015/main" val="1"/>
+              </p:ext>
+            </p:extLst>
+          </p:nvPr>
+        </p:nvSpPr>
+        <p:spPr bwMode="white">
+          <a:xfrm>
+            <a:off x="1524" y="0"/>
+            <a:ext cx="12188952" cy="6858000"/>
+          </a:xfrm>
+          <a:prstGeom prst="rect">
+            <a:avLst/>
+          </a:prstGeom>
+          <a:noFill/>
+          <a:ln>
+            <a:noFill/>
+          </a:ln>
+        </p:spPr>
+        <p:style>
+          <a:lnRef idx="2">
+            <a:schemeClr val="accent1">
+              <a:shade val="50000"/>
+            </a:schemeClr>
+          </a:lnRef>
+          <a:fillRef idx="1">
+            <a:schemeClr val="accent1"/>
+          </a:fillRef>
+          <a:effectRef idx="0">
+            <a:schemeClr val="accent1"/>
+          </a:effectRef>
+          <a:fontRef idx="minor">
+            <a:schemeClr val="lt1"/>
+          </a:fontRef>
+        </p:style>
+        <p:txBody>
+          <a:bodyPr rtlCol="0" anchor="ctr"/>
+          <a:lstStyle>
+            <a:defPPr>
+              <a:defRPr lang="en-US"/>
+            </a:defPPr>
+            <a:lvl1pPr marL="0" algn="l" defTabSz="914400" rtl="0" eaLnBrk="1" latinLnBrk="0" hangingPunct="1">
+              <a:defRPr sz="1800" kern="1200">
+                <a:solidFill>
+                  <a:schemeClr val="lt1"/>
+                </a:solidFill>
+                <a:latin typeface="+mn-lt"/>
+                <a:ea typeface="+mn-ea"/>
+                <a:cs typeface="+mn-cs"/>
+              </a:defRPr>
+            </a:lvl1pPr>
+            <a:lvl2pPr marL="457200" algn="l" defTabSz="914400" rtl="0" eaLnBrk="1" latinLnBrk="0" hangingPunct="1">
+              <a:defRPr sz="1800" kern="1200">
+                <a:solidFill>
+                  <a:schemeClr val="lt1"/>
+                </a:solidFill>
+                <a:latin typeface="+mn-lt"/>
+                <a:ea typeface="+mn-ea"/>
+                <a:cs typeface="+mn-cs"/>
+              </a:defRPr>
+            </a:lvl2pPr>
+            <a:lvl3pPr marL="914400" algn="l" defTabSz="914400" rtl="0" eaLnBrk="1" latinLnBrk="0" hangingPunct="1">
+              <a:defRPr sz="1800" kern="1200">
+                <a:solidFill>
+                  <a:schemeClr val="lt1"/>
+                </a:solidFill>
+                <a:latin typeface="+mn-lt"/>
+                <a:ea typeface="+mn-ea"/>
+                <a:cs typeface="+mn-cs"/>
+              </a:defRPr>
+            </a:lvl3pPr>
+            <a:lvl4pPr marL="1371600" algn="l" defTabSz="914400" rtl="0" eaLnBrk="1" latinLnBrk="0" hangingPunct="1">
+              <a:defRPr sz="1800" kern="1200">
+                <a:solidFill>
+                  <a:schemeClr val="lt1"/>
+                </a:solidFill>
+                <a:latin typeface="+mn-lt"/>
+                <a:ea typeface="+mn-ea"/>
+                <a:cs typeface="+mn-cs"/>
+              </a:defRPr>
+            </a:lvl4pPr>
+            <a:lvl5pPr marL="1828800" algn="l" defTabSz="914400" rtl="0" eaLnBrk="1" latinLnBrk="0" hangingPunct="1">
+              <a:defRPr sz="1800" kern="1200">
+                <a:solidFill>
+                  <a:schemeClr val="lt1"/>
+                </a:solidFill>
+                <a:latin typeface="+mn-lt"/>
+                <a:ea typeface="+mn-ea"/>
+                <a:cs typeface="+mn-cs"/>
+              </a:defRPr>
+            </a:lvl5pPr>
+            <a:lvl6pPr marL="2286000" algn="l" defTabSz="914400" rtl="0" eaLnBrk="1" latinLnBrk="0" hangingPunct="1">
+              <a:defRPr sz="1800" kern="1200">
+                <a:solidFill>
+                  <a:schemeClr val="lt1"/>
+                </a:solidFill>
+                <a:latin typeface="+mn-lt"/>
+                <a:ea typeface="+mn-ea"/>
+                <a:cs typeface="+mn-cs"/>
+              </a:defRPr>
+            </a:lvl6pPr>
+            <a:lvl7pPr marL="2743200" algn="l" defTabSz="914400" rtl="0" eaLnBrk="1" latinLnBrk="0" hangingPunct="1">
+              <a:defRPr sz="1800" kern="1200">
+                <a:solidFill>
+                  <a:schemeClr val="lt1"/>
+                </a:solidFill>
+                <a:latin typeface="+mn-lt"/>
+                <a:ea typeface="+mn-ea"/>
+                <a:cs typeface="+mn-cs"/>
+              </a:defRPr>
+            </a:lvl7pPr>
+            <a:lvl8pPr marL="3200400" algn="l" defTabSz="914400" rtl="0" eaLnBrk="1" latinLnBrk="0" hangingPunct="1">
+              <a:defRPr sz="1800" kern="1200">
+                <a:solidFill>
+                  <a:schemeClr val="lt1"/>
+                </a:solidFill>
+                <a:latin typeface="+mn-lt"/>
+                <a:ea typeface="+mn-ea"/>
+                <a:cs typeface="+mn-cs"/>
+              </a:defRPr>
+            </a:lvl8pPr>
+            <a:lvl9pPr marL="3657600" algn="l" defTabSz="914400" rtl="0" eaLnBrk="1" latinLnBrk="0" hangingPunct="1">
+              <a:defRPr sz="1800" kern="1200">
+                <a:solidFill>
+                  <a:schemeClr val="lt1"/>
+                </a:solidFill>
+                <a:latin typeface="+mn-lt"/>
+                <a:ea typeface="+mn-ea"/>
+                <a:cs typeface="+mn-cs"/>
+              </a:defRPr>
+            </a:lvl9pPr>
+          </a:lstStyle>
+          <a:p>
+            <a:pPr algn="ctr"/>
+            <a:endParaRPr lang="en-US"/>
+          </a:p>
+        </p:txBody>
+      </p:sp>
+      <p:pic>
+        <p:nvPicPr>
           <p:cNvPr id="5" name="Picture 4" descr="Text, application&#10;&#10;Description automatically generated">
             <a:extLst>
               <a:ext uri="{FF2B5EF4-FFF2-40B4-BE49-F238E27FC236}">
@@ -6332,7 +6561,7 @@
 </p:sld>
 </file>
 
-<file path=ppt/slides/slide11.xml><?xml version="1.0" encoding="utf-8"?>
+<file path=ppt/slides/slide12.xml><?xml version="1.0" encoding="utf-8"?>
 <p:sld xmlns:a="http://schemas.openxmlformats.org/drawingml/2006/main" xmlns:r="http://schemas.openxmlformats.org/officeDocument/2006/relationships" xmlns:p="http://schemas.openxmlformats.org/presentationml/2006/main">
   <p:cSld>
     <p:bg>
@@ -6715,7 +6944,7 @@
 </p:sld>
 </file>
 
-<file path=ppt/slides/slide12.xml><?xml version="1.0" encoding="utf-8"?>
+<file path=ppt/slides/slide13.xml><?xml version="1.0" encoding="utf-8"?>
 <p:sld xmlns:a="http://schemas.openxmlformats.org/drawingml/2006/main" xmlns:r="http://schemas.openxmlformats.org/officeDocument/2006/relationships" xmlns:p="http://schemas.openxmlformats.org/presentationml/2006/main">
   <p:cSld>
     <p:spTree>
@@ -11589,7 +11818,7 @@
 </p:sld>
 </file>
 
-<file path=ppt/slides/slide13.xml><?xml version="1.0" encoding="utf-8"?>
+<file path=ppt/slides/slide14.xml><?xml version="1.0" encoding="utf-8"?>
 <p:sld xmlns:a="http://schemas.openxmlformats.org/drawingml/2006/main" xmlns:r="http://schemas.openxmlformats.org/officeDocument/2006/relationships" xmlns:p="http://schemas.openxmlformats.org/presentationml/2006/main">
   <p:cSld>
     <p:spTree>
@@ -17956,7 +18185,7 @@
 </p:sld>
 </file>
 
-<file path=ppt/slides/slide14.xml><?xml version="1.0" encoding="utf-8"?>
+<file path=ppt/slides/slide15.xml><?xml version="1.0" encoding="utf-8"?>
 <p:sld xmlns:a="http://schemas.openxmlformats.org/drawingml/2006/main" xmlns:r="http://schemas.openxmlformats.org/officeDocument/2006/relationships" xmlns:p="http://schemas.openxmlformats.org/presentationml/2006/main">
   <p:cSld>
     <p:spTree>
@@ -23709,7 +23938,7 @@
 </p:sld>
 </file>
 
-<file path=ppt/slides/slide15.xml><?xml version="1.0" encoding="utf-8"?>
+<file path=ppt/slides/slide16.xml><?xml version="1.0" encoding="utf-8"?>
 <p:sld xmlns:a="http://schemas.openxmlformats.org/drawingml/2006/main" xmlns:r="http://schemas.openxmlformats.org/officeDocument/2006/relationships" xmlns:p="http://schemas.openxmlformats.org/presentationml/2006/main">
   <p:cSld>
     <p:spTree>
@@ -24128,7 +24357,7 @@
 </p:sld>
 </file>
 
-<file path=ppt/slides/slide16.xml><?xml version="1.0" encoding="utf-8"?>
+<file path=ppt/slides/slide17.xml><?xml version="1.0" encoding="utf-8"?>
 <p:sld xmlns:a="http://schemas.openxmlformats.org/drawingml/2006/main" xmlns:r="http://schemas.openxmlformats.org/officeDocument/2006/relationships" xmlns:p="http://schemas.openxmlformats.org/presentationml/2006/main">
   <p:cSld>
     <p:spTree>
@@ -35234,6 +35463,234 @@
 <file path=ppt/slides/slide6.xml><?xml version="1.0" encoding="utf-8"?>
 <p:sld xmlns:a="http://schemas.openxmlformats.org/drawingml/2006/main" xmlns:r="http://schemas.openxmlformats.org/officeDocument/2006/relationships" xmlns:p="http://schemas.openxmlformats.org/presentationml/2006/main">
   <p:cSld>
+    <p:bg>
+      <p:bgPr>
+        <a:solidFill>
+          <a:schemeClr val="bg1"/>
+        </a:solidFill>
+        <a:effectLst/>
+      </p:bgPr>
+    </p:bg>
+    <p:spTree>
+      <p:nvGrpSpPr>
+        <p:cNvPr id="1" name=""/>
+        <p:cNvGrpSpPr/>
+        <p:nvPr/>
+      </p:nvGrpSpPr>
+      <p:grpSpPr>
+        <a:xfrm>
+          <a:off x="0" y="0"/>
+          <a:ext cx="0" cy="0"/>
+          <a:chOff x="0" y="0"/>
+          <a:chExt cx="0" cy="0"/>
+        </a:xfrm>
+      </p:grpSpPr>
+      <p:sp>
+        <p:nvSpPr>
+          <p:cNvPr id="10" name="Rectangle 9">
+            <a:extLst>
+              <a:ext uri="{FF2B5EF4-FFF2-40B4-BE49-F238E27FC236}">
+                <a16:creationId xmlns:a16="http://schemas.microsoft.com/office/drawing/2014/main" id="{42A4FC2C-047E-45A5-965D-8E1E3BF09BC6}"/>
+              </a:ext>
+              <a:ext uri="{C183D7F6-B498-43B3-948B-1728B52AA6E4}">
+                <adec:decorative xmlns:adec="http://schemas.microsoft.com/office/drawing/2017/decorative" val="1"/>
+              </a:ext>
+            </a:extLst>
+          </p:cNvPr>
+          <p:cNvSpPr>
+            <a:spLocks noGrp="1" noRot="1" noChangeAspect="1" noMove="1" noResize="1" noEditPoints="1" noAdjustHandles="1" noChangeArrowheads="1" noChangeShapeType="1" noTextEdit="1"/>
+          </p:cNvSpPr>
+          <p:nvPr>
+            <p:extLst>
+              <p:ext uri="{386F3935-93C4-4BCD-93E2-E3B085C9AB24}">
+                <p16:designElem xmlns:p16="http://schemas.microsoft.com/office/powerpoint/2015/main" val="1"/>
+              </p:ext>
+            </p:extLst>
+          </p:nvPr>
+        </p:nvSpPr>
+        <p:spPr bwMode="white">
+          <a:xfrm>
+            <a:off x="1524" y="0"/>
+            <a:ext cx="12188952" cy="6858000"/>
+          </a:xfrm>
+          <a:prstGeom prst="rect">
+            <a:avLst/>
+          </a:prstGeom>
+          <a:noFill/>
+          <a:ln>
+            <a:noFill/>
+          </a:ln>
+        </p:spPr>
+        <p:style>
+          <a:lnRef idx="2">
+            <a:schemeClr val="accent1">
+              <a:shade val="50000"/>
+            </a:schemeClr>
+          </a:lnRef>
+          <a:fillRef idx="1">
+            <a:schemeClr val="accent1"/>
+          </a:fillRef>
+          <a:effectRef idx="0">
+            <a:schemeClr val="accent1"/>
+          </a:effectRef>
+          <a:fontRef idx="minor">
+            <a:schemeClr val="lt1"/>
+          </a:fontRef>
+        </p:style>
+        <p:txBody>
+          <a:bodyPr rtlCol="0" anchor="ctr"/>
+          <a:lstStyle>
+            <a:defPPr>
+              <a:defRPr lang="en-US"/>
+            </a:defPPr>
+            <a:lvl1pPr marL="0" algn="l" defTabSz="914400" rtl="0" eaLnBrk="1" latinLnBrk="0" hangingPunct="1">
+              <a:defRPr sz="1800" kern="1200">
+                <a:solidFill>
+                  <a:schemeClr val="lt1"/>
+                </a:solidFill>
+                <a:latin typeface="+mn-lt"/>
+                <a:ea typeface="+mn-ea"/>
+                <a:cs typeface="+mn-cs"/>
+              </a:defRPr>
+            </a:lvl1pPr>
+            <a:lvl2pPr marL="457200" algn="l" defTabSz="914400" rtl="0" eaLnBrk="1" latinLnBrk="0" hangingPunct="1">
+              <a:defRPr sz="1800" kern="1200">
+                <a:solidFill>
+                  <a:schemeClr val="lt1"/>
+                </a:solidFill>
+                <a:latin typeface="+mn-lt"/>
+                <a:ea typeface="+mn-ea"/>
+                <a:cs typeface="+mn-cs"/>
+              </a:defRPr>
+            </a:lvl2pPr>
+            <a:lvl3pPr marL="914400" algn="l" defTabSz="914400" rtl="0" eaLnBrk="1" latinLnBrk="0" hangingPunct="1">
+              <a:defRPr sz="1800" kern="1200">
+                <a:solidFill>
+                  <a:schemeClr val="lt1"/>
+                </a:solidFill>
+                <a:latin typeface="+mn-lt"/>
+                <a:ea typeface="+mn-ea"/>
+                <a:cs typeface="+mn-cs"/>
+              </a:defRPr>
+            </a:lvl3pPr>
+            <a:lvl4pPr marL="1371600" algn="l" defTabSz="914400" rtl="0" eaLnBrk="1" latinLnBrk="0" hangingPunct="1">
+              <a:defRPr sz="1800" kern="1200">
+                <a:solidFill>
+                  <a:schemeClr val="lt1"/>
+                </a:solidFill>
+                <a:latin typeface="+mn-lt"/>
+                <a:ea typeface="+mn-ea"/>
+                <a:cs typeface="+mn-cs"/>
+              </a:defRPr>
+            </a:lvl4pPr>
+            <a:lvl5pPr marL="1828800" algn="l" defTabSz="914400" rtl="0" eaLnBrk="1" latinLnBrk="0" hangingPunct="1">
+              <a:defRPr sz="1800" kern="1200">
+                <a:solidFill>
+                  <a:schemeClr val="lt1"/>
+                </a:solidFill>
+                <a:latin typeface="+mn-lt"/>
+                <a:ea typeface="+mn-ea"/>
+                <a:cs typeface="+mn-cs"/>
+              </a:defRPr>
+            </a:lvl5pPr>
+            <a:lvl6pPr marL="2286000" algn="l" defTabSz="914400" rtl="0" eaLnBrk="1" latinLnBrk="0" hangingPunct="1">
+              <a:defRPr sz="1800" kern="1200">
+                <a:solidFill>
+                  <a:schemeClr val="lt1"/>
+                </a:solidFill>
+                <a:latin typeface="+mn-lt"/>
+                <a:ea typeface="+mn-ea"/>
+                <a:cs typeface="+mn-cs"/>
+              </a:defRPr>
+            </a:lvl6pPr>
+            <a:lvl7pPr marL="2743200" algn="l" defTabSz="914400" rtl="0" eaLnBrk="1" latinLnBrk="0" hangingPunct="1">
+              <a:defRPr sz="1800" kern="1200">
+                <a:solidFill>
+                  <a:schemeClr val="lt1"/>
+                </a:solidFill>
+                <a:latin typeface="+mn-lt"/>
+                <a:ea typeface="+mn-ea"/>
+                <a:cs typeface="+mn-cs"/>
+              </a:defRPr>
+            </a:lvl7pPr>
+            <a:lvl8pPr marL="3200400" algn="l" defTabSz="914400" rtl="0" eaLnBrk="1" latinLnBrk="0" hangingPunct="1">
+              <a:defRPr sz="1800" kern="1200">
+                <a:solidFill>
+                  <a:schemeClr val="lt1"/>
+                </a:solidFill>
+                <a:latin typeface="+mn-lt"/>
+                <a:ea typeface="+mn-ea"/>
+                <a:cs typeface="+mn-cs"/>
+              </a:defRPr>
+            </a:lvl8pPr>
+            <a:lvl9pPr marL="3657600" algn="l" defTabSz="914400" rtl="0" eaLnBrk="1" latinLnBrk="0" hangingPunct="1">
+              <a:defRPr sz="1800" kern="1200">
+                <a:solidFill>
+                  <a:schemeClr val="lt1"/>
+                </a:solidFill>
+                <a:latin typeface="+mn-lt"/>
+                <a:ea typeface="+mn-ea"/>
+                <a:cs typeface="+mn-cs"/>
+              </a:defRPr>
+            </a:lvl9pPr>
+          </a:lstStyle>
+          <a:p>
+            <a:pPr algn="ctr"/>
+            <a:endParaRPr lang="en-US"/>
+          </a:p>
+        </p:txBody>
+      </p:sp>
+      <p:pic>
+        <p:nvPicPr>
+          <p:cNvPr id="5" name="Picture 4" descr="Graphical user interface&#10;&#10;Description automatically generated with medium confidence">
+            <a:extLst>
+              <a:ext uri="{FF2B5EF4-FFF2-40B4-BE49-F238E27FC236}">
+                <a16:creationId xmlns:a16="http://schemas.microsoft.com/office/drawing/2014/main" id="{5B7461A1-4E97-4DE5-DB6C-F56D45EBD1A0}"/>
+              </a:ext>
+            </a:extLst>
+          </p:cNvPr>
+          <p:cNvPicPr>
+            <a:picLocks noChangeAspect="1"/>
+          </p:cNvPicPr>
+          <p:nvPr/>
+        </p:nvPicPr>
+        <p:blipFill rotWithShape="1">
+          <a:blip r:embed="rId2">
+            <a:extLst>
+              <a:ext uri="{28A0092B-C50C-407E-A947-70E740481C1C}">
+                <a14:useLocalDpi xmlns:a14="http://schemas.microsoft.com/office/drawing/2010/main" val="0"/>
+              </a:ext>
+            </a:extLst>
+          </a:blip>
+          <a:srcRect r="20874"/>
+          <a:stretch/>
+        </p:blipFill>
+        <p:spPr>
+          <a:xfrm>
+            <a:off x="20" y="1282"/>
+            <a:ext cx="12191980" cy="6856718"/>
+          </a:xfrm>
+          <a:prstGeom prst="rect">
+            <a:avLst/>
+          </a:prstGeom>
+        </p:spPr>
+      </p:pic>
+    </p:spTree>
+    <p:extLst>
+      <p:ext uri="{BB962C8B-B14F-4D97-AF65-F5344CB8AC3E}">
+        <p14:creationId xmlns:p14="http://schemas.microsoft.com/office/powerpoint/2010/main" val="3083312806"/>
+      </p:ext>
+    </p:extLst>
+  </p:cSld>
+  <p:clrMapOvr>
+    <a:masterClrMapping/>
+  </p:clrMapOvr>
+</p:sld>
+</file>
+
+<file path=ppt/slides/slide7.xml><?xml version="1.0" encoding="utf-8"?>
+<p:sld xmlns:a="http://schemas.openxmlformats.org/drawingml/2006/main" xmlns:r="http://schemas.openxmlformats.org/officeDocument/2006/relationships" xmlns:p="http://schemas.openxmlformats.org/presentationml/2006/main">
+  <p:cSld>
     <p:spTree>
       <p:nvGrpSpPr>
         <p:cNvPr id="1" name=""/>
@@ -35343,7 +35800,7 @@
 </p:sld>
 </file>
 
-<file path=ppt/slides/slide7.xml><?xml version="1.0" encoding="utf-8"?>
+<file path=ppt/slides/slide8.xml><?xml version="1.0" encoding="utf-8"?>
 <p:sld xmlns:a="http://schemas.openxmlformats.org/drawingml/2006/main" xmlns:r="http://schemas.openxmlformats.org/officeDocument/2006/relationships" xmlns:p="http://schemas.openxmlformats.org/presentationml/2006/main">
   <p:cSld>
     <p:spTree>
@@ -35455,7 +35912,7 @@
 </p:sld>
 </file>
 
-<file path=ppt/slides/slide8.xml><?xml version="1.0" encoding="utf-8"?>
+<file path=ppt/slides/slide9.xml><?xml version="1.0" encoding="utf-8"?>
 <p:sld xmlns:a="http://schemas.openxmlformats.org/drawingml/2006/main" xmlns:r="http://schemas.openxmlformats.org/officeDocument/2006/relationships" xmlns:p="http://schemas.openxmlformats.org/presentationml/2006/main">
   <p:cSld>
     <p:spTree>
@@ -35783,7 +36240,7 @@
                 <a:tabLst/>
                 <a:defRPr/>
               </a:pPr>
-              <a:t>8</a:t>
+              <a:t>9</a:t>
             </a:fld>
             <a:endParaRPr kumimoji="0" lang="en-IN" sz="1200" b="1" i="0" u="none" strike="noStrike" kern="1200" cap="none" spc="0" normalizeH="0" baseline="0" noProof="0" dirty="0">
               <a:ln>
@@ -37412,234 +37869,6 @@
 </p:sld>
 </file>
 
-<file path=ppt/slides/slide9.xml><?xml version="1.0" encoding="utf-8"?>
-<p:sld xmlns:a="http://schemas.openxmlformats.org/drawingml/2006/main" xmlns:r="http://schemas.openxmlformats.org/officeDocument/2006/relationships" xmlns:p="http://schemas.openxmlformats.org/presentationml/2006/main">
-  <p:cSld>
-    <p:bg>
-      <p:bgPr>
-        <a:solidFill>
-          <a:schemeClr val="bg1"/>
-        </a:solidFill>
-        <a:effectLst/>
-      </p:bgPr>
-    </p:bg>
-    <p:spTree>
-      <p:nvGrpSpPr>
-        <p:cNvPr id="1" name=""/>
-        <p:cNvGrpSpPr/>
-        <p:nvPr/>
-      </p:nvGrpSpPr>
-      <p:grpSpPr>
-        <a:xfrm>
-          <a:off x="0" y="0"/>
-          <a:ext cx="0" cy="0"/>
-          <a:chOff x="0" y="0"/>
-          <a:chExt cx="0" cy="0"/>
-        </a:xfrm>
-      </p:grpSpPr>
-      <p:sp>
-        <p:nvSpPr>
-          <p:cNvPr id="10" name="Rectangle 9">
-            <a:extLst>
-              <a:ext uri="{FF2B5EF4-FFF2-40B4-BE49-F238E27FC236}">
-                <a16:creationId xmlns:a16="http://schemas.microsoft.com/office/drawing/2014/main" id="{42A4FC2C-047E-45A5-965D-8E1E3BF09BC6}"/>
-              </a:ext>
-              <a:ext uri="{C183D7F6-B498-43B3-948B-1728B52AA6E4}">
-                <adec:decorative xmlns:adec="http://schemas.microsoft.com/office/drawing/2017/decorative" val="1"/>
-              </a:ext>
-            </a:extLst>
-          </p:cNvPr>
-          <p:cNvSpPr>
-            <a:spLocks noGrp="1" noRot="1" noChangeAspect="1" noMove="1" noResize="1" noEditPoints="1" noAdjustHandles="1" noChangeArrowheads="1" noChangeShapeType="1" noTextEdit="1"/>
-          </p:cNvSpPr>
-          <p:nvPr>
-            <p:extLst>
-              <p:ext uri="{386F3935-93C4-4BCD-93E2-E3B085C9AB24}">
-                <p16:designElem xmlns:p16="http://schemas.microsoft.com/office/powerpoint/2015/main" val="1"/>
-              </p:ext>
-            </p:extLst>
-          </p:nvPr>
-        </p:nvSpPr>
-        <p:spPr bwMode="white">
-          <a:xfrm>
-            <a:off x="1524" y="0"/>
-            <a:ext cx="12188952" cy="6858000"/>
-          </a:xfrm>
-          <a:prstGeom prst="rect">
-            <a:avLst/>
-          </a:prstGeom>
-          <a:noFill/>
-          <a:ln>
-            <a:noFill/>
-          </a:ln>
-        </p:spPr>
-        <p:style>
-          <a:lnRef idx="2">
-            <a:schemeClr val="accent1">
-              <a:shade val="50000"/>
-            </a:schemeClr>
-          </a:lnRef>
-          <a:fillRef idx="1">
-            <a:schemeClr val="accent1"/>
-          </a:fillRef>
-          <a:effectRef idx="0">
-            <a:schemeClr val="accent1"/>
-          </a:effectRef>
-          <a:fontRef idx="minor">
-            <a:schemeClr val="lt1"/>
-          </a:fontRef>
-        </p:style>
-        <p:txBody>
-          <a:bodyPr rtlCol="0" anchor="ctr"/>
-          <a:lstStyle>
-            <a:defPPr>
-              <a:defRPr lang="en-US"/>
-            </a:defPPr>
-            <a:lvl1pPr marL="0" algn="l" defTabSz="914400" rtl="0" eaLnBrk="1" latinLnBrk="0" hangingPunct="1">
-              <a:defRPr sz="1800" kern="1200">
-                <a:solidFill>
-                  <a:schemeClr val="lt1"/>
-                </a:solidFill>
-                <a:latin typeface="+mn-lt"/>
-                <a:ea typeface="+mn-ea"/>
-                <a:cs typeface="+mn-cs"/>
-              </a:defRPr>
-            </a:lvl1pPr>
-            <a:lvl2pPr marL="457200" algn="l" defTabSz="914400" rtl="0" eaLnBrk="1" latinLnBrk="0" hangingPunct="1">
-              <a:defRPr sz="1800" kern="1200">
-                <a:solidFill>
-                  <a:schemeClr val="lt1"/>
-                </a:solidFill>
-                <a:latin typeface="+mn-lt"/>
-                <a:ea typeface="+mn-ea"/>
-                <a:cs typeface="+mn-cs"/>
-              </a:defRPr>
-            </a:lvl2pPr>
-            <a:lvl3pPr marL="914400" algn="l" defTabSz="914400" rtl="0" eaLnBrk="1" latinLnBrk="0" hangingPunct="1">
-              <a:defRPr sz="1800" kern="1200">
-                <a:solidFill>
-                  <a:schemeClr val="lt1"/>
-                </a:solidFill>
-                <a:latin typeface="+mn-lt"/>
-                <a:ea typeface="+mn-ea"/>
-                <a:cs typeface="+mn-cs"/>
-              </a:defRPr>
-            </a:lvl3pPr>
-            <a:lvl4pPr marL="1371600" algn="l" defTabSz="914400" rtl="0" eaLnBrk="1" latinLnBrk="0" hangingPunct="1">
-              <a:defRPr sz="1800" kern="1200">
-                <a:solidFill>
-                  <a:schemeClr val="lt1"/>
-                </a:solidFill>
-                <a:latin typeface="+mn-lt"/>
-                <a:ea typeface="+mn-ea"/>
-                <a:cs typeface="+mn-cs"/>
-              </a:defRPr>
-            </a:lvl4pPr>
-            <a:lvl5pPr marL="1828800" algn="l" defTabSz="914400" rtl="0" eaLnBrk="1" latinLnBrk="0" hangingPunct="1">
-              <a:defRPr sz="1800" kern="1200">
-                <a:solidFill>
-                  <a:schemeClr val="lt1"/>
-                </a:solidFill>
-                <a:latin typeface="+mn-lt"/>
-                <a:ea typeface="+mn-ea"/>
-                <a:cs typeface="+mn-cs"/>
-              </a:defRPr>
-            </a:lvl5pPr>
-            <a:lvl6pPr marL="2286000" algn="l" defTabSz="914400" rtl="0" eaLnBrk="1" latinLnBrk="0" hangingPunct="1">
-              <a:defRPr sz="1800" kern="1200">
-                <a:solidFill>
-                  <a:schemeClr val="lt1"/>
-                </a:solidFill>
-                <a:latin typeface="+mn-lt"/>
-                <a:ea typeface="+mn-ea"/>
-                <a:cs typeface="+mn-cs"/>
-              </a:defRPr>
-            </a:lvl6pPr>
-            <a:lvl7pPr marL="2743200" algn="l" defTabSz="914400" rtl="0" eaLnBrk="1" latinLnBrk="0" hangingPunct="1">
-              <a:defRPr sz="1800" kern="1200">
-                <a:solidFill>
-                  <a:schemeClr val="lt1"/>
-                </a:solidFill>
-                <a:latin typeface="+mn-lt"/>
-                <a:ea typeface="+mn-ea"/>
-                <a:cs typeface="+mn-cs"/>
-              </a:defRPr>
-            </a:lvl7pPr>
-            <a:lvl8pPr marL="3200400" algn="l" defTabSz="914400" rtl="0" eaLnBrk="1" latinLnBrk="0" hangingPunct="1">
-              <a:defRPr sz="1800" kern="1200">
-                <a:solidFill>
-                  <a:schemeClr val="lt1"/>
-                </a:solidFill>
-                <a:latin typeface="+mn-lt"/>
-                <a:ea typeface="+mn-ea"/>
-                <a:cs typeface="+mn-cs"/>
-              </a:defRPr>
-            </a:lvl8pPr>
-            <a:lvl9pPr marL="3657600" algn="l" defTabSz="914400" rtl="0" eaLnBrk="1" latinLnBrk="0" hangingPunct="1">
-              <a:defRPr sz="1800" kern="1200">
-                <a:solidFill>
-                  <a:schemeClr val="lt1"/>
-                </a:solidFill>
-                <a:latin typeface="+mn-lt"/>
-                <a:ea typeface="+mn-ea"/>
-                <a:cs typeface="+mn-cs"/>
-              </a:defRPr>
-            </a:lvl9pPr>
-          </a:lstStyle>
-          <a:p>
-            <a:pPr algn="ctr"/>
-            <a:endParaRPr lang="en-US"/>
-          </a:p>
-        </p:txBody>
-      </p:sp>
-      <p:pic>
-        <p:nvPicPr>
-          <p:cNvPr id="5" name="Picture 4" descr="Graphical user interface, text, application&#10;&#10;Description automatically generated">
-            <a:extLst>
-              <a:ext uri="{FF2B5EF4-FFF2-40B4-BE49-F238E27FC236}">
-                <a16:creationId xmlns:a16="http://schemas.microsoft.com/office/drawing/2014/main" id="{66118B14-D058-D561-D443-9AD6E24AC29F}"/>
-              </a:ext>
-            </a:extLst>
-          </p:cNvPr>
-          <p:cNvPicPr>
-            <a:picLocks noChangeAspect="1"/>
-          </p:cNvPicPr>
-          <p:nvPr/>
-        </p:nvPicPr>
-        <p:blipFill rotWithShape="1">
-          <a:blip r:embed="rId2">
-            <a:extLst>
-              <a:ext uri="{28A0092B-C50C-407E-A947-70E740481C1C}">
-                <a14:useLocalDpi xmlns:a14="http://schemas.microsoft.com/office/drawing/2010/main" val="0"/>
-              </a:ext>
-            </a:extLst>
-          </a:blip>
-          <a:srcRect t="8492" b="10296"/>
-          <a:stretch/>
-        </p:blipFill>
-        <p:spPr>
-          <a:xfrm>
-            <a:off x="37728" y="47131"/>
-            <a:ext cx="12113423" cy="6749595"/>
-          </a:xfrm>
-          <a:prstGeom prst="rect">
-            <a:avLst/>
-          </a:prstGeom>
-        </p:spPr>
-      </p:pic>
-    </p:spTree>
-    <p:extLst>
-      <p:ext uri="{BB962C8B-B14F-4D97-AF65-F5344CB8AC3E}">
-        <p14:creationId xmlns:p14="http://schemas.microsoft.com/office/powerpoint/2010/main" val="1191071956"/>
-      </p:ext>
-    </p:extLst>
-  </p:cSld>
-  <p:clrMapOvr>
-    <a:masterClrMapping/>
-  </p:clrMapOvr>
-</p:sld>
-</file>
-
 <file path=ppt/theme/theme1.xml><?xml version="1.0" encoding="utf-8"?>
 <a:theme xmlns:a="http://schemas.openxmlformats.org/drawingml/2006/main" name="Office Theme">
   <a:themeElements>

</xml_diff>

<commit_message>
S11, S12 First Looks Images
</commit_message>
<xml_diff>
--- a/Documentation/Architecture.pptx
+++ b/Documentation/Architecture.pptx
@@ -7,22 +7,23 @@
   <p:sldIdLst>
     <p:sldId id="333" r:id="rId2"/>
     <p:sldId id="340" r:id="rId3"/>
-    <p:sldId id="348" r:id="rId4"/>
-    <p:sldId id="344" r:id="rId5"/>
-    <p:sldId id="256" r:id="rId6"/>
-    <p:sldId id="343" r:id="rId7"/>
-    <p:sldId id="347" r:id="rId8"/>
-    <p:sldId id="346" r:id="rId9"/>
-    <p:sldId id="345" r:id="rId10"/>
-    <p:sldId id="282" r:id="rId11"/>
-    <p:sldId id="342" r:id="rId12"/>
-    <p:sldId id="341" r:id="rId13"/>
-    <p:sldId id="335" r:id="rId14"/>
-    <p:sldId id="336" r:id="rId15"/>
-    <p:sldId id="338" r:id="rId16"/>
-    <p:sldId id="337" r:id="rId17"/>
-    <p:sldId id="339" r:id="rId18"/>
-    <p:sldId id="334" r:id="rId19"/>
+    <p:sldId id="349" r:id="rId4"/>
+    <p:sldId id="348" r:id="rId5"/>
+    <p:sldId id="344" r:id="rId6"/>
+    <p:sldId id="256" r:id="rId7"/>
+    <p:sldId id="343" r:id="rId8"/>
+    <p:sldId id="347" r:id="rId9"/>
+    <p:sldId id="346" r:id="rId10"/>
+    <p:sldId id="345" r:id="rId11"/>
+    <p:sldId id="282" r:id="rId12"/>
+    <p:sldId id="342" r:id="rId13"/>
+    <p:sldId id="341" r:id="rId14"/>
+    <p:sldId id="335" r:id="rId15"/>
+    <p:sldId id="336" r:id="rId16"/>
+    <p:sldId id="338" r:id="rId17"/>
+    <p:sldId id="337" r:id="rId18"/>
+    <p:sldId id="339" r:id="rId19"/>
+    <p:sldId id="334" r:id="rId20"/>
   </p:sldIdLst>
   <p:sldSz cx="12192000" cy="6858000"/>
   <p:notesSz cx="6858000" cy="9144000"/>
@@ -6123,6 +6124,118 @@
           <a:chExt cx="0" cy="0"/>
         </a:xfrm>
       </p:grpSpPr>
+      <p:pic>
+        <p:nvPicPr>
+          <p:cNvPr id="3" name="Picture 2" descr="Graphical user interface, text, application&#10;&#10;Description automatically generated">
+            <a:extLst>
+              <a:ext uri="{FF2B5EF4-FFF2-40B4-BE49-F238E27FC236}">
+                <a16:creationId xmlns:a16="http://schemas.microsoft.com/office/drawing/2014/main" id="{5F10DE46-1C76-C9C5-5B2A-2AAED0099F1C}"/>
+              </a:ext>
+            </a:extLst>
+          </p:cNvPr>
+          <p:cNvPicPr>
+            <a:picLocks noChangeAspect="1"/>
+          </p:cNvPicPr>
+          <p:nvPr/>
+        </p:nvPicPr>
+        <p:blipFill>
+          <a:blip r:embed="rId2">
+            <a:extLst>
+              <a:ext uri="{28A0092B-C50C-407E-A947-70E740481C1C}">
+                <a14:useLocalDpi xmlns:a14="http://schemas.microsoft.com/office/drawing/2010/main" val="0"/>
+              </a:ext>
+            </a:extLst>
+          </a:blip>
+          <a:stretch>
+            <a:fillRect/>
+          </a:stretch>
+        </p:blipFill>
+        <p:spPr>
+          <a:xfrm>
+            <a:off x="38908" y="39095"/>
+            <a:ext cx="12114180" cy="4089846"/>
+          </a:xfrm>
+          <a:prstGeom prst="rect">
+            <a:avLst/>
+          </a:prstGeom>
+          <a:ln>
+            <a:solidFill>
+              <a:srgbClr val="002060"/>
+            </a:solidFill>
+          </a:ln>
+        </p:spPr>
+      </p:pic>
+      <p:pic>
+        <p:nvPicPr>
+          <p:cNvPr id="6" name="Picture 5" descr="Graphical user interface, application&#10;&#10;Description automatically generated">
+            <a:extLst>
+              <a:ext uri="{FF2B5EF4-FFF2-40B4-BE49-F238E27FC236}">
+                <a16:creationId xmlns:a16="http://schemas.microsoft.com/office/drawing/2014/main" id="{64AF3A08-04CD-CC9D-5888-D2D73AD3088A}"/>
+              </a:ext>
+            </a:extLst>
+          </p:cNvPr>
+          <p:cNvPicPr>
+            <a:picLocks noChangeAspect="1"/>
+          </p:cNvPicPr>
+          <p:nvPr/>
+        </p:nvPicPr>
+        <p:blipFill>
+          <a:blip r:embed="rId3">
+            <a:extLst>
+              <a:ext uri="{28A0092B-C50C-407E-A947-70E740481C1C}">
+                <a14:useLocalDpi xmlns:a14="http://schemas.microsoft.com/office/drawing/2010/main" val="0"/>
+              </a:ext>
+            </a:extLst>
+          </a:blip>
+          <a:stretch>
+            <a:fillRect/>
+          </a:stretch>
+        </p:blipFill>
+        <p:spPr>
+          <a:xfrm>
+            <a:off x="48640" y="4194925"/>
+            <a:ext cx="12104448" cy="2623979"/>
+          </a:xfrm>
+          <a:prstGeom prst="rect">
+            <a:avLst/>
+          </a:prstGeom>
+          <a:ln>
+            <a:solidFill>
+              <a:schemeClr val="accent1"/>
+            </a:solidFill>
+          </a:ln>
+        </p:spPr>
+      </p:pic>
+    </p:spTree>
+    <p:extLst>
+      <p:ext uri="{BB962C8B-B14F-4D97-AF65-F5344CB8AC3E}">
+        <p14:creationId xmlns:p14="http://schemas.microsoft.com/office/powerpoint/2010/main" val="4262798318"/>
+      </p:ext>
+    </p:extLst>
+  </p:cSld>
+  <p:clrMapOvr>
+    <a:masterClrMapping/>
+  </p:clrMapOvr>
+</p:sld>
+</file>
+
+<file path=ppt/slides/slide11.xml><?xml version="1.0" encoding="utf-8"?>
+<p:sld xmlns:a="http://schemas.openxmlformats.org/drawingml/2006/main" xmlns:r="http://schemas.openxmlformats.org/officeDocument/2006/relationships" xmlns:p="http://schemas.openxmlformats.org/presentationml/2006/main">
+  <p:cSld>
+    <p:spTree>
+      <p:nvGrpSpPr>
+        <p:cNvPr id="1" name=""/>
+        <p:cNvGrpSpPr/>
+        <p:nvPr/>
+      </p:nvGrpSpPr>
+      <p:grpSpPr>
+        <a:xfrm>
+          <a:off x="0" y="0"/>
+          <a:ext cx="0" cy="0"/>
+          <a:chOff x="0" y="0"/>
+          <a:chExt cx="0" cy="0"/>
+        </a:xfrm>
+      </p:grpSpPr>
       <p:sp>
         <p:nvSpPr>
           <p:cNvPr id="4" name="Rectangle 3">
@@ -6434,7 +6547,7 @@
                 <a:tabLst/>
                 <a:defRPr/>
               </a:pPr>
-              <a:t>10</a:t>
+              <a:t>11</a:t>
             </a:fld>
             <a:endParaRPr kumimoji="0" lang="en-IN" sz="1200" b="1" i="0" u="none" strike="noStrike" kern="1200" cap="none" spc="0" normalizeH="0" baseline="0" noProof="0" dirty="0">
               <a:ln>
@@ -8063,7 +8176,7 @@
 </p:sld>
 </file>
 
-<file path=ppt/slides/slide11.xml><?xml version="1.0" encoding="utf-8"?>
+<file path=ppt/slides/slide12.xml><?xml version="1.0" encoding="utf-8"?>
 <p:sld xmlns:a="http://schemas.openxmlformats.org/drawingml/2006/main" xmlns:r="http://schemas.openxmlformats.org/officeDocument/2006/relationships" xmlns:p="http://schemas.openxmlformats.org/presentationml/2006/main">
   <p:cSld>
     <p:bg>
@@ -8291,7 +8404,7 @@
 </p:sld>
 </file>
 
-<file path=ppt/slides/slide12.xml><?xml version="1.0" encoding="utf-8"?>
+<file path=ppt/slides/slide13.xml><?xml version="1.0" encoding="utf-8"?>
 <p:sld xmlns:a="http://schemas.openxmlformats.org/drawingml/2006/main" xmlns:r="http://schemas.openxmlformats.org/officeDocument/2006/relationships" xmlns:p="http://schemas.openxmlformats.org/presentationml/2006/main">
   <p:cSld>
     <p:bg>
@@ -8519,7 +8632,7 @@
 </p:sld>
 </file>
 
-<file path=ppt/slides/slide13.xml><?xml version="1.0" encoding="utf-8"?>
+<file path=ppt/slides/slide14.xml><?xml version="1.0" encoding="utf-8"?>
 <p:sld xmlns:a="http://schemas.openxmlformats.org/drawingml/2006/main" xmlns:r="http://schemas.openxmlformats.org/officeDocument/2006/relationships" xmlns:p="http://schemas.openxmlformats.org/presentationml/2006/main">
   <p:cSld>
     <p:bg>
@@ -8902,7 +9015,7 @@
 </p:sld>
 </file>
 
-<file path=ppt/slides/slide14.xml><?xml version="1.0" encoding="utf-8"?>
+<file path=ppt/slides/slide15.xml><?xml version="1.0" encoding="utf-8"?>
 <p:sld xmlns:a="http://schemas.openxmlformats.org/drawingml/2006/main" xmlns:r="http://schemas.openxmlformats.org/officeDocument/2006/relationships" xmlns:p="http://schemas.openxmlformats.org/presentationml/2006/main">
   <p:cSld>
     <p:spTree>
@@ -13776,7 +13889,7 @@
 </p:sld>
 </file>
 
-<file path=ppt/slides/slide15.xml><?xml version="1.0" encoding="utf-8"?>
+<file path=ppt/slides/slide16.xml><?xml version="1.0" encoding="utf-8"?>
 <p:sld xmlns:a="http://schemas.openxmlformats.org/drawingml/2006/main" xmlns:r="http://schemas.openxmlformats.org/officeDocument/2006/relationships" xmlns:p="http://schemas.openxmlformats.org/presentationml/2006/main">
   <p:cSld>
     <p:spTree>
@@ -20143,7 +20256,7 @@
 </p:sld>
 </file>
 
-<file path=ppt/slides/slide16.xml><?xml version="1.0" encoding="utf-8"?>
+<file path=ppt/slides/slide17.xml><?xml version="1.0" encoding="utf-8"?>
 <p:sld xmlns:a="http://schemas.openxmlformats.org/drawingml/2006/main" xmlns:r="http://schemas.openxmlformats.org/officeDocument/2006/relationships" xmlns:p="http://schemas.openxmlformats.org/presentationml/2006/main">
   <p:cSld>
     <p:spTree>
@@ -25896,7 +26009,7 @@
 </p:sld>
 </file>
 
-<file path=ppt/slides/slide17.xml><?xml version="1.0" encoding="utf-8"?>
+<file path=ppt/slides/slide18.xml><?xml version="1.0" encoding="utf-8"?>
 <p:sld xmlns:a="http://schemas.openxmlformats.org/drawingml/2006/main" xmlns:r="http://schemas.openxmlformats.org/officeDocument/2006/relationships" xmlns:p="http://schemas.openxmlformats.org/presentationml/2006/main">
   <p:cSld>
     <p:spTree>
@@ -26315,7 +26428,7 @@
 </p:sld>
 </file>
 
-<file path=ppt/slides/slide18.xml><?xml version="1.0" encoding="utf-8"?>
+<file path=ppt/slides/slide19.xml><?xml version="1.0" encoding="utf-8"?>
 <p:sld xmlns:a="http://schemas.openxmlformats.org/drawingml/2006/main" xmlns:r="http://schemas.openxmlformats.org/officeDocument/2006/relationships" xmlns:p="http://schemas.openxmlformats.org/presentationml/2006/main">
   <p:cSld>
     <p:spTree>
@@ -29850,6 +29963,234 @@
       </p:grpSpPr>
       <p:sp>
         <p:nvSpPr>
+          <p:cNvPr id="9" name="Rectangle 8">
+            <a:extLst>
+              <a:ext uri="{FF2B5EF4-FFF2-40B4-BE49-F238E27FC236}">
+                <a16:creationId xmlns:a16="http://schemas.microsoft.com/office/drawing/2014/main" id="{42A4FC2C-047E-45A5-965D-8E1E3BF09BC6}"/>
+              </a:ext>
+              <a:ext uri="{C183D7F6-B498-43B3-948B-1728B52AA6E4}">
+                <adec:decorative xmlns:adec="http://schemas.microsoft.com/office/drawing/2017/decorative" val="1"/>
+              </a:ext>
+            </a:extLst>
+          </p:cNvPr>
+          <p:cNvSpPr>
+            <a:spLocks noGrp="1" noRot="1" noChangeAspect="1" noMove="1" noResize="1" noEditPoints="1" noAdjustHandles="1" noChangeArrowheads="1" noChangeShapeType="1" noTextEdit="1"/>
+          </p:cNvSpPr>
+          <p:nvPr>
+            <p:extLst>
+              <p:ext uri="{386F3935-93C4-4BCD-93E2-E3B085C9AB24}">
+                <p16:designElem xmlns:p16="http://schemas.microsoft.com/office/powerpoint/2015/main" val="1"/>
+              </p:ext>
+            </p:extLst>
+          </p:nvPr>
+        </p:nvSpPr>
+        <p:spPr bwMode="white">
+          <a:xfrm>
+            <a:off x="1524" y="0"/>
+            <a:ext cx="12188952" cy="6858000"/>
+          </a:xfrm>
+          <a:prstGeom prst="rect">
+            <a:avLst/>
+          </a:prstGeom>
+          <a:noFill/>
+          <a:ln>
+            <a:noFill/>
+          </a:ln>
+        </p:spPr>
+        <p:style>
+          <a:lnRef idx="2">
+            <a:schemeClr val="accent1">
+              <a:shade val="50000"/>
+            </a:schemeClr>
+          </a:lnRef>
+          <a:fillRef idx="1">
+            <a:schemeClr val="accent1"/>
+          </a:fillRef>
+          <a:effectRef idx="0">
+            <a:schemeClr val="accent1"/>
+          </a:effectRef>
+          <a:fontRef idx="minor">
+            <a:schemeClr val="lt1"/>
+          </a:fontRef>
+        </p:style>
+        <p:txBody>
+          <a:bodyPr rtlCol="0" anchor="ctr"/>
+          <a:lstStyle>
+            <a:defPPr>
+              <a:defRPr lang="en-US"/>
+            </a:defPPr>
+            <a:lvl1pPr marL="0" algn="l" defTabSz="914400" rtl="0" eaLnBrk="1" latinLnBrk="0" hangingPunct="1">
+              <a:defRPr sz="1800" kern="1200">
+                <a:solidFill>
+                  <a:schemeClr val="lt1"/>
+                </a:solidFill>
+                <a:latin typeface="+mn-lt"/>
+                <a:ea typeface="+mn-ea"/>
+                <a:cs typeface="+mn-cs"/>
+              </a:defRPr>
+            </a:lvl1pPr>
+            <a:lvl2pPr marL="457200" algn="l" defTabSz="914400" rtl="0" eaLnBrk="1" latinLnBrk="0" hangingPunct="1">
+              <a:defRPr sz="1800" kern="1200">
+                <a:solidFill>
+                  <a:schemeClr val="lt1"/>
+                </a:solidFill>
+                <a:latin typeface="+mn-lt"/>
+                <a:ea typeface="+mn-ea"/>
+                <a:cs typeface="+mn-cs"/>
+              </a:defRPr>
+            </a:lvl2pPr>
+            <a:lvl3pPr marL="914400" algn="l" defTabSz="914400" rtl="0" eaLnBrk="1" latinLnBrk="0" hangingPunct="1">
+              <a:defRPr sz="1800" kern="1200">
+                <a:solidFill>
+                  <a:schemeClr val="lt1"/>
+                </a:solidFill>
+                <a:latin typeface="+mn-lt"/>
+                <a:ea typeface="+mn-ea"/>
+                <a:cs typeface="+mn-cs"/>
+              </a:defRPr>
+            </a:lvl3pPr>
+            <a:lvl4pPr marL="1371600" algn="l" defTabSz="914400" rtl="0" eaLnBrk="1" latinLnBrk="0" hangingPunct="1">
+              <a:defRPr sz="1800" kern="1200">
+                <a:solidFill>
+                  <a:schemeClr val="lt1"/>
+                </a:solidFill>
+                <a:latin typeface="+mn-lt"/>
+                <a:ea typeface="+mn-ea"/>
+                <a:cs typeface="+mn-cs"/>
+              </a:defRPr>
+            </a:lvl4pPr>
+            <a:lvl5pPr marL="1828800" algn="l" defTabSz="914400" rtl="0" eaLnBrk="1" latinLnBrk="0" hangingPunct="1">
+              <a:defRPr sz="1800" kern="1200">
+                <a:solidFill>
+                  <a:schemeClr val="lt1"/>
+                </a:solidFill>
+                <a:latin typeface="+mn-lt"/>
+                <a:ea typeface="+mn-ea"/>
+                <a:cs typeface="+mn-cs"/>
+              </a:defRPr>
+            </a:lvl5pPr>
+            <a:lvl6pPr marL="2286000" algn="l" defTabSz="914400" rtl="0" eaLnBrk="1" latinLnBrk="0" hangingPunct="1">
+              <a:defRPr sz="1800" kern="1200">
+                <a:solidFill>
+                  <a:schemeClr val="lt1"/>
+                </a:solidFill>
+                <a:latin typeface="+mn-lt"/>
+                <a:ea typeface="+mn-ea"/>
+                <a:cs typeface="+mn-cs"/>
+              </a:defRPr>
+            </a:lvl6pPr>
+            <a:lvl7pPr marL="2743200" algn="l" defTabSz="914400" rtl="0" eaLnBrk="1" latinLnBrk="0" hangingPunct="1">
+              <a:defRPr sz="1800" kern="1200">
+                <a:solidFill>
+                  <a:schemeClr val="lt1"/>
+                </a:solidFill>
+                <a:latin typeface="+mn-lt"/>
+                <a:ea typeface="+mn-ea"/>
+                <a:cs typeface="+mn-cs"/>
+              </a:defRPr>
+            </a:lvl7pPr>
+            <a:lvl8pPr marL="3200400" algn="l" defTabSz="914400" rtl="0" eaLnBrk="1" latinLnBrk="0" hangingPunct="1">
+              <a:defRPr sz="1800" kern="1200">
+                <a:solidFill>
+                  <a:schemeClr val="lt1"/>
+                </a:solidFill>
+                <a:latin typeface="+mn-lt"/>
+                <a:ea typeface="+mn-ea"/>
+                <a:cs typeface="+mn-cs"/>
+              </a:defRPr>
+            </a:lvl8pPr>
+            <a:lvl9pPr marL="3657600" algn="l" defTabSz="914400" rtl="0" eaLnBrk="1" latinLnBrk="0" hangingPunct="1">
+              <a:defRPr sz="1800" kern="1200">
+                <a:solidFill>
+                  <a:schemeClr val="lt1"/>
+                </a:solidFill>
+                <a:latin typeface="+mn-lt"/>
+                <a:ea typeface="+mn-ea"/>
+                <a:cs typeface="+mn-cs"/>
+              </a:defRPr>
+            </a:lvl9pPr>
+          </a:lstStyle>
+          <a:p>
+            <a:pPr algn="ctr"/>
+            <a:endParaRPr lang="en-US"/>
+          </a:p>
+        </p:txBody>
+      </p:sp>
+      <p:pic>
+        <p:nvPicPr>
+          <p:cNvPr id="4" name="Picture 3" descr="Graphical user interface, text, application&#10;&#10;Description automatically generated">
+            <a:extLst>
+              <a:ext uri="{FF2B5EF4-FFF2-40B4-BE49-F238E27FC236}">
+                <a16:creationId xmlns:a16="http://schemas.microsoft.com/office/drawing/2014/main" id="{A4FBCD18-DB97-3919-C38C-11AC03AEF93E}"/>
+              </a:ext>
+            </a:extLst>
+          </p:cNvPr>
+          <p:cNvPicPr>
+            <a:picLocks noChangeAspect="1"/>
+          </p:cNvPicPr>
+          <p:nvPr/>
+        </p:nvPicPr>
+        <p:blipFill rotWithShape="1">
+          <a:blip r:embed="rId2">
+            <a:extLst>
+              <a:ext uri="{28A0092B-C50C-407E-A947-70E740481C1C}">
+                <a14:useLocalDpi xmlns:a14="http://schemas.microsoft.com/office/drawing/2010/main" val="0"/>
+              </a:ext>
+            </a:extLst>
+          </a:blip>
+          <a:srcRect t="15019" b="18030"/>
+          <a:stretch/>
+        </p:blipFill>
+        <p:spPr>
+          <a:xfrm>
+            <a:off x="20" y="1282"/>
+            <a:ext cx="12191980" cy="6856718"/>
+          </a:xfrm>
+          <a:prstGeom prst="rect">
+            <a:avLst/>
+          </a:prstGeom>
+        </p:spPr>
+      </p:pic>
+    </p:spTree>
+    <p:extLst>
+      <p:ext uri="{BB962C8B-B14F-4D97-AF65-F5344CB8AC3E}">
+        <p14:creationId xmlns:p14="http://schemas.microsoft.com/office/powerpoint/2010/main" val="4071482095"/>
+      </p:ext>
+    </p:extLst>
+  </p:cSld>
+  <p:clrMapOvr>
+    <a:masterClrMapping/>
+  </p:clrMapOvr>
+</p:sld>
+</file>
+
+<file path=ppt/slides/slide4.xml><?xml version="1.0" encoding="utf-8"?>
+<p:sld xmlns:a="http://schemas.openxmlformats.org/drawingml/2006/main" xmlns:r="http://schemas.openxmlformats.org/officeDocument/2006/relationships" xmlns:p="http://schemas.openxmlformats.org/presentationml/2006/main">
+  <p:cSld>
+    <p:bg>
+      <p:bgPr>
+        <a:solidFill>
+          <a:schemeClr val="bg1"/>
+        </a:solidFill>
+        <a:effectLst/>
+      </p:bgPr>
+    </p:bg>
+    <p:spTree>
+      <p:nvGrpSpPr>
+        <p:cNvPr id="1" name=""/>
+        <p:cNvGrpSpPr/>
+        <p:nvPr/>
+      </p:nvGrpSpPr>
+      <p:grpSpPr>
+        <a:xfrm>
+          <a:off x="0" y="0"/>
+          <a:ext cx="0" cy="0"/>
+          <a:chOff x="0" y="0"/>
+          <a:chExt cx="0" cy="0"/>
+        </a:xfrm>
+      </p:grpSpPr>
+      <p:sp>
+        <p:nvSpPr>
           <p:cNvPr id="20" name="Rectangle 19">
             <a:extLst>
               <a:ext uri="{FF2B5EF4-FFF2-40B4-BE49-F238E27FC236}">
@@ -30045,7 +30386,7 @@
 </p:sld>
 </file>
 
-<file path=ppt/slides/slide4.xml><?xml version="1.0" encoding="utf-8"?>
+<file path=ppt/slides/slide5.xml><?xml version="1.0" encoding="utf-8"?>
 <p:sld xmlns:a="http://schemas.openxmlformats.org/drawingml/2006/main" xmlns:r="http://schemas.openxmlformats.org/officeDocument/2006/relationships" xmlns:p="http://schemas.openxmlformats.org/presentationml/2006/main">
   <p:cSld>
     <p:spTree>
@@ -36412,7 +36753,7 @@
 </p:sld>
 </file>
 
-<file path=ppt/slides/slide5.xml><?xml version="1.0" encoding="utf-8"?>
+<file path=ppt/slides/slide6.xml><?xml version="1.0" encoding="utf-8"?>
 <p:sld xmlns:a="http://schemas.openxmlformats.org/drawingml/2006/main" xmlns:r="http://schemas.openxmlformats.org/officeDocument/2006/relationships" xmlns:p="http://schemas.openxmlformats.org/presentationml/2006/main">
   <p:cSld>
     <p:spTree>
@@ -36835,7 +37176,7 @@
 </p:sld>
 </file>
 
-<file path=ppt/slides/slide6.xml><?xml version="1.0" encoding="utf-8"?>
+<file path=ppt/slides/slide7.xml><?xml version="1.0" encoding="utf-8"?>
 <p:sld xmlns:a="http://schemas.openxmlformats.org/drawingml/2006/main" xmlns:r="http://schemas.openxmlformats.org/officeDocument/2006/relationships" xmlns:p="http://schemas.openxmlformats.org/presentationml/2006/main">
   <p:cSld>
     <p:spTree>
@@ -37640,7 +37981,7 @@
 </p:sld>
 </file>
 
-<file path=ppt/slides/slide7.xml><?xml version="1.0" encoding="utf-8"?>
+<file path=ppt/slides/slide8.xml><?xml version="1.0" encoding="utf-8"?>
 <p:sld xmlns:a="http://schemas.openxmlformats.org/drawingml/2006/main" xmlns:r="http://schemas.openxmlformats.org/officeDocument/2006/relationships" xmlns:p="http://schemas.openxmlformats.org/presentationml/2006/main">
   <p:cSld>
     <p:bg>
@@ -37868,7 +38209,7 @@
 </p:sld>
 </file>
 
-<file path=ppt/slides/slide8.xml><?xml version="1.0" encoding="utf-8"?>
+<file path=ppt/slides/slide9.xml><?xml version="1.0" encoding="utf-8"?>
 <p:sld xmlns:a="http://schemas.openxmlformats.org/drawingml/2006/main" xmlns:r="http://schemas.openxmlformats.org/officeDocument/2006/relationships" xmlns:p="http://schemas.openxmlformats.org/presentationml/2006/main">
   <p:cSld>
     <p:spTree>
@@ -37971,118 +38312,6 @@
     <p:extLst>
       <p:ext uri="{BB962C8B-B14F-4D97-AF65-F5344CB8AC3E}">
         <p14:creationId xmlns:p14="http://schemas.microsoft.com/office/powerpoint/2010/main" val="1846930178"/>
-      </p:ext>
-    </p:extLst>
-  </p:cSld>
-  <p:clrMapOvr>
-    <a:masterClrMapping/>
-  </p:clrMapOvr>
-</p:sld>
-</file>
-
-<file path=ppt/slides/slide9.xml><?xml version="1.0" encoding="utf-8"?>
-<p:sld xmlns:a="http://schemas.openxmlformats.org/drawingml/2006/main" xmlns:r="http://schemas.openxmlformats.org/officeDocument/2006/relationships" xmlns:p="http://schemas.openxmlformats.org/presentationml/2006/main">
-  <p:cSld>
-    <p:spTree>
-      <p:nvGrpSpPr>
-        <p:cNvPr id="1" name=""/>
-        <p:cNvGrpSpPr/>
-        <p:nvPr/>
-      </p:nvGrpSpPr>
-      <p:grpSpPr>
-        <a:xfrm>
-          <a:off x="0" y="0"/>
-          <a:ext cx="0" cy="0"/>
-          <a:chOff x="0" y="0"/>
-          <a:chExt cx="0" cy="0"/>
-        </a:xfrm>
-      </p:grpSpPr>
-      <p:pic>
-        <p:nvPicPr>
-          <p:cNvPr id="3" name="Picture 2" descr="Graphical user interface, text, application&#10;&#10;Description automatically generated">
-            <a:extLst>
-              <a:ext uri="{FF2B5EF4-FFF2-40B4-BE49-F238E27FC236}">
-                <a16:creationId xmlns:a16="http://schemas.microsoft.com/office/drawing/2014/main" id="{5F10DE46-1C76-C9C5-5B2A-2AAED0099F1C}"/>
-              </a:ext>
-            </a:extLst>
-          </p:cNvPr>
-          <p:cNvPicPr>
-            <a:picLocks noChangeAspect="1"/>
-          </p:cNvPicPr>
-          <p:nvPr/>
-        </p:nvPicPr>
-        <p:blipFill>
-          <a:blip r:embed="rId2">
-            <a:extLst>
-              <a:ext uri="{28A0092B-C50C-407E-A947-70E740481C1C}">
-                <a14:useLocalDpi xmlns:a14="http://schemas.microsoft.com/office/drawing/2010/main" val="0"/>
-              </a:ext>
-            </a:extLst>
-          </a:blip>
-          <a:stretch>
-            <a:fillRect/>
-          </a:stretch>
-        </p:blipFill>
-        <p:spPr>
-          <a:xfrm>
-            <a:off x="38908" y="39095"/>
-            <a:ext cx="12114180" cy="4089846"/>
-          </a:xfrm>
-          <a:prstGeom prst="rect">
-            <a:avLst/>
-          </a:prstGeom>
-          <a:ln>
-            <a:solidFill>
-              <a:srgbClr val="002060"/>
-            </a:solidFill>
-          </a:ln>
-        </p:spPr>
-      </p:pic>
-      <p:pic>
-        <p:nvPicPr>
-          <p:cNvPr id="6" name="Picture 5" descr="Graphical user interface, application&#10;&#10;Description automatically generated">
-            <a:extLst>
-              <a:ext uri="{FF2B5EF4-FFF2-40B4-BE49-F238E27FC236}">
-                <a16:creationId xmlns:a16="http://schemas.microsoft.com/office/drawing/2014/main" id="{64AF3A08-04CD-CC9D-5888-D2D73AD3088A}"/>
-              </a:ext>
-            </a:extLst>
-          </p:cNvPr>
-          <p:cNvPicPr>
-            <a:picLocks noChangeAspect="1"/>
-          </p:cNvPicPr>
-          <p:nvPr/>
-        </p:nvPicPr>
-        <p:blipFill>
-          <a:blip r:embed="rId3">
-            <a:extLst>
-              <a:ext uri="{28A0092B-C50C-407E-A947-70E740481C1C}">
-                <a14:useLocalDpi xmlns:a14="http://schemas.microsoft.com/office/drawing/2010/main" val="0"/>
-              </a:ext>
-            </a:extLst>
-          </a:blip>
-          <a:stretch>
-            <a:fillRect/>
-          </a:stretch>
-        </p:blipFill>
-        <p:spPr>
-          <a:xfrm>
-            <a:off x="48640" y="4194925"/>
-            <a:ext cx="12104448" cy="2623979"/>
-          </a:xfrm>
-          <a:prstGeom prst="rect">
-            <a:avLst/>
-          </a:prstGeom>
-          <a:ln>
-            <a:solidFill>
-              <a:schemeClr val="accent1"/>
-            </a:solidFill>
-          </a:ln>
-        </p:spPr>
-      </p:pic>
-    </p:spTree>
-    <p:extLst>
-      <p:ext uri="{BB962C8B-B14F-4D97-AF65-F5344CB8AC3E}">
-        <p14:creationId xmlns:p14="http://schemas.microsoft.com/office/powerpoint/2010/main" val="4262798318"/>
       </p:ext>
     </p:extLst>
   </p:cSld>

</xml_diff>

<commit_message>
Swamy/16oct2022 git clone pull ps changes (#81)
* Updated the PowerShell Script

* Initial version

* Update Main-Deploy-eShop-Solution.yml

* Update Main-Deploy-eShop-Solution.yml

* Update Main-Deploy-eShop-Solution.yml

* Added eShop Products API Deployment YAML file

* Update Main-Deploy-eShop-Solution.yml

* ff

* S11 First Look

* S11

* S11, S12 First Looks Images
</commit_message>
<xml_diff>
--- a/Documentation/Architecture.pptx
+++ b/Documentation/Architecture.pptx
@@ -7,21 +7,23 @@
   <p:sldIdLst>
     <p:sldId id="333" r:id="rId2"/>
     <p:sldId id="340" r:id="rId3"/>
-    <p:sldId id="344" r:id="rId4"/>
-    <p:sldId id="256" r:id="rId5"/>
-    <p:sldId id="343" r:id="rId6"/>
-    <p:sldId id="347" r:id="rId7"/>
-    <p:sldId id="346" r:id="rId8"/>
-    <p:sldId id="345" r:id="rId9"/>
-    <p:sldId id="282" r:id="rId10"/>
-    <p:sldId id="342" r:id="rId11"/>
-    <p:sldId id="341" r:id="rId12"/>
-    <p:sldId id="335" r:id="rId13"/>
-    <p:sldId id="336" r:id="rId14"/>
-    <p:sldId id="338" r:id="rId15"/>
-    <p:sldId id="337" r:id="rId16"/>
-    <p:sldId id="339" r:id="rId17"/>
-    <p:sldId id="334" r:id="rId18"/>
+    <p:sldId id="349" r:id="rId4"/>
+    <p:sldId id="348" r:id="rId5"/>
+    <p:sldId id="344" r:id="rId6"/>
+    <p:sldId id="256" r:id="rId7"/>
+    <p:sldId id="343" r:id="rId8"/>
+    <p:sldId id="347" r:id="rId9"/>
+    <p:sldId id="346" r:id="rId10"/>
+    <p:sldId id="345" r:id="rId11"/>
+    <p:sldId id="282" r:id="rId12"/>
+    <p:sldId id="342" r:id="rId13"/>
+    <p:sldId id="341" r:id="rId14"/>
+    <p:sldId id="335" r:id="rId15"/>
+    <p:sldId id="336" r:id="rId16"/>
+    <p:sldId id="338" r:id="rId17"/>
+    <p:sldId id="337" r:id="rId18"/>
+    <p:sldId id="339" r:id="rId19"/>
+    <p:sldId id="334" r:id="rId20"/>
   </p:sldIdLst>
   <p:sldSz cx="12192000" cy="6858000"/>
   <p:notesSz cx="6858000" cy="9144000"/>
@@ -283,7 +285,7 @@
           <a:p>
             <a:fld id="{DC2BF6E6-F863-479F-A057-0F7FF047E296}" type="datetimeFigureOut">
               <a:rPr lang="en-IN" smtClean="0"/>
-              <a:t>06-10-2022</a:t>
+              <a:t>29-10-2022</a:t>
             </a:fld>
             <a:endParaRPr lang="en-IN"/>
           </a:p>
@@ -483,7 +485,7 @@
           <a:p>
             <a:fld id="{DC2BF6E6-F863-479F-A057-0F7FF047E296}" type="datetimeFigureOut">
               <a:rPr lang="en-IN" smtClean="0"/>
-              <a:t>06-10-2022</a:t>
+              <a:t>29-10-2022</a:t>
             </a:fld>
             <a:endParaRPr lang="en-IN"/>
           </a:p>
@@ -693,7 +695,7 @@
           <a:p>
             <a:fld id="{DC2BF6E6-F863-479F-A057-0F7FF047E296}" type="datetimeFigureOut">
               <a:rPr lang="en-IN" smtClean="0"/>
-              <a:t>06-10-2022</a:t>
+              <a:t>29-10-2022</a:t>
             </a:fld>
             <a:endParaRPr lang="en-IN"/>
           </a:p>
@@ -893,7 +895,7 @@
           <a:p>
             <a:fld id="{DC2BF6E6-F863-479F-A057-0F7FF047E296}" type="datetimeFigureOut">
               <a:rPr lang="en-IN" smtClean="0"/>
-              <a:t>06-10-2022</a:t>
+              <a:t>29-10-2022</a:t>
             </a:fld>
             <a:endParaRPr lang="en-IN"/>
           </a:p>
@@ -1169,7 +1171,7 @@
           <a:p>
             <a:fld id="{DC2BF6E6-F863-479F-A057-0F7FF047E296}" type="datetimeFigureOut">
               <a:rPr lang="en-IN" smtClean="0"/>
-              <a:t>06-10-2022</a:t>
+              <a:t>29-10-2022</a:t>
             </a:fld>
             <a:endParaRPr lang="en-IN"/>
           </a:p>
@@ -1437,7 +1439,7 @@
           <a:p>
             <a:fld id="{DC2BF6E6-F863-479F-A057-0F7FF047E296}" type="datetimeFigureOut">
               <a:rPr lang="en-IN" smtClean="0"/>
-              <a:t>06-10-2022</a:t>
+              <a:t>29-10-2022</a:t>
             </a:fld>
             <a:endParaRPr lang="en-IN"/>
           </a:p>
@@ -1852,7 +1854,7 @@
           <a:p>
             <a:fld id="{DC2BF6E6-F863-479F-A057-0F7FF047E296}" type="datetimeFigureOut">
               <a:rPr lang="en-IN" smtClean="0"/>
-              <a:t>06-10-2022</a:t>
+              <a:t>29-10-2022</a:t>
             </a:fld>
             <a:endParaRPr lang="en-IN"/>
           </a:p>
@@ -1994,7 +1996,7 @@
           <a:p>
             <a:fld id="{DC2BF6E6-F863-479F-A057-0F7FF047E296}" type="datetimeFigureOut">
               <a:rPr lang="en-IN" smtClean="0"/>
-              <a:t>06-10-2022</a:t>
+              <a:t>29-10-2022</a:t>
             </a:fld>
             <a:endParaRPr lang="en-IN"/>
           </a:p>
@@ -2107,7 +2109,7 @@
           <a:p>
             <a:fld id="{DC2BF6E6-F863-479F-A057-0F7FF047E296}" type="datetimeFigureOut">
               <a:rPr lang="en-IN" smtClean="0"/>
-              <a:t>06-10-2022</a:t>
+              <a:t>29-10-2022</a:t>
             </a:fld>
             <a:endParaRPr lang="en-IN"/>
           </a:p>
@@ -2420,7 +2422,7 @@
           <a:p>
             <a:fld id="{DC2BF6E6-F863-479F-A057-0F7FF047E296}" type="datetimeFigureOut">
               <a:rPr lang="en-IN" smtClean="0"/>
-              <a:t>06-10-2022</a:t>
+              <a:t>29-10-2022</a:t>
             </a:fld>
             <a:endParaRPr lang="en-IN"/>
           </a:p>
@@ -2709,7 +2711,7 @@
           <a:p>
             <a:fld id="{DC2BF6E6-F863-479F-A057-0F7FF047E296}" type="datetimeFigureOut">
               <a:rPr lang="en-IN" smtClean="0"/>
-              <a:t>06-10-2022</a:t>
+              <a:t>29-10-2022</a:t>
             </a:fld>
             <a:endParaRPr lang="en-IN"/>
           </a:p>
@@ -2952,7 +2954,7 @@
           <a:p>
             <a:fld id="{DC2BF6E6-F863-479F-A057-0F7FF047E296}" type="datetimeFigureOut">
               <a:rPr lang="en-IN" smtClean="0"/>
-              <a:t>06-10-2022</a:t>
+              <a:t>29-10-2022</a:t>
             </a:fld>
             <a:endParaRPr lang="en-IN"/>
           </a:p>
@@ -6108,6 +6110,2075 @@
 <file path=ppt/slides/slide10.xml><?xml version="1.0" encoding="utf-8"?>
 <p:sld xmlns:a="http://schemas.openxmlformats.org/drawingml/2006/main" xmlns:r="http://schemas.openxmlformats.org/officeDocument/2006/relationships" xmlns:p="http://schemas.openxmlformats.org/presentationml/2006/main">
   <p:cSld>
+    <p:spTree>
+      <p:nvGrpSpPr>
+        <p:cNvPr id="1" name=""/>
+        <p:cNvGrpSpPr/>
+        <p:nvPr/>
+      </p:nvGrpSpPr>
+      <p:grpSpPr>
+        <a:xfrm>
+          <a:off x="0" y="0"/>
+          <a:ext cx="0" cy="0"/>
+          <a:chOff x="0" y="0"/>
+          <a:chExt cx="0" cy="0"/>
+        </a:xfrm>
+      </p:grpSpPr>
+      <p:pic>
+        <p:nvPicPr>
+          <p:cNvPr id="3" name="Picture 2" descr="Graphical user interface, text, application&#10;&#10;Description automatically generated">
+            <a:extLst>
+              <a:ext uri="{FF2B5EF4-FFF2-40B4-BE49-F238E27FC236}">
+                <a16:creationId xmlns:a16="http://schemas.microsoft.com/office/drawing/2014/main" id="{5F10DE46-1C76-C9C5-5B2A-2AAED0099F1C}"/>
+              </a:ext>
+            </a:extLst>
+          </p:cNvPr>
+          <p:cNvPicPr>
+            <a:picLocks noChangeAspect="1"/>
+          </p:cNvPicPr>
+          <p:nvPr/>
+        </p:nvPicPr>
+        <p:blipFill>
+          <a:blip r:embed="rId2">
+            <a:extLst>
+              <a:ext uri="{28A0092B-C50C-407E-A947-70E740481C1C}">
+                <a14:useLocalDpi xmlns:a14="http://schemas.microsoft.com/office/drawing/2010/main" val="0"/>
+              </a:ext>
+            </a:extLst>
+          </a:blip>
+          <a:stretch>
+            <a:fillRect/>
+          </a:stretch>
+        </p:blipFill>
+        <p:spPr>
+          <a:xfrm>
+            <a:off x="38908" y="39095"/>
+            <a:ext cx="12114180" cy="4089846"/>
+          </a:xfrm>
+          <a:prstGeom prst="rect">
+            <a:avLst/>
+          </a:prstGeom>
+          <a:ln>
+            <a:solidFill>
+              <a:srgbClr val="002060"/>
+            </a:solidFill>
+          </a:ln>
+        </p:spPr>
+      </p:pic>
+      <p:pic>
+        <p:nvPicPr>
+          <p:cNvPr id="6" name="Picture 5" descr="Graphical user interface, application&#10;&#10;Description automatically generated">
+            <a:extLst>
+              <a:ext uri="{FF2B5EF4-FFF2-40B4-BE49-F238E27FC236}">
+                <a16:creationId xmlns:a16="http://schemas.microsoft.com/office/drawing/2014/main" id="{64AF3A08-04CD-CC9D-5888-D2D73AD3088A}"/>
+              </a:ext>
+            </a:extLst>
+          </p:cNvPr>
+          <p:cNvPicPr>
+            <a:picLocks noChangeAspect="1"/>
+          </p:cNvPicPr>
+          <p:nvPr/>
+        </p:nvPicPr>
+        <p:blipFill>
+          <a:blip r:embed="rId3">
+            <a:extLst>
+              <a:ext uri="{28A0092B-C50C-407E-A947-70E740481C1C}">
+                <a14:useLocalDpi xmlns:a14="http://schemas.microsoft.com/office/drawing/2010/main" val="0"/>
+              </a:ext>
+            </a:extLst>
+          </a:blip>
+          <a:stretch>
+            <a:fillRect/>
+          </a:stretch>
+        </p:blipFill>
+        <p:spPr>
+          <a:xfrm>
+            <a:off x="48640" y="4194925"/>
+            <a:ext cx="12104448" cy="2623979"/>
+          </a:xfrm>
+          <a:prstGeom prst="rect">
+            <a:avLst/>
+          </a:prstGeom>
+          <a:ln>
+            <a:solidFill>
+              <a:schemeClr val="accent1"/>
+            </a:solidFill>
+          </a:ln>
+        </p:spPr>
+      </p:pic>
+    </p:spTree>
+    <p:extLst>
+      <p:ext uri="{BB962C8B-B14F-4D97-AF65-F5344CB8AC3E}">
+        <p14:creationId xmlns:p14="http://schemas.microsoft.com/office/powerpoint/2010/main" val="4262798318"/>
+      </p:ext>
+    </p:extLst>
+  </p:cSld>
+  <p:clrMapOvr>
+    <a:masterClrMapping/>
+  </p:clrMapOvr>
+</p:sld>
+</file>
+
+<file path=ppt/slides/slide11.xml><?xml version="1.0" encoding="utf-8"?>
+<p:sld xmlns:a="http://schemas.openxmlformats.org/drawingml/2006/main" xmlns:r="http://schemas.openxmlformats.org/officeDocument/2006/relationships" xmlns:p="http://schemas.openxmlformats.org/presentationml/2006/main">
+  <p:cSld>
+    <p:spTree>
+      <p:nvGrpSpPr>
+        <p:cNvPr id="1" name=""/>
+        <p:cNvGrpSpPr/>
+        <p:nvPr/>
+      </p:nvGrpSpPr>
+      <p:grpSpPr>
+        <a:xfrm>
+          <a:off x="0" y="0"/>
+          <a:ext cx="0" cy="0"/>
+          <a:chOff x="0" y="0"/>
+          <a:chExt cx="0" cy="0"/>
+        </a:xfrm>
+      </p:grpSpPr>
+      <p:sp>
+        <p:nvSpPr>
+          <p:cNvPr id="4" name="Rectangle 3">
+            <a:extLst>
+              <a:ext uri="{FF2B5EF4-FFF2-40B4-BE49-F238E27FC236}">
+                <a16:creationId xmlns:a16="http://schemas.microsoft.com/office/drawing/2014/main" id="{055C22F7-3FD1-4C1B-8D0C-0C2F7FB61DBE}"/>
+              </a:ext>
+            </a:extLst>
+          </p:cNvPr>
+          <p:cNvSpPr/>
+          <p:nvPr/>
+        </p:nvSpPr>
+        <p:spPr>
+          <a:xfrm>
+            <a:off x="0" y="8878"/>
+            <a:ext cx="12183122" cy="497150"/>
+          </a:xfrm>
+          <a:prstGeom prst="rect">
+            <a:avLst/>
+          </a:prstGeom>
+          <a:solidFill>
+            <a:srgbClr val="0070C0"/>
+          </a:solidFill>
+        </p:spPr>
+        <p:style>
+          <a:lnRef idx="2">
+            <a:schemeClr val="accent1">
+              <a:shade val="50000"/>
+            </a:schemeClr>
+          </a:lnRef>
+          <a:fillRef idx="1">
+            <a:schemeClr val="accent1"/>
+          </a:fillRef>
+          <a:effectRef idx="0">
+            <a:schemeClr val="accent1"/>
+          </a:effectRef>
+          <a:fontRef idx="minor">
+            <a:schemeClr val="lt1"/>
+          </a:fontRef>
+        </p:style>
+        <p:txBody>
+          <a:bodyPr rtlCol="0" anchor="ctr"/>
+          <a:lstStyle/>
+          <a:p>
+            <a:pPr marL="0" marR="0" lvl="0" indent="0" algn="ctr" defTabSz="914400" rtl="0" eaLnBrk="1" fontAlgn="auto" latinLnBrk="0" hangingPunct="1">
+              <a:lnSpc>
+                <a:spcPct val="100000"/>
+              </a:lnSpc>
+              <a:spcBef>
+                <a:spcPts val="0"/>
+              </a:spcBef>
+              <a:spcAft>
+                <a:spcPts val="0"/>
+              </a:spcAft>
+              <a:buClrTx/>
+              <a:buSzTx/>
+              <a:buFontTx/>
+              <a:buNone/>
+              <a:tabLst/>
+              <a:defRPr/>
+            </a:pPr>
+            <a:r>
+              <a:rPr kumimoji="0" lang="en-US" sz="1800" b="1" i="0" u="none" strike="noStrike" kern="1200" cap="none" spc="0" normalizeH="0" baseline="0" noProof="0" dirty="0">
+                <a:ln>
+                  <a:noFill/>
+                </a:ln>
+                <a:solidFill>
+                  <a:prstClr val="white"/>
+                </a:solidFill>
+                <a:effectLst/>
+                <a:uLnTx/>
+                <a:uFillTx/>
+                <a:latin typeface="Verdana" panose="020B0604030504040204" pitchFamily="34" charset="0"/>
+                <a:ea typeface="Verdana" panose="020B0604030504040204" pitchFamily="34" charset="0"/>
+                <a:cs typeface="+mn-cs"/>
+              </a:rPr>
+              <a:t>PR Process, CI, CD</a:t>
+            </a:r>
+            <a:endParaRPr kumimoji="0" lang="en-IN" sz="1800" b="1" i="0" u="none" strike="noStrike" kern="1200" cap="none" spc="0" normalizeH="0" baseline="0" noProof="0" dirty="0">
+              <a:ln>
+                <a:noFill/>
+              </a:ln>
+              <a:solidFill>
+                <a:prstClr val="white"/>
+              </a:solidFill>
+              <a:effectLst/>
+              <a:uLnTx/>
+              <a:uFillTx/>
+              <a:latin typeface="Verdana" panose="020B0604030504040204" pitchFamily="34" charset="0"/>
+              <a:ea typeface="Verdana" panose="020B0604030504040204" pitchFamily="34" charset="0"/>
+              <a:cs typeface="+mn-cs"/>
+            </a:endParaRPr>
+          </a:p>
+        </p:txBody>
+      </p:sp>
+      <p:sp>
+        <p:nvSpPr>
+          <p:cNvPr id="7" name="Rectangle 6">
+            <a:extLst>
+              <a:ext uri="{FF2B5EF4-FFF2-40B4-BE49-F238E27FC236}">
+                <a16:creationId xmlns:a16="http://schemas.microsoft.com/office/drawing/2014/main" id="{B10720DE-FD2A-4FE5-B9FB-74854D01A659}"/>
+              </a:ext>
+            </a:extLst>
+          </p:cNvPr>
+          <p:cNvSpPr/>
+          <p:nvPr/>
+        </p:nvSpPr>
+        <p:spPr>
+          <a:xfrm>
+            <a:off x="0" y="6383046"/>
+            <a:ext cx="12183122" cy="57703"/>
+          </a:xfrm>
+          <a:prstGeom prst="rect">
+            <a:avLst/>
+          </a:prstGeom>
+          <a:solidFill>
+            <a:srgbClr val="0070C0"/>
+          </a:solidFill>
+        </p:spPr>
+        <p:style>
+          <a:lnRef idx="2">
+            <a:schemeClr val="accent1">
+              <a:shade val="50000"/>
+            </a:schemeClr>
+          </a:lnRef>
+          <a:fillRef idx="1">
+            <a:schemeClr val="accent1"/>
+          </a:fillRef>
+          <a:effectRef idx="0">
+            <a:schemeClr val="accent1"/>
+          </a:effectRef>
+          <a:fontRef idx="minor">
+            <a:schemeClr val="lt1"/>
+          </a:fontRef>
+        </p:style>
+        <p:txBody>
+          <a:bodyPr rtlCol="0" anchor="ctr"/>
+          <a:lstStyle/>
+          <a:p>
+            <a:pPr marL="0" marR="0" lvl="0" indent="0" algn="ctr" defTabSz="914400" rtl="0" eaLnBrk="1" fontAlgn="auto" latinLnBrk="0" hangingPunct="1">
+              <a:lnSpc>
+                <a:spcPct val="100000"/>
+              </a:lnSpc>
+              <a:spcBef>
+                <a:spcPts val="0"/>
+              </a:spcBef>
+              <a:spcAft>
+                <a:spcPts val="0"/>
+              </a:spcAft>
+              <a:buClrTx/>
+              <a:buSzTx/>
+              <a:buFontTx/>
+              <a:buNone/>
+              <a:tabLst/>
+              <a:defRPr/>
+            </a:pPr>
+            <a:endParaRPr kumimoji="0" lang="en-IN" sz="1000" b="0" i="0" u="none" strike="noStrike" kern="1200" cap="none" spc="0" normalizeH="0" baseline="0" noProof="0" dirty="0">
+              <a:ln>
+                <a:noFill/>
+              </a:ln>
+              <a:solidFill>
+                <a:prstClr val="white"/>
+              </a:solidFill>
+              <a:effectLst/>
+              <a:uLnTx/>
+              <a:uFillTx/>
+              <a:latin typeface="Verdana" panose="020B0604030504040204" pitchFamily="34" charset="0"/>
+              <a:ea typeface="Verdana" panose="020B0604030504040204" pitchFamily="34" charset="0"/>
+              <a:cs typeface="+mn-cs"/>
+            </a:endParaRPr>
+          </a:p>
+        </p:txBody>
+      </p:sp>
+      <p:sp>
+        <p:nvSpPr>
+          <p:cNvPr id="8" name="Footer Placeholder 7">
+            <a:extLst>
+              <a:ext uri="{FF2B5EF4-FFF2-40B4-BE49-F238E27FC236}">
+                <a16:creationId xmlns:a16="http://schemas.microsoft.com/office/drawing/2014/main" id="{DD2A19CA-EC18-432D-8F8F-17079808F38B}"/>
+              </a:ext>
+            </a:extLst>
+          </p:cNvPr>
+          <p:cNvSpPr>
+            <a:spLocks noGrp="1"/>
+          </p:cNvSpPr>
+          <p:nvPr>
+            <p:ph type="ftr" sz="quarter" idx="11"/>
+          </p:nvPr>
+        </p:nvSpPr>
+        <p:spPr>
+          <a:xfrm>
+            <a:off x="4038600" y="6427374"/>
+            <a:ext cx="4114800" cy="365125"/>
+          </a:xfrm>
+        </p:spPr>
+        <p:txBody>
+          <a:bodyPr/>
+          <a:lstStyle/>
+          <a:p>
+            <a:pPr marL="0" marR="0" lvl="0" indent="0" algn="ctr" defTabSz="914400" rtl="0" eaLnBrk="1" fontAlgn="auto" latinLnBrk="0" hangingPunct="1">
+              <a:lnSpc>
+                <a:spcPct val="100000"/>
+              </a:lnSpc>
+              <a:spcBef>
+                <a:spcPts val="0"/>
+              </a:spcBef>
+              <a:spcAft>
+                <a:spcPts val="0"/>
+              </a:spcAft>
+              <a:buClrTx/>
+              <a:buSzTx/>
+              <a:buFontTx/>
+              <a:buNone/>
+              <a:tabLst/>
+              <a:defRPr/>
+            </a:pPr>
+            <a:r>
+              <a:rPr kumimoji="0" lang="en-IN" sz="1200" b="1" i="0" u="none" strike="noStrike" kern="1200" cap="none" spc="0" normalizeH="0" baseline="0" noProof="0" dirty="0">
+                <a:ln>
+                  <a:noFill/>
+                </a:ln>
+                <a:solidFill>
+                  <a:srgbClr val="002060"/>
+                </a:solidFill>
+                <a:effectLst/>
+                <a:uLnTx/>
+                <a:uFillTx/>
+                <a:latin typeface="Verdana" panose="020B0604030504040204" pitchFamily="34" charset="0"/>
+                <a:ea typeface="Verdana" panose="020B0604030504040204" pitchFamily="34" charset="0"/>
+                <a:cs typeface="+mn-cs"/>
+              </a:rPr>
+              <a:t>05-Aug-2022</a:t>
+            </a:r>
+          </a:p>
+        </p:txBody>
+      </p:sp>
+      <p:sp>
+        <p:nvSpPr>
+          <p:cNvPr id="9" name="Slide Number Placeholder 8">
+            <a:extLst>
+              <a:ext uri="{FF2B5EF4-FFF2-40B4-BE49-F238E27FC236}">
+                <a16:creationId xmlns:a16="http://schemas.microsoft.com/office/drawing/2014/main" id="{8162625C-0B1F-42E0-BE7C-D99A08FED7A3}"/>
+              </a:ext>
+            </a:extLst>
+          </p:cNvPr>
+          <p:cNvSpPr>
+            <a:spLocks noGrp="1"/>
+          </p:cNvSpPr>
+          <p:nvPr>
+            <p:ph type="sldNum" sz="quarter" idx="12"/>
+          </p:nvPr>
+        </p:nvSpPr>
+        <p:spPr>
+          <a:xfrm>
+            <a:off x="8610600" y="6427374"/>
+            <a:ext cx="2743200" cy="365125"/>
+          </a:xfrm>
+        </p:spPr>
+        <p:txBody>
+          <a:bodyPr/>
+          <a:lstStyle/>
+          <a:p>
+            <a:pPr marL="0" marR="0" lvl="0" indent="0" algn="r" defTabSz="914400" rtl="0" eaLnBrk="1" fontAlgn="auto" latinLnBrk="0" hangingPunct="1">
+              <a:lnSpc>
+                <a:spcPct val="100000"/>
+              </a:lnSpc>
+              <a:spcBef>
+                <a:spcPts val="0"/>
+              </a:spcBef>
+              <a:spcAft>
+                <a:spcPts val="0"/>
+              </a:spcAft>
+              <a:buClrTx/>
+              <a:buSzTx/>
+              <a:buFontTx/>
+              <a:buNone/>
+              <a:tabLst/>
+              <a:defRPr/>
+            </a:pPr>
+            <a:fld id="{30AF63FB-5233-4811-A918-B572E3A55817}" type="slidenum">
+              <a:rPr kumimoji="0" lang="en-IN" sz="1200" b="1" i="0" u="none" strike="noStrike" kern="1200" cap="none" spc="0" normalizeH="0" baseline="0" noProof="0" smtClean="0">
+                <a:ln>
+                  <a:noFill/>
+                </a:ln>
+                <a:solidFill>
+                  <a:srgbClr val="002060"/>
+                </a:solidFill>
+                <a:effectLst/>
+                <a:uLnTx/>
+                <a:uFillTx/>
+                <a:latin typeface="Verdana" panose="020B0604030504040204" pitchFamily="34" charset="0"/>
+                <a:ea typeface="Verdana" panose="020B0604030504040204" pitchFamily="34" charset="0"/>
+                <a:cs typeface="+mn-cs"/>
+              </a:rPr>
+              <a:pPr marL="0" marR="0" lvl="0" indent="0" algn="r" defTabSz="914400" rtl="0" eaLnBrk="1" fontAlgn="auto" latinLnBrk="0" hangingPunct="1">
+                <a:lnSpc>
+                  <a:spcPct val="100000"/>
+                </a:lnSpc>
+                <a:spcBef>
+                  <a:spcPts val="0"/>
+                </a:spcBef>
+                <a:spcAft>
+                  <a:spcPts val="0"/>
+                </a:spcAft>
+                <a:buClrTx/>
+                <a:buSzTx/>
+                <a:buFontTx/>
+                <a:buNone/>
+                <a:tabLst/>
+                <a:defRPr/>
+              </a:pPr>
+              <a:t>11</a:t>
+            </a:fld>
+            <a:endParaRPr kumimoji="0" lang="en-IN" sz="1200" b="1" i="0" u="none" strike="noStrike" kern="1200" cap="none" spc="0" normalizeH="0" baseline="0" noProof="0" dirty="0">
+              <a:ln>
+                <a:noFill/>
+              </a:ln>
+              <a:solidFill>
+                <a:srgbClr val="002060"/>
+              </a:solidFill>
+              <a:effectLst/>
+              <a:uLnTx/>
+              <a:uFillTx/>
+              <a:latin typeface="Verdana" panose="020B0604030504040204" pitchFamily="34" charset="0"/>
+              <a:ea typeface="Verdana" panose="020B0604030504040204" pitchFamily="34" charset="0"/>
+              <a:cs typeface="+mn-cs"/>
+            </a:endParaRPr>
+          </a:p>
+        </p:txBody>
+      </p:sp>
+      <p:sp>
+        <p:nvSpPr>
+          <p:cNvPr id="12" name="Footer Placeholder 7">
+            <a:extLst>
+              <a:ext uri="{FF2B5EF4-FFF2-40B4-BE49-F238E27FC236}">
+                <a16:creationId xmlns:a16="http://schemas.microsoft.com/office/drawing/2014/main" id="{64C57949-E349-47D3-A505-A098233AF49D}"/>
+              </a:ext>
+            </a:extLst>
+          </p:cNvPr>
+          <p:cNvSpPr txBox="1">
+            <a:spLocks/>
+          </p:cNvSpPr>
+          <p:nvPr/>
+        </p:nvSpPr>
+        <p:spPr>
+          <a:xfrm>
+            <a:off x="133897" y="6428848"/>
+            <a:ext cx="4114800" cy="365125"/>
+          </a:xfrm>
+          <a:prstGeom prst="rect">
+            <a:avLst/>
+          </a:prstGeom>
+        </p:spPr>
+        <p:txBody>
+          <a:bodyPr vert="horz" lIns="91440" tIns="45720" rIns="91440" bIns="45720" rtlCol="0" anchor="ctr"/>
+          <a:lstStyle>
+            <a:defPPr>
+              <a:defRPr lang="en-US"/>
+            </a:defPPr>
+            <a:lvl1pPr marL="0" algn="ctr" defTabSz="914400" rtl="0" eaLnBrk="1" latinLnBrk="0" hangingPunct="1">
+              <a:defRPr sz="1200" kern="1200">
+                <a:solidFill>
+                  <a:schemeClr val="tx1">
+                    <a:tint val="75000"/>
+                  </a:schemeClr>
+                </a:solidFill>
+                <a:latin typeface="+mn-lt"/>
+                <a:ea typeface="+mn-ea"/>
+                <a:cs typeface="+mn-cs"/>
+              </a:defRPr>
+            </a:lvl1pPr>
+            <a:lvl2pPr marL="457200" algn="l" defTabSz="914400" rtl="0" eaLnBrk="1" latinLnBrk="0" hangingPunct="1">
+              <a:defRPr sz="1800" kern="1200">
+                <a:solidFill>
+                  <a:schemeClr val="tx1"/>
+                </a:solidFill>
+                <a:latin typeface="+mn-lt"/>
+                <a:ea typeface="+mn-ea"/>
+                <a:cs typeface="+mn-cs"/>
+              </a:defRPr>
+            </a:lvl2pPr>
+            <a:lvl3pPr marL="914400" algn="l" defTabSz="914400" rtl="0" eaLnBrk="1" latinLnBrk="0" hangingPunct="1">
+              <a:defRPr sz="1800" kern="1200">
+                <a:solidFill>
+                  <a:schemeClr val="tx1"/>
+                </a:solidFill>
+                <a:latin typeface="+mn-lt"/>
+                <a:ea typeface="+mn-ea"/>
+                <a:cs typeface="+mn-cs"/>
+              </a:defRPr>
+            </a:lvl3pPr>
+            <a:lvl4pPr marL="1371600" algn="l" defTabSz="914400" rtl="0" eaLnBrk="1" latinLnBrk="0" hangingPunct="1">
+              <a:defRPr sz="1800" kern="1200">
+                <a:solidFill>
+                  <a:schemeClr val="tx1"/>
+                </a:solidFill>
+                <a:latin typeface="+mn-lt"/>
+                <a:ea typeface="+mn-ea"/>
+                <a:cs typeface="+mn-cs"/>
+              </a:defRPr>
+            </a:lvl4pPr>
+            <a:lvl5pPr marL="1828800" algn="l" defTabSz="914400" rtl="0" eaLnBrk="1" latinLnBrk="0" hangingPunct="1">
+              <a:defRPr sz="1800" kern="1200">
+                <a:solidFill>
+                  <a:schemeClr val="tx1"/>
+                </a:solidFill>
+                <a:latin typeface="+mn-lt"/>
+                <a:ea typeface="+mn-ea"/>
+                <a:cs typeface="+mn-cs"/>
+              </a:defRPr>
+            </a:lvl5pPr>
+            <a:lvl6pPr marL="2286000" algn="l" defTabSz="914400" rtl="0" eaLnBrk="1" latinLnBrk="0" hangingPunct="1">
+              <a:defRPr sz="1800" kern="1200">
+                <a:solidFill>
+                  <a:schemeClr val="tx1"/>
+                </a:solidFill>
+                <a:latin typeface="+mn-lt"/>
+                <a:ea typeface="+mn-ea"/>
+                <a:cs typeface="+mn-cs"/>
+              </a:defRPr>
+            </a:lvl6pPr>
+            <a:lvl7pPr marL="2743200" algn="l" defTabSz="914400" rtl="0" eaLnBrk="1" latinLnBrk="0" hangingPunct="1">
+              <a:defRPr sz="1800" kern="1200">
+                <a:solidFill>
+                  <a:schemeClr val="tx1"/>
+                </a:solidFill>
+                <a:latin typeface="+mn-lt"/>
+                <a:ea typeface="+mn-ea"/>
+                <a:cs typeface="+mn-cs"/>
+              </a:defRPr>
+            </a:lvl7pPr>
+            <a:lvl8pPr marL="3200400" algn="l" defTabSz="914400" rtl="0" eaLnBrk="1" latinLnBrk="0" hangingPunct="1">
+              <a:defRPr sz="1800" kern="1200">
+                <a:solidFill>
+                  <a:schemeClr val="tx1"/>
+                </a:solidFill>
+                <a:latin typeface="+mn-lt"/>
+                <a:ea typeface="+mn-ea"/>
+                <a:cs typeface="+mn-cs"/>
+              </a:defRPr>
+            </a:lvl8pPr>
+            <a:lvl9pPr marL="3657600" algn="l" defTabSz="914400" rtl="0" eaLnBrk="1" latinLnBrk="0" hangingPunct="1">
+              <a:defRPr sz="1800" kern="1200">
+                <a:solidFill>
+                  <a:schemeClr val="tx1"/>
+                </a:solidFill>
+                <a:latin typeface="+mn-lt"/>
+                <a:ea typeface="+mn-ea"/>
+                <a:cs typeface="+mn-cs"/>
+              </a:defRPr>
+            </a:lvl9pPr>
+          </a:lstStyle>
+          <a:p>
+            <a:pPr marL="0" marR="0" lvl="0" indent="0" algn="ctr" defTabSz="914400" rtl="0" eaLnBrk="1" fontAlgn="auto" latinLnBrk="0" hangingPunct="1">
+              <a:lnSpc>
+                <a:spcPct val="100000"/>
+              </a:lnSpc>
+              <a:spcBef>
+                <a:spcPts val="0"/>
+              </a:spcBef>
+              <a:spcAft>
+                <a:spcPts val="0"/>
+              </a:spcAft>
+              <a:buClrTx/>
+              <a:buSzTx/>
+              <a:buFontTx/>
+              <a:buNone/>
+              <a:tabLst/>
+              <a:defRPr/>
+            </a:pPr>
+            <a:r>
+              <a:rPr kumimoji="0" lang="en-IN" sz="1200" b="1" i="0" u="none" strike="noStrike" kern="1200" cap="none" spc="0" normalizeH="0" baseline="0" noProof="0" dirty="0">
+                <a:ln>
+                  <a:noFill/>
+                </a:ln>
+                <a:solidFill>
+                  <a:srgbClr val="002060"/>
+                </a:solidFill>
+                <a:effectLst/>
+                <a:uLnTx/>
+                <a:uFillTx/>
+                <a:latin typeface="Verdana" panose="020B0604030504040204" pitchFamily="34" charset="0"/>
+                <a:ea typeface="Verdana" panose="020B0604030504040204" pitchFamily="34" charset="0"/>
+                <a:cs typeface="+mn-cs"/>
+              </a:rPr>
+              <a:t>Dot Net Learners House</a:t>
+            </a:r>
+          </a:p>
+        </p:txBody>
+      </p:sp>
+      <p:pic>
+        <p:nvPicPr>
+          <p:cNvPr id="3" name="Picture 2" descr="A picture containing drawing&#10;&#10;Description automatically generated">
+            <a:extLst>
+              <a:ext uri="{FF2B5EF4-FFF2-40B4-BE49-F238E27FC236}">
+                <a16:creationId xmlns:a16="http://schemas.microsoft.com/office/drawing/2014/main" id="{36D46947-3455-49F6-81DC-66502143C41D}"/>
+              </a:ext>
+            </a:extLst>
+          </p:cNvPr>
+          <p:cNvPicPr>
+            <a:picLocks noChangeAspect="1"/>
+          </p:cNvPicPr>
+          <p:nvPr/>
+        </p:nvPicPr>
+        <p:blipFill>
+          <a:blip r:embed="rId2">
+            <a:extLst>
+              <a:ext uri="{28A0092B-C50C-407E-A947-70E740481C1C}">
+                <a14:useLocalDpi xmlns:a14="http://schemas.microsoft.com/office/drawing/2010/main" val="0"/>
+              </a:ext>
+            </a:extLst>
+          </a:blip>
+          <a:stretch>
+            <a:fillRect/>
+          </a:stretch>
+        </p:blipFill>
+        <p:spPr>
+          <a:xfrm>
+            <a:off x="757291" y="966358"/>
+            <a:ext cx="780290" cy="780290"/>
+          </a:xfrm>
+          <a:prstGeom prst="rect">
+            <a:avLst/>
+          </a:prstGeom>
+        </p:spPr>
+      </p:pic>
+      <p:pic>
+        <p:nvPicPr>
+          <p:cNvPr id="11" name="Graphic 10">
+            <a:extLst>
+              <a:ext uri="{FF2B5EF4-FFF2-40B4-BE49-F238E27FC236}">
+                <a16:creationId xmlns:a16="http://schemas.microsoft.com/office/drawing/2014/main" id="{68CC5020-AEBC-4D94-8930-1E6AA6C03504}"/>
+              </a:ext>
+            </a:extLst>
+          </p:cNvPr>
+          <p:cNvPicPr>
+            <a:picLocks noChangeAspect="1"/>
+          </p:cNvPicPr>
+          <p:nvPr/>
+        </p:nvPicPr>
+        <p:blipFill>
+          <a:blip r:embed="rId3">
+            <a:extLst>
+              <a:ext uri="{28A0092B-C50C-407E-A947-70E740481C1C}">
+                <a14:useLocalDpi xmlns:a14="http://schemas.microsoft.com/office/drawing/2010/main" val="0"/>
+              </a:ext>
+              <a:ext uri="{96DAC541-7B7A-43D3-8B79-37D633B846F1}">
+                <asvg:svgBlip xmlns:asvg="http://schemas.microsoft.com/office/drawing/2016/SVG/main" r:embed="rId4"/>
+              </a:ext>
+            </a:extLst>
+          </a:blip>
+          <a:stretch>
+            <a:fillRect/>
+          </a:stretch>
+        </p:blipFill>
+        <p:spPr>
+          <a:xfrm>
+            <a:off x="4686132" y="966358"/>
+            <a:ext cx="780290" cy="780290"/>
+          </a:xfrm>
+          <a:prstGeom prst="rect">
+            <a:avLst/>
+          </a:prstGeom>
+        </p:spPr>
+      </p:pic>
+      <p:pic>
+        <p:nvPicPr>
+          <p:cNvPr id="13" name="Graphic 12">
+            <a:extLst>
+              <a:ext uri="{FF2B5EF4-FFF2-40B4-BE49-F238E27FC236}">
+                <a16:creationId xmlns:a16="http://schemas.microsoft.com/office/drawing/2014/main" id="{FF18036A-9AA0-4AAF-A6CF-9B332A840FD8}"/>
+              </a:ext>
+            </a:extLst>
+          </p:cNvPr>
+          <p:cNvPicPr>
+            <a:picLocks noChangeAspect="1"/>
+          </p:cNvPicPr>
+          <p:nvPr/>
+        </p:nvPicPr>
+        <p:blipFill>
+          <a:blip r:embed="rId5">
+            <a:extLst>
+              <a:ext uri="{28A0092B-C50C-407E-A947-70E740481C1C}">
+                <a14:useLocalDpi xmlns:a14="http://schemas.microsoft.com/office/drawing/2010/main" val="0"/>
+              </a:ext>
+              <a:ext uri="{96DAC541-7B7A-43D3-8B79-37D633B846F1}">
+                <asvg:svgBlip xmlns:asvg="http://schemas.microsoft.com/office/drawing/2016/SVG/main" r:embed="rId6"/>
+              </a:ext>
+            </a:extLst>
+          </a:blip>
+          <a:stretch>
+            <a:fillRect/>
+          </a:stretch>
+        </p:blipFill>
+        <p:spPr>
+          <a:xfrm>
+            <a:off x="6605457" y="966358"/>
+            <a:ext cx="780290" cy="780290"/>
+          </a:xfrm>
+          <a:prstGeom prst="rect">
+            <a:avLst/>
+          </a:prstGeom>
+        </p:spPr>
+      </p:pic>
+      <p:pic>
+        <p:nvPicPr>
+          <p:cNvPr id="14" name="Graphic 13">
+            <a:extLst>
+              <a:ext uri="{FF2B5EF4-FFF2-40B4-BE49-F238E27FC236}">
+                <a16:creationId xmlns:a16="http://schemas.microsoft.com/office/drawing/2014/main" id="{28A56780-CD7C-41F9-83CC-0901E3A92440}"/>
+              </a:ext>
+            </a:extLst>
+          </p:cNvPr>
+          <p:cNvPicPr>
+            <a:picLocks noChangeAspect="1"/>
+          </p:cNvPicPr>
+          <p:nvPr/>
+        </p:nvPicPr>
+        <p:blipFill>
+          <a:blip r:embed="rId3">
+            <a:extLst>
+              <a:ext uri="{28A0092B-C50C-407E-A947-70E740481C1C}">
+                <a14:useLocalDpi xmlns:a14="http://schemas.microsoft.com/office/drawing/2010/main" val="0"/>
+              </a:ext>
+              <a:ext uri="{96DAC541-7B7A-43D3-8B79-37D633B846F1}">
+                <asvg:svgBlip xmlns:asvg="http://schemas.microsoft.com/office/drawing/2016/SVG/main" r:embed="rId4"/>
+              </a:ext>
+            </a:extLst>
+          </a:blip>
+          <a:stretch>
+            <a:fillRect/>
+          </a:stretch>
+        </p:blipFill>
+        <p:spPr>
+          <a:xfrm>
+            <a:off x="8478377" y="966358"/>
+            <a:ext cx="780290" cy="780290"/>
+          </a:xfrm>
+          <a:prstGeom prst="rect">
+            <a:avLst/>
+          </a:prstGeom>
+        </p:spPr>
+      </p:pic>
+      <p:grpSp>
+        <p:nvGrpSpPr>
+          <p:cNvPr id="33" name="Group 32">
+            <a:extLst>
+              <a:ext uri="{FF2B5EF4-FFF2-40B4-BE49-F238E27FC236}">
+                <a16:creationId xmlns:a16="http://schemas.microsoft.com/office/drawing/2014/main" id="{741F7567-791E-4A67-9274-1439E4CF2D54}"/>
+              </a:ext>
+            </a:extLst>
+          </p:cNvPr>
+          <p:cNvGrpSpPr/>
+          <p:nvPr/>
+        </p:nvGrpSpPr>
+        <p:grpSpPr>
+          <a:xfrm>
+            <a:off x="259953" y="2714890"/>
+            <a:ext cx="5608263" cy="3233356"/>
+            <a:chOff x="6101386" y="2796466"/>
+            <a:chExt cx="5608263" cy="3233356"/>
+          </a:xfrm>
+        </p:grpSpPr>
+        <p:sp>
+          <p:nvSpPr>
+            <p:cNvPr id="19" name="Thought Bubble: Cloud 18">
+              <a:extLst>
+                <a:ext uri="{FF2B5EF4-FFF2-40B4-BE49-F238E27FC236}">
+                  <a16:creationId xmlns:a16="http://schemas.microsoft.com/office/drawing/2014/main" id="{A7D35382-D69E-4203-B4A9-52A05A4FD8D7}"/>
+                </a:ext>
+              </a:extLst>
+            </p:cNvPr>
+            <p:cNvSpPr/>
+            <p:nvPr/>
+          </p:nvSpPr>
+          <p:spPr>
+            <a:xfrm>
+              <a:off x="6101386" y="2796466"/>
+              <a:ext cx="5608263" cy="3233356"/>
+            </a:xfrm>
+            <a:prstGeom prst="cloudCallout">
+              <a:avLst>
+                <a:gd name="adj1" fmla="val -10766"/>
+                <a:gd name="adj2" fmla="val 39295"/>
+              </a:avLst>
+            </a:prstGeom>
+            <a:solidFill>
+              <a:schemeClr val="bg1"/>
+            </a:solidFill>
+          </p:spPr>
+          <p:style>
+            <a:lnRef idx="2">
+              <a:schemeClr val="accent1">
+                <a:shade val="50000"/>
+              </a:schemeClr>
+            </a:lnRef>
+            <a:fillRef idx="1">
+              <a:schemeClr val="accent1"/>
+            </a:fillRef>
+            <a:effectRef idx="0">
+              <a:schemeClr val="accent1"/>
+            </a:effectRef>
+            <a:fontRef idx="minor">
+              <a:schemeClr val="lt1"/>
+            </a:fontRef>
+          </p:style>
+          <p:txBody>
+            <a:bodyPr rtlCol="0" anchor="ctr"/>
+            <a:lstStyle/>
+            <a:p>
+              <a:pPr marL="0" marR="0" lvl="0" indent="0" algn="ctr" defTabSz="914400" rtl="0" eaLnBrk="1" fontAlgn="auto" latinLnBrk="0" hangingPunct="1">
+                <a:lnSpc>
+                  <a:spcPct val="100000"/>
+                </a:lnSpc>
+                <a:spcBef>
+                  <a:spcPts val="0"/>
+                </a:spcBef>
+                <a:spcAft>
+                  <a:spcPts val="0"/>
+                </a:spcAft>
+                <a:buClrTx/>
+                <a:buSzTx/>
+                <a:buFontTx/>
+                <a:buNone/>
+                <a:tabLst/>
+                <a:defRPr/>
+              </a:pPr>
+              <a:endParaRPr kumimoji="0" lang="en-IN" sz="1800" b="0" i="0" u="none" strike="noStrike" kern="1200" cap="none" spc="0" normalizeH="0" baseline="0" noProof="0">
+                <a:ln>
+                  <a:noFill/>
+                </a:ln>
+                <a:solidFill>
+                  <a:prstClr val="white"/>
+                </a:solidFill>
+                <a:effectLst/>
+                <a:uLnTx/>
+                <a:uFillTx/>
+                <a:latin typeface="Calibri" panose="020F0502020204030204"/>
+                <a:ea typeface="+mn-ea"/>
+                <a:cs typeface="+mn-cs"/>
+              </a:endParaRPr>
+            </a:p>
+          </p:txBody>
+        </p:sp>
+        <p:grpSp>
+          <p:nvGrpSpPr>
+            <p:cNvPr id="29" name="Group 28">
+              <a:extLst>
+                <a:ext uri="{FF2B5EF4-FFF2-40B4-BE49-F238E27FC236}">
+                  <a16:creationId xmlns:a16="http://schemas.microsoft.com/office/drawing/2014/main" id="{FF592EF6-1E6D-47AE-A34C-AB5A774B30D8}"/>
+                </a:ext>
+              </a:extLst>
+            </p:cNvPr>
+            <p:cNvGrpSpPr/>
+            <p:nvPr/>
+          </p:nvGrpSpPr>
+          <p:grpSpPr>
+            <a:xfrm>
+              <a:off x="6972126" y="3249876"/>
+              <a:ext cx="3866781" cy="1892550"/>
+              <a:chOff x="5965146" y="3263136"/>
+              <a:chExt cx="3866781" cy="1892550"/>
+            </a:xfrm>
+          </p:grpSpPr>
+          <p:pic>
+            <p:nvPicPr>
+              <p:cNvPr id="20" name="Picture 19" descr="A picture containing drawing&#10;&#10;Description automatically generated">
+                <a:extLst>
+                  <a:ext uri="{FF2B5EF4-FFF2-40B4-BE49-F238E27FC236}">
+                    <a16:creationId xmlns:a16="http://schemas.microsoft.com/office/drawing/2014/main" id="{9966C00C-1E5C-4E39-9381-2359516062C6}"/>
+                  </a:ext>
+                </a:extLst>
+              </p:cNvPr>
+              <p:cNvPicPr>
+                <a:picLocks noChangeAspect="1"/>
+              </p:cNvPicPr>
+              <p:nvPr/>
+            </p:nvPicPr>
+            <p:blipFill>
+              <a:blip r:embed="rId7">
+                <a:extLst>
+                  <a:ext uri="{28A0092B-C50C-407E-A947-70E740481C1C}">
+                    <a14:useLocalDpi xmlns:a14="http://schemas.microsoft.com/office/drawing/2010/main" val="0"/>
+                  </a:ext>
+                </a:extLst>
+              </a:blip>
+              <a:stretch>
+                <a:fillRect/>
+              </a:stretch>
+            </p:blipFill>
+            <p:spPr>
+              <a:xfrm>
+                <a:off x="6313959" y="3444336"/>
+                <a:ext cx="780290" cy="780290"/>
+              </a:xfrm>
+              <a:prstGeom prst="rect">
+                <a:avLst/>
+              </a:prstGeom>
+            </p:spPr>
+          </p:pic>
+          <p:pic>
+            <p:nvPicPr>
+              <p:cNvPr id="22" name="Graphic 21">
+                <a:extLst>
+                  <a:ext uri="{FF2B5EF4-FFF2-40B4-BE49-F238E27FC236}">
+                    <a16:creationId xmlns:a16="http://schemas.microsoft.com/office/drawing/2014/main" id="{C723A7AA-CBAF-404F-AA2B-631CC56FB8CE}"/>
+                  </a:ext>
+                </a:extLst>
+              </p:cNvPr>
+              <p:cNvPicPr>
+                <a:picLocks noChangeAspect="1"/>
+              </p:cNvPicPr>
+              <p:nvPr/>
+            </p:nvPicPr>
+            <p:blipFill>
+              <a:blip r:embed="rId8">
+                <a:extLst>
+                  <a:ext uri="{28A0092B-C50C-407E-A947-70E740481C1C}">
+                    <a14:useLocalDpi xmlns:a14="http://schemas.microsoft.com/office/drawing/2010/main" val="0"/>
+                  </a:ext>
+                  <a:ext uri="{96DAC541-7B7A-43D3-8B79-37D633B846F1}">
+                    <asvg:svgBlip xmlns:asvg="http://schemas.microsoft.com/office/drawing/2016/SVG/main" r:embed="rId9"/>
+                  </a:ext>
+                </a:extLst>
+              </a:blip>
+              <a:stretch>
+                <a:fillRect/>
+              </a:stretch>
+            </p:blipFill>
+            <p:spPr>
+              <a:xfrm>
+                <a:off x="9355677" y="3263136"/>
+                <a:ext cx="476250" cy="476250"/>
+              </a:xfrm>
+              <a:prstGeom prst="rect">
+                <a:avLst/>
+              </a:prstGeom>
+            </p:spPr>
+          </p:pic>
+          <p:pic>
+            <p:nvPicPr>
+              <p:cNvPr id="24" name="Graphic 23">
+                <a:extLst>
+                  <a:ext uri="{FF2B5EF4-FFF2-40B4-BE49-F238E27FC236}">
+                    <a16:creationId xmlns:a16="http://schemas.microsoft.com/office/drawing/2014/main" id="{925071B5-D25D-44D1-8436-17A064FA82BA}"/>
+                  </a:ext>
+                </a:extLst>
+              </p:cNvPr>
+              <p:cNvPicPr>
+                <a:picLocks noChangeAspect="1"/>
+              </p:cNvPicPr>
+              <p:nvPr/>
+            </p:nvPicPr>
+            <p:blipFill>
+              <a:blip r:embed="rId10">
+                <a:extLst>
+                  <a:ext uri="{28A0092B-C50C-407E-A947-70E740481C1C}">
+                    <a14:useLocalDpi xmlns:a14="http://schemas.microsoft.com/office/drawing/2010/main" val="0"/>
+                  </a:ext>
+                  <a:ext uri="{96DAC541-7B7A-43D3-8B79-37D633B846F1}">
+                    <asvg:svgBlip xmlns:asvg="http://schemas.microsoft.com/office/drawing/2016/SVG/main" r:embed="rId11"/>
+                  </a:ext>
+                </a:extLst>
+              </a:blip>
+              <a:stretch>
+                <a:fillRect/>
+              </a:stretch>
+            </p:blipFill>
+            <p:spPr>
+              <a:xfrm>
+                <a:off x="8965152" y="4517937"/>
+                <a:ext cx="628650" cy="600075"/>
+              </a:xfrm>
+              <a:prstGeom prst="rect">
+                <a:avLst/>
+              </a:prstGeom>
+            </p:spPr>
+          </p:pic>
+          <p:pic>
+            <p:nvPicPr>
+              <p:cNvPr id="26" name="Graphic 25">
+                <a:extLst>
+                  <a:ext uri="{FF2B5EF4-FFF2-40B4-BE49-F238E27FC236}">
+                    <a16:creationId xmlns:a16="http://schemas.microsoft.com/office/drawing/2014/main" id="{02E07A17-A57F-4E63-8BA7-95B0DA3919A5}"/>
+                  </a:ext>
+                </a:extLst>
+              </p:cNvPr>
+              <p:cNvPicPr>
+                <a:picLocks noChangeAspect="1"/>
+              </p:cNvPicPr>
+              <p:nvPr/>
+            </p:nvPicPr>
+            <p:blipFill>
+              <a:blip r:embed="rId12">
+                <a:extLst>
+                  <a:ext uri="{28A0092B-C50C-407E-A947-70E740481C1C}">
+                    <a14:useLocalDpi xmlns:a14="http://schemas.microsoft.com/office/drawing/2010/main" val="0"/>
+                  </a:ext>
+                  <a:ext uri="{96DAC541-7B7A-43D3-8B79-37D633B846F1}">
+                    <asvg:svgBlip xmlns:asvg="http://schemas.microsoft.com/office/drawing/2016/SVG/main" r:embed="rId13"/>
+                  </a:ext>
+                </a:extLst>
+              </a:blip>
+              <a:stretch>
+                <a:fillRect/>
+              </a:stretch>
+            </p:blipFill>
+            <p:spPr>
+              <a:xfrm>
+                <a:off x="5965146" y="4679436"/>
+                <a:ext cx="476250" cy="476250"/>
+              </a:xfrm>
+              <a:prstGeom prst="rect">
+                <a:avLst/>
+              </a:prstGeom>
+            </p:spPr>
+          </p:pic>
+          <p:pic>
+            <p:nvPicPr>
+              <p:cNvPr id="28" name="Graphic 27">
+                <a:extLst>
+                  <a:ext uri="{FF2B5EF4-FFF2-40B4-BE49-F238E27FC236}">
+                    <a16:creationId xmlns:a16="http://schemas.microsoft.com/office/drawing/2014/main" id="{C7B8C726-E294-4A32-B7CC-0D388BEA8CE5}"/>
+                  </a:ext>
+                </a:extLst>
+              </p:cNvPr>
+              <p:cNvPicPr>
+                <a:picLocks noChangeAspect="1"/>
+              </p:cNvPicPr>
+              <p:nvPr/>
+            </p:nvPicPr>
+            <p:blipFill>
+              <a:blip r:embed="rId14">
+                <a:extLst>
+                  <a:ext uri="{28A0092B-C50C-407E-A947-70E740481C1C}">
+                    <a14:useLocalDpi xmlns:a14="http://schemas.microsoft.com/office/drawing/2010/main" val="0"/>
+                  </a:ext>
+                  <a:ext uri="{96DAC541-7B7A-43D3-8B79-37D633B846F1}">
+                    <asvg:svgBlip xmlns:asvg="http://schemas.microsoft.com/office/drawing/2016/SVG/main" r:embed="rId15"/>
+                  </a:ext>
+                </a:extLst>
+              </a:blip>
+              <a:stretch>
+                <a:fillRect/>
+              </a:stretch>
+            </p:blipFill>
+            <p:spPr>
+              <a:xfrm>
+                <a:off x="7858812" y="3986501"/>
+                <a:ext cx="476250" cy="476250"/>
+              </a:xfrm>
+              <a:prstGeom prst="rect">
+                <a:avLst/>
+              </a:prstGeom>
+            </p:spPr>
+          </p:pic>
+        </p:grpSp>
+      </p:grpSp>
+      <p:pic>
+        <p:nvPicPr>
+          <p:cNvPr id="30" name="Graphic 29">
+            <a:extLst>
+              <a:ext uri="{FF2B5EF4-FFF2-40B4-BE49-F238E27FC236}">
+                <a16:creationId xmlns:a16="http://schemas.microsoft.com/office/drawing/2014/main" id="{A297AF32-D8A2-4423-B36B-CE86473A2088}"/>
+              </a:ext>
+            </a:extLst>
+          </p:cNvPr>
+          <p:cNvPicPr>
+            <a:picLocks noChangeAspect="1"/>
+          </p:cNvPicPr>
+          <p:nvPr/>
+        </p:nvPicPr>
+        <p:blipFill>
+          <a:blip r:embed="rId3">
+            <a:extLst>
+              <a:ext uri="{28A0092B-C50C-407E-A947-70E740481C1C}">
+                <a14:useLocalDpi xmlns:a14="http://schemas.microsoft.com/office/drawing/2010/main" val="0"/>
+              </a:ext>
+              <a:ext uri="{96DAC541-7B7A-43D3-8B79-37D633B846F1}">
+                <asvg:svgBlip xmlns:asvg="http://schemas.microsoft.com/office/drawing/2016/SVG/main" r:embed="rId4"/>
+              </a:ext>
+            </a:extLst>
+          </a:blip>
+          <a:stretch>
+            <a:fillRect/>
+          </a:stretch>
+        </p:blipFill>
+        <p:spPr>
+          <a:xfrm>
+            <a:off x="10573510" y="3559685"/>
+            <a:ext cx="780290" cy="780290"/>
+          </a:xfrm>
+          <a:prstGeom prst="rect">
+            <a:avLst/>
+          </a:prstGeom>
+        </p:spPr>
+      </p:pic>
+      <p:pic>
+        <p:nvPicPr>
+          <p:cNvPr id="1026" name="Picture 2">
+            <a:extLst>
+              <a:ext uri="{FF2B5EF4-FFF2-40B4-BE49-F238E27FC236}">
+                <a16:creationId xmlns:a16="http://schemas.microsoft.com/office/drawing/2014/main" id="{84738135-B527-4325-8D62-F8B9B9D1984A}"/>
+              </a:ext>
+            </a:extLst>
+          </p:cNvPr>
+          <p:cNvPicPr>
+            <a:picLocks noChangeAspect="1" noChangeArrowheads="1"/>
+          </p:cNvPicPr>
+          <p:nvPr/>
+        </p:nvPicPr>
+        <p:blipFill>
+          <a:blip r:embed="rId16">
+            <a:extLst>
+              <a:ext uri="{28A0092B-C50C-407E-A947-70E740481C1C}">
+                <a14:useLocalDpi xmlns:a14="http://schemas.microsoft.com/office/drawing/2010/main" val="0"/>
+              </a:ext>
+            </a:extLst>
+          </a:blip>
+          <a:srcRect/>
+          <a:stretch>
+            <a:fillRect/>
+          </a:stretch>
+        </p:blipFill>
+        <p:spPr bwMode="auto">
+          <a:xfrm>
+            <a:off x="2623349" y="862903"/>
+            <a:ext cx="814057" cy="987144"/>
+          </a:xfrm>
+          <a:prstGeom prst="rect">
+            <a:avLst/>
+          </a:prstGeom>
+          <a:noFill/>
+          <a:extLst>
+            <a:ext uri="{909E8E84-426E-40DD-AFC4-6F175D3DCCD1}">
+              <a14:hiddenFill xmlns:a14="http://schemas.microsoft.com/office/drawing/2010/main">
+                <a:solidFill>
+                  <a:srgbClr val="FFFFFF"/>
+                </a:solidFill>
+              </a14:hiddenFill>
+            </a:ext>
+          </a:extLst>
+        </p:spPr>
+      </p:pic>
+      <p:pic>
+        <p:nvPicPr>
+          <p:cNvPr id="32" name="Graphic 31">
+            <a:extLst>
+              <a:ext uri="{FF2B5EF4-FFF2-40B4-BE49-F238E27FC236}">
+                <a16:creationId xmlns:a16="http://schemas.microsoft.com/office/drawing/2014/main" id="{AAF0FC8B-CA83-4A8E-A2F7-220F96B6E74A}"/>
+              </a:ext>
+            </a:extLst>
+          </p:cNvPr>
+          <p:cNvPicPr>
+            <a:picLocks noChangeAspect="1"/>
+          </p:cNvPicPr>
+          <p:nvPr/>
+        </p:nvPicPr>
+        <p:blipFill>
+          <a:blip r:embed="rId17">
+            <a:extLst>
+              <a:ext uri="{28A0092B-C50C-407E-A947-70E740481C1C}">
+                <a14:useLocalDpi xmlns:a14="http://schemas.microsoft.com/office/drawing/2010/main" val="0"/>
+              </a:ext>
+              <a:ext uri="{96DAC541-7B7A-43D3-8B79-37D633B846F1}">
+                <asvg:svgBlip xmlns:asvg="http://schemas.microsoft.com/office/drawing/2016/SVG/main" r:embed="rId18"/>
+              </a:ext>
+            </a:extLst>
+          </a:blip>
+          <a:stretch>
+            <a:fillRect/>
+          </a:stretch>
+        </p:blipFill>
+        <p:spPr>
+          <a:xfrm>
+            <a:off x="10573509" y="965778"/>
+            <a:ext cx="780095" cy="781393"/>
+          </a:xfrm>
+          <a:prstGeom prst="rect">
+            <a:avLst/>
+          </a:prstGeom>
+        </p:spPr>
+      </p:pic>
+      <p:pic>
+        <p:nvPicPr>
+          <p:cNvPr id="40" name="Picture 39" descr="A picture containing drawing, clock&#10;&#10;Description automatically generated">
+            <a:extLst>
+              <a:ext uri="{FF2B5EF4-FFF2-40B4-BE49-F238E27FC236}">
+                <a16:creationId xmlns:a16="http://schemas.microsoft.com/office/drawing/2014/main" id="{893951CC-E62C-48AE-B7E2-F096699C2CF3}"/>
+              </a:ext>
+            </a:extLst>
+          </p:cNvPr>
+          <p:cNvPicPr>
+            <a:picLocks noChangeAspect="1"/>
+          </p:cNvPicPr>
+          <p:nvPr/>
+        </p:nvPicPr>
+        <p:blipFill>
+          <a:blip r:embed="rId19">
+            <a:extLst>
+              <a:ext uri="{28A0092B-C50C-407E-A947-70E740481C1C}">
+                <a14:useLocalDpi xmlns:a14="http://schemas.microsoft.com/office/drawing/2010/main" val="0"/>
+              </a:ext>
+            </a:extLst>
+          </a:blip>
+          <a:stretch>
+            <a:fillRect/>
+          </a:stretch>
+        </p:blipFill>
+        <p:spPr>
+          <a:xfrm>
+            <a:off x="935616" y="506028"/>
+            <a:ext cx="390153" cy="390153"/>
+          </a:xfrm>
+          <a:prstGeom prst="rect">
+            <a:avLst/>
+          </a:prstGeom>
+        </p:spPr>
+      </p:pic>
+      <p:pic>
+        <p:nvPicPr>
+          <p:cNvPr id="42" name="Picture 41" descr="A picture containing clock&#10;&#10;Description automatically generated">
+            <a:extLst>
+              <a:ext uri="{FF2B5EF4-FFF2-40B4-BE49-F238E27FC236}">
+                <a16:creationId xmlns:a16="http://schemas.microsoft.com/office/drawing/2014/main" id="{79BA6822-C72A-4838-A922-66E4DB0E55AC}"/>
+              </a:ext>
+            </a:extLst>
+          </p:cNvPr>
+          <p:cNvPicPr>
+            <a:picLocks noChangeAspect="1"/>
+          </p:cNvPicPr>
+          <p:nvPr/>
+        </p:nvPicPr>
+        <p:blipFill>
+          <a:blip r:embed="rId20">
+            <a:extLst>
+              <a:ext uri="{28A0092B-C50C-407E-A947-70E740481C1C}">
+                <a14:useLocalDpi xmlns:a14="http://schemas.microsoft.com/office/drawing/2010/main" val="0"/>
+              </a:ext>
+            </a:extLst>
+          </a:blip>
+          <a:stretch>
+            <a:fillRect/>
+          </a:stretch>
+        </p:blipFill>
+        <p:spPr>
+          <a:xfrm>
+            <a:off x="2727199" y="507535"/>
+            <a:ext cx="390153" cy="390153"/>
+          </a:xfrm>
+          <a:prstGeom prst="rect">
+            <a:avLst/>
+          </a:prstGeom>
+        </p:spPr>
+      </p:pic>
+      <p:pic>
+        <p:nvPicPr>
+          <p:cNvPr id="44" name="Picture 43" descr="A close up of a logo&#10;&#10;Description automatically generated">
+            <a:extLst>
+              <a:ext uri="{FF2B5EF4-FFF2-40B4-BE49-F238E27FC236}">
+                <a16:creationId xmlns:a16="http://schemas.microsoft.com/office/drawing/2014/main" id="{9C7E8CA2-5F1E-4E2F-8888-3197EBCE7171}"/>
+              </a:ext>
+            </a:extLst>
+          </p:cNvPr>
+          <p:cNvPicPr>
+            <a:picLocks noChangeAspect="1"/>
+          </p:cNvPicPr>
+          <p:nvPr/>
+        </p:nvPicPr>
+        <p:blipFill>
+          <a:blip r:embed="rId21">
+            <a:extLst>
+              <a:ext uri="{28A0092B-C50C-407E-A947-70E740481C1C}">
+                <a14:useLocalDpi xmlns:a14="http://schemas.microsoft.com/office/drawing/2010/main" val="0"/>
+              </a:ext>
+            </a:extLst>
+          </a:blip>
+          <a:stretch>
+            <a:fillRect/>
+          </a:stretch>
+        </p:blipFill>
+        <p:spPr>
+          <a:xfrm>
+            <a:off x="4881200" y="506028"/>
+            <a:ext cx="390153" cy="390153"/>
+          </a:xfrm>
+          <a:prstGeom prst="rect">
+            <a:avLst/>
+          </a:prstGeom>
+        </p:spPr>
+      </p:pic>
+      <p:pic>
+        <p:nvPicPr>
+          <p:cNvPr id="46" name="Picture 45" descr="A picture containing object, drawing, clock&#10;&#10;Description automatically generated">
+            <a:extLst>
+              <a:ext uri="{FF2B5EF4-FFF2-40B4-BE49-F238E27FC236}">
+                <a16:creationId xmlns:a16="http://schemas.microsoft.com/office/drawing/2014/main" id="{4F6779B2-2CDD-466E-BE8D-3DC3B38B185F}"/>
+              </a:ext>
+            </a:extLst>
+          </p:cNvPr>
+          <p:cNvPicPr>
+            <a:picLocks noChangeAspect="1"/>
+          </p:cNvPicPr>
+          <p:nvPr/>
+        </p:nvPicPr>
+        <p:blipFill>
+          <a:blip r:embed="rId22">
+            <a:extLst>
+              <a:ext uri="{28A0092B-C50C-407E-A947-70E740481C1C}">
+                <a14:useLocalDpi xmlns:a14="http://schemas.microsoft.com/office/drawing/2010/main" val="0"/>
+              </a:ext>
+            </a:extLst>
+          </a:blip>
+          <a:stretch>
+            <a:fillRect/>
+          </a:stretch>
+        </p:blipFill>
+        <p:spPr>
+          <a:xfrm>
+            <a:off x="6802982" y="506028"/>
+            <a:ext cx="390153" cy="390153"/>
+          </a:xfrm>
+          <a:prstGeom prst="rect">
+            <a:avLst/>
+          </a:prstGeom>
+        </p:spPr>
+      </p:pic>
+      <p:pic>
+        <p:nvPicPr>
+          <p:cNvPr id="48" name="Picture 47" descr="A picture containing game&#10;&#10;Description automatically generated">
+            <a:extLst>
+              <a:ext uri="{FF2B5EF4-FFF2-40B4-BE49-F238E27FC236}">
+                <a16:creationId xmlns:a16="http://schemas.microsoft.com/office/drawing/2014/main" id="{FF03DBD6-CC50-4A97-BD33-82244A6C7E6F}"/>
+              </a:ext>
+            </a:extLst>
+          </p:cNvPr>
+          <p:cNvPicPr>
+            <a:picLocks noChangeAspect="1"/>
+          </p:cNvPicPr>
+          <p:nvPr/>
+        </p:nvPicPr>
+        <p:blipFill>
+          <a:blip r:embed="rId23">
+            <a:extLst>
+              <a:ext uri="{28A0092B-C50C-407E-A947-70E740481C1C}">
+                <a14:useLocalDpi xmlns:a14="http://schemas.microsoft.com/office/drawing/2010/main" val="0"/>
+              </a:ext>
+            </a:extLst>
+          </a:blip>
+          <a:stretch>
+            <a:fillRect/>
+          </a:stretch>
+        </p:blipFill>
+        <p:spPr>
+          <a:xfrm>
+            <a:off x="8650677" y="506352"/>
+            <a:ext cx="390153" cy="390153"/>
+          </a:xfrm>
+          <a:prstGeom prst="rect">
+            <a:avLst/>
+          </a:prstGeom>
+        </p:spPr>
+      </p:pic>
+      <p:pic>
+        <p:nvPicPr>
+          <p:cNvPr id="50" name="Picture 49" descr="A close up of a logo&#10;&#10;Description automatically generated">
+            <a:extLst>
+              <a:ext uri="{FF2B5EF4-FFF2-40B4-BE49-F238E27FC236}">
+                <a16:creationId xmlns:a16="http://schemas.microsoft.com/office/drawing/2014/main" id="{779F2AB2-CDEF-415F-AE8D-58D363E55E56}"/>
+              </a:ext>
+            </a:extLst>
+          </p:cNvPr>
+          <p:cNvPicPr>
+            <a:picLocks noChangeAspect="1"/>
+          </p:cNvPicPr>
+          <p:nvPr/>
+        </p:nvPicPr>
+        <p:blipFill>
+          <a:blip r:embed="rId24">
+            <a:extLst>
+              <a:ext uri="{28A0092B-C50C-407E-A947-70E740481C1C}">
+                <a14:useLocalDpi xmlns:a14="http://schemas.microsoft.com/office/drawing/2010/main" val="0"/>
+              </a:ext>
+            </a:extLst>
+          </a:blip>
+          <a:stretch>
+            <a:fillRect/>
+          </a:stretch>
+        </p:blipFill>
+        <p:spPr>
+          <a:xfrm>
+            <a:off x="10768479" y="506027"/>
+            <a:ext cx="390153" cy="390153"/>
+          </a:xfrm>
+          <a:prstGeom prst="rect">
+            <a:avLst/>
+          </a:prstGeom>
+        </p:spPr>
+      </p:pic>
+      <p:pic>
+        <p:nvPicPr>
+          <p:cNvPr id="54" name="Picture 53" descr="A picture containing drawing&#10;&#10;Description automatically generated">
+            <a:extLst>
+              <a:ext uri="{FF2B5EF4-FFF2-40B4-BE49-F238E27FC236}">
+                <a16:creationId xmlns:a16="http://schemas.microsoft.com/office/drawing/2014/main" id="{B5C6B40D-2E6C-4A97-B379-4D03C27B58D2}"/>
+              </a:ext>
+            </a:extLst>
+          </p:cNvPr>
+          <p:cNvPicPr>
+            <a:picLocks noChangeAspect="1"/>
+          </p:cNvPicPr>
+          <p:nvPr/>
+        </p:nvPicPr>
+        <p:blipFill>
+          <a:blip r:embed="rId25">
+            <a:extLst>
+              <a:ext uri="{28A0092B-C50C-407E-A947-70E740481C1C}">
+                <a14:useLocalDpi xmlns:a14="http://schemas.microsoft.com/office/drawing/2010/main" val="0"/>
+              </a:ext>
+            </a:extLst>
+          </a:blip>
+          <a:stretch>
+            <a:fillRect/>
+          </a:stretch>
+        </p:blipFill>
+        <p:spPr>
+          <a:xfrm>
+            <a:off x="10768478" y="3019041"/>
+            <a:ext cx="390153" cy="390153"/>
+          </a:xfrm>
+          <a:prstGeom prst="rect">
+            <a:avLst/>
+          </a:prstGeom>
+        </p:spPr>
+      </p:pic>
+      <p:pic>
+        <p:nvPicPr>
+          <p:cNvPr id="56" name="Picture 55" descr="A close up of a logo&#10;&#10;Description automatically generated">
+            <a:extLst>
+              <a:ext uri="{FF2B5EF4-FFF2-40B4-BE49-F238E27FC236}">
+                <a16:creationId xmlns:a16="http://schemas.microsoft.com/office/drawing/2014/main" id="{4B7097A5-180E-461B-B13C-0CC5B836DD40}"/>
+              </a:ext>
+            </a:extLst>
+          </p:cNvPr>
+          <p:cNvPicPr>
+            <a:picLocks noChangeAspect="1"/>
+          </p:cNvPicPr>
+          <p:nvPr/>
+        </p:nvPicPr>
+        <p:blipFill>
+          <a:blip r:embed="rId26">
+            <a:extLst>
+              <a:ext uri="{28A0092B-C50C-407E-A947-70E740481C1C}">
+                <a14:useLocalDpi xmlns:a14="http://schemas.microsoft.com/office/drawing/2010/main" val="0"/>
+              </a:ext>
+            </a:extLst>
+          </a:blip>
+          <a:stretch>
+            <a:fillRect/>
+          </a:stretch>
+        </p:blipFill>
+        <p:spPr>
+          <a:xfrm>
+            <a:off x="5933633" y="3023311"/>
+            <a:ext cx="390153" cy="390153"/>
+          </a:xfrm>
+          <a:prstGeom prst="rect">
+            <a:avLst/>
+          </a:prstGeom>
+        </p:spPr>
+      </p:pic>
+      <p:sp>
+        <p:nvSpPr>
+          <p:cNvPr id="57" name="TextBox 56">
+            <a:extLst>
+              <a:ext uri="{FF2B5EF4-FFF2-40B4-BE49-F238E27FC236}">
+                <a16:creationId xmlns:a16="http://schemas.microsoft.com/office/drawing/2014/main" id="{24801AF1-40F5-4B78-8B88-3B17F07F3996}"/>
+              </a:ext>
+            </a:extLst>
+          </p:cNvPr>
+          <p:cNvSpPr txBox="1"/>
+          <p:nvPr/>
+        </p:nvSpPr>
+        <p:spPr>
+          <a:xfrm>
+            <a:off x="648070" y="1926452"/>
+            <a:ext cx="1111202" cy="369332"/>
+          </a:xfrm>
+          <a:prstGeom prst="rect">
+            <a:avLst/>
+          </a:prstGeom>
+          <a:noFill/>
+        </p:spPr>
+        <p:txBody>
+          <a:bodyPr wrap="none" rtlCol="0">
+            <a:spAutoFit/>
+          </a:bodyPr>
+          <a:lstStyle/>
+          <a:p>
+            <a:pPr marL="0" marR="0" lvl="0" indent="0" algn="ctr" defTabSz="914400" rtl="0" eaLnBrk="1" fontAlgn="auto" latinLnBrk="0" hangingPunct="1">
+              <a:lnSpc>
+                <a:spcPct val="100000"/>
+              </a:lnSpc>
+              <a:spcBef>
+                <a:spcPts val="0"/>
+              </a:spcBef>
+              <a:spcAft>
+                <a:spcPts val="0"/>
+              </a:spcAft>
+              <a:buClrTx/>
+              <a:buSzTx/>
+              <a:buFontTx/>
+              <a:buNone/>
+              <a:tabLst/>
+              <a:defRPr/>
+            </a:pPr>
+            <a:r>
+              <a:rPr kumimoji="0" lang="en-IN" sz="900" b="0" i="0" u="none" strike="noStrike" kern="1200" cap="none" spc="0" normalizeH="0" baseline="0" noProof="0" dirty="0">
+                <a:ln>
+                  <a:noFill/>
+                </a:ln>
+                <a:solidFill>
+                  <a:srgbClr val="0070C0"/>
+                </a:solidFill>
+                <a:effectLst/>
+                <a:uLnTx/>
+                <a:uFillTx/>
+                <a:latin typeface="Verdana" panose="020B0604030504040204" pitchFamily="34" charset="0"/>
+                <a:ea typeface="Verdana" panose="020B0604030504040204" pitchFamily="34" charset="0"/>
+                <a:cs typeface="+mn-cs"/>
+              </a:rPr>
+              <a:t>Feature Branch </a:t>
+            </a:r>
+          </a:p>
+          <a:p>
+            <a:pPr marL="0" marR="0" lvl="0" indent="0" algn="ctr" defTabSz="914400" rtl="0" eaLnBrk="1" fontAlgn="auto" latinLnBrk="0" hangingPunct="1">
+              <a:lnSpc>
+                <a:spcPct val="100000"/>
+              </a:lnSpc>
+              <a:spcBef>
+                <a:spcPts val="0"/>
+              </a:spcBef>
+              <a:spcAft>
+                <a:spcPts val="0"/>
+              </a:spcAft>
+              <a:buClrTx/>
+              <a:buSzTx/>
+              <a:buFontTx/>
+              <a:buNone/>
+              <a:tabLst/>
+              <a:defRPr/>
+            </a:pPr>
+            <a:r>
+              <a:rPr kumimoji="0" lang="en-IN" sz="900" b="0" i="0" u="none" strike="noStrike" kern="1200" cap="none" spc="0" normalizeH="0" baseline="0" noProof="0" dirty="0">
+                <a:ln>
+                  <a:noFill/>
+                </a:ln>
+                <a:solidFill>
+                  <a:srgbClr val="0070C0"/>
+                </a:solidFill>
+                <a:effectLst/>
+                <a:uLnTx/>
+                <a:uFillTx/>
+                <a:latin typeface="Verdana" panose="020B0604030504040204" pitchFamily="34" charset="0"/>
+                <a:ea typeface="Verdana" panose="020B0604030504040204" pitchFamily="34" charset="0"/>
+                <a:cs typeface="+mn-cs"/>
+              </a:rPr>
+              <a:t>Code </a:t>
+            </a:r>
+          </a:p>
+        </p:txBody>
+      </p:sp>
+      <p:sp>
+        <p:nvSpPr>
+          <p:cNvPr id="59" name="TextBox 58">
+            <a:extLst>
+              <a:ext uri="{FF2B5EF4-FFF2-40B4-BE49-F238E27FC236}">
+                <a16:creationId xmlns:a16="http://schemas.microsoft.com/office/drawing/2014/main" id="{8C126E89-A1A7-4EB3-9DEC-44A16C851BD3}"/>
+              </a:ext>
+            </a:extLst>
+          </p:cNvPr>
+          <p:cNvSpPr txBox="1"/>
+          <p:nvPr/>
+        </p:nvSpPr>
+        <p:spPr>
+          <a:xfrm>
+            <a:off x="2601105" y="1927929"/>
+            <a:ext cx="901209" cy="230832"/>
+          </a:xfrm>
+          <a:prstGeom prst="rect">
+            <a:avLst/>
+          </a:prstGeom>
+          <a:noFill/>
+        </p:spPr>
+        <p:txBody>
+          <a:bodyPr wrap="none" rtlCol="0">
+            <a:spAutoFit/>
+          </a:bodyPr>
+          <a:lstStyle/>
+          <a:p>
+            <a:pPr marL="0" marR="0" lvl="0" indent="0" algn="ctr" defTabSz="914400" rtl="0" eaLnBrk="1" fontAlgn="auto" latinLnBrk="0" hangingPunct="1">
+              <a:lnSpc>
+                <a:spcPct val="100000"/>
+              </a:lnSpc>
+              <a:spcBef>
+                <a:spcPts val="0"/>
+              </a:spcBef>
+              <a:spcAft>
+                <a:spcPts val="0"/>
+              </a:spcAft>
+              <a:buClrTx/>
+              <a:buSzTx/>
+              <a:buFontTx/>
+              <a:buNone/>
+              <a:tabLst/>
+              <a:defRPr/>
+            </a:pPr>
+            <a:r>
+              <a:rPr kumimoji="0" lang="en-IN" sz="900" b="0" i="0" u="none" strike="noStrike" kern="1200" cap="none" spc="0" normalizeH="0" baseline="0" noProof="0" dirty="0">
+                <a:ln>
+                  <a:noFill/>
+                </a:ln>
+                <a:solidFill>
+                  <a:srgbClr val="0070C0"/>
+                </a:solidFill>
+                <a:effectLst/>
+                <a:uLnTx/>
+                <a:uFillTx/>
+                <a:latin typeface="Verdana" panose="020B0604030504040204" pitchFamily="34" charset="0"/>
+                <a:ea typeface="Verdana" panose="020B0604030504040204" pitchFamily="34" charset="0"/>
+                <a:cs typeface="+mn-cs"/>
+              </a:rPr>
+              <a:t>Pull Request</a:t>
+            </a:r>
+          </a:p>
+        </p:txBody>
+      </p:sp>
+      <p:sp>
+        <p:nvSpPr>
+          <p:cNvPr id="60" name="TextBox 59">
+            <a:extLst>
+              <a:ext uri="{FF2B5EF4-FFF2-40B4-BE49-F238E27FC236}">
+                <a16:creationId xmlns:a16="http://schemas.microsoft.com/office/drawing/2014/main" id="{DBCFAD7A-E88C-4A0F-A610-6CBE85188BB1}"/>
+              </a:ext>
+            </a:extLst>
+          </p:cNvPr>
+          <p:cNvSpPr txBox="1"/>
+          <p:nvPr/>
+        </p:nvSpPr>
+        <p:spPr>
+          <a:xfrm>
+            <a:off x="4602471" y="1927928"/>
+            <a:ext cx="857927" cy="230832"/>
+          </a:xfrm>
+          <a:prstGeom prst="rect">
+            <a:avLst/>
+          </a:prstGeom>
+          <a:noFill/>
+        </p:spPr>
+        <p:txBody>
+          <a:bodyPr wrap="none" rtlCol="0">
+            <a:spAutoFit/>
+          </a:bodyPr>
+          <a:lstStyle/>
+          <a:p>
+            <a:pPr marL="0" marR="0" lvl="0" indent="0" algn="ctr" defTabSz="914400" rtl="0" eaLnBrk="1" fontAlgn="auto" latinLnBrk="0" hangingPunct="1">
+              <a:lnSpc>
+                <a:spcPct val="100000"/>
+              </a:lnSpc>
+              <a:spcBef>
+                <a:spcPts val="0"/>
+              </a:spcBef>
+              <a:spcAft>
+                <a:spcPts val="0"/>
+              </a:spcAft>
+              <a:buClrTx/>
+              <a:buSzTx/>
+              <a:buFontTx/>
+              <a:buNone/>
+              <a:tabLst/>
+              <a:defRPr/>
+            </a:pPr>
+            <a:r>
+              <a:rPr kumimoji="0" lang="en-IN" sz="900" b="0" i="0" u="none" strike="noStrike" kern="1200" cap="none" spc="0" normalizeH="0" baseline="0" noProof="0" dirty="0">
+                <a:ln>
+                  <a:noFill/>
+                </a:ln>
+                <a:solidFill>
+                  <a:srgbClr val="0070C0"/>
+                </a:solidFill>
+                <a:effectLst/>
+                <a:uLnTx/>
+                <a:uFillTx/>
+                <a:latin typeface="Verdana" panose="020B0604030504040204" pitchFamily="34" charset="0"/>
+                <a:ea typeface="Verdana" panose="020B0604030504040204" pitchFamily="34" charset="0"/>
+                <a:cs typeface="+mn-cs"/>
+              </a:rPr>
+              <a:t>Gated Build</a:t>
+            </a:r>
+          </a:p>
+        </p:txBody>
+      </p:sp>
+      <p:sp>
+        <p:nvSpPr>
+          <p:cNvPr id="61" name="TextBox 60">
+            <a:extLst>
+              <a:ext uri="{FF2B5EF4-FFF2-40B4-BE49-F238E27FC236}">
+                <a16:creationId xmlns:a16="http://schemas.microsoft.com/office/drawing/2014/main" id="{82C61609-CC07-4FD7-9C30-D031271928D1}"/>
+              </a:ext>
+            </a:extLst>
+          </p:cNvPr>
+          <p:cNvSpPr txBox="1"/>
+          <p:nvPr/>
+        </p:nvSpPr>
+        <p:spPr>
+          <a:xfrm>
+            <a:off x="6518198" y="1927932"/>
+            <a:ext cx="1021433" cy="230832"/>
+          </a:xfrm>
+          <a:prstGeom prst="rect">
+            <a:avLst/>
+          </a:prstGeom>
+          <a:noFill/>
+        </p:spPr>
+        <p:txBody>
+          <a:bodyPr wrap="none" rtlCol="0">
+            <a:spAutoFit/>
+          </a:bodyPr>
+          <a:lstStyle/>
+          <a:p>
+            <a:pPr marL="0" marR="0" lvl="0" indent="0" algn="ctr" defTabSz="914400" rtl="0" eaLnBrk="1" fontAlgn="auto" latinLnBrk="0" hangingPunct="1">
+              <a:lnSpc>
+                <a:spcPct val="100000"/>
+              </a:lnSpc>
+              <a:spcBef>
+                <a:spcPts val="0"/>
+              </a:spcBef>
+              <a:spcAft>
+                <a:spcPts val="0"/>
+              </a:spcAft>
+              <a:buClrTx/>
+              <a:buSzTx/>
+              <a:buFontTx/>
+              <a:buNone/>
+              <a:tabLst/>
+              <a:defRPr/>
+            </a:pPr>
+            <a:r>
+              <a:rPr kumimoji="0" lang="en-IN" sz="900" b="0" i="0" u="none" strike="noStrike" kern="1200" cap="none" spc="0" normalizeH="0" baseline="0" noProof="0" dirty="0">
+                <a:ln>
+                  <a:noFill/>
+                </a:ln>
+                <a:solidFill>
+                  <a:srgbClr val="0070C0"/>
+                </a:solidFill>
+                <a:effectLst/>
+                <a:uLnTx/>
+                <a:uFillTx/>
+                <a:latin typeface="Verdana" panose="020B0604030504040204" pitchFamily="34" charset="0"/>
+                <a:ea typeface="Verdana" panose="020B0604030504040204" pitchFamily="34" charset="0"/>
+                <a:cs typeface="+mn-cs"/>
+              </a:rPr>
+              <a:t>Master Branch</a:t>
+            </a:r>
+          </a:p>
+        </p:txBody>
+      </p:sp>
+      <p:sp>
+        <p:nvSpPr>
+          <p:cNvPr id="62" name="TextBox 61">
+            <a:extLst>
+              <a:ext uri="{FF2B5EF4-FFF2-40B4-BE49-F238E27FC236}">
+                <a16:creationId xmlns:a16="http://schemas.microsoft.com/office/drawing/2014/main" id="{249C46EA-9E6D-44DB-8464-705398B77D4A}"/>
+              </a:ext>
+            </a:extLst>
+          </p:cNvPr>
+          <p:cNvSpPr txBox="1"/>
+          <p:nvPr/>
+        </p:nvSpPr>
+        <p:spPr>
+          <a:xfrm>
+            <a:off x="8474817" y="1927931"/>
+            <a:ext cx="641522" cy="230832"/>
+          </a:xfrm>
+          <a:prstGeom prst="rect">
+            <a:avLst/>
+          </a:prstGeom>
+          <a:noFill/>
+        </p:spPr>
+        <p:txBody>
+          <a:bodyPr wrap="none" rtlCol="0">
+            <a:spAutoFit/>
+          </a:bodyPr>
+          <a:lstStyle/>
+          <a:p>
+            <a:pPr marL="0" marR="0" lvl="0" indent="0" algn="ctr" defTabSz="914400" rtl="0" eaLnBrk="1" fontAlgn="auto" latinLnBrk="0" hangingPunct="1">
+              <a:lnSpc>
+                <a:spcPct val="100000"/>
+              </a:lnSpc>
+              <a:spcBef>
+                <a:spcPts val="0"/>
+              </a:spcBef>
+              <a:spcAft>
+                <a:spcPts val="0"/>
+              </a:spcAft>
+              <a:buClrTx/>
+              <a:buSzTx/>
+              <a:buFontTx/>
+              <a:buNone/>
+              <a:tabLst/>
+              <a:defRPr/>
+            </a:pPr>
+            <a:r>
+              <a:rPr kumimoji="0" lang="en-IN" sz="900" b="0" i="0" u="none" strike="noStrike" kern="1200" cap="none" spc="0" normalizeH="0" baseline="0" noProof="0" dirty="0">
+                <a:ln>
+                  <a:noFill/>
+                </a:ln>
+                <a:solidFill>
+                  <a:srgbClr val="0070C0"/>
+                </a:solidFill>
+                <a:effectLst/>
+                <a:uLnTx/>
+                <a:uFillTx/>
+                <a:latin typeface="Verdana" panose="020B0604030504040204" pitchFamily="34" charset="0"/>
+                <a:ea typeface="Verdana" panose="020B0604030504040204" pitchFamily="34" charset="0"/>
+                <a:cs typeface="+mn-cs"/>
+              </a:rPr>
+              <a:t>CI Build</a:t>
+            </a:r>
+          </a:p>
+        </p:txBody>
+      </p:sp>
+      <p:sp>
+        <p:nvSpPr>
+          <p:cNvPr id="63" name="TextBox 62">
+            <a:extLst>
+              <a:ext uri="{FF2B5EF4-FFF2-40B4-BE49-F238E27FC236}">
+                <a16:creationId xmlns:a16="http://schemas.microsoft.com/office/drawing/2014/main" id="{42143B6B-0DBF-411D-B5F8-55CC77C45241}"/>
+              </a:ext>
+            </a:extLst>
+          </p:cNvPr>
+          <p:cNvSpPr txBox="1"/>
+          <p:nvPr/>
+        </p:nvSpPr>
+        <p:spPr>
+          <a:xfrm>
+            <a:off x="10484864" y="1927928"/>
+            <a:ext cx="1007007" cy="230832"/>
+          </a:xfrm>
+          <a:prstGeom prst="rect">
+            <a:avLst/>
+          </a:prstGeom>
+          <a:noFill/>
+        </p:spPr>
+        <p:txBody>
+          <a:bodyPr wrap="none" rtlCol="0">
+            <a:spAutoFit/>
+          </a:bodyPr>
+          <a:lstStyle/>
+          <a:p>
+            <a:pPr marL="0" marR="0" lvl="0" indent="0" algn="ctr" defTabSz="914400" rtl="0" eaLnBrk="1" fontAlgn="auto" latinLnBrk="0" hangingPunct="1">
+              <a:lnSpc>
+                <a:spcPct val="100000"/>
+              </a:lnSpc>
+              <a:spcBef>
+                <a:spcPts val="0"/>
+              </a:spcBef>
+              <a:spcAft>
+                <a:spcPts val="0"/>
+              </a:spcAft>
+              <a:buClrTx/>
+              <a:buSzTx/>
+              <a:buFontTx/>
+              <a:buNone/>
+              <a:tabLst/>
+              <a:defRPr/>
+            </a:pPr>
+            <a:r>
+              <a:rPr kumimoji="0" lang="en-IN" sz="900" b="0" i="0" u="none" strike="noStrike" kern="1200" cap="none" spc="0" normalizeH="0" baseline="0" noProof="0" dirty="0">
+                <a:ln>
+                  <a:noFill/>
+                </a:ln>
+                <a:solidFill>
+                  <a:srgbClr val="0070C0"/>
+                </a:solidFill>
+                <a:effectLst/>
+                <a:uLnTx/>
+                <a:uFillTx/>
+                <a:latin typeface="Verdana" panose="020B0604030504040204" pitchFamily="34" charset="0"/>
+                <a:ea typeface="Verdana" panose="020B0604030504040204" pitchFamily="34" charset="0"/>
+                <a:cs typeface="+mn-cs"/>
+              </a:rPr>
+              <a:t>Artefacts drop</a:t>
+            </a:r>
+          </a:p>
+        </p:txBody>
+      </p:sp>
+      <p:sp>
+        <p:nvSpPr>
+          <p:cNvPr id="64" name="TextBox 63">
+            <a:extLst>
+              <a:ext uri="{FF2B5EF4-FFF2-40B4-BE49-F238E27FC236}">
+                <a16:creationId xmlns:a16="http://schemas.microsoft.com/office/drawing/2014/main" id="{1B214976-97E2-44AA-89EE-93858B032AF0}"/>
+              </a:ext>
+            </a:extLst>
+          </p:cNvPr>
+          <p:cNvSpPr txBox="1"/>
+          <p:nvPr/>
+        </p:nvSpPr>
+        <p:spPr>
+          <a:xfrm>
+            <a:off x="10673090" y="4406279"/>
+            <a:ext cx="633507" cy="230832"/>
+          </a:xfrm>
+          <a:prstGeom prst="rect">
+            <a:avLst/>
+          </a:prstGeom>
+          <a:noFill/>
+        </p:spPr>
+        <p:txBody>
+          <a:bodyPr wrap="none" rtlCol="0">
+            <a:spAutoFit/>
+          </a:bodyPr>
+          <a:lstStyle/>
+          <a:p>
+            <a:pPr marL="0" marR="0" lvl="0" indent="0" algn="ctr" defTabSz="914400" rtl="0" eaLnBrk="1" fontAlgn="auto" latinLnBrk="0" hangingPunct="1">
+              <a:lnSpc>
+                <a:spcPct val="100000"/>
+              </a:lnSpc>
+              <a:spcBef>
+                <a:spcPts val="0"/>
+              </a:spcBef>
+              <a:spcAft>
+                <a:spcPts val="0"/>
+              </a:spcAft>
+              <a:buClrTx/>
+              <a:buSzTx/>
+              <a:buFontTx/>
+              <a:buNone/>
+              <a:tabLst/>
+              <a:defRPr/>
+            </a:pPr>
+            <a:r>
+              <a:rPr kumimoji="0" lang="en-IN" sz="900" b="0" i="0" u="none" strike="noStrike" kern="1200" cap="none" spc="0" normalizeH="0" baseline="0" noProof="0" dirty="0">
+                <a:ln>
+                  <a:noFill/>
+                </a:ln>
+                <a:solidFill>
+                  <a:srgbClr val="0070C0"/>
+                </a:solidFill>
+                <a:effectLst/>
+                <a:uLnTx/>
+                <a:uFillTx/>
+                <a:latin typeface="Verdana" panose="020B0604030504040204" pitchFamily="34" charset="0"/>
+                <a:ea typeface="Verdana" panose="020B0604030504040204" pitchFamily="34" charset="0"/>
+                <a:cs typeface="+mn-cs"/>
+              </a:rPr>
+              <a:t>Release</a:t>
+            </a:r>
+          </a:p>
+        </p:txBody>
+      </p:sp>
+      <p:sp>
+        <p:nvSpPr>
+          <p:cNvPr id="65" name="TextBox 64">
+            <a:extLst>
+              <a:ext uri="{FF2B5EF4-FFF2-40B4-BE49-F238E27FC236}">
+                <a16:creationId xmlns:a16="http://schemas.microsoft.com/office/drawing/2014/main" id="{B13AA115-519F-4E7B-A289-6AF4CCC85A69}"/>
+              </a:ext>
+            </a:extLst>
+          </p:cNvPr>
+          <p:cNvSpPr txBox="1"/>
+          <p:nvPr/>
+        </p:nvSpPr>
+        <p:spPr>
+          <a:xfrm>
+            <a:off x="5804273" y="3438412"/>
+            <a:ext cx="1045479" cy="230832"/>
+          </a:xfrm>
+          <a:prstGeom prst="rect">
+            <a:avLst/>
+          </a:prstGeom>
+          <a:noFill/>
+        </p:spPr>
+        <p:txBody>
+          <a:bodyPr wrap="none" rtlCol="0">
+            <a:spAutoFit/>
+          </a:bodyPr>
+          <a:lstStyle/>
+          <a:p>
+            <a:pPr marL="0" marR="0" lvl="0" indent="0" algn="ctr" defTabSz="914400" rtl="0" eaLnBrk="1" fontAlgn="auto" latinLnBrk="0" hangingPunct="1">
+              <a:lnSpc>
+                <a:spcPct val="100000"/>
+              </a:lnSpc>
+              <a:spcBef>
+                <a:spcPts val="0"/>
+              </a:spcBef>
+              <a:spcAft>
+                <a:spcPts val="0"/>
+              </a:spcAft>
+              <a:buClrTx/>
+              <a:buSzTx/>
+              <a:buFontTx/>
+              <a:buNone/>
+              <a:tabLst/>
+              <a:defRPr/>
+            </a:pPr>
+            <a:r>
+              <a:rPr kumimoji="0" lang="en-IN" sz="900" b="0" i="0" u="none" strike="noStrike" kern="1200" cap="none" spc="0" normalizeH="0" baseline="0" noProof="0" dirty="0">
+                <a:ln>
+                  <a:noFill/>
+                </a:ln>
+                <a:solidFill>
+                  <a:srgbClr val="0070C0"/>
+                </a:solidFill>
+                <a:effectLst/>
+                <a:uLnTx/>
+                <a:uFillTx/>
+                <a:latin typeface="Verdana" panose="020B0604030504040204" pitchFamily="34" charset="0"/>
+                <a:ea typeface="Verdana" panose="020B0604030504040204" pitchFamily="34" charset="0"/>
+                <a:cs typeface="+mn-cs"/>
+              </a:rPr>
+              <a:t>Environment A</a:t>
+            </a:r>
+          </a:p>
+        </p:txBody>
+      </p:sp>
+    </p:spTree>
+    <p:extLst>
+      <p:ext uri="{BB962C8B-B14F-4D97-AF65-F5344CB8AC3E}">
+        <p14:creationId xmlns:p14="http://schemas.microsoft.com/office/powerpoint/2010/main" val="2001996074"/>
+      </p:ext>
+    </p:extLst>
+  </p:cSld>
+  <p:clrMapOvr>
+    <a:masterClrMapping/>
+  </p:clrMapOvr>
+</p:sld>
+</file>
+
+<file path=ppt/slides/slide12.xml><?xml version="1.0" encoding="utf-8"?>
+<p:sld xmlns:a="http://schemas.openxmlformats.org/drawingml/2006/main" xmlns:r="http://schemas.openxmlformats.org/officeDocument/2006/relationships" xmlns:p="http://schemas.openxmlformats.org/presentationml/2006/main">
+  <p:cSld>
     <p:bg>
       <p:bgPr>
         <a:solidFill>
@@ -6333,7 +8404,7 @@
 </p:sld>
 </file>
 
-<file path=ppt/slides/slide11.xml><?xml version="1.0" encoding="utf-8"?>
+<file path=ppt/slides/slide13.xml><?xml version="1.0" encoding="utf-8"?>
 <p:sld xmlns:a="http://schemas.openxmlformats.org/drawingml/2006/main" xmlns:r="http://schemas.openxmlformats.org/officeDocument/2006/relationships" xmlns:p="http://schemas.openxmlformats.org/presentationml/2006/main">
   <p:cSld>
     <p:bg>
@@ -6561,7 +8632,7 @@
 </p:sld>
 </file>
 
-<file path=ppt/slides/slide12.xml><?xml version="1.0" encoding="utf-8"?>
+<file path=ppt/slides/slide14.xml><?xml version="1.0" encoding="utf-8"?>
 <p:sld xmlns:a="http://schemas.openxmlformats.org/drawingml/2006/main" xmlns:r="http://schemas.openxmlformats.org/officeDocument/2006/relationships" xmlns:p="http://schemas.openxmlformats.org/presentationml/2006/main">
   <p:cSld>
     <p:bg>
@@ -6944,7 +9015,7 @@
 </p:sld>
 </file>
 
-<file path=ppt/slides/slide13.xml><?xml version="1.0" encoding="utf-8"?>
+<file path=ppt/slides/slide15.xml><?xml version="1.0" encoding="utf-8"?>
 <p:sld xmlns:a="http://schemas.openxmlformats.org/drawingml/2006/main" xmlns:r="http://schemas.openxmlformats.org/officeDocument/2006/relationships" xmlns:p="http://schemas.openxmlformats.org/presentationml/2006/main">
   <p:cSld>
     <p:spTree>
@@ -11818,7 +13889,7 @@
 </p:sld>
 </file>
 
-<file path=ppt/slides/slide14.xml><?xml version="1.0" encoding="utf-8"?>
+<file path=ppt/slides/slide16.xml><?xml version="1.0" encoding="utf-8"?>
 <p:sld xmlns:a="http://schemas.openxmlformats.org/drawingml/2006/main" xmlns:r="http://schemas.openxmlformats.org/officeDocument/2006/relationships" xmlns:p="http://schemas.openxmlformats.org/presentationml/2006/main">
   <p:cSld>
     <p:spTree>
@@ -18185,7 +20256,7 @@
 </p:sld>
 </file>
 
-<file path=ppt/slides/slide15.xml><?xml version="1.0" encoding="utf-8"?>
+<file path=ppt/slides/slide17.xml><?xml version="1.0" encoding="utf-8"?>
 <p:sld xmlns:a="http://schemas.openxmlformats.org/drawingml/2006/main" xmlns:r="http://schemas.openxmlformats.org/officeDocument/2006/relationships" xmlns:p="http://schemas.openxmlformats.org/presentationml/2006/main">
   <p:cSld>
     <p:spTree>
@@ -23938,7 +26009,7 @@
 </p:sld>
 </file>
 
-<file path=ppt/slides/slide16.xml><?xml version="1.0" encoding="utf-8"?>
+<file path=ppt/slides/slide18.xml><?xml version="1.0" encoding="utf-8"?>
 <p:sld xmlns:a="http://schemas.openxmlformats.org/drawingml/2006/main" xmlns:r="http://schemas.openxmlformats.org/officeDocument/2006/relationships" xmlns:p="http://schemas.openxmlformats.org/presentationml/2006/main">
   <p:cSld>
     <p:spTree>
@@ -24357,7 +26428,7 @@
 </p:sld>
 </file>
 
-<file path=ppt/slides/slide17.xml><?xml version="1.0" encoding="utf-8"?>
+<file path=ppt/slides/slide19.xml><?xml version="1.0" encoding="utf-8"?>
 <p:sld xmlns:a="http://schemas.openxmlformats.org/drawingml/2006/main" xmlns:r="http://schemas.openxmlformats.org/officeDocument/2006/relationships" xmlns:p="http://schemas.openxmlformats.org/presentationml/2006/main">
   <p:cSld>
     <p:spTree>
@@ -27866,6 +29937,456 @@
 </file>
 
 <file path=ppt/slides/slide3.xml><?xml version="1.0" encoding="utf-8"?>
+<p:sld xmlns:a="http://schemas.openxmlformats.org/drawingml/2006/main" xmlns:r="http://schemas.openxmlformats.org/officeDocument/2006/relationships" xmlns:p="http://schemas.openxmlformats.org/presentationml/2006/main">
+  <p:cSld>
+    <p:bg>
+      <p:bgPr>
+        <a:solidFill>
+          <a:schemeClr val="bg1"/>
+        </a:solidFill>
+        <a:effectLst/>
+      </p:bgPr>
+    </p:bg>
+    <p:spTree>
+      <p:nvGrpSpPr>
+        <p:cNvPr id="1" name=""/>
+        <p:cNvGrpSpPr/>
+        <p:nvPr/>
+      </p:nvGrpSpPr>
+      <p:grpSpPr>
+        <a:xfrm>
+          <a:off x="0" y="0"/>
+          <a:ext cx="0" cy="0"/>
+          <a:chOff x="0" y="0"/>
+          <a:chExt cx="0" cy="0"/>
+        </a:xfrm>
+      </p:grpSpPr>
+      <p:sp>
+        <p:nvSpPr>
+          <p:cNvPr id="9" name="Rectangle 8">
+            <a:extLst>
+              <a:ext uri="{FF2B5EF4-FFF2-40B4-BE49-F238E27FC236}">
+                <a16:creationId xmlns:a16="http://schemas.microsoft.com/office/drawing/2014/main" id="{42A4FC2C-047E-45A5-965D-8E1E3BF09BC6}"/>
+              </a:ext>
+              <a:ext uri="{C183D7F6-B498-43B3-948B-1728B52AA6E4}">
+                <adec:decorative xmlns:adec="http://schemas.microsoft.com/office/drawing/2017/decorative" val="1"/>
+              </a:ext>
+            </a:extLst>
+          </p:cNvPr>
+          <p:cNvSpPr>
+            <a:spLocks noGrp="1" noRot="1" noChangeAspect="1" noMove="1" noResize="1" noEditPoints="1" noAdjustHandles="1" noChangeArrowheads="1" noChangeShapeType="1" noTextEdit="1"/>
+          </p:cNvSpPr>
+          <p:nvPr>
+            <p:extLst>
+              <p:ext uri="{386F3935-93C4-4BCD-93E2-E3B085C9AB24}">
+                <p16:designElem xmlns:p16="http://schemas.microsoft.com/office/powerpoint/2015/main" val="1"/>
+              </p:ext>
+            </p:extLst>
+          </p:nvPr>
+        </p:nvSpPr>
+        <p:spPr bwMode="white">
+          <a:xfrm>
+            <a:off x="1524" y="0"/>
+            <a:ext cx="12188952" cy="6858000"/>
+          </a:xfrm>
+          <a:prstGeom prst="rect">
+            <a:avLst/>
+          </a:prstGeom>
+          <a:noFill/>
+          <a:ln>
+            <a:noFill/>
+          </a:ln>
+        </p:spPr>
+        <p:style>
+          <a:lnRef idx="2">
+            <a:schemeClr val="accent1">
+              <a:shade val="50000"/>
+            </a:schemeClr>
+          </a:lnRef>
+          <a:fillRef idx="1">
+            <a:schemeClr val="accent1"/>
+          </a:fillRef>
+          <a:effectRef idx="0">
+            <a:schemeClr val="accent1"/>
+          </a:effectRef>
+          <a:fontRef idx="minor">
+            <a:schemeClr val="lt1"/>
+          </a:fontRef>
+        </p:style>
+        <p:txBody>
+          <a:bodyPr rtlCol="0" anchor="ctr"/>
+          <a:lstStyle>
+            <a:defPPr>
+              <a:defRPr lang="en-US"/>
+            </a:defPPr>
+            <a:lvl1pPr marL="0" algn="l" defTabSz="914400" rtl="0" eaLnBrk="1" latinLnBrk="0" hangingPunct="1">
+              <a:defRPr sz="1800" kern="1200">
+                <a:solidFill>
+                  <a:schemeClr val="lt1"/>
+                </a:solidFill>
+                <a:latin typeface="+mn-lt"/>
+                <a:ea typeface="+mn-ea"/>
+                <a:cs typeface="+mn-cs"/>
+              </a:defRPr>
+            </a:lvl1pPr>
+            <a:lvl2pPr marL="457200" algn="l" defTabSz="914400" rtl="0" eaLnBrk="1" latinLnBrk="0" hangingPunct="1">
+              <a:defRPr sz="1800" kern="1200">
+                <a:solidFill>
+                  <a:schemeClr val="lt1"/>
+                </a:solidFill>
+                <a:latin typeface="+mn-lt"/>
+                <a:ea typeface="+mn-ea"/>
+                <a:cs typeface="+mn-cs"/>
+              </a:defRPr>
+            </a:lvl2pPr>
+            <a:lvl3pPr marL="914400" algn="l" defTabSz="914400" rtl="0" eaLnBrk="1" latinLnBrk="0" hangingPunct="1">
+              <a:defRPr sz="1800" kern="1200">
+                <a:solidFill>
+                  <a:schemeClr val="lt1"/>
+                </a:solidFill>
+                <a:latin typeface="+mn-lt"/>
+                <a:ea typeface="+mn-ea"/>
+                <a:cs typeface="+mn-cs"/>
+              </a:defRPr>
+            </a:lvl3pPr>
+            <a:lvl4pPr marL="1371600" algn="l" defTabSz="914400" rtl="0" eaLnBrk="1" latinLnBrk="0" hangingPunct="1">
+              <a:defRPr sz="1800" kern="1200">
+                <a:solidFill>
+                  <a:schemeClr val="lt1"/>
+                </a:solidFill>
+                <a:latin typeface="+mn-lt"/>
+                <a:ea typeface="+mn-ea"/>
+                <a:cs typeface="+mn-cs"/>
+              </a:defRPr>
+            </a:lvl4pPr>
+            <a:lvl5pPr marL="1828800" algn="l" defTabSz="914400" rtl="0" eaLnBrk="1" latinLnBrk="0" hangingPunct="1">
+              <a:defRPr sz="1800" kern="1200">
+                <a:solidFill>
+                  <a:schemeClr val="lt1"/>
+                </a:solidFill>
+                <a:latin typeface="+mn-lt"/>
+                <a:ea typeface="+mn-ea"/>
+                <a:cs typeface="+mn-cs"/>
+              </a:defRPr>
+            </a:lvl5pPr>
+            <a:lvl6pPr marL="2286000" algn="l" defTabSz="914400" rtl="0" eaLnBrk="1" latinLnBrk="0" hangingPunct="1">
+              <a:defRPr sz="1800" kern="1200">
+                <a:solidFill>
+                  <a:schemeClr val="lt1"/>
+                </a:solidFill>
+                <a:latin typeface="+mn-lt"/>
+                <a:ea typeface="+mn-ea"/>
+                <a:cs typeface="+mn-cs"/>
+              </a:defRPr>
+            </a:lvl6pPr>
+            <a:lvl7pPr marL="2743200" algn="l" defTabSz="914400" rtl="0" eaLnBrk="1" latinLnBrk="0" hangingPunct="1">
+              <a:defRPr sz="1800" kern="1200">
+                <a:solidFill>
+                  <a:schemeClr val="lt1"/>
+                </a:solidFill>
+                <a:latin typeface="+mn-lt"/>
+                <a:ea typeface="+mn-ea"/>
+                <a:cs typeface="+mn-cs"/>
+              </a:defRPr>
+            </a:lvl7pPr>
+            <a:lvl8pPr marL="3200400" algn="l" defTabSz="914400" rtl="0" eaLnBrk="1" latinLnBrk="0" hangingPunct="1">
+              <a:defRPr sz="1800" kern="1200">
+                <a:solidFill>
+                  <a:schemeClr val="lt1"/>
+                </a:solidFill>
+                <a:latin typeface="+mn-lt"/>
+                <a:ea typeface="+mn-ea"/>
+                <a:cs typeface="+mn-cs"/>
+              </a:defRPr>
+            </a:lvl8pPr>
+            <a:lvl9pPr marL="3657600" algn="l" defTabSz="914400" rtl="0" eaLnBrk="1" latinLnBrk="0" hangingPunct="1">
+              <a:defRPr sz="1800" kern="1200">
+                <a:solidFill>
+                  <a:schemeClr val="lt1"/>
+                </a:solidFill>
+                <a:latin typeface="+mn-lt"/>
+                <a:ea typeface="+mn-ea"/>
+                <a:cs typeface="+mn-cs"/>
+              </a:defRPr>
+            </a:lvl9pPr>
+          </a:lstStyle>
+          <a:p>
+            <a:pPr algn="ctr"/>
+            <a:endParaRPr lang="en-US"/>
+          </a:p>
+        </p:txBody>
+      </p:sp>
+      <p:pic>
+        <p:nvPicPr>
+          <p:cNvPr id="4" name="Picture 3" descr="Graphical user interface, text, application&#10;&#10;Description automatically generated">
+            <a:extLst>
+              <a:ext uri="{FF2B5EF4-FFF2-40B4-BE49-F238E27FC236}">
+                <a16:creationId xmlns:a16="http://schemas.microsoft.com/office/drawing/2014/main" id="{A4FBCD18-DB97-3919-C38C-11AC03AEF93E}"/>
+              </a:ext>
+            </a:extLst>
+          </p:cNvPr>
+          <p:cNvPicPr>
+            <a:picLocks noChangeAspect="1"/>
+          </p:cNvPicPr>
+          <p:nvPr/>
+        </p:nvPicPr>
+        <p:blipFill rotWithShape="1">
+          <a:blip r:embed="rId2">
+            <a:extLst>
+              <a:ext uri="{28A0092B-C50C-407E-A947-70E740481C1C}">
+                <a14:useLocalDpi xmlns:a14="http://schemas.microsoft.com/office/drawing/2010/main" val="0"/>
+              </a:ext>
+            </a:extLst>
+          </a:blip>
+          <a:srcRect t="15019" b="18030"/>
+          <a:stretch/>
+        </p:blipFill>
+        <p:spPr>
+          <a:xfrm>
+            <a:off x="20" y="1282"/>
+            <a:ext cx="12191980" cy="6856718"/>
+          </a:xfrm>
+          <a:prstGeom prst="rect">
+            <a:avLst/>
+          </a:prstGeom>
+        </p:spPr>
+      </p:pic>
+    </p:spTree>
+    <p:extLst>
+      <p:ext uri="{BB962C8B-B14F-4D97-AF65-F5344CB8AC3E}">
+        <p14:creationId xmlns:p14="http://schemas.microsoft.com/office/powerpoint/2010/main" val="4071482095"/>
+      </p:ext>
+    </p:extLst>
+  </p:cSld>
+  <p:clrMapOvr>
+    <a:masterClrMapping/>
+  </p:clrMapOvr>
+</p:sld>
+</file>
+
+<file path=ppt/slides/slide4.xml><?xml version="1.0" encoding="utf-8"?>
+<p:sld xmlns:a="http://schemas.openxmlformats.org/drawingml/2006/main" xmlns:r="http://schemas.openxmlformats.org/officeDocument/2006/relationships" xmlns:p="http://schemas.openxmlformats.org/presentationml/2006/main">
+  <p:cSld>
+    <p:bg>
+      <p:bgPr>
+        <a:solidFill>
+          <a:schemeClr val="bg1"/>
+        </a:solidFill>
+        <a:effectLst/>
+      </p:bgPr>
+    </p:bg>
+    <p:spTree>
+      <p:nvGrpSpPr>
+        <p:cNvPr id="1" name=""/>
+        <p:cNvGrpSpPr/>
+        <p:nvPr/>
+      </p:nvGrpSpPr>
+      <p:grpSpPr>
+        <a:xfrm>
+          <a:off x="0" y="0"/>
+          <a:ext cx="0" cy="0"/>
+          <a:chOff x="0" y="0"/>
+          <a:chExt cx="0" cy="0"/>
+        </a:xfrm>
+      </p:grpSpPr>
+      <p:sp>
+        <p:nvSpPr>
+          <p:cNvPr id="20" name="Rectangle 19">
+            <a:extLst>
+              <a:ext uri="{FF2B5EF4-FFF2-40B4-BE49-F238E27FC236}">
+                <a16:creationId xmlns:a16="http://schemas.microsoft.com/office/drawing/2014/main" id="{42A4FC2C-047E-45A5-965D-8E1E3BF09BC6}"/>
+              </a:ext>
+              <a:ext uri="{C183D7F6-B498-43B3-948B-1728B52AA6E4}">
+                <adec:decorative xmlns:adec="http://schemas.microsoft.com/office/drawing/2017/decorative" val="1"/>
+              </a:ext>
+            </a:extLst>
+          </p:cNvPr>
+          <p:cNvSpPr>
+            <a:spLocks noGrp="1" noRot="1" noChangeAspect="1" noMove="1" noResize="1" noEditPoints="1" noAdjustHandles="1" noChangeArrowheads="1" noChangeShapeType="1" noTextEdit="1"/>
+          </p:cNvSpPr>
+          <p:nvPr>
+            <p:extLst>
+              <p:ext uri="{386F3935-93C4-4BCD-93E2-E3B085C9AB24}">
+                <p16:designElem xmlns:p16="http://schemas.microsoft.com/office/powerpoint/2015/main" val="1"/>
+              </p:ext>
+            </p:extLst>
+          </p:nvPr>
+        </p:nvSpPr>
+        <p:spPr bwMode="white">
+          <a:xfrm>
+            <a:off x="1524" y="0"/>
+            <a:ext cx="12188952" cy="6858000"/>
+          </a:xfrm>
+          <a:prstGeom prst="rect">
+            <a:avLst/>
+          </a:prstGeom>
+          <a:noFill/>
+          <a:ln>
+            <a:noFill/>
+          </a:ln>
+        </p:spPr>
+        <p:style>
+          <a:lnRef idx="2">
+            <a:schemeClr val="accent1">
+              <a:shade val="50000"/>
+            </a:schemeClr>
+          </a:lnRef>
+          <a:fillRef idx="1">
+            <a:schemeClr val="accent1"/>
+          </a:fillRef>
+          <a:effectRef idx="0">
+            <a:schemeClr val="accent1"/>
+          </a:effectRef>
+          <a:fontRef idx="minor">
+            <a:schemeClr val="lt1"/>
+          </a:fontRef>
+        </p:style>
+        <p:txBody>
+          <a:bodyPr rtlCol="0" anchor="ctr"/>
+          <a:lstStyle>
+            <a:defPPr>
+              <a:defRPr lang="en-US"/>
+            </a:defPPr>
+            <a:lvl1pPr marL="0" algn="l" defTabSz="914400" rtl="0" eaLnBrk="1" latinLnBrk="0" hangingPunct="1">
+              <a:defRPr sz="1800" kern="1200">
+                <a:solidFill>
+                  <a:schemeClr val="lt1"/>
+                </a:solidFill>
+                <a:latin typeface="+mn-lt"/>
+                <a:ea typeface="+mn-ea"/>
+                <a:cs typeface="+mn-cs"/>
+              </a:defRPr>
+            </a:lvl1pPr>
+            <a:lvl2pPr marL="457200" algn="l" defTabSz="914400" rtl="0" eaLnBrk="1" latinLnBrk="0" hangingPunct="1">
+              <a:defRPr sz="1800" kern="1200">
+                <a:solidFill>
+                  <a:schemeClr val="lt1"/>
+                </a:solidFill>
+                <a:latin typeface="+mn-lt"/>
+                <a:ea typeface="+mn-ea"/>
+                <a:cs typeface="+mn-cs"/>
+              </a:defRPr>
+            </a:lvl2pPr>
+            <a:lvl3pPr marL="914400" algn="l" defTabSz="914400" rtl="0" eaLnBrk="1" latinLnBrk="0" hangingPunct="1">
+              <a:defRPr sz="1800" kern="1200">
+                <a:solidFill>
+                  <a:schemeClr val="lt1"/>
+                </a:solidFill>
+                <a:latin typeface="+mn-lt"/>
+                <a:ea typeface="+mn-ea"/>
+                <a:cs typeface="+mn-cs"/>
+              </a:defRPr>
+            </a:lvl3pPr>
+            <a:lvl4pPr marL="1371600" algn="l" defTabSz="914400" rtl="0" eaLnBrk="1" latinLnBrk="0" hangingPunct="1">
+              <a:defRPr sz="1800" kern="1200">
+                <a:solidFill>
+                  <a:schemeClr val="lt1"/>
+                </a:solidFill>
+                <a:latin typeface="+mn-lt"/>
+                <a:ea typeface="+mn-ea"/>
+                <a:cs typeface="+mn-cs"/>
+              </a:defRPr>
+            </a:lvl4pPr>
+            <a:lvl5pPr marL="1828800" algn="l" defTabSz="914400" rtl="0" eaLnBrk="1" latinLnBrk="0" hangingPunct="1">
+              <a:defRPr sz="1800" kern="1200">
+                <a:solidFill>
+                  <a:schemeClr val="lt1"/>
+                </a:solidFill>
+                <a:latin typeface="+mn-lt"/>
+                <a:ea typeface="+mn-ea"/>
+                <a:cs typeface="+mn-cs"/>
+              </a:defRPr>
+            </a:lvl5pPr>
+            <a:lvl6pPr marL="2286000" algn="l" defTabSz="914400" rtl="0" eaLnBrk="1" latinLnBrk="0" hangingPunct="1">
+              <a:defRPr sz="1800" kern="1200">
+                <a:solidFill>
+                  <a:schemeClr val="lt1"/>
+                </a:solidFill>
+                <a:latin typeface="+mn-lt"/>
+                <a:ea typeface="+mn-ea"/>
+                <a:cs typeface="+mn-cs"/>
+              </a:defRPr>
+            </a:lvl6pPr>
+            <a:lvl7pPr marL="2743200" algn="l" defTabSz="914400" rtl="0" eaLnBrk="1" latinLnBrk="0" hangingPunct="1">
+              <a:defRPr sz="1800" kern="1200">
+                <a:solidFill>
+                  <a:schemeClr val="lt1"/>
+                </a:solidFill>
+                <a:latin typeface="+mn-lt"/>
+                <a:ea typeface="+mn-ea"/>
+                <a:cs typeface="+mn-cs"/>
+              </a:defRPr>
+            </a:lvl7pPr>
+            <a:lvl8pPr marL="3200400" algn="l" defTabSz="914400" rtl="0" eaLnBrk="1" latinLnBrk="0" hangingPunct="1">
+              <a:defRPr sz="1800" kern="1200">
+                <a:solidFill>
+                  <a:schemeClr val="lt1"/>
+                </a:solidFill>
+                <a:latin typeface="+mn-lt"/>
+                <a:ea typeface="+mn-ea"/>
+                <a:cs typeface="+mn-cs"/>
+              </a:defRPr>
+            </a:lvl8pPr>
+            <a:lvl9pPr marL="3657600" algn="l" defTabSz="914400" rtl="0" eaLnBrk="1" latinLnBrk="0" hangingPunct="1">
+              <a:defRPr sz="1800" kern="1200">
+                <a:solidFill>
+                  <a:schemeClr val="lt1"/>
+                </a:solidFill>
+                <a:latin typeface="+mn-lt"/>
+                <a:ea typeface="+mn-ea"/>
+                <a:cs typeface="+mn-cs"/>
+              </a:defRPr>
+            </a:lvl9pPr>
+          </a:lstStyle>
+          <a:p>
+            <a:pPr algn="ctr"/>
+            <a:endParaRPr lang="en-US"/>
+          </a:p>
+        </p:txBody>
+      </p:sp>
+      <p:pic>
+        <p:nvPicPr>
+          <p:cNvPr id="3" name="Picture 2" descr="Graphical user interface, timeline&#10;&#10;Description automatically generated">
+            <a:extLst>
+              <a:ext uri="{FF2B5EF4-FFF2-40B4-BE49-F238E27FC236}">
+                <a16:creationId xmlns:a16="http://schemas.microsoft.com/office/drawing/2014/main" id="{789E144F-F4F6-391F-7951-54F10625E726}"/>
+              </a:ext>
+            </a:extLst>
+          </p:cNvPr>
+          <p:cNvPicPr>
+            <a:picLocks noChangeAspect="1"/>
+          </p:cNvPicPr>
+          <p:nvPr/>
+        </p:nvPicPr>
+        <p:blipFill rotWithShape="1">
+          <a:blip r:embed="rId2"/>
+          <a:srcRect b="19"/>
+          <a:stretch/>
+        </p:blipFill>
+        <p:spPr>
+          <a:xfrm>
+            <a:off x="20" y="1282"/>
+            <a:ext cx="12191980" cy="6856718"/>
+          </a:xfrm>
+          <a:prstGeom prst="rect">
+            <a:avLst/>
+          </a:prstGeom>
+        </p:spPr>
+      </p:pic>
+    </p:spTree>
+    <p:extLst>
+      <p:ext uri="{BB962C8B-B14F-4D97-AF65-F5344CB8AC3E}">
+        <p14:creationId xmlns:p14="http://schemas.microsoft.com/office/powerpoint/2010/main" val="3031114970"/>
+      </p:ext>
+    </p:extLst>
+  </p:cSld>
+  <p:clrMapOvr>
+    <a:masterClrMapping/>
+  </p:clrMapOvr>
+</p:sld>
+</file>
+
+<file path=ppt/slides/slide5.xml><?xml version="1.0" encoding="utf-8"?>
 <p:sld xmlns:a="http://schemas.openxmlformats.org/drawingml/2006/main" xmlns:r="http://schemas.openxmlformats.org/officeDocument/2006/relationships" xmlns:p="http://schemas.openxmlformats.org/presentationml/2006/main">
   <p:cSld>
     <p:spTree>
@@ -34232,7 +36753,7 @@
 </p:sld>
 </file>
 
-<file path=ppt/slides/slide4.xml><?xml version="1.0" encoding="utf-8"?>
+<file path=ppt/slides/slide6.xml><?xml version="1.0" encoding="utf-8"?>
 <p:sld xmlns:a="http://schemas.openxmlformats.org/drawingml/2006/main" xmlns:r="http://schemas.openxmlformats.org/officeDocument/2006/relationships" xmlns:p="http://schemas.openxmlformats.org/presentationml/2006/main">
   <p:cSld>
     <p:spTree>
@@ -34655,7 +37176,7 @@
 </p:sld>
 </file>
 
-<file path=ppt/slides/slide5.xml><?xml version="1.0" encoding="utf-8"?>
+<file path=ppt/slides/slide7.xml><?xml version="1.0" encoding="utf-8"?>
 <p:sld xmlns:a="http://schemas.openxmlformats.org/drawingml/2006/main" xmlns:r="http://schemas.openxmlformats.org/officeDocument/2006/relationships" xmlns:p="http://schemas.openxmlformats.org/presentationml/2006/main">
   <p:cSld>
     <p:spTree>
@@ -35460,7 +37981,7 @@
 </p:sld>
 </file>
 
-<file path=ppt/slides/slide6.xml><?xml version="1.0" encoding="utf-8"?>
+<file path=ppt/slides/slide8.xml><?xml version="1.0" encoding="utf-8"?>
 <p:sld xmlns:a="http://schemas.openxmlformats.org/drawingml/2006/main" xmlns:r="http://schemas.openxmlformats.org/officeDocument/2006/relationships" xmlns:p="http://schemas.openxmlformats.org/presentationml/2006/main">
   <p:cSld>
     <p:bg>
@@ -35688,7 +38209,7 @@
 </p:sld>
 </file>
 
-<file path=ppt/slides/slide7.xml><?xml version="1.0" encoding="utf-8"?>
+<file path=ppt/slides/slide9.xml><?xml version="1.0" encoding="utf-8"?>
 <p:sld xmlns:a="http://schemas.openxmlformats.org/drawingml/2006/main" xmlns:r="http://schemas.openxmlformats.org/officeDocument/2006/relationships" xmlns:p="http://schemas.openxmlformats.org/presentationml/2006/main">
   <p:cSld>
     <p:spTree>
@@ -35791,2075 +38312,6 @@
     <p:extLst>
       <p:ext uri="{BB962C8B-B14F-4D97-AF65-F5344CB8AC3E}">
         <p14:creationId xmlns:p14="http://schemas.microsoft.com/office/powerpoint/2010/main" val="1846930178"/>
-      </p:ext>
-    </p:extLst>
-  </p:cSld>
-  <p:clrMapOvr>
-    <a:masterClrMapping/>
-  </p:clrMapOvr>
-</p:sld>
-</file>
-
-<file path=ppt/slides/slide8.xml><?xml version="1.0" encoding="utf-8"?>
-<p:sld xmlns:a="http://schemas.openxmlformats.org/drawingml/2006/main" xmlns:r="http://schemas.openxmlformats.org/officeDocument/2006/relationships" xmlns:p="http://schemas.openxmlformats.org/presentationml/2006/main">
-  <p:cSld>
-    <p:spTree>
-      <p:nvGrpSpPr>
-        <p:cNvPr id="1" name=""/>
-        <p:cNvGrpSpPr/>
-        <p:nvPr/>
-      </p:nvGrpSpPr>
-      <p:grpSpPr>
-        <a:xfrm>
-          <a:off x="0" y="0"/>
-          <a:ext cx="0" cy="0"/>
-          <a:chOff x="0" y="0"/>
-          <a:chExt cx="0" cy="0"/>
-        </a:xfrm>
-      </p:grpSpPr>
-      <p:pic>
-        <p:nvPicPr>
-          <p:cNvPr id="3" name="Picture 2" descr="Graphical user interface, text, application&#10;&#10;Description automatically generated">
-            <a:extLst>
-              <a:ext uri="{FF2B5EF4-FFF2-40B4-BE49-F238E27FC236}">
-                <a16:creationId xmlns:a16="http://schemas.microsoft.com/office/drawing/2014/main" id="{5F10DE46-1C76-C9C5-5B2A-2AAED0099F1C}"/>
-              </a:ext>
-            </a:extLst>
-          </p:cNvPr>
-          <p:cNvPicPr>
-            <a:picLocks noChangeAspect="1"/>
-          </p:cNvPicPr>
-          <p:nvPr/>
-        </p:nvPicPr>
-        <p:blipFill>
-          <a:blip r:embed="rId2">
-            <a:extLst>
-              <a:ext uri="{28A0092B-C50C-407E-A947-70E740481C1C}">
-                <a14:useLocalDpi xmlns:a14="http://schemas.microsoft.com/office/drawing/2010/main" val="0"/>
-              </a:ext>
-            </a:extLst>
-          </a:blip>
-          <a:stretch>
-            <a:fillRect/>
-          </a:stretch>
-        </p:blipFill>
-        <p:spPr>
-          <a:xfrm>
-            <a:off x="38908" y="39095"/>
-            <a:ext cx="12114180" cy="4089846"/>
-          </a:xfrm>
-          <a:prstGeom prst="rect">
-            <a:avLst/>
-          </a:prstGeom>
-          <a:ln>
-            <a:solidFill>
-              <a:srgbClr val="002060"/>
-            </a:solidFill>
-          </a:ln>
-        </p:spPr>
-      </p:pic>
-      <p:pic>
-        <p:nvPicPr>
-          <p:cNvPr id="6" name="Picture 5" descr="Graphical user interface, application&#10;&#10;Description automatically generated">
-            <a:extLst>
-              <a:ext uri="{FF2B5EF4-FFF2-40B4-BE49-F238E27FC236}">
-                <a16:creationId xmlns:a16="http://schemas.microsoft.com/office/drawing/2014/main" id="{64AF3A08-04CD-CC9D-5888-D2D73AD3088A}"/>
-              </a:ext>
-            </a:extLst>
-          </p:cNvPr>
-          <p:cNvPicPr>
-            <a:picLocks noChangeAspect="1"/>
-          </p:cNvPicPr>
-          <p:nvPr/>
-        </p:nvPicPr>
-        <p:blipFill>
-          <a:blip r:embed="rId3">
-            <a:extLst>
-              <a:ext uri="{28A0092B-C50C-407E-A947-70E740481C1C}">
-                <a14:useLocalDpi xmlns:a14="http://schemas.microsoft.com/office/drawing/2010/main" val="0"/>
-              </a:ext>
-            </a:extLst>
-          </a:blip>
-          <a:stretch>
-            <a:fillRect/>
-          </a:stretch>
-        </p:blipFill>
-        <p:spPr>
-          <a:xfrm>
-            <a:off x="48640" y="4194925"/>
-            <a:ext cx="12104448" cy="2623979"/>
-          </a:xfrm>
-          <a:prstGeom prst="rect">
-            <a:avLst/>
-          </a:prstGeom>
-          <a:ln>
-            <a:solidFill>
-              <a:schemeClr val="accent1"/>
-            </a:solidFill>
-          </a:ln>
-        </p:spPr>
-      </p:pic>
-    </p:spTree>
-    <p:extLst>
-      <p:ext uri="{BB962C8B-B14F-4D97-AF65-F5344CB8AC3E}">
-        <p14:creationId xmlns:p14="http://schemas.microsoft.com/office/powerpoint/2010/main" val="4262798318"/>
-      </p:ext>
-    </p:extLst>
-  </p:cSld>
-  <p:clrMapOvr>
-    <a:masterClrMapping/>
-  </p:clrMapOvr>
-</p:sld>
-</file>
-
-<file path=ppt/slides/slide9.xml><?xml version="1.0" encoding="utf-8"?>
-<p:sld xmlns:a="http://schemas.openxmlformats.org/drawingml/2006/main" xmlns:r="http://schemas.openxmlformats.org/officeDocument/2006/relationships" xmlns:p="http://schemas.openxmlformats.org/presentationml/2006/main">
-  <p:cSld>
-    <p:spTree>
-      <p:nvGrpSpPr>
-        <p:cNvPr id="1" name=""/>
-        <p:cNvGrpSpPr/>
-        <p:nvPr/>
-      </p:nvGrpSpPr>
-      <p:grpSpPr>
-        <a:xfrm>
-          <a:off x="0" y="0"/>
-          <a:ext cx="0" cy="0"/>
-          <a:chOff x="0" y="0"/>
-          <a:chExt cx="0" cy="0"/>
-        </a:xfrm>
-      </p:grpSpPr>
-      <p:sp>
-        <p:nvSpPr>
-          <p:cNvPr id="4" name="Rectangle 3">
-            <a:extLst>
-              <a:ext uri="{FF2B5EF4-FFF2-40B4-BE49-F238E27FC236}">
-                <a16:creationId xmlns:a16="http://schemas.microsoft.com/office/drawing/2014/main" id="{055C22F7-3FD1-4C1B-8D0C-0C2F7FB61DBE}"/>
-              </a:ext>
-            </a:extLst>
-          </p:cNvPr>
-          <p:cNvSpPr/>
-          <p:nvPr/>
-        </p:nvSpPr>
-        <p:spPr>
-          <a:xfrm>
-            <a:off x="0" y="8878"/>
-            <a:ext cx="12183122" cy="497150"/>
-          </a:xfrm>
-          <a:prstGeom prst="rect">
-            <a:avLst/>
-          </a:prstGeom>
-          <a:solidFill>
-            <a:srgbClr val="0070C0"/>
-          </a:solidFill>
-        </p:spPr>
-        <p:style>
-          <a:lnRef idx="2">
-            <a:schemeClr val="accent1">
-              <a:shade val="50000"/>
-            </a:schemeClr>
-          </a:lnRef>
-          <a:fillRef idx="1">
-            <a:schemeClr val="accent1"/>
-          </a:fillRef>
-          <a:effectRef idx="0">
-            <a:schemeClr val="accent1"/>
-          </a:effectRef>
-          <a:fontRef idx="minor">
-            <a:schemeClr val="lt1"/>
-          </a:fontRef>
-        </p:style>
-        <p:txBody>
-          <a:bodyPr rtlCol="0" anchor="ctr"/>
-          <a:lstStyle/>
-          <a:p>
-            <a:pPr marL="0" marR="0" lvl="0" indent="0" algn="ctr" defTabSz="914400" rtl="0" eaLnBrk="1" fontAlgn="auto" latinLnBrk="0" hangingPunct="1">
-              <a:lnSpc>
-                <a:spcPct val="100000"/>
-              </a:lnSpc>
-              <a:spcBef>
-                <a:spcPts val="0"/>
-              </a:spcBef>
-              <a:spcAft>
-                <a:spcPts val="0"/>
-              </a:spcAft>
-              <a:buClrTx/>
-              <a:buSzTx/>
-              <a:buFontTx/>
-              <a:buNone/>
-              <a:tabLst/>
-              <a:defRPr/>
-            </a:pPr>
-            <a:r>
-              <a:rPr kumimoji="0" lang="en-US" sz="1800" b="1" i="0" u="none" strike="noStrike" kern="1200" cap="none" spc="0" normalizeH="0" baseline="0" noProof="0" dirty="0">
-                <a:ln>
-                  <a:noFill/>
-                </a:ln>
-                <a:solidFill>
-                  <a:prstClr val="white"/>
-                </a:solidFill>
-                <a:effectLst/>
-                <a:uLnTx/>
-                <a:uFillTx/>
-                <a:latin typeface="Verdana" panose="020B0604030504040204" pitchFamily="34" charset="0"/>
-                <a:ea typeface="Verdana" panose="020B0604030504040204" pitchFamily="34" charset="0"/>
-                <a:cs typeface="+mn-cs"/>
-              </a:rPr>
-              <a:t>PR Process, CI, CD</a:t>
-            </a:r>
-            <a:endParaRPr kumimoji="0" lang="en-IN" sz="1800" b="1" i="0" u="none" strike="noStrike" kern="1200" cap="none" spc="0" normalizeH="0" baseline="0" noProof="0" dirty="0">
-              <a:ln>
-                <a:noFill/>
-              </a:ln>
-              <a:solidFill>
-                <a:prstClr val="white"/>
-              </a:solidFill>
-              <a:effectLst/>
-              <a:uLnTx/>
-              <a:uFillTx/>
-              <a:latin typeface="Verdana" panose="020B0604030504040204" pitchFamily="34" charset="0"/>
-              <a:ea typeface="Verdana" panose="020B0604030504040204" pitchFamily="34" charset="0"/>
-              <a:cs typeface="+mn-cs"/>
-            </a:endParaRPr>
-          </a:p>
-        </p:txBody>
-      </p:sp>
-      <p:sp>
-        <p:nvSpPr>
-          <p:cNvPr id="7" name="Rectangle 6">
-            <a:extLst>
-              <a:ext uri="{FF2B5EF4-FFF2-40B4-BE49-F238E27FC236}">
-                <a16:creationId xmlns:a16="http://schemas.microsoft.com/office/drawing/2014/main" id="{B10720DE-FD2A-4FE5-B9FB-74854D01A659}"/>
-              </a:ext>
-            </a:extLst>
-          </p:cNvPr>
-          <p:cNvSpPr/>
-          <p:nvPr/>
-        </p:nvSpPr>
-        <p:spPr>
-          <a:xfrm>
-            <a:off x="0" y="6383046"/>
-            <a:ext cx="12183122" cy="57703"/>
-          </a:xfrm>
-          <a:prstGeom prst="rect">
-            <a:avLst/>
-          </a:prstGeom>
-          <a:solidFill>
-            <a:srgbClr val="0070C0"/>
-          </a:solidFill>
-        </p:spPr>
-        <p:style>
-          <a:lnRef idx="2">
-            <a:schemeClr val="accent1">
-              <a:shade val="50000"/>
-            </a:schemeClr>
-          </a:lnRef>
-          <a:fillRef idx="1">
-            <a:schemeClr val="accent1"/>
-          </a:fillRef>
-          <a:effectRef idx="0">
-            <a:schemeClr val="accent1"/>
-          </a:effectRef>
-          <a:fontRef idx="minor">
-            <a:schemeClr val="lt1"/>
-          </a:fontRef>
-        </p:style>
-        <p:txBody>
-          <a:bodyPr rtlCol="0" anchor="ctr"/>
-          <a:lstStyle/>
-          <a:p>
-            <a:pPr marL="0" marR="0" lvl="0" indent="0" algn="ctr" defTabSz="914400" rtl="0" eaLnBrk="1" fontAlgn="auto" latinLnBrk="0" hangingPunct="1">
-              <a:lnSpc>
-                <a:spcPct val="100000"/>
-              </a:lnSpc>
-              <a:spcBef>
-                <a:spcPts val="0"/>
-              </a:spcBef>
-              <a:spcAft>
-                <a:spcPts val="0"/>
-              </a:spcAft>
-              <a:buClrTx/>
-              <a:buSzTx/>
-              <a:buFontTx/>
-              <a:buNone/>
-              <a:tabLst/>
-              <a:defRPr/>
-            </a:pPr>
-            <a:endParaRPr kumimoji="0" lang="en-IN" sz="1000" b="0" i="0" u="none" strike="noStrike" kern="1200" cap="none" spc="0" normalizeH="0" baseline="0" noProof="0" dirty="0">
-              <a:ln>
-                <a:noFill/>
-              </a:ln>
-              <a:solidFill>
-                <a:prstClr val="white"/>
-              </a:solidFill>
-              <a:effectLst/>
-              <a:uLnTx/>
-              <a:uFillTx/>
-              <a:latin typeface="Verdana" panose="020B0604030504040204" pitchFamily="34" charset="0"/>
-              <a:ea typeface="Verdana" panose="020B0604030504040204" pitchFamily="34" charset="0"/>
-              <a:cs typeface="+mn-cs"/>
-            </a:endParaRPr>
-          </a:p>
-        </p:txBody>
-      </p:sp>
-      <p:sp>
-        <p:nvSpPr>
-          <p:cNvPr id="8" name="Footer Placeholder 7">
-            <a:extLst>
-              <a:ext uri="{FF2B5EF4-FFF2-40B4-BE49-F238E27FC236}">
-                <a16:creationId xmlns:a16="http://schemas.microsoft.com/office/drawing/2014/main" id="{DD2A19CA-EC18-432D-8F8F-17079808F38B}"/>
-              </a:ext>
-            </a:extLst>
-          </p:cNvPr>
-          <p:cNvSpPr>
-            <a:spLocks noGrp="1"/>
-          </p:cNvSpPr>
-          <p:nvPr>
-            <p:ph type="ftr" sz="quarter" idx="11"/>
-          </p:nvPr>
-        </p:nvSpPr>
-        <p:spPr>
-          <a:xfrm>
-            <a:off x="4038600" y="6427374"/>
-            <a:ext cx="4114800" cy="365125"/>
-          </a:xfrm>
-        </p:spPr>
-        <p:txBody>
-          <a:bodyPr/>
-          <a:lstStyle/>
-          <a:p>
-            <a:pPr marL="0" marR="0" lvl="0" indent="0" algn="ctr" defTabSz="914400" rtl="0" eaLnBrk="1" fontAlgn="auto" latinLnBrk="0" hangingPunct="1">
-              <a:lnSpc>
-                <a:spcPct val="100000"/>
-              </a:lnSpc>
-              <a:spcBef>
-                <a:spcPts val="0"/>
-              </a:spcBef>
-              <a:spcAft>
-                <a:spcPts val="0"/>
-              </a:spcAft>
-              <a:buClrTx/>
-              <a:buSzTx/>
-              <a:buFontTx/>
-              <a:buNone/>
-              <a:tabLst/>
-              <a:defRPr/>
-            </a:pPr>
-            <a:r>
-              <a:rPr kumimoji="0" lang="en-IN" sz="1200" b="1" i="0" u="none" strike="noStrike" kern="1200" cap="none" spc="0" normalizeH="0" baseline="0" noProof="0" dirty="0">
-                <a:ln>
-                  <a:noFill/>
-                </a:ln>
-                <a:solidFill>
-                  <a:srgbClr val="002060"/>
-                </a:solidFill>
-                <a:effectLst/>
-                <a:uLnTx/>
-                <a:uFillTx/>
-                <a:latin typeface="Verdana" panose="020B0604030504040204" pitchFamily="34" charset="0"/>
-                <a:ea typeface="Verdana" panose="020B0604030504040204" pitchFamily="34" charset="0"/>
-                <a:cs typeface="+mn-cs"/>
-              </a:rPr>
-              <a:t>05-Aug-2022</a:t>
-            </a:r>
-          </a:p>
-        </p:txBody>
-      </p:sp>
-      <p:sp>
-        <p:nvSpPr>
-          <p:cNvPr id="9" name="Slide Number Placeholder 8">
-            <a:extLst>
-              <a:ext uri="{FF2B5EF4-FFF2-40B4-BE49-F238E27FC236}">
-                <a16:creationId xmlns:a16="http://schemas.microsoft.com/office/drawing/2014/main" id="{8162625C-0B1F-42E0-BE7C-D99A08FED7A3}"/>
-              </a:ext>
-            </a:extLst>
-          </p:cNvPr>
-          <p:cNvSpPr>
-            <a:spLocks noGrp="1"/>
-          </p:cNvSpPr>
-          <p:nvPr>
-            <p:ph type="sldNum" sz="quarter" idx="12"/>
-          </p:nvPr>
-        </p:nvSpPr>
-        <p:spPr>
-          <a:xfrm>
-            <a:off x="8610600" y="6427374"/>
-            <a:ext cx="2743200" cy="365125"/>
-          </a:xfrm>
-        </p:spPr>
-        <p:txBody>
-          <a:bodyPr/>
-          <a:lstStyle/>
-          <a:p>
-            <a:pPr marL="0" marR="0" lvl="0" indent="0" algn="r" defTabSz="914400" rtl="0" eaLnBrk="1" fontAlgn="auto" latinLnBrk="0" hangingPunct="1">
-              <a:lnSpc>
-                <a:spcPct val="100000"/>
-              </a:lnSpc>
-              <a:spcBef>
-                <a:spcPts val="0"/>
-              </a:spcBef>
-              <a:spcAft>
-                <a:spcPts val="0"/>
-              </a:spcAft>
-              <a:buClrTx/>
-              <a:buSzTx/>
-              <a:buFontTx/>
-              <a:buNone/>
-              <a:tabLst/>
-              <a:defRPr/>
-            </a:pPr>
-            <a:fld id="{30AF63FB-5233-4811-A918-B572E3A55817}" type="slidenum">
-              <a:rPr kumimoji="0" lang="en-IN" sz="1200" b="1" i="0" u="none" strike="noStrike" kern="1200" cap="none" spc="0" normalizeH="0" baseline="0" noProof="0" smtClean="0">
-                <a:ln>
-                  <a:noFill/>
-                </a:ln>
-                <a:solidFill>
-                  <a:srgbClr val="002060"/>
-                </a:solidFill>
-                <a:effectLst/>
-                <a:uLnTx/>
-                <a:uFillTx/>
-                <a:latin typeface="Verdana" panose="020B0604030504040204" pitchFamily="34" charset="0"/>
-                <a:ea typeface="Verdana" panose="020B0604030504040204" pitchFamily="34" charset="0"/>
-                <a:cs typeface="+mn-cs"/>
-              </a:rPr>
-              <a:pPr marL="0" marR="0" lvl="0" indent="0" algn="r" defTabSz="914400" rtl="0" eaLnBrk="1" fontAlgn="auto" latinLnBrk="0" hangingPunct="1">
-                <a:lnSpc>
-                  <a:spcPct val="100000"/>
-                </a:lnSpc>
-                <a:spcBef>
-                  <a:spcPts val="0"/>
-                </a:spcBef>
-                <a:spcAft>
-                  <a:spcPts val="0"/>
-                </a:spcAft>
-                <a:buClrTx/>
-                <a:buSzTx/>
-                <a:buFontTx/>
-                <a:buNone/>
-                <a:tabLst/>
-                <a:defRPr/>
-              </a:pPr>
-              <a:t>9</a:t>
-            </a:fld>
-            <a:endParaRPr kumimoji="0" lang="en-IN" sz="1200" b="1" i="0" u="none" strike="noStrike" kern="1200" cap="none" spc="0" normalizeH="0" baseline="0" noProof="0" dirty="0">
-              <a:ln>
-                <a:noFill/>
-              </a:ln>
-              <a:solidFill>
-                <a:srgbClr val="002060"/>
-              </a:solidFill>
-              <a:effectLst/>
-              <a:uLnTx/>
-              <a:uFillTx/>
-              <a:latin typeface="Verdana" panose="020B0604030504040204" pitchFamily="34" charset="0"/>
-              <a:ea typeface="Verdana" panose="020B0604030504040204" pitchFamily="34" charset="0"/>
-              <a:cs typeface="+mn-cs"/>
-            </a:endParaRPr>
-          </a:p>
-        </p:txBody>
-      </p:sp>
-      <p:sp>
-        <p:nvSpPr>
-          <p:cNvPr id="12" name="Footer Placeholder 7">
-            <a:extLst>
-              <a:ext uri="{FF2B5EF4-FFF2-40B4-BE49-F238E27FC236}">
-                <a16:creationId xmlns:a16="http://schemas.microsoft.com/office/drawing/2014/main" id="{64C57949-E349-47D3-A505-A098233AF49D}"/>
-              </a:ext>
-            </a:extLst>
-          </p:cNvPr>
-          <p:cNvSpPr txBox="1">
-            <a:spLocks/>
-          </p:cNvSpPr>
-          <p:nvPr/>
-        </p:nvSpPr>
-        <p:spPr>
-          <a:xfrm>
-            <a:off x="133897" y="6428848"/>
-            <a:ext cx="4114800" cy="365125"/>
-          </a:xfrm>
-          <a:prstGeom prst="rect">
-            <a:avLst/>
-          </a:prstGeom>
-        </p:spPr>
-        <p:txBody>
-          <a:bodyPr vert="horz" lIns="91440" tIns="45720" rIns="91440" bIns="45720" rtlCol="0" anchor="ctr"/>
-          <a:lstStyle>
-            <a:defPPr>
-              <a:defRPr lang="en-US"/>
-            </a:defPPr>
-            <a:lvl1pPr marL="0" algn="ctr" defTabSz="914400" rtl="0" eaLnBrk="1" latinLnBrk="0" hangingPunct="1">
-              <a:defRPr sz="1200" kern="1200">
-                <a:solidFill>
-                  <a:schemeClr val="tx1">
-                    <a:tint val="75000"/>
-                  </a:schemeClr>
-                </a:solidFill>
-                <a:latin typeface="+mn-lt"/>
-                <a:ea typeface="+mn-ea"/>
-                <a:cs typeface="+mn-cs"/>
-              </a:defRPr>
-            </a:lvl1pPr>
-            <a:lvl2pPr marL="457200" algn="l" defTabSz="914400" rtl="0" eaLnBrk="1" latinLnBrk="0" hangingPunct="1">
-              <a:defRPr sz="1800" kern="1200">
-                <a:solidFill>
-                  <a:schemeClr val="tx1"/>
-                </a:solidFill>
-                <a:latin typeface="+mn-lt"/>
-                <a:ea typeface="+mn-ea"/>
-                <a:cs typeface="+mn-cs"/>
-              </a:defRPr>
-            </a:lvl2pPr>
-            <a:lvl3pPr marL="914400" algn="l" defTabSz="914400" rtl="0" eaLnBrk="1" latinLnBrk="0" hangingPunct="1">
-              <a:defRPr sz="1800" kern="1200">
-                <a:solidFill>
-                  <a:schemeClr val="tx1"/>
-                </a:solidFill>
-                <a:latin typeface="+mn-lt"/>
-                <a:ea typeface="+mn-ea"/>
-                <a:cs typeface="+mn-cs"/>
-              </a:defRPr>
-            </a:lvl3pPr>
-            <a:lvl4pPr marL="1371600" algn="l" defTabSz="914400" rtl="0" eaLnBrk="1" latinLnBrk="0" hangingPunct="1">
-              <a:defRPr sz="1800" kern="1200">
-                <a:solidFill>
-                  <a:schemeClr val="tx1"/>
-                </a:solidFill>
-                <a:latin typeface="+mn-lt"/>
-                <a:ea typeface="+mn-ea"/>
-                <a:cs typeface="+mn-cs"/>
-              </a:defRPr>
-            </a:lvl4pPr>
-            <a:lvl5pPr marL="1828800" algn="l" defTabSz="914400" rtl="0" eaLnBrk="1" latinLnBrk="0" hangingPunct="1">
-              <a:defRPr sz="1800" kern="1200">
-                <a:solidFill>
-                  <a:schemeClr val="tx1"/>
-                </a:solidFill>
-                <a:latin typeface="+mn-lt"/>
-                <a:ea typeface="+mn-ea"/>
-                <a:cs typeface="+mn-cs"/>
-              </a:defRPr>
-            </a:lvl5pPr>
-            <a:lvl6pPr marL="2286000" algn="l" defTabSz="914400" rtl="0" eaLnBrk="1" latinLnBrk="0" hangingPunct="1">
-              <a:defRPr sz="1800" kern="1200">
-                <a:solidFill>
-                  <a:schemeClr val="tx1"/>
-                </a:solidFill>
-                <a:latin typeface="+mn-lt"/>
-                <a:ea typeface="+mn-ea"/>
-                <a:cs typeface="+mn-cs"/>
-              </a:defRPr>
-            </a:lvl6pPr>
-            <a:lvl7pPr marL="2743200" algn="l" defTabSz="914400" rtl="0" eaLnBrk="1" latinLnBrk="0" hangingPunct="1">
-              <a:defRPr sz="1800" kern="1200">
-                <a:solidFill>
-                  <a:schemeClr val="tx1"/>
-                </a:solidFill>
-                <a:latin typeface="+mn-lt"/>
-                <a:ea typeface="+mn-ea"/>
-                <a:cs typeface="+mn-cs"/>
-              </a:defRPr>
-            </a:lvl7pPr>
-            <a:lvl8pPr marL="3200400" algn="l" defTabSz="914400" rtl="0" eaLnBrk="1" latinLnBrk="0" hangingPunct="1">
-              <a:defRPr sz="1800" kern="1200">
-                <a:solidFill>
-                  <a:schemeClr val="tx1"/>
-                </a:solidFill>
-                <a:latin typeface="+mn-lt"/>
-                <a:ea typeface="+mn-ea"/>
-                <a:cs typeface="+mn-cs"/>
-              </a:defRPr>
-            </a:lvl8pPr>
-            <a:lvl9pPr marL="3657600" algn="l" defTabSz="914400" rtl="0" eaLnBrk="1" latinLnBrk="0" hangingPunct="1">
-              <a:defRPr sz="1800" kern="1200">
-                <a:solidFill>
-                  <a:schemeClr val="tx1"/>
-                </a:solidFill>
-                <a:latin typeface="+mn-lt"/>
-                <a:ea typeface="+mn-ea"/>
-                <a:cs typeface="+mn-cs"/>
-              </a:defRPr>
-            </a:lvl9pPr>
-          </a:lstStyle>
-          <a:p>
-            <a:pPr marL="0" marR="0" lvl="0" indent="0" algn="ctr" defTabSz="914400" rtl="0" eaLnBrk="1" fontAlgn="auto" latinLnBrk="0" hangingPunct="1">
-              <a:lnSpc>
-                <a:spcPct val="100000"/>
-              </a:lnSpc>
-              <a:spcBef>
-                <a:spcPts val="0"/>
-              </a:spcBef>
-              <a:spcAft>
-                <a:spcPts val="0"/>
-              </a:spcAft>
-              <a:buClrTx/>
-              <a:buSzTx/>
-              <a:buFontTx/>
-              <a:buNone/>
-              <a:tabLst/>
-              <a:defRPr/>
-            </a:pPr>
-            <a:r>
-              <a:rPr kumimoji="0" lang="en-IN" sz="1200" b="1" i="0" u="none" strike="noStrike" kern="1200" cap="none" spc="0" normalizeH="0" baseline="0" noProof="0" dirty="0">
-                <a:ln>
-                  <a:noFill/>
-                </a:ln>
-                <a:solidFill>
-                  <a:srgbClr val="002060"/>
-                </a:solidFill>
-                <a:effectLst/>
-                <a:uLnTx/>
-                <a:uFillTx/>
-                <a:latin typeface="Verdana" panose="020B0604030504040204" pitchFamily="34" charset="0"/>
-                <a:ea typeface="Verdana" panose="020B0604030504040204" pitchFamily="34" charset="0"/>
-                <a:cs typeface="+mn-cs"/>
-              </a:rPr>
-              <a:t>Dot Net Learners House</a:t>
-            </a:r>
-          </a:p>
-        </p:txBody>
-      </p:sp>
-      <p:pic>
-        <p:nvPicPr>
-          <p:cNvPr id="3" name="Picture 2" descr="A picture containing drawing&#10;&#10;Description automatically generated">
-            <a:extLst>
-              <a:ext uri="{FF2B5EF4-FFF2-40B4-BE49-F238E27FC236}">
-                <a16:creationId xmlns:a16="http://schemas.microsoft.com/office/drawing/2014/main" id="{36D46947-3455-49F6-81DC-66502143C41D}"/>
-              </a:ext>
-            </a:extLst>
-          </p:cNvPr>
-          <p:cNvPicPr>
-            <a:picLocks noChangeAspect="1"/>
-          </p:cNvPicPr>
-          <p:nvPr/>
-        </p:nvPicPr>
-        <p:blipFill>
-          <a:blip r:embed="rId2">
-            <a:extLst>
-              <a:ext uri="{28A0092B-C50C-407E-A947-70E740481C1C}">
-                <a14:useLocalDpi xmlns:a14="http://schemas.microsoft.com/office/drawing/2010/main" val="0"/>
-              </a:ext>
-            </a:extLst>
-          </a:blip>
-          <a:stretch>
-            <a:fillRect/>
-          </a:stretch>
-        </p:blipFill>
-        <p:spPr>
-          <a:xfrm>
-            <a:off x="757291" y="966358"/>
-            <a:ext cx="780290" cy="780290"/>
-          </a:xfrm>
-          <a:prstGeom prst="rect">
-            <a:avLst/>
-          </a:prstGeom>
-        </p:spPr>
-      </p:pic>
-      <p:pic>
-        <p:nvPicPr>
-          <p:cNvPr id="11" name="Graphic 10">
-            <a:extLst>
-              <a:ext uri="{FF2B5EF4-FFF2-40B4-BE49-F238E27FC236}">
-                <a16:creationId xmlns:a16="http://schemas.microsoft.com/office/drawing/2014/main" id="{68CC5020-AEBC-4D94-8930-1E6AA6C03504}"/>
-              </a:ext>
-            </a:extLst>
-          </p:cNvPr>
-          <p:cNvPicPr>
-            <a:picLocks noChangeAspect="1"/>
-          </p:cNvPicPr>
-          <p:nvPr/>
-        </p:nvPicPr>
-        <p:blipFill>
-          <a:blip r:embed="rId3">
-            <a:extLst>
-              <a:ext uri="{28A0092B-C50C-407E-A947-70E740481C1C}">
-                <a14:useLocalDpi xmlns:a14="http://schemas.microsoft.com/office/drawing/2010/main" val="0"/>
-              </a:ext>
-              <a:ext uri="{96DAC541-7B7A-43D3-8B79-37D633B846F1}">
-                <asvg:svgBlip xmlns:asvg="http://schemas.microsoft.com/office/drawing/2016/SVG/main" r:embed="rId4"/>
-              </a:ext>
-            </a:extLst>
-          </a:blip>
-          <a:stretch>
-            <a:fillRect/>
-          </a:stretch>
-        </p:blipFill>
-        <p:spPr>
-          <a:xfrm>
-            <a:off x="4686132" y="966358"/>
-            <a:ext cx="780290" cy="780290"/>
-          </a:xfrm>
-          <a:prstGeom prst="rect">
-            <a:avLst/>
-          </a:prstGeom>
-        </p:spPr>
-      </p:pic>
-      <p:pic>
-        <p:nvPicPr>
-          <p:cNvPr id="13" name="Graphic 12">
-            <a:extLst>
-              <a:ext uri="{FF2B5EF4-FFF2-40B4-BE49-F238E27FC236}">
-                <a16:creationId xmlns:a16="http://schemas.microsoft.com/office/drawing/2014/main" id="{FF18036A-9AA0-4AAF-A6CF-9B332A840FD8}"/>
-              </a:ext>
-            </a:extLst>
-          </p:cNvPr>
-          <p:cNvPicPr>
-            <a:picLocks noChangeAspect="1"/>
-          </p:cNvPicPr>
-          <p:nvPr/>
-        </p:nvPicPr>
-        <p:blipFill>
-          <a:blip r:embed="rId5">
-            <a:extLst>
-              <a:ext uri="{28A0092B-C50C-407E-A947-70E740481C1C}">
-                <a14:useLocalDpi xmlns:a14="http://schemas.microsoft.com/office/drawing/2010/main" val="0"/>
-              </a:ext>
-              <a:ext uri="{96DAC541-7B7A-43D3-8B79-37D633B846F1}">
-                <asvg:svgBlip xmlns:asvg="http://schemas.microsoft.com/office/drawing/2016/SVG/main" r:embed="rId6"/>
-              </a:ext>
-            </a:extLst>
-          </a:blip>
-          <a:stretch>
-            <a:fillRect/>
-          </a:stretch>
-        </p:blipFill>
-        <p:spPr>
-          <a:xfrm>
-            <a:off x="6605457" y="966358"/>
-            <a:ext cx="780290" cy="780290"/>
-          </a:xfrm>
-          <a:prstGeom prst="rect">
-            <a:avLst/>
-          </a:prstGeom>
-        </p:spPr>
-      </p:pic>
-      <p:pic>
-        <p:nvPicPr>
-          <p:cNvPr id="14" name="Graphic 13">
-            <a:extLst>
-              <a:ext uri="{FF2B5EF4-FFF2-40B4-BE49-F238E27FC236}">
-                <a16:creationId xmlns:a16="http://schemas.microsoft.com/office/drawing/2014/main" id="{28A56780-CD7C-41F9-83CC-0901E3A92440}"/>
-              </a:ext>
-            </a:extLst>
-          </p:cNvPr>
-          <p:cNvPicPr>
-            <a:picLocks noChangeAspect="1"/>
-          </p:cNvPicPr>
-          <p:nvPr/>
-        </p:nvPicPr>
-        <p:blipFill>
-          <a:blip r:embed="rId3">
-            <a:extLst>
-              <a:ext uri="{28A0092B-C50C-407E-A947-70E740481C1C}">
-                <a14:useLocalDpi xmlns:a14="http://schemas.microsoft.com/office/drawing/2010/main" val="0"/>
-              </a:ext>
-              <a:ext uri="{96DAC541-7B7A-43D3-8B79-37D633B846F1}">
-                <asvg:svgBlip xmlns:asvg="http://schemas.microsoft.com/office/drawing/2016/SVG/main" r:embed="rId4"/>
-              </a:ext>
-            </a:extLst>
-          </a:blip>
-          <a:stretch>
-            <a:fillRect/>
-          </a:stretch>
-        </p:blipFill>
-        <p:spPr>
-          <a:xfrm>
-            <a:off x="8478377" y="966358"/>
-            <a:ext cx="780290" cy="780290"/>
-          </a:xfrm>
-          <a:prstGeom prst="rect">
-            <a:avLst/>
-          </a:prstGeom>
-        </p:spPr>
-      </p:pic>
-      <p:grpSp>
-        <p:nvGrpSpPr>
-          <p:cNvPr id="33" name="Group 32">
-            <a:extLst>
-              <a:ext uri="{FF2B5EF4-FFF2-40B4-BE49-F238E27FC236}">
-                <a16:creationId xmlns:a16="http://schemas.microsoft.com/office/drawing/2014/main" id="{741F7567-791E-4A67-9274-1439E4CF2D54}"/>
-              </a:ext>
-            </a:extLst>
-          </p:cNvPr>
-          <p:cNvGrpSpPr/>
-          <p:nvPr/>
-        </p:nvGrpSpPr>
-        <p:grpSpPr>
-          <a:xfrm>
-            <a:off x="259953" y="2714890"/>
-            <a:ext cx="5608263" cy="3233356"/>
-            <a:chOff x="6101386" y="2796466"/>
-            <a:chExt cx="5608263" cy="3233356"/>
-          </a:xfrm>
-        </p:grpSpPr>
-        <p:sp>
-          <p:nvSpPr>
-            <p:cNvPr id="19" name="Thought Bubble: Cloud 18">
-              <a:extLst>
-                <a:ext uri="{FF2B5EF4-FFF2-40B4-BE49-F238E27FC236}">
-                  <a16:creationId xmlns:a16="http://schemas.microsoft.com/office/drawing/2014/main" id="{A7D35382-D69E-4203-B4A9-52A05A4FD8D7}"/>
-                </a:ext>
-              </a:extLst>
-            </p:cNvPr>
-            <p:cNvSpPr/>
-            <p:nvPr/>
-          </p:nvSpPr>
-          <p:spPr>
-            <a:xfrm>
-              <a:off x="6101386" y="2796466"/>
-              <a:ext cx="5608263" cy="3233356"/>
-            </a:xfrm>
-            <a:prstGeom prst="cloudCallout">
-              <a:avLst>
-                <a:gd name="adj1" fmla="val -10766"/>
-                <a:gd name="adj2" fmla="val 39295"/>
-              </a:avLst>
-            </a:prstGeom>
-            <a:solidFill>
-              <a:schemeClr val="bg1"/>
-            </a:solidFill>
-          </p:spPr>
-          <p:style>
-            <a:lnRef idx="2">
-              <a:schemeClr val="accent1">
-                <a:shade val="50000"/>
-              </a:schemeClr>
-            </a:lnRef>
-            <a:fillRef idx="1">
-              <a:schemeClr val="accent1"/>
-            </a:fillRef>
-            <a:effectRef idx="0">
-              <a:schemeClr val="accent1"/>
-            </a:effectRef>
-            <a:fontRef idx="minor">
-              <a:schemeClr val="lt1"/>
-            </a:fontRef>
-          </p:style>
-          <p:txBody>
-            <a:bodyPr rtlCol="0" anchor="ctr"/>
-            <a:lstStyle/>
-            <a:p>
-              <a:pPr marL="0" marR="0" lvl="0" indent="0" algn="ctr" defTabSz="914400" rtl="0" eaLnBrk="1" fontAlgn="auto" latinLnBrk="0" hangingPunct="1">
-                <a:lnSpc>
-                  <a:spcPct val="100000"/>
-                </a:lnSpc>
-                <a:spcBef>
-                  <a:spcPts val="0"/>
-                </a:spcBef>
-                <a:spcAft>
-                  <a:spcPts val="0"/>
-                </a:spcAft>
-                <a:buClrTx/>
-                <a:buSzTx/>
-                <a:buFontTx/>
-                <a:buNone/>
-                <a:tabLst/>
-                <a:defRPr/>
-              </a:pPr>
-              <a:endParaRPr kumimoji="0" lang="en-IN" sz="1800" b="0" i="0" u="none" strike="noStrike" kern="1200" cap="none" spc="0" normalizeH="0" baseline="0" noProof="0">
-                <a:ln>
-                  <a:noFill/>
-                </a:ln>
-                <a:solidFill>
-                  <a:prstClr val="white"/>
-                </a:solidFill>
-                <a:effectLst/>
-                <a:uLnTx/>
-                <a:uFillTx/>
-                <a:latin typeface="Calibri" panose="020F0502020204030204"/>
-                <a:ea typeface="+mn-ea"/>
-                <a:cs typeface="+mn-cs"/>
-              </a:endParaRPr>
-            </a:p>
-          </p:txBody>
-        </p:sp>
-        <p:grpSp>
-          <p:nvGrpSpPr>
-            <p:cNvPr id="29" name="Group 28">
-              <a:extLst>
-                <a:ext uri="{FF2B5EF4-FFF2-40B4-BE49-F238E27FC236}">
-                  <a16:creationId xmlns:a16="http://schemas.microsoft.com/office/drawing/2014/main" id="{FF592EF6-1E6D-47AE-A34C-AB5A774B30D8}"/>
-                </a:ext>
-              </a:extLst>
-            </p:cNvPr>
-            <p:cNvGrpSpPr/>
-            <p:nvPr/>
-          </p:nvGrpSpPr>
-          <p:grpSpPr>
-            <a:xfrm>
-              <a:off x="6972126" y="3249876"/>
-              <a:ext cx="3866781" cy="1892550"/>
-              <a:chOff x="5965146" y="3263136"/>
-              <a:chExt cx="3866781" cy="1892550"/>
-            </a:xfrm>
-          </p:grpSpPr>
-          <p:pic>
-            <p:nvPicPr>
-              <p:cNvPr id="20" name="Picture 19" descr="A picture containing drawing&#10;&#10;Description automatically generated">
-                <a:extLst>
-                  <a:ext uri="{FF2B5EF4-FFF2-40B4-BE49-F238E27FC236}">
-                    <a16:creationId xmlns:a16="http://schemas.microsoft.com/office/drawing/2014/main" id="{9966C00C-1E5C-4E39-9381-2359516062C6}"/>
-                  </a:ext>
-                </a:extLst>
-              </p:cNvPr>
-              <p:cNvPicPr>
-                <a:picLocks noChangeAspect="1"/>
-              </p:cNvPicPr>
-              <p:nvPr/>
-            </p:nvPicPr>
-            <p:blipFill>
-              <a:blip r:embed="rId7">
-                <a:extLst>
-                  <a:ext uri="{28A0092B-C50C-407E-A947-70E740481C1C}">
-                    <a14:useLocalDpi xmlns:a14="http://schemas.microsoft.com/office/drawing/2010/main" val="0"/>
-                  </a:ext>
-                </a:extLst>
-              </a:blip>
-              <a:stretch>
-                <a:fillRect/>
-              </a:stretch>
-            </p:blipFill>
-            <p:spPr>
-              <a:xfrm>
-                <a:off x="6313959" y="3444336"/>
-                <a:ext cx="780290" cy="780290"/>
-              </a:xfrm>
-              <a:prstGeom prst="rect">
-                <a:avLst/>
-              </a:prstGeom>
-            </p:spPr>
-          </p:pic>
-          <p:pic>
-            <p:nvPicPr>
-              <p:cNvPr id="22" name="Graphic 21">
-                <a:extLst>
-                  <a:ext uri="{FF2B5EF4-FFF2-40B4-BE49-F238E27FC236}">
-                    <a16:creationId xmlns:a16="http://schemas.microsoft.com/office/drawing/2014/main" id="{C723A7AA-CBAF-404F-AA2B-631CC56FB8CE}"/>
-                  </a:ext>
-                </a:extLst>
-              </p:cNvPr>
-              <p:cNvPicPr>
-                <a:picLocks noChangeAspect="1"/>
-              </p:cNvPicPr>
-              <p:nvPr/>
-            </p:nvPicPr>
-            <p:blipFill>
-              <a:blip r:embed="rId8">
-                <a:extLst>
-                  <a:ext uri="{28A0092B-C50C-407E-A947-70E740481C1C}">
-                    <a14:useLocalDpi xmlns:a14="http://schemas.microsoft.com/office/drawing/2010/main" val="0"/>
-                  </a:ext>
-                  <a:ext uri="{96DAC541-7B7A-43D3-8B79-37D633B846F1}">
-                    <asvg:svgBlip xmlns:asvg="http://schemas.microsoft.com/office/drawing/2016/SVG/main" r:embed="rId9"/>
-                  </a:ext>
-                </a:extLst>
-              </a:blip>
-              <a:stretch>
-                <a:fillRect/>
-              </a:stretch>
-            </p:blipFill>
-            <p:spPr>
-              <a:xfrm>
-                <a:off x="9355677" y="3263136"/>
-                <a:ext cx="476250" cy="476250"/>
-              </a:xfrm>
-              <a:prstGeom prst="rect">
-                <a:avLst/>
-              </a:prstGeom>
-            </p:spPr>
-          </p:pic>
-          <p:pic>
-            <p:nvPicPr>
-              <p:cNvPr id="24" name="Graphic 23">
-                <a:extLst>
-                  <a:ext uri="{FF2B5EF4-FFF2-40B4-BE49-F238E27FC236}">
-                    <a16:creationId xmlns:a16="http://schemas.microsoft.com/office/drawing/2014/main" id="{925071B5-D25D-44D1-8436-17A064FA82BA}"/>
-                  </a:ext>
-                </a:extLst>
-              </p:cNvPr>
-              <p:cNvPicPr>
-                <a:picLocks noChangeAspect="1"/>
-              </p:cNvPicPr>
-              <p:nvPr/>
-            </p:nvPicPr>
-            <p:blipFill>
-              <a:blip r:embed="rId10">
-                <a:extLst>
-                  <a:ext uri="{28A0092B-C50C-407E-A947-70E740481C1C}">
-                    <a14:useLocalDpi xmlns:a14="http://schemas.microsoft.com/office/drawing/2010/main" val="0"/>
-                  </a:ext>
-                  <a:ext uri="{96DAC541-7B7A-43D3-8B79-37D633B846F1}">
-                    <asvg:svgBlip xmlns:asvg="http://schemas.microsoft.com/office/drawing/2016/SVG/main" r:embed="rId11"/>
-                  </a:ext>
-                </a:extLst>
-              </a:blip>
-              <a:stretch>
-                <a:fillRect/>
-              </a:stretch>
-            </p:blipFill>
-            <p:spPr>
-              <a:xfrm>
-                <a:off x="8965152" y="4517937"/>
-                <a:ext cx="628650" cy="600075"/>
-              </a:xfrm>
-              <a:prstGeom prst="rect">
-                <a:avLst/>
-              </a:prstGeom>
-            </p:spPr>
-          </p:pic>
-          <p:pic>
-            <p:nvPicPr>
-              <p:cNvPr id="26" name="Graphic 25">
-                <a:extLst>
-                  <a:ext uri="{FF2B5EF4-FFF2-40B4-BE49-F238E27FC236}">
-                    <a16:creationId xmlns:a16="http://schemas.microsoft.com/office/drawing/2014/main" id="{02E07A17-A57F-4E63-8BA7-95B0DA3919A5}"/>
-                  </a:ext>
-                </a:extLst>
-              </p:cNvPr>
-              <p:cNvPicPr>
-                <a:picLocks noChangeAspect="1"/>
-              </p:cNvPicPr>
-              <p:nvPr/>
-            </p:nvPicPr>
-            <p:blipFill>
-              <a:blip r:embed="rId12">
-                <a:extLst>
-                  <a:ext uri="{28A0092B-C50C-407E-A947-70E740481C1C}">
-                    <a14:useLocalDpi xmlns:a14="http://schemas.microsoft.com/office/drawing/2010/main" val="0"/>
-                  </a:ext>
-                  <a:ext uri="{96DAC541-7B7A-43D3-8B79-37D633B846F1}">
-                    <asvg:svgBlip xmlns:asvg="http://schemas.microsoft.com/office/drawing/2016/SVG/main" r:embed="rId13"/>
-                  </a:ext>
-                </a:extLst>
-              </a:blip>
-              <a:stretch>
-                <a:fillRect/>
-              </a:stretch>
-            </p:blipFill>
-            <p:spPr>
-              <a:xfrm>
-                <a:off x="5965146" y="4679436"/>
-                <a:ext cx="476250" cy="476250"/>
-              </a:xfrm>
-              <a:prstGeom prst="rect">
-                <a:avLst/>
-              </a:prstGeom>
-            </p:spPr>
-          </p:pic>
-          <p:pic>
-            <p:nvPicPr>
-              <p:cNvPr id="28" name="Graphic 27">
-                <a:extLst>
-                  <a:ext uri="{FF2B5EF4-FFF2-40B4-BE49-F238E27FC236}">
-                    <a16:creationId xmlns:a16="http://schemas.microsoft.com/office/drawing/2014/main" id="{C7B8C726-E294-4A32-B7CC-0D388BEA8CE5}"/>
-                  </a:ext>
-                </a:extLst>
-              </p:cNvPr>
-              <p:cNvPicPr>
-                <a:picLocks noChangeAspect="1"/>
-              </p:cNvPicPr>
-              <p:nvPr/>
-            </p:nvPicPr>
-            <p:blipFill>
-              <a:blip r:embed="rId14">
-                <a:extLst>
-                  <a:ext uri="{28A0092B-C50C-407E-A947-70E740481C1C}">
-                    <a14:useLocalDpi xmlns:a14="http://schemas.microsoft.com/office/drawing/2010/main" val="0"/>
-                  </a:ext>
-                  <a:ext uri="{96DAC541-7B7A-43D3-8B79-37D633B846F1}">
-                    <asvg:svgBlip xmlns:asvg="http://schemas.microsoft.com/office/drawing/2016/SVG/main" r:embed="rId15"/>
-                  </a:ext>
-                </a:extLst>
-              </a:blip>
-              <a:stretch>
-                <a:fillRect/>
-              </a:stretch>
-            </p:blipFill>
-            <p:spPr>
-              <a:xfrm>
-                <a:off x="7858812" y="3986501"/>
-                <a:ext cx="476250" cy="476250"/>
-              </a:xfrm>
-              <a:prstGeom prst="rect">
-                <a:avLst/>
-              </a:prstGeom>
-            </p:spPr>
-          </p:pic>
-        </p:grpSp>
-      </p:grpSp>
-      <p:pic>
-        <p:nvPicPr>
-          <p:cNvPr id="30" name="Graphic 29">
-            <a:extLst>
-              <a:ext uri="{FF2B5EF4-FFF2-40B4-BE49-F238E27FC236}">
-                <a16:creationId xmlns:a16="http://schemas.microsoft.com/office/drawing/2014/main" id="{A297AF32-D8A2-4423-B36B-CE86473A2088}"/>
-              </a:ext>
-            </a:extLst>
-          </p:cNvPr>
-          <p:cNvPicPr>
-            <a:picLocks noChangeAspect="1"/>
-          </p:cNvPicPr>
-          <p:nvPr/>
-        </p:nvPicPr>
-        <p:blipFill>
-          <a:blip r:embed="rId3">
-            <a:extLst>
-              <a:ext uri="{28A0092B-C50C-407E-A947-70E740481C1C}">
-                <a14:useLocalDpi xmlns:a14="http://schemas.microsoft.com/office/drawing/2010/main" val="0"/>
-              </a:ext>
-              <a:ext uri="{96DAC541-7B7A-43D3-8B79-37D633B846F1}">
-                <asvg:svgBlip xmlns:asvg="http://schemas.microsoft.com/office/drawing/2016/SVG/main" r:embed="rId4"/>
-              </a:ext>
-            </a:extLst>
-          </a:blip>
-          <a:stretch>
-            <a:fillRect/>
-          </a:stretch>
-        </p:blipFill>
-        <p:spPr>
-          <a:xfrm>
-            <a:off x="10573510" y="3559685"/>
-            <a:ext cx="780290" cy="780290"/>
-          </a:xfrm>
-          <a:prstGeom prst="rect">
-            <a:avLst/>
-          </a:prstGeom>
-        </p:spPr>
-      </p:pic>
-      <p:pic>
-        <p:nvPicPr>
-          <p:cNvPr id="1026" name="Picture 2">
-            <a:extLst>
-              <a:ext uri="{FF2B5EF4-FFF2-40B4-BE49-F238E27FC236}">
-                <a16:creationId xmlns:a16="http://schemas.microsoft.com/office/drawing/2014/main" id="{84738135-B527-4325-8D62-F8B9B9D1984A}"/>
-              </a:ext>
-            </a:extLst>
-          </p:cNvPr>
-          <p:cNvPicPr>
-            <a:picLocks noChangeAspect="1" noChangeArrowheads="1"/>
-          </p:cNvPicPr>
-          <p:nvPr/>
-        </p:nvPicPr>
-        <p:blipFill>
-          <a:blip r:embed="rId16">
-            <a:extLst>
-              <a:ext uri="{28A0092B-C50C-407E-A947-70E740481C1C}">
-                <a14:useLocalDpi xmlns:a14="http://schemas.microsoft.com/office/drawing/2010/main" val="0"/>
-              </a:ext>
-            </a:extLst>
-          </a:blip>
-          <a:srcRect/>
-          <a:stretch>
-            <a:fillRect/>
-          </a:stretch>
-        </p:blipFill>
-        <p:spPr bwMode="auto">
-          <a:xfrm>
-            <a:off x="2623349" y="862903"/>
-            <a:ext cx="814057" cy="987144"/>
-          </a:xfrm>
-          <a:prstGeom prst="rect">
-            <a:avLst/>
-          </a:prstGeom>
-          <a:noFill/>
-          <a:extLst>
-            <a:ext uri="{909E8E84-426E-40DD-AFC4-6F175D3DCCD1}">
-              <a14:hiddenFill xmlns:a14="http://schemas.microsoft.com/office/drawing/2010/main">
-                <a:solidFill>
-                  <a:srgbClr val="FFFFFF"/>
-                </a:solidFill>
-              </a14:hiddenFill>
-            </a:ext>
-          </a:extLst>
-        </p:spPr>
-      </p:pic>
-      <p:pic>
-        <p:nvPicPr>
-          <p:cNvPr id="32" name="Graphic 31">
-            <a:extLst>
-              <a:ext uri="{FF2B5EF4-FFF2-40B4-BE49-F238E27FC236}">
-                <a16:creationId xmlns:a16="http://schemas.microsoft.com/office/drawing/2014/main" id="{AAF0FC8B-CA83-4A8E-A2F7-220F96B6E74A}"/>
-              </a:ext>
-            </a:extLst>
-          </p:cNvPr>
-          <p:cNvPicPr>
-            <a:picLocks noChangeAspect="1"/>
-          </p:cNvPicPr>
-          <p:nvPr/>
-        </p:nvPicPr>
-        <p:blipFill>
-          <a:blip r:embed="rId17">
-            <a:extLst>
-              <a:ext uri="{28A0092B-C50C-407E-A947-70E740481C1C}">
-                <a14:useLocalDpi xmlns:a14="http://schemas.microsoft.com/office/drawing/2010/main" val="0"/>
-              </a:ext>
-              <a:ext uri="{96DAC541-7B7A-43D3-8B79-37D633B846F1}">
-                <asvg:svgBlip xmlns:asvg="http://schemas.microsoft.com/office/drawing/2016/SVG/main" r:embed="rId18"/>
-              </a:ext>
-            </a:extLst>
-          </a:blip>
-          <a:stretch>
-            <a:fillRect/>
-          </a:stretch>
-        </p:blipFill>
-        <p:spPr>
-          <a:xfrm>
-            <a:off x="10573509" y="965778"/>
-            <a:ext cx="780095" cy="781393"/>
-          </a:xfrm>
-          <a:prstGeom prst="rect">
-            <a:avLst/>
-          </a:prstGeom>
-        </p:spPr>
-      </p:pic>
-      <p:pic>
-        <p:nvPicPr>
-          <p:cNvPr id="40" name="Picture 39" descr="A picture containing drawing, clock&#10;&#10;Description automatically generated">
-            <a:extLst>
-              <a:ext uri="{FF2B5EF4-FFF2-40B4-BE49-F238E27FC236}">
-                <a16:creationId xmlns:a16="http://schemas.microsoft.com/office/drawing/2014/main" id="{893951CC-E62C-48AE-B7E2-F096699C2CF3}"/>
-              </a:ext>
-            </a:extLst>
-          </p:cNvPr>
-          <p:cNvPicPr>
-            <a:picLocks noChangeAspect="1"/>
-          </p:cNvPicPr>
-          <p:nvPr/>
-        </p:nvPicPr>
-        <p:blipFill>
-          <a:blip r:embed="rId19">
-            <a:extLst>
-              <a:ext uri="{28A0092B-C50C-407E-A947-70E740481C1C}">
-                <a14:useLocalDpi xmlns:a14="http://schemas.microsoft.com/office/drawing/2010/main" val="0"/>
-              </a:ext>
-            </a:extLst>
-          </a:blip>
-          <a:stretch>
-            <a:fillRect/>
-          </a:stretch>
-        </p:blipFill>
-        <p:spPr>
-          <a:xfrm>
-            <a:off x="935616" y="506028"/>
-            <a:ext cx="390153" cy="390153"/>
-          </a:xfrm>
-          <a:prstGeom prst="rect">
-            <a:avLst/>
-          </a:prstGeom>
-        </p:spPr>
-      </p:pic>
-      <p:pic>
-        <p:nvPicPr>
-          <p:cNvPr id="42" name="Picture 41" descr="A picture containing clock&#10;&#10;Description automatically generated">
-            <a:extLst>
-              <a:ext uri="{FF2B5EF4-FFF2-40B4-BE49-F238E27FC236}">
-                <a16:creationId xmlns:a16="http://schemas.microsoft.com/office/drawing/2014/main" id="{79BA6822-C72A-4838-A922-66E4DB0E55AC}"/>
-              </a:ext>
-            </a:extLst>
-          </p:cNvPr>
-          <p:cNvPicPr>
-            <a:picLocks noChangeAspect="1"/>
-          </p:cNvPicPr>
-          <p:nvPr/>
-        </p:nvPicPr>
-        <p:blipFill>
-          <a:blip r:embed="rId20">
-            <a:extLst>
-              <a:ext uri="{28A0092B-C50C-407E-A947-70E740481C1C}">
-                <a14:useLocalDpi xmlns:a14="http://schemas.microsoft.com/office/drawing/2010/main" val="0"/>
-              </a:ext>
-            </a:extLst>
-          </a:blip>
-          <a:stretch>
-            <a:fillRect/>
-          </a:stretch>
-        </p:blipFill>
-        <p:spPr>
-          <a:xfrm>
-            <a:off x="2727199" y="507535"/>
-            <a:ext cx="390153" cy="390153"/>
-          </a:xfrm>
-          <a:prstGeom prst="rect">
-            <a:avLst/>
-          </a:prstGeom>
-        </p:spPr>
-      </p:pic>
-      <p:pic>
-        <p:nvPicPr>
-          <p:cNvPr id="44" name="Picture 43" descr="A close up of a logo&#10;&#10;Description automatically generated">
-            <a:extLst>
-              <a:ext uri="{FF2B5EF4-FFF2-40B4-BE49-F238E27FC236}">
-                <a16:creationId xmlns:a16="http://schemas.microsoft.com/office/drawing/2014/main" id="{9C7E8CA2-5F1E-4E2F-8888-3197EBCE7171}"/>
-              </a:ext>
-            </a:extLst>
-          </p:cNvPr>
-          <p:cNvPicPr>
-            <a:picLocks noChangeAspect="1"/>
-          </p:cNvPicPr>
-          <p:nvPr/>
-        </p:nvPicPr>
-        <p:blipFill>
-          <a:blip r:embed="rId21">
-            <a:extLst>
-              <a:ext uri="{28A0092B-C50C-407E-A947-70E740481C1C}">
-                <a14:useLocalDpi xmlns:a14="http://schemas.microsoft.com/office/drawing/2010/main" val="0"/>
-              </a:ext>
-            </a:extLst>
-          </a:blip>
-          <a:stretch>
-            <a:fillRect/>
-          </a:stretch>
-        </p:blipFill>
-        <p:spPr>
-          <a:xfrm>
-            <a:off x="4881200" y="506028"/>
-            <a:ext cx="390153" cy="390153"/>
-          </a:xfrm>
-          <a:prstGeom prst="rect">
-            <a:avLst/>
-          </a:prstGeom>
-        </p:spPr>
-      </p:pic>
-      <p:pic>
-        <p:nvPicPr>
-          <p:cNvPr id="46" name="Picture 45" descr="A picture containing object, drawing, clock&#10;&#10;Description automatically generated">
-            <a:extLst>
-              <a:ext uri="{FF2B5EF4-FFF2-40B4-BE49-F238E27FC236}">
-                <a16:creationId xmlns:a16="http://schemas.microsoft.com/office/drawing/2014/main" id="{4F6779B2-2CDD-466E-BE8D-3DC3B38B185F}"/>
-              </a:ext>
-            </a:extLst>
-          </p:cNvPr>
-          <p:cNvPicPr>
-            <a:picLocks noChangeAspect="1"/>
-          </p:cNvPicPr>
-          <p:nvPr/>
-        </p:nvPicPr>
-        <p:blipFill>
-          <a:blip r:embed="rId22">
-            <a:extLst>
-              <a:ext uri="{28A0092B-C50C-407E-A947-70E740481C1C}">
-                <a14:useLocalDpi xmlns:a14="http://schemas.microsoft.com/office/drawing/2010/main" val="0"/>
-              </a:ext>
-            </a:extLst>
-          </a:blip>
-          <a:stretch>
-            <a:fillRect/>
-          </a:stretch>
-        </p:blipFill>
-        <p:spPr>
-          <a:xfrm>
-            <a:off x="6802982" y="506028"/>
-            <a:ext cx="390153" cy="390153"/>
-          </a:xfrm>
-          <a:prstGeom prst="rect">
-            <a:avLst/>
-          </a:prstGeom>
-        </p:spPr>
-      </p:pic>
-      <p:pic>
-        <p:nvPicPr>
-          <p:cNvPr id="48" name="Picture 47" descr="A picture containing game&#10;&#10;Description automatically generated">
-            <a:extLst>
-              <a:ext uri="{FF2B5EF4-FFF2-40B4-BE49-F238E27FC236}">
-                <a16:creationId xmlns:a16="http://schemas.microsoft.com/office/drawing/2014/main" id="{FF03DBD6-CC50-4A97-BD33-82244A6C7E6F}"/>
-              </a:ext>
-            </a:extLst>
-          </p:cNvPr>
-          <p:cNvPicPr>
-            <a:picLocks noChangeAspect="1"/>
-          </p:cNvPicPr>
-          <p:nvPr/>
-        </p:nvPicPr>
-        <p:blipFill>
-          <a:blip r:embed="rId23">
-            <a:extLst>
-              <a:ext uri="{28A0092B-C50C-407E-A947-70E740481C1C}">
-                <a14:useLocalDpi xmlns:a14="http://schemas.microsoft.com/office/drawing/2010/main" val="0"/>
-              </a:ext>
-            </a:extLst>
-          </a:blip>
-          <a:stretch>
-            <a:fillRect/>
-          </a:stretch>
-        </p:blipFill>
-        <p:spPr>
-          <a:xfrm>
-            <a:off x="8650677" y="506352"/>
-            <a:ext cx="390153" cy="390153"/>
-          </a:xfrm>
-          <a:prstGeom prst="rect">
-            <a:avLst/>
-          </a:prstGeom>
-        </p:spPr>
-      </p:pic>
-      <p:pic>
-        <p:nvPicPr>
-          <p:cNvPr id="50" name="Picture 49" descr="A close up of a logo&#10;&#10;Description automatically generated">
-            <a:extLst>
-              <a:ext uri="{FF2B5EF4-FFF2-40B4-BE49-F238E27FC236}">
-                <a16:creationId xmlns:a16="http://schemas.microsoft.com/office/drawing/2014/main" id="{779F2AB2-CDEF-415F-AE8D-58D363E55E56}"/>
-              </a:ext>
-            </a:extLst>
-          </p:cNvPr>
-          <p:cNvPicPr>
-            <a:picLocks noChangeAspect="1"/>
-          </p:cNvPicPr>
-          <p:nvPr/>
-        </p:nvPicPr>
-        <p:blipFill>
-          <a:blip r:embed="rId24">
-            <a:extLst>
-              <a:ext uri="{28A0092B-C50C-407E-A947-70E740481C1C}">
-                <a14:useLocalDpi xmlns:a14="http://schemas.microsoft.com/office/drawing/2010/main" val="0"/>
-              </a:ext>
-            </a:extLst>
-          </a:blip>
-          <a:stretch>
-            <a:fillRect/>
-          </a:stretch>
-        </p:blipFill>
-        <p:spPr>
-          <a:xfrm>
-            <a:off x="10768479" y="506027"/>
-            <a:ext cx="390153" cy="390153"/>
-          </a:xfrm>
-          <a:prstGeom prst="rect">
-            <a:avLst/>
-          </a:prstGeom>
-        </p:spPr>
-      </p:pic>
-      <p:pic>
-        <p:nvPicPr>
-          <p:cNvPr id="54" name="Picture 53" descr="A picture containing drawing&#10;&#10;Description automatically generated">
-            <a:extLst>
-              <a:ext uri="{FF2B5EF4-FFF2-40B4-BE49-F238E27FC236}">
-                <a16:creationId xmlns:a16="http://schemas.microsoft.com/office/drawing/2014/main" id="{B5C6B40D-2E6C-4A97-B379-4D03C27B58D2}"/>
-              </a:ext>
-            </a:extLst>
-          </p:cNvPr>
-          <p:cNvPicPr>
-            <a:picLocks noChangeAspect="1"/>
-          </p:cNvPicPr>
-          <p:nvPr/>
-        </p:nvPicPr>
-        <p:blipFill>
-          <a:blip r:embed="rId25">
-            <a:extLst>
-              <a:ext uri="{28A0092B-C50C-407E-A947-70E740481C1C}">
-                <a14:useLocalDpi xmlns:a14="http://schemas.microsoft.com/office/drawing/2010/main" val="0"/>
-              </a:ext>
-            </a:extLst>
-          </a:blip>
-          <a:stretch>
-            <a:fillRect/>
-          </a:stretch>
-        </p:blipFill>
-        <p:spPr>
-          <a:xfrm>
-            <a:off x="10768478" y="3019041"/>
-            <a:ext cx="390153" cy="390153"/>
-          </a:xfrm>
-          <a:prstGeom prst="rect">
-            <a:avLst/>
-          </a:prstGeom>
-        </p:spPr>
-      </p:pic>
-      <p:pic>
-        <p:nvPicPr>
-          <p:cNvPr id="56" name="Picture 55" descr="A close up of a logo&#10;&#10;Description automatically generated">
-            <a:extLst>
-              <a:ext uri="{FF2B5EF4-FFF2-40B4-BE49-F238E27FC236}">
-                <a16:creationId xmlns:a16="http://schemas.microsoft.com/office/drawing/2014/main" id="{4B7097A5-180E-461B-B13C-0CC5B836DD40}"/>
-              </a:ext>
-            </a:extLst>
-          </p:cNvPr>
-          <p:cNvPicPr>
-            <a:picLocks noChangeAspect="1"/>
-          </p:cNvPicPr>
-          <p:nvPr/>
-        </p:nvPicPr>
-        <p:blipFill>
-          <a:blip r:embed="rId26">
-            <a:extLst>
-              <a:ext uri="{28A0092B-C50C-407E-A947-70E740481C1C}">
-                <a14:useLocalDpi xmlns:a14="http://schemas.microsoft.com/office/drawing/2010/main" val="0"/>
-              </a:ext>
-            </a:extLst>
-          </a:blip>
-          <a:stretch>
-            <a:fillRect/>
-          </a:stretch>
-        </p:blipFill>
-        <p:spPr>
-          <a:xfrm>
-            <a:off x="5933633" y="3023311"/>
-            <a:ext cx="390153" cy="390153"/>
-          </a:xfrm>
-          <a:prstGeom prst="rect">
-            <a:avLst/>
-          </a:prstGeom>
-        </p:spPr>
-      </p:pic>
-      <p:sp>
-        <p:nvSpPr>
-          <p:cNvPr id="57" name="TextBox 56">
-            <a:extLst>
-              <a:ext uri="{FF2B5EF4-FFF2-40B4-BE49-F238E27FC236}">
-                <a16:creationId xmlns:a16="http://schemas.microsoft.com/office/drawing/2014/main" id="{24801AF1-40F5-4B78-8B88-3B17F07F3996}"/>
-              </a:ext>
-            </a:extLst>
-          </p:cNvPr>
-          <p:cNvSpPr txBox="1"/>
-          <p:nvPr/>
-        </p:nvSpPr>
-        <p:spPr>
-          <a:xfrm>
-            <a:off x="648070" y="1926452"/>
-            <a:ext cx="1111202" cy="369332"/>
-          </a:xfrm>
-          <a:prstGeom prst="rect">
-            <a:avLst/>
-          </a:prstGeom>
-          <a:noFill/>
-        </p:spPr>
-        <p:txBody>
-          <a:bodyPr wrap="none" rtlCol="0">
-            <a:spAutoFit/>
-          </a:bodyPr>
-          <a:lstStyle/>
-          <a:p>
-            <a:pPr marL="0" marR="0" lvl="0" indent="0" algn="ctr" defTabSz="914400" rtl="0" eaLnBrk="1" fontAlgn="auto" latinLnBrk="0" hangingPunct="1">
-              <a:lnSpc>
-                <a:spcPct val="100000"/>
-              </a:lnSpc>
-              <a:spcBef>
-                <a:spcPts val="0"/>
-              </a:spcBef>
-              <a:spcAft>
-                <a:spcPts val="0"/>
-              </a:spcAft>
-              <a:buClrTx/>
-              <a:buSzTx/>
-              <a:buFontTx/>
-              <a:buNone/>
-              <a:tabLst/>
-              <a:defRPr/>
-            </a:pPr>
-            <a:r>
-              <a:rPr kumimoji="0" lang="en-IN" sz="900" b="0" i="0" u="none" strike="noStrike" kern="1200" cap="none" spc="0" normalizeH="0" baseline="0" noProof="0" dirty="0">
-                <a:ln>
-                  <a:noFill/>
-                </a:ln>
-                <a:solidFill>
-                  <a:srgbClr val="0070C0"/>
-                </a:solidFill>
-                <a:effectLst/>
-                <a:uLnTx/>
-                <a:uFillTx/>
-                <a:latin typeface="Verdana" panose="020B0604030504040204" pitchFamily="34" charset="0"/>
-                <a:ea typeface="Verdana" panose="020B0604030504040204" pitchFamily="34" charset="0"/>
-                <a:cs typeface="+mn-cs"/>
-              </a:rPr>
-              <a:t>Feature Branch </a:t>
-            </a:r>
-          </a:p>
-          <a:p>
-            <a:pPr marL="0" marR="0" lvl="0" indent="0" algn="ctr" defTabSz="914400" rtl="0" eaLnBrk="1" fontAlgn="auto" latinLnBrk="0" hangingPunct="1">
-              <a:lnSpc>
-                <a:spcPct val="100000"/>
-              </a:lnSpc>
-              <a:spcBef>
-                <a:spcPts val="0"/>
-              </a:spcBef>
-              <a:spcAft>
-                <a:spcPts val="0"/>
-              </a:spcAft>
-              <a:buClrTx/>
-              <a:buSzTx/>
-              <a:buFontTx/>
-              <a:buNone/>
-              <a:tabLst/>
-              <a:defRPr/>
-            </a:pPr>
-            <a:r>
-              <a:rPr kumimoji="0" lang="en-IN" sz="900" b="0" i="0" u="none" strike="noStrike" kern="1200" cap="none" spc="0" normalizeH="0" baseline="0" noProof="0" dirty="0">
-                <a:ln>
-                  <a:noFill/>
-                </a:ln>
-                <a:solidFill>
-                  <a:srgbClr val="0070C0"/>
-                </a:solidFill>
-                <a:effectLst/>
-                <a:uLnTx/>
-                <a:uFillTx/>
-                <a:latin typeface="Verdana" panose="020B0604030504040204" pitchFamily="34" charset="0"/>
-                <a:ea typeface="Verdana" panose="020B0604030504040204" pitchFamily="34" charset="0"/>
-                <a:cs typeface="+mn-cs"/>
-              </a:rPr>
-              <a:t>Code </a:t>
-            </a:r>
-          </a:p>
-        </p:txBody>
-      </p:sp>
-      <p:sp>
-        <p:nvSpPr>
-          <p:cNvPr id="59" name="TextBox 58">
-            <a:extLst>
-              <a:ext uri="{FF2B5EF4-FFF2-40B4-BE49-F238E27FC236}">
-                <a16:creationId xmlns:a16="http://schemas.microsoft.com/office/drawing/2014/main" id="{8C126E89-A1A7-4EB3-9DEC-44A16C851BD3}"/>
-              </a:ext>
-            </a:extLst>
-          </p:cNvPr>
-          <p:cNvSpPr txBox="1"/>
-          <p:nvPr/>
-        </p:nvSpPr>
-        <p:spPr>
-          <a:xfrm>
-            <a:off x="2601105" y="1927929"/>
-            <a:ext cx="901209" cy="230832"/>
-          </a:xfrm>
-          <a:prstGeom prst="rect">
-            <a:avLst/>
-          </a:prstGeom>
-          <a:noFill/>
-        </p:spPr>
-        <p:txBody>
-          <a:bodyPr wrap="none" rtlCol="0">
-            <a:spAutoFit/>
-          </a:bodyPr>
-          <a:lstStyle/>
-          <a:p>
-            <a:pPr marL="0" marR="0" lvl="0" indent="0" algn="ctr" defTabSz="914400" rtl="0" eaLnBrk="1" fontAlgn="auto" latinLnBrk="0" hangingPunct="1">
-              <a:lnSpc>
-                <a:spcPct val="100000"/>
-              </a:lnSpc>
-              <a:spcBef>
-                <a:spcPts val="0"/>
-              </a:spcBef>
-              <a:spcAft>
-                <a:spcPts val="0"/>
-              </a:spcAft>
-              <a:buClrTx/>
-              <a:buSzTx/>
-              <a:buFontTx/>
-              <a:buNone/>
-              <a:tabLst/>
-              <a:defRPr/>
-            </a:pPr>
-            <a:r>
-              <a:rPr kumimoji="0" lang="en-IN" sz="900" b="0" i="0" u="none" strike="noStrike" kern="1200" cap="none" spc="0" normalizeH="0" baseline="0" noProof="0" dirty="0">
-                <a:ln>
-                  <a:noFill/>
-                </a:ln>
-                <a:solidFill>
-                  <a:srgbClr val="0070C0"/>
-                </a:solidFill>
-                <a:effectLst/>
-                <a:uLnTx/>
-                <a:uFillTx/>
-                <a:latin typeface="Verdana" panose="020B0604030504040204" pitchFamily="34" charset="0"/>
-                <a:ea typeface="Verdana" panose="020B0604030504040204" pitchFamily="34" charset="0"/>
-                <a:cs typeface="+mn-cs"/>
-              </a:rPr>
-              <a:t>Pull Request</a:t>
-            </a:r>
-          </a:p>
-        </p:txBody>
-      </p:sp>
-      <p:sp>
-        <p:nvSpPr>
-          <p:cNvPr id="60" name="TextBox 59">
-            <a:extLst>
-              <a:ext uri="{FF2B5EF4-FFF2-40B4-BE49-F238E27FC236}">
-                <a16:creationId xmlns:a16="http://schemas.microsoft.com/office/drawing/2014/main" id="{DBCFAD7A-E88C-4A0F-A610-6CBE85188BB1}"/>
-              </a:ext>
-            </a:extLst>
-          </p:cNvPr>
-          <p:cNvSpPr txBox="1"/>
-          <p:nvPr/>
-        </p:nvSpPr>
-        <p:spPr>
-          <a:xfrm>
-            <a:off x="4602471" y="1927928"/>
-            <a:ext cx="857927" cy="230832"/>
-          </a:xfrm>
-          <a:prstGeom prst="rect">
-            <a:avLst/>
-          </a:prstGeom>
-          <a:noFill/>
-        </p:spPr>
-        <p:txBody>
-          <a:bodyPr wrap="none" rtlCol="0">
-            <a:spAutoFit/>
-          </a:bodyPr>
-          <a:lstStyle/>
-          <a:p>
-            <a:pPr marL="0" marR="0" lvl="0" indent="0" algn="ctr" defTabSz="914400" rtl="0" eaLnBrk="1" fontAlgn="auto" latinLnBrk="0" hangingPunct="1">
-              <a:lnSpc>
-                <a:spcPct val="100000"/>
-              </a:lnSpc>
-              <a:spcBef>
-                <a:spcPts val="0"/>
-              </a:spcBef>
-              <a:spcAft>
-                <a:spcPts val="0"/>
-              </a:spcAft>
-              <a:buClrTx/>
-              <a:buSzTx/>
-              <a:buFontTx/>
-              <a:buNone/>
-              <a:tabLst/>
-              <a:defRPr/>
-            </a:pPr>
-            <a:r>
-              <a:rPr kumimoji="0" lang="en-IN" sz="900" b="0" i="0" u="none" strike="noStrike" kern="1200" cap="none" spc="0" normalizeH="0" baseline="0" noProof="0" dirty="0">
-                <a:ln>
-                  <a:noFill/>
-                </a:ln>
-                <a:solidFill>
-                  <a:srgbClr val="0070C0"/>
-                </a:solidFill>
-                <a:effectLst/>
-                <a:uLnTx/>
-                <a:uFillTx/>
-                <a:latin typeface="Verdana" panose="020B0604030504040204" pitchFamily="34" charset="0"/>
-                <a:ea typeface="Verdana" panose="020B0604030504040204" pitchFamily="34" charset="0"/>
-                <a:cs typeface="+mn-cs"/>
-              </a:rPr>
-              <a:t>Gated Build</a:t>
-            </a:r>
-          </a:p>
-        </p:txBody>
-      </p:sp>
-      <p:sp>
-        <p:nvSpPr>
-          <p:cNvPr id="61" name="TextBox 60">
-            <a:extLst>
-              <a:ext uri="{FF2B5EF4-FFF2-40B4-BE49-F238E27FC236}">
-                <a16:creationId xmlns:a16="http://schemas.microsoft.com/office/drawing/2014/main" id="{82C61609-CC07-4FD7-9C30-D031271928D1}"/>
-              </a:ext>
-            </a:extLst>
-          </p:cNvPr>
-          <p:cNvSpPr txBox="1"/>
-          <p:nvPr/>
-        </p:nvSpPr>
-        <p:spPr>
-          <a:xfrm>
-            <a:off x="6518198" y="1927932"/>
-            <a:ext cx="1021433" cy="230832"/>
-          </a:xfrm>
-          <a:prstGeom prst="rect">
-            <a:avLst/>
-          </a:prstGeom>
-          <a:noFill/>
-        </p:spPr>
-        <p:txBody>
-          <a:bodyPr wrap="none" rtlCol="0">
-            <a:spAutoFit/>
-          </a:bodyPr>
-          <a:lstStyle/>
-          <a:p>
-            <a:pPr marL="0" marR="0" lvl="0" indent="0" algn="ctr" defTabSz="914400" rtl="0" eaLnBrk="1" fontAlgn="auto" latinLnBrk="0" hangingPunct="1">
-              <a:lnSpc>
-                <a:spcPct val="100000"/>
-              </a:lnSpc>
-              <a:spcBef>
-                <a:spcPts val="0"/>
-              </a:spcBef>
-              <a:spcAft>
-                <a:spcPts val="0"/>
-              </a:spcAft>
-              <a:buClrTx/>
-              <a:buSzTx/>
-              <a:buFontTx/>
-              <a:buNone/>
-              <a:tabLst/>
-              <a:defRPr/>
-            </a:pPr>
-            <a:r>
-              <a:rPr kumimoji="0" lang="en-IN" sz="900" b="0" i="0" u="none" strike="noStrike" kern="1200" cap="none" spc="0" normalizeH="0" baseline="0" noProof="0" dirty="0">
-                <a:ln>
-                  <a:noFill/>
-                </a:ln>
-                <a:solidFill>
-                  <a:srgbClr val="0070C0"/>
-                </a:solidFill>
-                <a:effectLst/>
-                <a:uLnTx/>
-                <a:uFillTx/>
-                <a:latin typeface="Verdana" panose="020B0604030504040204" pitchFamily="34" charset="0"/>
-                <a:ea typeface="Verdana" panose="020B0604030504040204" pitchFamily="34" charset="0"/>
-                <a:cs typeface="+mn-cs"/>
-              </a:rPr>
-              <a:t>Master Branch</a:t>
-            </a:r>
-          </a:p>
-        </p:txBody>
-      </p:sp>
-      <p:sp>
-        <p:nvSpPr>
-          <p:cNvPr id="62" name="TextBox 61">
-            <a:extLst>
-              <a:ext uri="{FF2B5EF4-FFF2-40B4-BE49-F238E27FC236}">
-                <a16:creationId xmlns:a16="http://schemas.microsoft.com/office/drawing/2014/main" id="{249C46EA-9E6D-44DB-8464-705398B77D4A}"/>
-              </a:ext>
-            </a:extLst>
-          </p:cNvPr>
-          <p:cNvSpPr txBox="1"/>
-          <p:nvPr/>
-        </p:nvSpPr>
-        <p:spPr>
-          <a:xfrm>
-            <a:off x="8474817" y="1927931"/>
-            <a:ext cx="641522" cy="230832"/>
-          </a:xfrm>
-          <a:prstGeom prst="rect">
-            <a:avLst/>
-          </a:prstGeom>
-          <a:noFill/>
-        </p:spPr>
-        <p:txBody>
-          <a:bodyPr wrap="none" rtlCol="0">
-            <a:spAutoFit/>
-          </a:bodyPr>
-          <a:lstStyle/>
-          <a:p>
-            <a:pPr marL="0" marR="0" lvl="0" indent="0" algn="ctr" defTabSz="914400" rtl="0" eaLnBrk="1" fontAlgn="auto" latinLnBrk="0" hangingPunct="1">
-              <a:lnSpc>
-                <a:spcPct val="100000"/>
-              </a:lnSpc>
-              <a:spcBef>
-                <a:spcPts val="0"/>
-              </a:spcBef>
-              <a:spcAft>
-                <a:spcPts val="0"/>
-              </a:spcAft>
-              <a:buClrTx/>
-              <a:buSzTx/>
-              <a:buFontTx/>
-              <a:buNone/>
-              <a:tabLst/>
-              <a:defRPr/>
-            </a:pPr>
-            <a:r>
-              <a:rPr kumimoji="0" lang="en-IN" sz="900" b="0" i="0" u="none" strike="noStrike" kern="1200" cap="none" spc="0" normalizeH="0" baseline="0" noProof="0" dirty="0">
-                <a:ln>
-                  <a:noFill/>
-                </a:ln>
-                <a:solidFill>
-                  <a:srgbClr val="0070C0"/>
-                </a:solidFill>
-                <a:effectLst/>
-                <a:uLnTx/>
-                <a:uFillTx/>
-                <a:latin typeface="Verdana" panose="020B0604030504040204" pitchFamily="34" charset="0"/>
-                <a:ea typeface="Verdana" panose="020B0604030504040204" pitchFamily="34" charset="0"/>
-                <a:cs typeface="+mn-cs"/>
-              </a:rPr>
-              <a:t>CI Build</a:t>
-            </a:r>
-          </a:p>
-        </p:txBody>
-      </p:sp>
-      <p:sp>
-        <p:nvSpPr>
-          <p:cNvPr id="63" name="TextBox 62">
-            <a:extLst>
-              <a:ext uri="{FF2B5EF4-FFF2-40B4-BE49-F238E27FC236}">
-                <a16:creationId xmlns:a16="http://schemas.microsoft.com/office/drawing/2014/main" id="{42143B6B-0DBF-411D-B5F8-55CC77C45241}"/>
-              </a:ext>
-            </a:extLst>
-          </p:cNvPr>
-          <p:cNvSpPr txBox="1"/>
-          <p:nvPr/>
-        </p:nvSpPr>
-        <p:spPr>
-          <a:xfrm>
-            <a:off x="10484864" y="1927928"/>
-            <a:ext cx="1007007" cy="230832"/>
-          </a:xfrm>
-          <a:prstGeom prst="rect">
-            <a:avLst/>
-          </a:prstGeom>
-          <a:noFill/>
-        </p:spPr>
-        <p:txBody>
-          <a:bodyPr wrap="none" rtlCol="0">
-            <a:spAutoFit/>
-          </a:bodyPr>
-          <a:lstStyle/>
-          <a:p>
-            <a:pPr marL="0" marR="0" lvl="0" indent="0" algn="ctr" defTabSz="914400" rtl="0" eaLnBrk="1" fontAlgn="auto" latinLnBrk="0" hangingPunct="1">
-              <a:lnSpc>
-                <a:spcPct val="100000"/>
-              </a:lnSpc>
-              <a:spcBef>
-                <a:spcPts val="0"/>
-              </a:spcBef>
-              <a:spcAft>
-                <a:spcPts val="0"/>
-              </a:spcAft>
-              <a:buClrTx/>
-              <a:buSzTx/>
-              <a:buFontTx/>
-              <a:buNone/>
-              <a:tabLst/>
-              <a:defRPr/>
-            </a:pPr>
-            <a:r>
-              <a:rPr kumimoji="0" lang="en-IN" sz="900" b="0" i="0" u="none" strike="noStrike" kern="1200" cap="none" spc="0" normalizeH="0" baseline="0" noProof="0" dirty="0">
-                <a:ln>
-                  <a:noFill/>
-                </a:ln>
-                <a:solidFill>
-                  <a:srgbClr val="0070C0"/>
-                </a:solidFill>
-                <a:effectLst/>
-                <a:uLnTx/>
-                <a:uFillTx/>
-                <a:latin typeface="Verdana" panose="020B0604030504040204" pitchFamily="34" charset="0"/>
-                <a:ea typeface="Verdana" panose="020B0604030504040204" pitchFamily="34" charset="0"/>
-                <a:cs typeface="+mn-cs"/>
-              </a:rPr>
-              <a:t>Artefacts drop</a:t>
-            </a:r>
-          </a:p>
-        </p:txBody>
-      </p:sp>
-      <p:sp>
-        <p:nvSpPr>
-          <p:cNvPr id="64" name="TextBox 63">
-            <a:extLst>
-              <a:ext uri="{FF2B5EF4-FFF2-40B4-BE49-F238E27FC236}">
-                <a16:creationId xmlns:a16="http://schemas.microsoft.com/office/drawing/2014/main" id="{1B214976-97E2-44AA-89EE-93858B032AF0}"/>
-              </a:ext>
-            </a:extLst>
-          </p:cNvPr>
-          <p:cNvSpPr txBox="1"/>
-          <p:nvPr/>
-        </p:nvSpPr>
-        <p:spPr>
-          <a:xfrm>
-            <a:off x="10673090" y="4406279"/>
-            <a:ext cx="633507" cy="230832"/>
-          </a:xfrm>
-          <a:prstGeom prst="rect">
-            <a:avLst/>
-          </a:prstGeom>
-          <a:noFill/>
-        </p:spPr>
-        <p:txBody>
-          <a:bodyPr wrap="none" rtlCol="0">
-            <a:spAutoFit/>
-          </a:bodyPr>
-          <a:lstStyle/>
-          <a:p>
-            <a:pPr marL="0" marR="0" lvl="0" indent="0" algn="ctr" defTabSz="914400" rtl="0" eaLnBrk="1" fontAlgn="auto" latinLnBrk="0" hangingPunct="1">
-              <a:lnSpc>
-                <a:spcPct val="100000"/>
-              </a:lnSpc>
-              <a:spcBef>
-                <a:spcPts val="0"/>
-              </a:spcBef>
-              <a:spcAft>
-                <a:spcPts val="0"/>
-              </a:spcAft>
-              <a:buClrTx/>
-              <a:buSzTx/>
-              <a:buFontTx/>
-              <a:buNone/>
-              <a:tabLst/>
-              <a:defRPr/>
-            </a:pPr>
-            <a:r>
-              <a:rPr kumimoji="0" lang="en-IN" sz="900" b="0" i="0" u="none" strike="noStrike" kern="1200" cap="none" spc="0" normalizeH="0" baseline="0" noProof="0" dirty="0">
-                <a:ln>
-                  <a:noFill/>
-                </a:ln>
-                <a:solidFill>
-                  <a:srgbClr val="0070C0"/>
-                </a:solidFill>
-                <a:effectLst/>
-                <a:uLnTx/>
-                <a:uFillTx/>
-                <a:latin typeface="Verdana" panose="020B0604030504040204" pitchFamily="34" charset="0"/>
-                <a:ea typeface="Verdana" panose="020B0604030504040204" pitchFamily="34" charset="0"/>
-                <a:cs typeface="+mn-cs"/>
-              </a:rPr>
-              <a:t>Release</a:t>
-            </a:r>
-          </a:p>
-        </p:txBody>
-      </p:sp>
-      <p:sp>
-        <p:nvSpPr>
-          <p:cNvPr id="65" name="TextBox 64">
-            <a:extLst>
-              <a:ext uri="{FF2B5EF4-FFF2-40B4-BE49-F238E27FC236}">
-                <a16:creationId xmlns:a16="http://schemas.microsoft.com/office/drawing/2014/main" id="{B13AA115-519F-4E7B-A289-6AF4CCC85A69}"/>
-              </a:ext>
-            </a:extLst>
-          </p:cNvPr>
-          <p:cNvSpPr txBox="1"/>
-          <p:nvPr/>
-        </p:nvSpPr>
-        <p:spPr>
-          <a:xfrm>
-            <a:off x="5804273" y="3438412"/>
-            <a:ext cx="1045479" cy="230832"/>
-          </a:xfrm>
-          <a:prstGeom prst="rect">
-            <a:avLst/>
-          </a:prstGeom>
-          <a:noFill/>
-        </p:spPr>
-        <p:txBody>
-          <a:bodyPr wrap="none" rtlCol="0">
-            <a:spAutoFit/>
-          </a:bodyPr>
-          <a:lstStyle/>
-          <a:p>
-            <a:pPr marL="0" marR="0" lvl="0" indent="0" algn="ctr" defTabSz="914400" rtl="0" eaLnBrk="1" fontAlgn="auto" latinLnBrk="0" hangingPunct="1">
-              <a:lnSpc>
-                <a:spcPct val="100000"/>
-              </a:lnSpc>
-              <a:spcBef>
-                <a:spcPts val="0"/>
-              </a:spcBef>
-              <a:spcAft>
-                <a:spcPts val="0"/>
-              </a:spcAft>
-              <a:buClrTx/>
-              <a:buSzTx/>
-              <a:buFontTx/>
-              <a:buNone/>
-              <a:tabLst/>
-              <a:defRPr/>
-            </a:pPr>
-            <a:r>
-              <a:rPr kumimoji="0" lang="en-IN" sz="900" b="0" i="0" u="none" strike="noStrike" kern="1200" cap="none" spc="0" normalizeH="0" baseline="0" noProof="0" dirty="0">
-                <a:ln>
-                  <a:noFill/>
-                </a:ln>
-                <a:solidFill>
-                  <a:srgbClr val="0070C0"/>
-                </a:solidFill>
-                <a:effectLst/>
-                <a:uLnTx/>
-                <a:uFillTx/>
-                <a:latin typeface="Verdana" panose="020B0604030504040204" pitchFamily="34" charset="0"/>
-                <a:ea typeface="Verdana" panose="020B0604030504040204" pitchFamily="34" charset="0"/>
-                <a:cs typeface="+mn-cs"/>
-              </a:rPr>
-              <a:t>Environment A</a:t>
-            </a:r>
-          </a:p>
-        </p:txBody>
-      </p:sp>
-    </p:spTree>
-    <p:extLst>
-      <p:ext uri="{BB962C8B-B14F-4D97-AF65-F5344CB8AC3E}">
-        <p14:creationId xmlns:p14="http://schemas.microsoft.com/office/powerpoint/2010/main" val="2001996074"/>
       </p:ext>
     </p:extLst>
   </p:cSld>

</xml_diff>

<commit_message>
Swamy/05nov2022 session 12 first cut (#83)
* Update README.md

* Admin Work Flow

* Update Architecture.pptx
</commit_message>
<xml_diff>
--- a/Documentation/Architecture.pptx
+++ b/Documentation/Architecture.pptx
@@ -9,21 +9,22 @@
     <p:sldId id="340" r:id="rId3"/>
     <p:sldId id="349" r:id="rId4"/>
     <p:sldId id="348" r:id="rId5"/>
-    <p:sldId id="344" r:id="rId6"/>
-    <p:sldId id="256" r:id="rId7"/>
-    <p:sldId id="343" r:id="rId8"/>
-    <p:sldId id="347" r:id="rId9"/>
-    <p:sldId id="346" r:id="rId10"/>
-    <p:sldId id="345" r:id="rId11"/>
-    <p:sldId id="282" r:id="rId12"/>
-    <p:sldId id="342" r:id="rId13"/>
-    <p:sldId id="341" r:id="rId14"/>
-    <p:sldId id="335" r:id="rId15"/>
-    <p:sldId id="336" r:id="rId16"/>
-    <p:sldId id="338" r:id="rId17"/>
-    <p:sldId id="337" r:id="rId18"/>
-    <p:sldId id="339" r:id="rId19"/>
-    <p:sldId id="334" r:id="rId20"/>
+    <p:sldId id="352" r:id="rId6"/>
+    <p:sldId id="344" r:id="rId7"/>
+    <p:sldId id="256" r:id="rId8"/>
+    <p:sldId id="343" r:id="rId9"/>
+    <p:sldId id="347" r:id="rId10"/>
+    <p:sldId id="346" r:id="rId11"/>
+    <p:sldId id="345" r:id="rId12"/>
+    <p:sldId id="282" r:id="rId13"/>
+    <p:sldId id="342" r:id="rId14"/>
+    <p:sldId id="341" r:id="rId15"/>
+    <p:sldId id="335" r:id="rId16"/>
+    <p:sldId id="336" r:id="rId17"/>
+    <p:sldId id="338" r:id="rId18"/>
+    <p:sldId id="337" r:id="rId19"/>
+    <p:sldId id="339" r:id="rId20"/>
+    <p:sldId id="334" r:id="rId21"/>
   </p:sldIdLst>
   <p:sldSz cx="12192000" cy="6858000"/>
   <p:notesSz cx="6858000" cy="9144000"/>
@@ -285,7 +286,7 @@
           <a:p>
             <a:fld id="{DC2BF6E6-F863-479F-A057-0F7FF047E296}" type="datetimeFigureOut">
               <a:rPr lang="en-IN" smtClean="0"/>
-              <a:t>29-10-2022</a:t>
+              <a:t>05-11-2022</a:t>
             </a:fld>
             <a:endParaRPr lang="en-IN"/>
           </a:p>
@@ -485,7 +486,7 @@
           <a:p>
             <a:fld id="{DC2BF6E6-F863-479F-A057-0F7FF047E296}" type="datetimeFigureOut">
               <a:rPr lang="en-IN" smtClean="0"/>
-              <a:t>29-10-2022</a:t>
+              <a:t>05-11-2022</a:t>
             </a:fld>
             <a:endParaRPr lang="en-IN"/>
           </a:p>
@@ -695,7 +696,7 @@
           <a:p>
             <a:fld id="{DC2BF6E6-F863-479F-A057-0F7FF047E296}" type="datetimeFigureOut">
               <a:rPr lang="en-IN" smtClean="0"/>
-              <a:t>29-10-2022</a:t>
+              <a:t>05-11-2022</a:t>
             </a:fld>
             <a:endParaRPr lang="en-IN"/>
           </a:p>
@@ -895,7 +896,7 @@
           <a:p>
             <a:fld id="{DC2BF6E6-F863-479F-A057-0F7FF047E296}" type="datetimeFigureOut">
               <a:rPr lang="en-IN" smtClean="0"/>
-              <a:t>29-10-2022</a:t>
+              <a:t>05-11-2022</a:t>
             </a:fld>
             <a:endParaRPr lang="en-IN"/>
           </a:p>
@@ -1171,7 +1172,7 @@
           <a:p>
             <a:fld id="{DC2BF6E6-F863-479F-A057-0F7FF047E296}" type="datetimeFigureOut">
               <a:rPr lang="en-IN" smtClean="0"/>
-              <a:t>29-10-2022</a:t>
+              <a:t>05-11-2022</a:t>
             </a:fld>
             <a:endParaRPr lang="en-IN"/>
           </a:p>
@@ -1439,7 +1440,7 @@
           <a:p>
             <a:fld id="{DC2BF6E6-F863-479F-A057-0F7FF047E296}" type="datetimeFigureOut">
               <a:rPr lang="en-IN" smtClean="0"/>
-              <a:t>29-10-2022</a:t>
+              <a:t>05-11-2022</a:t>
             </a:fld>
             <a:endParaRPr lang="en-IN"/>
           </a:p>
@@ -1854,7 +1855,7 @@
           <a:p>
             <a:fld id="{DC2BF6E6-F863-479F-A057-0F7FF047E296}" type="datetimeFigureOut">
               <a:rPr lang="en-IN" smtClean="0"/>
-              <a:t>29-10-2022</a:t>
+              <a:t>05-11-2022</a:t>
             </a:fld>
             <a:endParaRPr lang="en-IN"/>
           </a:p>
@@ -1996,7 +1997,7 @@
           <a:p>
             <a:fld id="{DC2BF6E6-F863-479F-A057-0F7FF047E296}" type="datetimeFigureOut">
               <a:rPr lang="en-IN" smtClean="0"/>
-              <a:t>29-10-2022</a:t>
+              <a:t>05-11-2022</a:t>
             </a:fld>
             <a:endParaRPr lang="en-IN"/>
           </a:p>
@@ -2109,7 +2110,7 @@
           <a:p>
             <a:fld id="{DC2BF6E6-F863-479F-A057-0F7FF047E296}" type="datetimeFigureOut">
               <a:rPr lang="en-IN" smtClean="0"/>
-              <a:t>29-10-2022</a:t>
+              <a:t>05-11-2022</a:t>
             </a:fld>
             <a:endParaRPr lang="en-IN"/>
           </a:p>
@@ -2422,7 +2423,7 @@
           <a:p>
             <a:fld id="{DC2BF6E6-F863-479F-A057-0F7FF047E296}" type="datetimeFigureOut">
               <a:rPr lang="en-IN" smtClean="0"/>
-              <a:t>29-10-2022</a:t>
+              <a:t>05-11-2022</a:t>
             </a:fld>
             <a:endParaRPr lang="en-IN"/>
           </a:p>
@@ -2711,7 +2712,7 @@
           <a:p>
             <a:fld id="{DC2BF6E6-F863-479F-A057-0F7FF047E296}" type="datetimeFigureOut">
               <a:rPr lang="en-IN" smtClean="0"/>
-              <a:t>29-10-2022</a:t>
+              <a:t>05-11-2022</a:t>
             </a:fld>
             <a:endParaRPr lang="en-IN"/>
           </a:p>
@@ -2954,7 +2955,7 @@
           <a:p>
             <a:fld id="{DC2BF6E6-F863-479F-A057-0F7FF047E296}" type="datetimeFigureOut">
               <a:rPr lang="en-IN" smtClean="0"/>
-              <a:t>29-10-2022</a:t>
+              <a:t>05-11-2022</a:t>
             </a:fld>
             <a:endParaRPr lang="en-IN"/>
           </a:p>
@@ -6126,6 +6127,118 @@
       </p:grpSpPr>
       <p:pic>
         <p:nvPicPr>
+          <p:cNvPr id="7" name="Picture 6" descr="Graphical user interface, text, application, website&#10;&#10;Description automatically generated">
+            <a:extLst>
+              <a:ext uri="{FF2B5EF4-FFF2-40B4-BE49-F238E27FC236}">
+                <a16:creationId xmlns:a16="http://schemas.microsoft.com/office/drawing/2014/main" id="{F7BE3A76-BBCA-C34D-3EFB-E1F5F764C4B3}"/>
+              </a:ext>
+            </a:extLst>
+          </p:cNvPr>
+          <p:cNvPicPr>
+            <a:picLocks noChangeAspect="1"/>
+          </p:cNvPicPr>
+          <p:nvPr/>
+        </p:nvPicPr>
+        <p:blipFill>
+          <a:blip r:embed="rId2">
+            <a:extLst>
+              <a:ext uri="{28A0092B-C50C-407E-A947-70E740481C1C}">
+                <a14:useLocalDpi xmlns:a14="http://schemas.microsoft.com/office/drawing/2010/main" val="0"/>
+              </a:ext>
+            </a:extLst>
+          </a:blip>
+          <a:stretch>
+            <a:fillRect/>
+          </a:stretch>
+        </p:blipFill>
+        <p:spPr>
+          <a:xfrm>
+            <a:off x="59303" y="4034672"/>
+            <a:ext cx="12073394" cy="2795047"/>
+          </a:xfrm>
+          <a:prstGeom prst="rect">
+            <a:avLst/>
+          </a:prstGeom>
+          <a:ln>
+            <a:solidFill>
+              <a:schemeClr val="accent1"/>
+            </a:solidFill>
+          </a:ln>
+        </p:spPr>
+      </p:pic>
+      <p:pic>
+        <p:nvPicPr>
+          <p:cNvPr id="11" name="Picture 10" descr="Text&#10;&#10;Description automatically generated">
+            <a:extLst>
+              <a:ext uri="{FF2B5EF4-FFF2-40B4-BE49-F238E27FC236}">
+                <a16:creationId xmlns:a16="http://schemas.microsoft.com/office/drawing/2014/main" id="{8C3514FA-6DEC-0D4D-BD0F-59806B7D3AC0}"/>
+              </a:ext>
+            </a:extLst>
+          </p:cNvPr>
+          <p:cNvPicPr>
+            <a:picLocks noChangeAspect="1"/>
+          </p:cNvPicPr>
+          <p:nvPr/>
+        </p:nvPicPr>
+        <p:blipFill>
+          <a:blip r:embed="rId3">
+            <a:extLst>
+              <a:ext uri="{28A0092B-C50C-407E-A947-70E740481C1C}">
+                <a14:useLocalDpi xmlns:a14="http://schemas.microsoft.com/office/drawing/2010/main" val="0"/>
+              </a:ext>
+            </a:extLst>
+          </a:blip>
+          <a:stretch>
+            <a:fillRect/>
+          </a:stretch>
+        </p:blipFill>
+        <p:spPr>
+          <a:xfrm>
+            <a:off x="49475" y="28281"/>
+            <a:ext cx="12099255" cy="3940404"/>
+          </a:xfrm>
+          <a:prstGeom prst="rect">
+            <a:avLst/>
+          </a:prstGeom>
+          <a:ln>
+            <a:solidFill>
+              <a:schemeClr val="accent1"/>
+            </a:solidFill>
+          </a:ln>
+        </p:spPr>
+      </p:pic>
+    </p:spTree>
+    <p:extLst>
+      <p:ext uri="{BB962C8B-B14F-4D97-AF65-F5344CB8AC3E}">
+        <p14:creationId xmlns:p14="http://schemas.microsoft.com/office/powerpoint/2010/main" val="1846930178"/>
+      </p:ext>
+    </p:extLst>
+  </p:cSld>
+  <p:clrMapOvr>
+    <a:masterClrMapping/>
+  </p:clrMapOvr>
+</p:sld>
+</file>
+
+<file path=ppt/slides/slide11.xml><?xml version="1.0" encoding="utf-8"?>
+<p:sld xmlns:a="http://schemas.openxmlformats.org/drawingml/2006/main" xmlns:r="http://schemas.openxmlformats.org/officeDocument/2006/relationships" xmlns:p="http://schemas.openxmlformats.org/presentationml/2006/main">
+  <p:cSld>
+    <p:spTree>
+      <p:nvGrpSpPr>
+        <p:cNvPr id="1" name=""/>
+        <p:cNvGrpSpPr/>
+        <p:nvPr/>
+      </p:nvGrpSpPr>
+      <p:grpSpPr>
+        <a:xfrm>
+          <a:off x="0" y="0"/>
+          <a:ext cx="0" cy="0"/>
+          <a:chOff x="0" y="0"/>
+          <a:chExt cx="0" cy="0"/>
+        </a:xfrm>
+      </p:grpSpPr>
+      <p:pic>
+        <p:nvPicPr>
           <p:cNvPr id="3" name="Picture 2" descr="Graphical user interface, text, application&#10;&#10;Description automatically generated">
             <a:extLst>
               <a:ext uri="{FF2B5EF4-FFF2-40B4-BE49-F238E27FC236}">
@@ -6219,7 +6332,7 @@
 </p:sld>
 </file>
 
-<file path=ppt/slides/slide11.xml><?xml version="1.0" encoding="utf-8"?>
+<file path=ppt/slides/slide12.xml><?xml version="1.0" encoding="utf-8"?>
 <p:sld xmlns:a="http://schemas.openxmlformats.org/drawingml/2006/main" xmlns:r="http://schemas.openxmlformats.org/officeDocument/2006/relationships" xmlns:p="http://schemas.openxmlformats.org/presentationml/2006/main">
   <p:cSld>
     <p:spTree>
@@ -6547,7 +6660,7 @@
                 <a:tabLst/>
                 <a:defRPr/>
               </a:pPr>
-              <a:t>11</a:t>
+              <a:t>12</a:t>
             </a:fld>
             <a:endParaRPr kumimoji="0" lang="en-IN" sz="1200" b="1" i="0" u="none" strike="noStrike" kern="1200" cap="none" spc="0" normalizeH="0" baseline="0" noProof="0" dirty="0">
               <a:ln>
@@ -8176,7 +8289,7 @@
 </p:sld>
 </file>
 
-<file path=ppt/slides/slide12.xml><?xml version="1.0" encoding="utf-8"?>
+<file path=ppt/slides/slide13.xml><?xml version="1.0" encoding="utf-8"?>
 <p:sld xmlns:a="http://schemas.openxmlformats.org/drawingml/2006/main" xmlns:r="http://schemas.openxmlformats.org/officeDocument/2006/relationships" xmlns:p="http://schemas.openxmlformats.org/presentationml/2006/main">
   <p:cSld>
     <p:bg>
@@ -8404,7 +8517,7 @@
 </p:sld>
 </file>
 
-<file path=ppt/slides/slide13.xml><?xml version="1.0" encoding="utf-8"?>
+<file path=ppt/slides/slide14.xml><?xml version="1.0" encoding="utf-8"?>
 <p:sld xmlns:a="http://schemas.openxmlformats.org/drawingml/2006/main" xmlns:r="http://schemas.openxmlformats.org/officeDocument/2006/relationships" xmlns:p="http://schemas.openxmlformats.org/presentationml/2006/main">
   <p:cSld>
     <p:bg>
@@ -8632,7 +8745,7 @@
 </p:sld>
 </file>
 
-<file path=ppt/slides/slide14.xml><?xml version="1.0" encoding="utf-8"?>
+<file path=ppt/slides/slide15.xml><?xml version="1.0" encoding="utf-8"?>
 <p:sld xmlns:a="http://schemas.openxmlformats.org/drawingml/2006/main" xmlns:r="http://schemas.openxmlformats.org/officeDocument/2006/relationships" xmlns:p="http://schemas.openxmlformats.org/presentationml/2006/main">
   <p:cSld>
     <p:bg>
@@ -9015,7 +9128,7 @@
 </p:sld>
 </file>
 
-<file path=ppt/slides/slide15.xml><?xml version="1.0" encoding="utf-8"?>
+<file path=ppt/slides/slide16.xml><?xml version="1.0" encoding="utf-8"?>
 <p:sld xmlns:a="http://schemas.openxmlformats.org/drawingml/2006/main" xmlns:r="http://schemas.openxmlformats.org/officeDocument/2006/relationships" xmlns:p="http://schemas.openxmlformats.org/presentationml/2006/main">
   <p:cSld>
     <p:spTree>
@@ -13889,7 +14002,7 @@
 </p:sld>
 </file>
 
-<file path=ppt/slides/slide16.xml><?xml version="1.0" encoding="utf-8"?>
+<file path=ppt/slides/slide17.xml><?xml version="1.0" encoding="utf-8"?>
 <p:sld xmlns:a="http://schemas.openxmlformats.org/drawingml/2006/main" xmlns:r="http://schemas.openxmlformats.org/officeDocument/2006/relationships" xmlns:p="http://schemas.openxmlformats.org/presentationml/2006/main">
   <p:cSld>
     <p:spTree>
@@ -20256,7 +20369,7 @@
 </p:sld>
 </file>
 
-<file path=ppt/slides/slide17.xml><?xml version="1.0" encoding="utf-8"?>
+<file path=ppt/slides/slide18.xml><?xml version="1.0" encoding="utf-8"?>
 <p:sld xmlns:a="http://schemas.openxmlformats.org/drawingml/2006/main" xmlns:r="http://schemas.openxmlformats.org/officeDocument/2006/relationships" xmlns:p="http://schemas.openxmlformats.org/presentationml/2006/main">
   <p:cSld>
     <p:spTree>
@@ -26009,7 +26122,7 @@
 </p:sld>
 </file>
 
-<file path=ppt/slides/slide18.xml><?xml version="1.0" encoding="utf-8"?>
+<file path=ppt/slides/slide19.xml><?xml version="1.0" encoding="utf-8"?>
 <p:sld xmlns:a="http://schemas.openxmlformats.org/drawingml/2006/main" xmlns:r="http://schemas.openxmlformats.org/officeDocument/2006/relationships" xmlns:p="http://schemas.openxmlformats.org/presentationml/2006/main">
   <p:cSld>
     <p:spTree>
@@ -26428,7 +26541,758 @@
 </p:sld>
 </file>
 
-<file path=ppt/slides/slide19.xml><?xml version="1.0" encoding="utf-8"?>
+<file path=ppt/slides/slide2.xml><?xml version="1.0" encoding="utf-8"?>
+<p:sld xmlns:a="http://schemas.openxmlformats.org/drawingml/2006/main" xmlns:r="http://schemas.openxmlformats.org/officeDocument/2006/relationships" xmlns:p="http://schemas.openxmlformats.org/presentationml/2006/main">
+  <p:cSld>
+    <p:spTree>
+      <p:nvGrpSpPr>
+        <p:cNvPr id="1" name=""/>
+        <p:cNvGrpSpPr/>
+        <p:nvPr/>
+      </p:nvGrpSpPr>
+      <p:grpSpPr>
+        <a:xfrm>
+          <a:off x="0" y="0"/>
+          <a:ext cx="0" cy="0"/>
+          <a:chOff x="0" y="0"/>
+          <a:chExt cx="0" cy="0"/>
+        </a:xfrm>
+      </p:grpSpPr>
+      <p:sp>
+        <p:nvSpPr>
+          <p:cNvPr id="4" name="Rectangle 3">
+            <a:extLst>
+              <a:ext uri="{FF2B5EF4-FFF2-40B4-BE49-F238E27FC236}">
+                <a16:creationId xmlns:a16="http://schemas.microsoft.com/office/drawing/2014/main" id="{055C22F7-3FD1-4C1B-8D0C-0C2F7FB61DBE}"/>
+              </a:ext>
+            </a:extLst>
+          </p:cNvPr>
+          <p:cNvSpPr/>
+          <p:nvPr/>
+        </p:nvSpPr>
+        <p:spPr>
+          <a:xfrm>
+            <a:off x="0" y="8878"/>
+            <a:ext cx="12183122" cy="497150"/>
+          </a:xfrm>
+          <a:prstGeom prst="rect">
+            <a:avLst/>
+          </a:prstGeom>
+          <a:solidFill>
+            <a:srgbClr val="0070C0"/>
+          </a:solidFill>
+        </p:spPr>
+        <p:style>
+          <a:lnRef idx="2">
+            <a:schemeClr val="accent1">
+              <a:shade val="50000"/>
+            </a:schemeClr>
+          </a:lnRef>
+          <a:fillRef idx="1">
+            <a:schemeClr val="accent1"/>
+          </a:fillRef>
+          <a:effectRef idx="0">
+            <a:schemeClr val="accent1"/>
+          </a:effectRef>
+          <a:fontRef idx="minor">
+            <a:schemeClr val="lt1"/>
+          </a:fontRef>
+        </p:style>
+        <p:txBody>
+          <a:bodyPr rtlCol="0" anchor="ctr"/>
+          <a:lstStyle/>
+          <a:p>
+            <a:pPr marL="0" marR="0" lvl="0" indent="0" algn="ctr" defTabSz="914400" rtl="0" eaLnBrk="1" fontAlgn="auto" latinLnBrk="0" hangingPunct="1">
+              <a:lnSpc>
+                <a:spcPct val="100000"/>
+              </a:lnSpc>
+              <a:spcBef>
+                <a:spcPts val="0"/>
+              </a:spcBef>
+              <a:spcAft>
+                <a:spcPts val="0"/>
+              </a:spcAft>
+              <a:buClrTx/>
+              <a:buSzTx/>
+              <a:buFontTx/>
+              <a:buNone/>
+              <a:tabLst/>
+              <a:defRPr/>
+            </a:pPr>
+            <a:r>
+              <a:rPr kumimoji="0" lang="en-US" sz="1800" b="1" i="0" u="none" strike="noStrike" kern="1200" cap="none" spc="0" normalizeH="0" baseline="0" noProof="0" dirty="0">
+                <a:ln>
+                  <a:noFill/>
+                </a:ln>
+                <a:solidFill>
+                  <a:prstClr val="white"/>
+                </a:solidFill>
+                <a:effectLst/>
+                <a:uLnTx/>
+                <a:uFillTx/>
+                <a:latin typeface="Verdana" panose="020B0604030504040204" pitchFamily="34" charset="0"/>
+                <a:ea typeface="Verdana" panose="020B0604030504040204" pitchFamily="34" charset="0"/>
+                <a:cs typeface="+mn-cs"/>
+              </a:rPr>
+              <a:t>Information</a:t>
+            </a:r>
+            <a:endParaRPr kumimoji="0" lang="en-IN" sz="1800" b="1" i="0" u="none" strike="noStrike" kern="1200" cap="none" spc="0" normalizeH="0" baseline="0" noProof="0" dirty="0">
+              <a:ln>
+                <a:noFill/>
+              </a:ln>
+              <a:solidFill>
+                <a:prstClr val="white"/>
+              </a:solidFill>
+              <a:effectLst/>
+              <a:uLnTx/>
+              <a:uFillTx/>
+              <a:latin typeface="Verdana" panose="020B0604030504040204" pitchFamily="34" charset="0"/>
+              <a:ea typeface="Verdana" panose="020B0604030504040204" pitchFamily="34" charset="0"/>
+              <a:cs typeface="+mn-cs"/>
+            </a:endParaRPr>
+          </a:p>
+        </p:txBody>
+      </p:sp>
+      <p:sp>
+        <p:nvSpPr>
+          <p:cNvPr id="7" name="Rectangle 6">
+            <a:extLst>
+              <a:ext uri="{FF2B5EF4-FFF2-40B4-BE49-F238E27FC236}">
+                <a16:creationId xmlns:a16="http://schemas.microsoft.com/office/drawing/2014/main" id="{B10720DE-FD2A-4FE5-B9FB-74854D01A659}"/>
+              </a:ext>
+            </a:extLst>
+          </p:cNvPr>
+          <p:cNvSpPr/>
+          <p:nvPr/>
+        </p:nvSpPr>
+        <p:spPr>
+          <a:xfrm>
+            <a:off x="0" y="3915050"/>
+            <a:ext cx="12183122" cy="57703"/>
+          </a:xfrm>
+          <a:prstGeom prst="rect">
+            <a:avLst/>
+          </a:prstGeom>
+          <a:solidFill>
+            <a:srgbClr val="0070C0"/>
+          </a:solidFill>
+        </p:spPr>
+        <p:style>
+          <a:lnRef idx="2">
+            <a:schemeClr val="accent1">
+              <a:shade val="50000"/>
+            </a:schemeClr>
+          </a:lnRef>
+          <a:fillRef idx="1">
+            <a:schemeClr val="accent1"/>
+          </a:fillRef>
+          <a:effectRef idx="0">
+            <a:schemeClr val="accent1"/>
+          </a:effectRef>
+          <a:fontRef idx="minor">
+            <a:schemeClr val="lt1"/>
+          </a:fontRef>
+        </p:style>
+        <p:txBody>
+          <a:bodyPr rtlCol="0" anchor="ctr"/>
+          <a:lstStyle/>
+          <a:p>
+            <a:pPr marL="0" marR="0" lvl="0" indent="0" algn="ctr" defTabSz="914400" rtl="0" eaLnBrk="1" fontAlgn="auto" latinLnBrk="0" hangingPunct="1">
+              <a:lnSpc>
+                <a:spcPct val="100000"/>
+              </a:lnSpc>
+              <a:spcBef>
+                <a:spcPts val="0"/>
+              </a:spcBef>
+              <a:spcAft>
+                <a:spcPts val="0"/>
+              </a:spcAft>
+              <a:buClrTx/>
+              <a:buSzTx/>
+              <a:buFontTx/>
+              <a:buNone/>
+              <a:tabLst/>
+              <a:defRPr/>
+            </a:pPr>
+            <a:endParaRPr kumimoji="0" lang="en-IN" sz="1000" b="0" i="0" u="none" strike="noStrike" kern="1200" cap="none" spc="0" normalizeH="0" baseline="0" noProof="0" dirty="0">
+              <a:ln>
+                <a:noFill/>
+              </a:ln>
+              <a:solidFill>
+                <a:prstClr val="white"/>
+              </a:solidFill>
+              <a:effectLst/>
+              <a:uLnTx/>
+              <a:uFillTx/>
+              <a:latin typeface="Verdana" panose="020B0604030504040204" pitchFamily="34" charset="0"/>
+              <a:ea typeface="Verdana" panose="020B0604030504040204" pitchFamily="34" charset="0"/>
+              <a:cs typeface="+mn-cs"/>
+            </a:endParaRPr>
+          </a:p>
+        </p:txBody>
+      </p:sp>
+      <p:sp>
+        <p:nvSpPr>
+          <p:cNvPr id="8" name="Footer Placeholder 7">
+            <a:extLst>
+              <a:ext uri="{FF2B5EF4-FFF2-40B4-BE49-F238E27FC236}">
+                <a16:creationId xmlns:a16="http://schemas.microsoft.com/office/drawing/2014/main" id="{DD2A19CA-EC18-432D-8F8F-17079808F38B}"/>
+              </a:ext>
+            </a:extLst>
+          </p:cNvPr>
+          <p:cNvSpPr>
+            <a:spLocks noGrp="1"/>
+          </p:cNvSpPr>
+          <p:nvPr>
+            <p:ph type="ftr" sz="quarter" idx="11"/>
+          </p:nvPr>
+        </p:nvSpPr>
+        <p:spPr>
+          <a:xfrm>
+            <a:off x="4038600" y="3959378"/>
+            <a:ext cx="4114800" cy="365125"/>
+          </a:xfrm>
+        </p:spPr>
+        <p:txBody>
+          <a:bodyPr/>
+          <a:lstStyle/>
+          <a:p>
+            <a:pPr marL="0" marR="0" lvl="0" indent="0" algn="ctr" defTabSz="914400" rtl="0" eaLnBrk="1" fontAlgn="auto" latinLnBrk="0" hangingPunct="1">
+              <a:lnSpc>
+                <a:spcPct val="100000"/>
+              </a:lnSpc>
+              <a:spcBef>
+                <a:spcPts val="0"/>
+              </a:spcBef>
+              <a:spcAft>
+                <a:spcPts val="0"/>
+              </a:spcAft>
+              <a:buClrTx/>
+              <a:buSzTx/>
+              <a:buFontTx/>
+              <a:buNone/>
+              <a:tabLst/>
+              <a:defRPr/>
+            </a:pPr>
+            <a:r>
+              <a:rPr kumimoji="0" lang="en-IN" sz="1200" b="1" i="0" u="none" strike="noStrike" kern="1200" cap="none" spc="0" normalizeH="0" baseline="0" noProof="0" dirty="0">
+                <a:ln>
+                  <a:noFill/>
+                </a:ln>
+                <a:solidFill>
+                  <a:srgbClr val="002060"/>
+                </a:solidFill>
+                <a:effectLst/>
+                <a:uLnTx/>
+                <a:uFillTx/>
+                <a:latin typeface="Verdana" panose="020B0604030504040204" pitchFamily="34" charset="0"/>
+                <a:ea typeface="Verdana" panose="020B0604030504040204" pitchFamily="34" charset="0"/>
+                <a:cs typeface="+mn-cs"/>
+              </a:rPr>
+              <a:t>2022</a:t>
+            </a:r>
+          </a:p>
+        </p:txBody>
+      </p:sp>
+      <p:sp>
+        <p:nvSpPr>
+          <p:cNvPr id="9" name="Slide Number Placeholder 8">
+            <a:extLst>
+              <a:ext uri="{FF2B5EF4-FFF2-40B4-BE49-F238E27FC236}">
+                <a16:creationId xmlns:a16="http://schemas.microsoft.com/office/drawing/2014/main" id="{8162625C-0B1F-42E0-BE7C-D99A08FED7A3}"/>
+              </a:ext>
+            </a:extLst>
+          </p:cNvPr>
+          <p:cNvSpPr>
+            <a:spLocks noGrp="1"/>
+          </p:cNvSpPr>
+          <p:nvPr>
+            <p:ph type="sldNum" sz="quarter" idx="12"/>
+          </p:nvPr>
+        </p:nvSpPr>
+        <p:spPr>
+          <a:xfrm>
+            <a:off x="8610600" y="3959378"/>
+            <a:ext cx="2743200" cy="365125"/>
+          </a:xfrm>
+        </p:spPr>
+        <p:txBody>
+          <a:bodyPr/>
+          <a:lstStyle/>
+          <a:p>
+            <a:pPr marL="0" marR="0" lvl="0" indent="0" algn="r" defTabSz="914400" rtl="0" eaLnBrk="1" fontAlgn="auto" latinLnBrk="0" hangingPunct="1">
+              <a:lnSpc>
+                <a:spcPct val="100000"/>
+              </a:lnSpc>
+              <a:spcBef>
+                <a:spcPts val="0"/>
+              </a:spcBef>
+              <a:spcAft>
+                <a:spcPts val="0"/>
+              </a:spcAft>
+              <a:buClrTx/>
+              <a:buSzTx/>
+              <a:buFontTx/>
+              <a:buNone/>
+              <a:tabLst/>
+              <a:defRPr/>
+            </a:pPr>
+            <a:r>
+              <a:rPr kumimoji="0" lang="en-IN" sz="1200" b="1" i="0" u="none" strike="noStrike" kern="1200" cap="none" spc="0" normalizeH="0" baseline="0" noProof="0" dirty="0">
+                <a:ln>
+                  <a:noFill/>
+                </a:ln>
+                <a:solidFill>
+                  <a:srgbClr val="002060"/>
+                </a:solidFill>
+                <a:effectLst/>
+                <a:uLnTx/>
+                <a:uFillTx/>
+                <a:latin typeface="Verdana" panose="020B0604030504040204" pitchFamily="34" charset="0"/>
+                <a:ea typeface="Verdana" panose="020B0604030504040204" pitchFamily="34" charset="0"/>
+                <a:cs typeface="+mn-cs"/>
+              </a:rPr>
+              <a:t>1</a:t>
+            </a:r>
+          </a:p>
+        </p:txBody>
+      </p:sp>
+      <p:sp>
+        <p:nvSpPr>
+          <p:cNvPr id="12" name="Footer Placeholder 7">
+            <a:extLst>
+              <a:ext uri="{FF2B5EF4-FFF2-40B4-BE49-F238E27FC236}">
+                <a16:creationId xmlns:a16="http://schemas.microsoft.com/office/drawing/2014/main" id="{64C57949-E349-47D3-A505-A098233AF49D}"/>
+              </a:ext>
+            </a:extLst>
+          </p:cNvPr>
+          <p:cNvSpPr txBox="1">
+            <a:spLocks/>
+          </p:cNvSpPr>
+          <p:nvPr/>
+        </p:nvSpPr>
+        <p:spPr>
+          <a:xfrm>
+            <a:off x="133897" y="3960852"/>
+            <a:ext cx="4114800" cy="365125"/>
+          </a:xfrm>
+          <a:prstGeom prst="rect">
+            <a:avLst/>
+          </a:prstGeom>
+        </p:spPr>
+        <p:txBody>
+          <a:bodyPr vert="horz" lIns="91440" tIns="45720" rIns="91440" bIns="45720" rtlCol="0" anchor="ctr"/>
+          <a:lstStyle>
+            <a:defPPr>
+              <a:defRPr lang="en-US"/>
+            </a:defPPr>
+            <a:lvl1pPr marL="0" algn="ctr" defTabSz="914400" rtl="0" eaLnBrk="1" latinLnBrk="0" hangingPunct="1">
+              <a:defRPr sz="1200" kern="1200">
+                <a:solidFill>
+                  <a:schemeClr val="tx1">
+                    <a:tint val="75000"/>
+                  </a:schemeClr>
+                </a:solidFill>
+                <a:latin typeface="+mn-lt"/>
+                <a:ea typeface="+mn-ea"/>
+                <a:cs typeface="+mn-cs"/>
+              </a:defRPr>
+            </a:lvl1pPr>
+            <a:lvl2pPr marL="457200" algn="l" defTabSz="914400" rtl="0" eaLnBrk="1" latinLnBrk="0" hangingPunct="1">
+              <a:defRPr sz="1800" kern="1200">
+                <a:solidFill>
+                  <a:schemeClr val="tx1"/>
+                </a:solidFill>
+                <a:latin typeface="+mn-lt"/>
+                <a:ea typeface="+mn-ea"/>
+                <a:cs typeface="+mn-cs"/>
+              </a:defRPr>
+            </a:lvl2pPr>
+            <a:lvl3pPr marL="914400" algn="l" defTabSz="914400" rtl="0" eaLnBrk="1" latinLnBrk="0" hangingPunct="1">
+              <a:defRPr sz="1800" kern="1200">
+                <a:solidFill>
+                  <a:schemeClr val="tx1"/>
+                </a:solidFill>
+                <a:latin typeface="+mn-lt"/>
+                <a:ea typeface="+mn-ea"/>
+                <a:cs typeface="+mn-cs"/>
+              </a:defRPr>
+            </a:lvl3pPr>
+            <a:lvl4pPr marL="1371600" algn="l" defTabSz="914400" rtl="0" eaLnBrk="1" latinLnBrk="0" hangingPunct="1">
+              <a:defRPr sz="1800" kern="1200">
+                <a:solidFill>
+                  <a:schemeClr val="tx1"/>
+                </a:solidFill>
+                <a:latin typeface="+mn-lt"/>
+                <a:ea typeface="+mn-ea"/>
+                <a:cs typeface="+mn-cs"/>
+              </a:defRPr>
+            </a:lvl4pPr>
+            <a:lvl5pPr marL="1828800" algn="l" defTabSz="914400" rtl="0" eaLnBrk="1" latinLnBrk="0" hangingPunct="1">
+              <a:defRPr sz="1800" kern="1200">
+                <a:solidFill>
+                  <a:schemeClr val="tx1"/>
+                </a:solidFill>
+                <a:latin typeface="+mn-lt"/>
+                <a:ea typeface="+mn-ea"/>
+                <a:cs typeface="+mn-cs"/>
+              </a:defRPr>
+            </a:lvl5pPr>
+            <a:lvl6pPr marL="2286000" algn="l" defTabSz="914400" rtl="0" eaLnBrk="1" latinLnBrk="0" hangingPunct="1">
+              <a:defRPr sz="1800" kern="1200">
+                <a:solidFill>
+                  <a:schemeClr val="tx1"/>
+                </a:solidFill>
+                <a:latin typeface="+mn-lt"/>
+                <a:ea typeface="+mn-ea"/>
+                <a:cs typeface="+mn-cs"/>
+              </a:defRPr>
+            </a:lvl6pPr>
+            <a:lvl7pPr marL="2743200" algn="l" defTabSz="914400" rtl="0" eaLnBrk="1" latinLnBrk="0" hangingPunct="1">
+              <a:defRPr sz="1800" kern="1200">
+                <a:solidFill>
+                  <a:schemeClr val="tx1"/>
+                </a:solidFill>
+                <a:latin typeface="+mn-lt"/>
+                <a:ea typeface="+mn-ea"/>
+                <a:cs typeface="+mn-cs"/>
+              </a:defRPr>
+            </a:lvl7pPr>
+            <a:lvl8pPr marL="3200400" algn="l" defTabSz="914400" rtl="0" eaLnBrk="1" latinLnBrk="0" hangingPunct="1">
+              <a:defRPr sz="1800" kern="1200">
+                <a:solidFill>
+                  <a:schemeClr val="tx1"/>
+                </a:solidFill>
+                <a:latin typeface="+mn-lt"/>
+                <a:ea typeface="+mn-ea"/>
+                <a:cs typeface="+mn-cs"/>
+              </a:defRPr>
+            </a:lvl8pPr>
+            <a:lvl9pPr marL="3657600" algn="l" defTabSz="914400" rtl="0" eaLnBrk="1" latinLnBrk="0" hangingPunct="1">
+              <a:defRPr sz="1800" kern="1200">
+                <a:solidFill>
+                  <a:schemeClr val="tx1"/>
+                </a:solidFill>
+                <a:latin typeface="+mn-lt"/>
+                <a:ea typeface="+mn-ea"/>
+                <a:cs typeface="+mn-cs"/>
+              </a:defRPr>
+            </a:lvl9pPr>
+          </a:lstStyle>
+          <a:p>
+            <a:pPr marL="0" marR="0" lvl="0" indent="0" algn="ctr" defTabSz="914400" rtl="0" eaLnBrk="1" fontAlgn="auto" latinLnBrk="0" hangingPunct="1">
+              <a:lnSpc>
+                <a:spcPct val="100000"/>
+              </a:lnSpc>
+              <a:spcBef>
+                <a:spcPts val="0"/>
+              </a:spcBef>
+              <a:spcAft>
+                <a:spcPts val="0"/>
+              </a:spcAft>
+              <a:buClrTx/>
+              <a:buSzTx/>
+              <a:buFontTx/>
+              <a:buNone/>
+              <a:tabLst/>
+              <a:defRPr/>
+            </a:pPr>
+            <a:r>
+              <a:rPr kumimoji="0" lang="en-IN" sz="1200" b="1" i="0" u="none" strike="noStrike" kern="1200" cap="none" spc="0" normalizeH="0" baseline="0" noProof="0" dirty="0">
+                <a:ln>
+                  <a:noFill/>
+                </a:ln>
+                <a:solidFill>
+                  <a:srgbClr val="002060"/>
+                </a:solidFill>
+                <a:effectLst/>
+                <a:uLnTx/>
+                <a:uFillTx/>
+                <a:latin typeface="Verdana" panose="020B0604030504040204" pitchFamily="34" charset="0"/>
+                <a:ea typeface="Verdana" panose="020B0604030504040204" pitchFamily="34" charset="0"/>
+                <a:cs typeface="+mn-cs"/>
+              </a:rPr>
+              <a:t>Dot Net Learners House</a:t>
+            </a:r>
+          </a:p>
+        </p:txBody>
+      </p:sp>
+      <p:sp>
+        <p:nvSpPr>
+          <p:cNvPr id="10" name="TextBox 9">
+            <a:extLst>
+              <a:ext uri="{FF2B5EF4-FFF2-40B4-BE49-F238E27FC236}">
+                <a16:creationId xmlns:a16="http://schemas.microsoft.com/office/drawing/2014/main" id="{19953791-0C49-4113-A95A-639979BFF9A6}"/>
+              </a:ext>
+            </a:extLst>
+          </p:cNvPr>
+          <p:cNvSpPr txBox="1"/>
+          <p:nvPr/>
+        </p:nvSpPr>
+        <p:spPr>
+          <a:xfrm>
+            <a:off x="80629" y="557824"/>
+            <a:ext cx="12037390" cy="2800062"/>
+          </a:xfrm>
+          <a:prstGeom prst="rect">
+            <a:avLst/>
+          </a:prstGeom>
+          <a:noFill/>
+        </p:spPr>
+        <p:txBody>
+          <a:bodyPr wrap="square" rtlCol="0">
+            <a:spAutoFit/>
+          </a:bodyPr>
+          <a:lstStyle/>
+          <a:p>
+            <a:pPr marL="628650" marR="0" lvl="1" indent="-171450" algn="l" defTabSz="914400" rtl="0" eaLnBrk="1" fontAlgn="auto" latinLnBrk="0" hangingPunct="1">
+              <a:lnSpc>
+                <a:spcPct val="150000"/>
+              </a:lnSpc>
+              <a:spcBef>
+                <a:spcPts val="0"/>
+              </a:spcBef>
+              <a:spcAft>
+                <a:spcPts val="0"/>
+              </a:spcAft>
+              <a:buClrTx/>
+              <a:buSzTx/>
+              <a:buFont typeface="Wingdings" panose="05000000000000000000" pitchFamily="2" charset="2"/>
+              <a:buChar char="Ø"/>
+              <a:tabLst/>
+              <a:defRPr/>
+            </a:pPr>
+            <a:r>
+              <a:rPr kumimoji="0" lang="en-US" sz="2000" b="0" i="0" u="none" strike="noStrike" kern="1200" cap="none" spc="0" normalizeH="0" baseline="0" noProof="0" dirty="0">
+                <a:ln>
+                  <a:noFill/>
+                </a:ln>
+                <a:solidFill>
+                  <a:srgbClr val="00B0F0"/>
+                </a:solidFill>
+                <a:effectLst/>
+                <a:uLnTx/>
+                <a:uFillTx/>
+                <a:latin typeface="Verdana" panose="020B0604030504040204" pitchFamily="34" charset="0"/>
+                <a:ea typeface="Verdana" panose="020B0604030504040204" pitchFamily="34" charset="0"/>
+                <a:cs typeface="+mn-cs"/>
+              </a:rPr>
+              <a:t> </a:t>
+            </a:r>
+            <a:r>
+              <a:rPr kumimoji="0" lang="en-US" sz="2000" b="0" i="0" u="none" strike="noStrike" kern="1200" cap="none" spc="0" normalizeH="0" baseline="0" noProof="0" dirty="0">
+                <a:ln>
+                  <a:noFill/>
+                </a:ln>
+                <a:solidFill>
+                  <a:srgbClr val="0070C0"/>
+                </a:solidFill>
+                <a:effectLst/>
+                <a:uLnTx/>
+                <a:uFillTx/>
+                <a:latin typeface="Verdana" panose="020B0604030504040204" pitchFamily="34" charset="0"/>
+                <a:ea typeface="Verdana" panose="020B0604030504040204" pitchFamily="34" charset="0"/>
+                <a:cs typeface="+mn-cs"/>
+              </a:rPr>
+              <a:t>I am still a learner. Apologize if I do any mistake.</a:t>
+            </a:r>
+          </a:p>
+          <a:p>
+            <a:pPr marL="628650" marR="0" lvl="1" indent="-171450" algn="l" defTabSz="914400" rtl="0" eaLnBrk="1" fontAlgn="auto" latinLnBrk="0" hangingPunct="1">
+              <a:lnSpc>
+                <a:spcPct val="150000"/>
+              </a:lnSpc>
+              <a:spcBef>
+                <a:spcPts val="0"/>
+              </a:spcBef>
+              <a:spcAft>
+                <a:spcPts val="0"/>
+              </a:spcAft>
+              <a:buClrTx/>
+              <a:buSzTx/>
+              <a:buFont typeface="Wingdings" panose="05000000000000000000" pitchFamily="2" charset="2"/>
+              <a:buChar char="Ø"/>
+              <a:tabLst/>
+              <a:defRPr/>
+            </a:pPr>
+            <a:r>
+              <a:rPr kumimoji="0" lang="en-US" sz="2000" b="0" i="0" u="none" strike="noStrike" kern="1200" cap="none" spc="0" normalizeH="0" baseline="0" noProof="0" dirty="0">
+                <a:ln>
+                  <a:noFill/>
+                </a:ln>
+                <a:solidFill>
+                  <a:srgbClr val="002060"/>
+                </a:solidFill>
+                <a:effectLst/>
+                <a:uLnTx/>
+                <a:uFillTx/>
+                <a:latin typeface="Verdana" panose="020B0604030504040204" pitchFamily="34" charset="0"/>
+                <a:ea typeface="Verdana" panose="020B0604030504040204" pitchFamily="34" charset="0"/>
+                <a:cs typeface="+mn-cs"/>
+              </a:rPr>
+              <a:t> All the sessions will be hands on.</a:t>
+            </a:r>
+          </a:p>
+          <a:p>
+            <a:pPr marL="628650" marR="0" lvl="1" indent="-171450" algn="l" defTabSz="914400" rtl="0" eaLnBrk="1" fontAlgn="auto" latinLnBrk="0" hangingPunct="1">
+              <a:lnSpc>
+                <a:spcPct val="150000"/>
+              </a:lnSpc>
+              <a:spcBef>
+                <a:spcPts val="0"/>
+              </a:spcBef>
+              <a:spcAft>
+                <a:spcPts val="0"/>
+              </a:spcAft>
+              <a:buClrTx/>
+              <a:buSzTx/>
+              <a:buFont typeface="Wingdings" panose="05000000000000000000" pitchFamily="2" charset="2"/>
+              <a:buChar char="Ø"/>
+              <a:tabLst/>
+              <a:defRPr/>
+            </a:pPr>
+            <a:r>
+              <a:rPr kumimoji="0" lang="en-US" sz="2000" b="0" i="0" u="none" strike="noStrike" kern="1200" cap="none" spc="0" normalizeH="0" baseline="0" noProof="0" dirty="0">
+                <a:ln>
+                  <a:noFill/>
+                </a:ln>
+                <a:solidFill>
+                  <a:srgbClr val="002060"/>
+                </a:solidFill>
+                <a:effectLst/>
+                <a:uLnTx/>
+                <a:uFillTx/>
+                <a:latin typeface="Verdana" panose="020B0604030504040204" pitchFamily="34" charset="0"/>
+                <a:ea typeface="Verdana" panose="020B0604030504040204" pitchFamily="34" charset="0"/>
+                <a:cs typeface="+mn-cs"/>
+              </a:rPr>
+              <a:t> Will have parking lots for queries and other topics.</a:t>
+            </a:r>
+          </a:p>
+          <a:p>
+            <a:pPr marL="628650" marR="0" lvl="1" indent="-171450" algn="l" defTabSz="914400" rtl="0" eaLnBrk="1" fontAlgn="auto" latinLnBrk="0" hangingPunct="1">
+              <a:lnSpc>
+                <a:spcPct val="150000"/>
+              </a:lnSpc>
+              <a:spcBef>
+                <a:spcPts val="0"/>
+              </a:spcBef>
+              <a:spcAft>
+                <a:spcPts val="0"/>
+              </a:spcAft>
+              <a:buClrTx/>
+              <a:buSzTx/>
+              <a:buFont typeface="Wingdings" panose="05000000000000000000" pitchFamily="2" charset="2"/>
+              <a:buChar char="Ø"/>
+              <a:tabLst/>
+              <a:defRPr/>
+            </a:pPr>
+            <a:r>
+              <a:rPr kumimoji="0" lang="en-US" sz="2000" b="0" i="0" u="none" strike="noStrike" kern="1200" cap="none" spc="0" normalizeH="0" baseline="0" noProof="0" dirty="0">
+                <a:ln>
+                  <a:noFill/>
+                </a:ln>
+                <a:solidFill>
+                  <a:srgbClr val="002060"/>
+                </a:solidFill>
+                <a:effectLst/>
+                <a:uLnTx/>
+                <a:uFillTx/>
+                <a:latin typeface="Verdana" panose="020B0604030504040204" pitchFamily="34" charset="0"/>
+                <a:ea typeface="Verdana" panose="020B0604030504040204" pitchFamily="34" charset="0"/>
+                <a:cs typeface="+mn-cs"/>
+              </a:rPr>
+              <a:t> Some of the concepts we will introduced and revisited in next sessions.</a:t>
+            </a:r>
+          </a:p>
+          <a:p>
+            <a:pPr marL="628650" marR="0" lvl="1" indent="-171450" algn="l" defTabSz="914400" rtl="0" eaLnBrk="1" fontAlgn="auto" latinLnBrk="0" hangingPunct="1">
+              <a:lnSpc>
+                <a:spcPct val="150000"/>
+              </a:lnSpc>
+              <a:spcBef>
+                <a:spcPts val="0"/>
+              </a:spcBef>
+              <a:spcAft>
+                <a:spcPts val="0"/>
+              </a:spcAft>
+              <a:buClrTx/>
+              <a:buSzTx/>
+              <a:buFont typeface="Wingdings" panose="05000000000000000000" pitchFamily="2" charset="2"/>
+              <a:buChar char="Ø"/>
+              <a:tabLst/>
+              <a:defRPr/>
+            </a:pPr>
+            <a:r>
+              <a:rPr kumimoji="0" lang="en-US" sz="2000" b="0" i="0" u="none" strike="noStrike" kern="1200" cap="none" spc="0" normalizeH="0" baseline="0" noProof="0" dirty="0">
+                <a:ln>
+                  <a:noFill/>
+                </a:ln>
+                <a:solidFill>
+                  <a:srgbClr val="002060"/>
+                </a:solidFill>
+                <a:effectLst/>
+                <a:uLnTx/>
+                <a:uFillTx/>
+                <a:latin typeface="Verdana" panose="020B0604030504040204" pitchFamily="34" charset="0"/>
+                <a:ea typeface="Verdana" panose="020B0604030504040204" pitchFamily="34" charset="0"/>
+                <a:cs typeface="+mn-cs"/>
+              </a:rPr>
+              <a:t> There are multiple ways to do, we will use one of the ways.</a:t>
+            </a:r>
+          </a:p>
+          <a:p>
+            <a:pPr marL="628650" marR="0" lvl="1" indent="-171450" algn="l" defTabSz="914400" rtl="0" eaLnBrk="1" fontAlgn="auto" latinLnBrk="0" hangingPunct="1">
+              <a:lnSpc>
+                <a:spcPct val="150000"/>
+              </a:lnSpc>
+              <a:spcBef>
+                <a:spcPts val="0"/>
+              </a:spcBef>
+              <a:spcAft>
+                <a:spcPts val="0"/>
+              </a:spcAft>
+              <a:buClrTx/>
+              <a:buSzTx/>
+              <a:buFont typeface="Wingdings" panose="05000000000000000000" pitchFamily="2" charset="2"/>
+              <a:buChar char="Ø"/>
+              <a:tabLst/>
+              <a:defRPr/>
+            </a:pPr>
+            <a:r>
+              <a:rPr kumimoji="0" lang="en-US" sz="2000" b="0" i="0" u="none" strike="noStrike" kern="1200" cap="none" spc="0" normalizeH="0" baseline="0" noProof="0" dirty="0">
+                <a:ln>
+                  <a:noFill/>
+                </a:ln>
+                <a:solidFill>
+                  <a:srgbClr val="002060"/>
+                </a:solidFill>
+                <a:effectLst/>
+                <a:uLnTx/>
+                <a:uFillTx/>
+                <a:latin typeface="Verdana" panose="020B0604030504040204" pitchFamily="34" charset="0"/>
+                <a:ea typeface="Verdana" panose="020B0604030504040204" pitchFamily="34" charset="0"/>
+                <a:cs typeface="+mn-cs"/>
+              </a:rPr>
+              <a:t> The focus was more on concepts and demos are kept simple. </a:t>
+            </a:r>
+          </a:p>
+        </p:txBody>
+      </p:sp>
+    </p:spTree>
+    <p:extLst>
+      <p:ext uri="{BB962C8B-B14F-4D97-AF65-F5344CB8AC3E}">
+        <p14:creationId xmlns:p14="http://schemas.microsoft.com/office/powerpoint/2010/main" val="933004240"/>
+      </p:ext>
+    </p:extLst>
+  </p:cSld>
+  <p:clrMapOvr>
+    <a:masterClrMapping/>
+  </p:clrMapOvr>
+</p:sld>
+</file>
+
+<file path=ppt/slides/slide20.xml><?xml version="1.0" encoding="utf-8"?>
 <p:sld xmlns:a="http://schemas.openxmlformats.org/drawingml/2006/main" xmlns:r="http://schemas.openxmlformats.org/officeDocument/2006/relationships" xmlns:p="http://schemas.openxmlformats.org/presentationml/2006/main">
   <p:cSld>
     <p:spTree>
@@ -29185,757 +30049,6 @@
 </p:sld>
 </file>
 
-<file path=ppt/slides/slide2.xml><?xml version="1.0" encoding="utf-8"?>
-<p:sld xmlns:a="http://schemas.openxmlformats.org/drawingml/2006/main" xmlns:r="http://schemas.openxmlformats.org/officeDocument/2006/relationships" xmlns:p="http://schemas.openxmlformats.org/presentationml/2006/main">
-  <p:cSld>
-    <p:spTree>
-      <p:nvGrpSpPr>
-        <p:cNvPr id="1" name=""/>
-        <p:cNvGrpSpPr/>
-        <p:nvPr/>
-      </p:nvGrpSpPr>
-      <p:grpSpPr>
-        <a:xfrm>
-          <a:off x="0" y="0"/>
-          <a:ext cx="0" cy="0"/>
-          <a:chOff x="0" y="0"/>
-          <a:chExt cx="0" cy="0"/>
-        </a:xfrm>
-      </p:grpSpPr>
-      <p:sp>
-        <p:nvSpPr>
-          <p:cNvPr id="4" name="Rectangle 3">
-            <a:extLst>
-              <a:ext uri="{FF2B5EF4-FFF2-40B4-BE49-F238E27FC236}">
-                <a16:creationId xmlns:a16="http://schemas.microsoft.com/office/drawing/2014/main" id="{055C22F7-3FD1-4C1B-8D0C-0C2F7FB61DBE}"/>
-              </a:ext>
-            </a:extLst>
-          </p:cNvPr>
-          <p:cNvSpPr/>
-          <p:nvPr/>
-        </p:nvSpPr>
-        <p:spPr>
-          <a:xfrm>
-            <a:off x="0" y="8878"/>
-            <a:ext cx="12183122" cy="497150"/>
-          </a:xfrm>
-          <a:prstGeom prst="rect">
-            <a:avLst/>
-          </a:prstGeom>
-          <a:solidFill>
-            <a:srgbClr val="0070C0"/>
-          </a:solidFill>
-        </p:spPr>
-        <p:style>
-          <a:lnRef idx="2">
-            <a:schemeClr val="accent1">
-              <a:shade val="50000"/>
-            </a:schemeClr>
-          </a:lnRef>
-          <a:fillRef idx="1">
-            <a:schemeClr val="accent1"/>
-          </a:fillRef>
-          <a:effectRef idx="0">
-            <a:schemeClr val="accent1"/>
-          </a:effectRef>
-          <a:fontRef idx="minor">
-            <a:schemeClr val="lt1"/>
-          </a:fontRef>
-        </p:style>
-        <p:txBody>
-          <a:bodyPr rtlCol="0" anchor="ctr"/>
-          <a:lstStyle/>
-          <a:p>
-            <a:pPr marL="0" marR="0" lvl="0" indent="0" algn="ctr" defTabSz="914400" rtl="0" eaLnBrk="1" fontAlgn="auto" latinLnBrk="0" hangingPunct="1">
-              <a:lnSpc>
-                <a:spcPct val="100000"/>
-              </a:lnSpc>
-              <a:spcBef>
-                <a:spcPts val="0"/>
-              </a:spcBef>
-              <a:spcAft>
-                <a:spcPts val="0"/>
-              </a:spcAft>
-              <a:buClrTx/>
-              <a:buSzTx/>
-              <a:buFontTx/>
-              <a:buNone/>
-              <a:tabLst/>
-              <a:defRPr/>
-            </a:pPr>
-            <a:r>
-              <a:rPr kumimoji="0" lang="en-US" sz="1800" b="1" i="0" u="none" strike="noStrike" kern="1200" cap="none" spc="0" normalizeH="0" baseline="0" noProof="0" dirty="0">
-                <a:ln>
-                  <a:noFill/>
-                </a:ln>
-                <a:solidFill>
-                  <a:prstClr val="white"/>
-                </a:solidFill>
-                <a:effectLst/>
-                <a:uLnTx/>
-                <a:uFillTx/>
-                <a:latin typeface="Verdana" panose="020B0604030504040204" pitchFamily="34" charset="0"/>
-                <a:ea typeface="Verdana" panose="020B0604030504040204" pitchFamily="34" charset="0"/>
-                <a:cs typeface="+mn-cs"/>
-              </a:rPr>
-              <a:t>Information</a:t>
-            </a:r>
-            <a:endParaRPr kumimoji="0" lang="en-IN" sz="1800" b="1" i="0" u="none" strike="noStrike" kern="1200" cap="none" spc="0" normalizeH="0" baseline="0" noProof="0" dirty="0">
-              <a:ln>
-                <a:noFill/>
-              </a:ln>
-              <a:solidFill>
-                <a:prstClr val="white"/>
-              </a:solidFill>
-              <a:effectLst/>
-              <a:uLnTx/>
-              <a:uFillTx/>
-              <a:latin typeface="Verdana" panose="020B0604030504040204" pitchFamily="34" charset="0"/>
-              <a:ea typeface="Verdana" panose="020B0604030504040204" pitchFamily="34" charset="0"/>
-              <a:cs typeface="+mn-cs"/>
-            </a:endParaRPr>
-          </a:p>
-        </p:txBody>
-      </p:sp>
-      <p:sp>
-        <p:nvSpPr>
-          <p:cNvPr id="7" name="Rectangle 6">
-            <a:extLst>
-              <a:ext uri="{FF2B5EF4-FFF2-40B4-BE49-F238E27FC236}">
-                <a16:creationId xmlns:a16="http://schemas.microsoft.com/office/drawing/2014/main" id="{B10720DE-FD2A-4FE5-B9FB-74854D01A659}"/>
-              </a:ext>
-            </a:extLst>
-          </p:cNvPr>
-          <p:cNvSpPr/>
-          <p:nvPr/>
-        </p:nvSpPr>
-        <p:spPr>
-          <a:xfrm>
-            <a:off x="0" y="3915050"/>
-            <a:ext cx="12183122" cy="57703"/>
-          </a:xfrm>
-          <a:prstGeom prst="rect">
-            <a:avLst/>
-          </a:prstGeom>
-          <a:solidFill>
-            <a:srgbClr val="0070C0"/>
-          </a:solidFill>
-        </p:spPr>
-        <p:style>
-          <a:lnRef idx="2">
-            <a:schemeClr val="accent1">
-              <a:shade val="50000"/>
-            </a:schemeClr>
-          </a:lnRef>
-          <a:fillRef idx="1">
-            <a:schemeClr val="accent1"/>
-          </a:fillRef>
-          <a:effectRef idx="0">
-            <a:schemeClr val="accent1"/>
-          </a:effectRef>
-          <a:fontRef idx="minor">
-            <a:schemeClr val="lt1"/>
-          </a:fontRef>
-        </p:style>
-        <p:txBody>
-          <a:bodyPr rtlCol="0" anchor="ctr"/>
-          <a:lstStyle/>
-          <a:p>
-            <a:pPr marL="0" marR="0" lvl="0" indent="0" algn="ctr" defTabSz="914400" rtl="0" eaLnBrk="1" fontAlgn="auto" latinLnBrk="0" hangingPunct="1">
-              <a:lnSpc>
-                <a:spcPct val="100000"/>
-              </a:lnSpc>
-              <a:spcBef>
-                <a:spcPts val="0"/>
-              </a:spcBef>
-              <a:spcAft>
-                <a:spcPts val="0"/>
-              </a:spcAft>
-              <a:buClrTx/>
-              <a:buSzTx/>
-              <a:buFontTx/>
-              <a:buNone/>
-              <a:tabLst/>
-              <a:defRPr/>
-            </a:pPr>
-            <a:endParaRPr kumimoji="0" lang="en-IN" sz="1000" b="0" i="0" u="none" strike="noStrike" kern="1200" cap="none" spc="0" normalizeH="0" baseline="0" noProof="0" dirty="0">
-              <a:ln>
-                <a:noFill/>
-              </a:ln>
-              <a:solidFill>
-                <a:prstClr val="white"/>
-              </a:solidFill>
-              <a:effectLst/>
-              <a:uLnTx/>
-              <a:uFillTx/>
-              <a:latin typeface="Verdana" panose="020B0604030504040204" pitchFamily="34" charset="0"/>
-              <a:ea typeface="Verdana" panose="020B0604030504040204" pitchFamily="34" charset="0"/>
-              <a:cs typeface="+mn-cs"/>
-            </a:endParaRPr>
-          </a:p>
-        </p:txBody>
-      </p:sp>
-      <p:sp>
-        <p:nvSpPr>
-          <p:cNvPr id="8" name="Footer Placeholder 7">
-            <a:extLst>
-              <a:ext uri="{FF2B5EF4-FFF2-40B4-BE49-F238E27FC236}">
-                <a16:creationId xmlns:a16="http://schemas.microsoft.com/office/drawing/2014/main" id="{DD2A19CA-EC18-432D-8F8F-17079808F38B}"/>
-              </a:ext>
-            </a:extLst>
-          </p:cNvPr>
-          <p:cNvSpPr>
-            <a:spLocks noGrp="1"/>
-          </p:cNvSpPr>
-          <p:nvPr>
-            <p:ph type="ftr" sz="quarter" idx="11"/>
-          </p:nvPr>
-        </p:nvSpPr>
-        <p:spPr>
-          <a:xfrm>
-            <a:off x="4038600" y="3959378"/>
-            <a:ext cx="4114800" cy="365125"/>
-          </a:xfrm>
-        </p:spPr>
-        <p:txBody>
-          <a:bodyPr/>
-          <a:lstStyle/>
-          <a:p>
-            <a:pPr marL="0" marR="0" lvl="0" indent="0" algn="ctr" defTabSz="914400" rtl="0" eaLnBrk="1" fontAlgn="auto" latinLnBrk="0" hangingPunct="1">
-              <a:lnSpc>
-                <a:spcPct val="100000"/>
-              </a:lnSpc>
-              <a:spcBef>
-                <a:spcPts val="0"/>
-              </a:spcBef>
-              <a:spcAft>
-                <a:spcPts val="0"/>
-              </a:spcAft>
-              <a:buClrTx/>
-              <a:buSzTx/>
-              <a:buFontTx/>
-              <a:buNone/>
-              <a:tabLst/>
-              <a:defRPr/>
-            </a:pPr>
-            <a:r>
-              <a:rPr kumimoji="0" lang="en-IN" sz="1200" b="1" i="0" u="none" strike="noStrike" kern="1200" cap="none" spc="0" normalizeH="0" baseline="0" noProof="0" dirty="0">
-                <a:ln>
-                  <a:noFill/>
-                </a:ln>
-                <a:solidFill>
-                  <a:srgbClr val="002060"/>
-                </a:solidFill>
-                <a:effectLst/>
-                <a:uLnTx/>
-                <a:uFillTx/>
-                <a:latin typeface="Verdana" panose="020B0604030504040204" pitchFamily="34" charset="0"/>
-                <a:ea typeface="Verdana" panose="020B0604030504040204" pitchFamily="34" charset="0"/>
-                <a:cs typeface="+mn-cs"/>
-              </a:rPr>
-              <a:t>2022</a:t>
-            </a:r>
-          </a:p>
-        </p:txBody>
-      </p:sp>
-      <p:sp>
-        <p:nvSpPr>
-          <p:cNvPr id="9" name="Slide Number Placeholder 8">
-            <a:extLst>
-              <a:ext uri="{FF2B5EF4-FFF2-40B4-BE49-F238E27FC236}">
-                <a16:creationId xmlns:a16="http://schemas.microsoft.com/office/drawing/2014/main" id="{8162625C-0B1F-42E0-BE7C-D99A08FED7A3}"/>
-              </a:ext>
-            </a:extLst>
-          </p:cNvPr>
-          <p:cNvSpPr>
-            <a:spLocks noGrp="1"/>
-          </p:cNvSpPr>
-          <p:nvPr>
-            <p:ph type="sldNum" sz="quarter" idx="12"/>
-          </p:nvPr>
-        </p:nvSpPr>
-        <p:spPr>
-          <a:xfrm>
-            <a:off x="8610600" y="3959378"/>
-            <a:ext cx="2743200" cy="365125"/>
-          </a:xfrm>
-        </p:spPr>
-        <p:txBody>
-          <a:bodyPr/>
-          <a:lstStyle/>
-          <a:p>
-            <a:pPr marL="0" marR="0" lvl="0" indent="0" algn="r" defTabSz="914400" rtl="0" eaLnBrk="1" fontAlgn="auto" latinLnBrk="0" hangingPunct="1">
-              <a:lnSpc>
-                <a:spcPct val="100000"/>
-              </a:lnSpc>
-              <a:spcBef>
-                <a:spcPts val="0"/>
-              </a:spcBef>
-              <a:spcAft>
-                <a:spcPts val="0"/>
-              </a:spcAft>
-              <a:buClrTx/>
-              <a:buSzTx/>
-              <a:buFontTx/>
-              <a:buNone/>
-              <a:tabLst/>
-              <a:defRPr/>
-            </a:pPr>
-            <a:r>
-              <a:rPr kumimoji="0" lang="en-IN" sz="1200" b="1" i="0" u="none" strike="noStrike" kern="1200" cap="none" spc="0" normalizeH="0" baseline="0" noProof="0" dirty="0">
-                <a:ln>
-                  <a:noFill/>
-                </a:ln>
-                <a:solidFill>
-                  <a:srgbClr val="002060"/>
-                </a:solidFill>
-                <a:effectLst/>
-                <a:uLnTx/>
-                <a:uFillTx/>
-                <a:latin typeface="Verdana" panose="020B0604030504040204" pitchFamily="34" charset="0"/>
-                <a:ea typeface="Verdana" panose="020B0604030504040204" pitchFamily="34" charset="0"/>
-                <a:cs typeface="+mn-cs"/>
-              </a:rPr>
-              <a:t>1</a:t>
-            </a:r>
-          </a:p>
-        </p:txBody>
-      </p:sp>
-      <p:sp>
-        <p:nvSpPr>
-          <p:cNvPr id="12" name="Footer Placeholder 7">
-            <a:extLst>
-              <a:ext uri="{FF2B5EF4-FFF2-40B4-BE49-F238E27FC236}">
-                <a16:creationId xmlns:a16="http://schemas.microsoft.com/office/drawing/2014/main" id="{64C57949-E349-47D3-A505-A098233AF49D}"/>
-              </a:ext>
-            </a:extLst>
-          </p:cNvPr>
-          <p:cNvSpPr txBox="1">
-            <a:spLocks/>
-          </p:cNvSpPr>
-          <p:nvPr/>
-        </p:nvSpPr>
-        <p:spPr>
-          <a:xfrm>
-            <a:off x="133897" y="3960852"/>
-            <a:ext cx="4114800" cy="365125"/>
-          </a:xfrm>
-          <a:prstGeom prst="rect">
-            <a:avLst/>
-          </a:prstGeom>
-        </p:spPr>
-        <p:txBody>
-          <a:bodyPr vert="horz" lIns="91440" tIns="45720" rIns="91440" bIns="45720" rtlCol="0" anchor="ctr"/>
-          <a:lstStyle>
-            <a:defPPr>
-              <a:defRPr lang="en-US"/>
-            </a:defPPr>
-            <a:lvl1pPr marL="0" algn="ctr" defTabSz="914400" rtl="0" eaLnBrk="1" latinLnBrk="0" hangingPunct="1">
-              <a:defRPr sz="1200" kern="1200">
-                <a:solidFill>
-                  <a:schemeClr val="tx1">
-                    <a:tint val="75000"/>
-                  </a:schemeClr>
-                </a:solidFill>
-                <a:latin typeface="+mn-lt"/>
-                <a:ea typeface="+mn-ea"/>
-                <a:cs typeface="+mn-cs"/>
-              </a:defRPr>
-            </a:lvl1pPr>
-            <a:lvl2pPr marL="457200" algn="l" defTabSz="914400" rtl="0" eaLnBrk="1" latinLnBrk="0" hangingPunct="1">
-              <a:defRPr sz="1800" kern="1200">
-                <a:solidFill>
-                  <a:schemeClr val="tx1"/>
-                </a:solidFill>
-                <a:latin typeface="+mn-lt"/>
-                <a:ea typeface="+mn-ea"/>
-                <a:cs typeface="+mn-cs"/>
-              </a:defRPr>
-            </a:lvl2pPr>
-            <a:lvl3pPr marL="914400" algn="l" defTabSz="914400" rtl="0" eaLnBrk="1" latinLnBrk="0" hangingPunct="1">
-              <a:defRPr sz="1800" kern="1200">
-                <a:solidFill>
-                  <a:schemeClr val="tx1"/>
-                </a:solidFill>
-                <a:latin typeface="+mn-lt"/>
-                <a:ea typeface="+mn-ea"/>
-                <a:cs typeface="+mn-cs"/>
-              </a:defRPr>
-            </a:lvl3pPr>
-            <a:lvl4pPr marL="1371600" algn="l" defTabSz="914400" rtl="0" eaLnBrk="1" latinLnBrk="0" hangingPunct="1">
-              <a:defRPr sz="1800" kern="1200">
-                <a:solidFill>
-                  <a:schemeClr val="tx1"/>
-                </a:solidFill>
-                <a:latin typeface="+mn-lt"/>
-                <a:ea typeface="+mn-ea"/>
-                <a:cs typeface="+mn-cs"/>
-              </a:defRPr>
-            </a:lvl4pPr>
-            <a:lvl5pPr marL="1828800" algn="l" defTabSz="914400" rtl="0" eaLnBrk="1" latinLnBrk="0" hangingPunct="1">
-              <a:defRPr sz="1800" kern="1200">
-                <a:solidFill>
-                  <a:schemeClr val="tx1"/>
-                </a:solidFill>
-                <a:latin typeface="+mn-lt"/>
-                <a:ea typeface="+mn-ea"/>
-                <a:cs typeface="+mn-cs"/>
-              </a:defRPr>
-            </a:lvl5pPr>
-            <a:lvl6pPr marL="2286000" algn="l" defTabSz="914400" rtl="0" eaLnBrk="1" latinLnBrk="0" hangingPunct="1">
-              <a:defRPr sz="1800" kern="1200">
-                <a:solidFill>
-                  <a:schemeClr val="tx1"/>
-                </a:solidFill>
-                <a:latin typeface="+mn-lt"/>
-                <a:ea typeface="+mn-ea"/>
-                <a:cs typeface="+mn-cs"/>
-              </a:defRPr>
-            </a:lvl6pPr>
-            <a:lvl7pPr marL="2743200" algn="l" defTabSz="914400" rtl="0" eaLnBrk="1" latinLnBrk="0" hangingPunct="1">
-              <a:defRPr sz="1800" kern="1200">
-                <a:solidFill>
-                  <a:schemeClr val="tx1"/>
-                </a:solidFill>
-                <a:latin typeface="+mn-lt"/>
-                <a:ea typeface="+mn-ea"/>
-                <a:cs typeface="+mn-cs"/>
-              </a:defRPr>
-            </a:lvl7pPr>
-            <a:lvl8pPr marL="3200400" algn="l" defTabSz="914400" rtl="0" eaLnBrk="1" latinLnBrk="0" hangingPunct="1">
-              <a:defRPr sz="1800" kern="1200">
-                <a:solidFill>
-                  <a:schemeClr val="tx1"/>
-                </a:solidFill>
-                <a:latin typeface="+mn-lt"/>
-                <a:ea typeface="+mn-ea"/>
-                <a:cs typeface="+mn-cs"/>
-              </a:defRPr>
-            </a:lvl8pPr>
-            <a:lvl9pPr marL="3657600" algn="l" defTabSz="914400" rtl="0" eaLnBrk="1" latinLnBrk="0" hangingPunct="1">
-              <a:defRPr sz="1800" kern="1200">
-                <a:solidFill>
-                  <a:schemeClr val="tx1"/>
-                </a:solidFill>
-                <a:latin typeface="+mn-lt"/>
-                <a:ea typeface="+mn-ea"/>
-                <a:cs typeface="+mn-cs"/>
-              </a:defRPr>
-            </a:lvl9pPr>
-          </a:lstStyle>
-          <a:p>
-            <a:pPr marL="0" marR="0" lvl="0" indent="0" algn="ctr" defTabSz="914400" rtl="0" eaLnBrk="1" fontAlgn="auto" latinLnBrk="0" hangingPunct="1">
-              <a:lnSpc>
-                <a:spcPct val="100000"/>
-              </a:lnSpc>
-              <a:spcBef>
-                <a:spcPts val="0"/>
-              </a:spcBef>
-              <a:spcAft>
-                <a:spcPts val="0"/>
-              </a:spcAft>
-              <a:buClrTx/>
-              <a:buSzTx/>
-              <a:buFontTx/>
-              <a:buNone/>
-              <a:tabLst/>
-              <a:defRPr/>
-            </a:pPr>
-            <a:r>
-              <a:rPr kumimoji="0" lang="en-IN" sz="1200" b="1" i="0" u="none" strike="noStrike" kern="1200" cap="none" spc="0" normalizeH="0" baseline="0" noProof="0" dirty="0">
-                <a:ln>
-                  <a:noFill/>
-                </a:ln>
-                <a:solidFill>
-                  <a:srgbClr val="002060"/>
-                </a:solidFill>
-                <a:effectLst/>
-                <a:uLnTx/>
-                <a:uFillTx/>
-                <a:latin typeface="Verdana" panose="020B0604030504040204" pitchFamily="34" charset="0"/>
-                <a:ea typeface="Verdana" panose="020B0604030504040204" pitchFamily="34" charset="0"/>
-                <a:cs typeface="+mn-cs"/>
-              </a:rPr>
-              <a:t>Dot Net Learners House</a:t>
-            </a:r>
-          </a:p>
-        </p:txBody>
-      </p:sp>
-      <p:sp>
-        <p:nvSpPr>
-          <p:cNvPr id="10" name="TextBox 9">
-            <a:extLst>
-              <a:ext uri="{FF2B5EF4-FFF2-40B4-BE49-F238E27FC236}">
-                <a16:creationId xmlns:a16="http://schemas.microsoft.com/office/drawing/2014/main" id="{19953791-0C49-4113-A95A-639979BFF9A6}"/>
-              </a:ext>
-            </a:extLst>
-          </p:cNvPr>
-          <p:cNvSpPr txBox="1"/>
-          <p:nvPr/>
-        </p:nvSpPr>
-        <p:spPr>
-          <a:xfrm>
-            <a:off x="80629" y="557824"/>
-            <a:ext cx="12037390" cy="2800062"/>
-          </a:xfrm>
-          <a:prstGeom prst="rect">
-            <a:avLst/>
-          </a:prstGeom>
-          <a:noFill/>
-        </p:spPr>
-        <p:txBody>
-          <a:bodyPr wrap="square" rtlCol="0">
-            <a:spAutoFit/>
-          </a:bodyPr>
-          <a:lstStyle/>
-          <a:p>
-            <a:pPr marL="628650" marR="0" lvl="1" indent="-171450" algn="l" defTabSz="914400" rtl="0" eaLnBrk="1" fontAlgn="auto" latinLnBrk="0" hangingPunct="1">
-              <a:lnSpc>
-                <a:spcPct val="150000"/>
-              </a:lnSpc>
-              <a:spcBef>
-                <a:spcPts val="0"/>
-              </a:spcBef>
-              <a:spcAft>
-                <a:spcPts val="0"/>
-              </a:spcAft>
-              <a:buClrTx/>
-              <a:buSzTx/>
-              <a:buFont typeface="Wingdings" panose="05000000000000000000" pitchFamily="2" charset="2"/>
-              <a:buChar char="Ø"/>
-              <a:tabLst/>
-              <a:defRPr/>
-            </a:pPr>
-            <a:r>
-              <a:rPr kumimoji="0" lang="en-US" sz="2000" b="0" i="0" u="none" strike="noStrike" kern="1200" cap="none" spc="0" normalizeH="0" baseline="0" noProof="0" dirty="0">
-                <a:ln>
-                  <a:noFill/>
-                </a:ln>
-                <a:solidFill>
-                  <a:srgbClr val="00B0F0"/>
-                </a:solidFill>
-                <a:effectLst/>
-                <a:uLnTx/>
-                <a:uFillTx/>
-                <a:latin typeface="Verdana" panose="020B0604030504040204" pitchFamily="34" charset="0"/>
-                <a:ea typeface="Verdana" panose="020B0604030504040204" pitchFamily="34" charset="0"/>
-                <a:cs typeface="+mn-cs"/>
-              </a:rPr>
-              <a:t> </a:t>
-            </a:r>
-            <a:r>
-              <a:rPr kumimoji="0" lang="en-US" sz="2000" b="0" i="0" u="none" strike="noStrike" kern="1200" cap="none" spc="0" normalizeH="0" baseline="0" noProof="0" dirty="0">
-                <a:ln>
-                  <a:noFill/>
-                </a:ln>
-                <a:solidFill>
-                  <a:srgbClr val="0070C0"/>
-                </a:solidFill>
-                <a:effectLst/>
-                <a:uLnTx/>
-                <a:uFillTx/>
-                <a:latin typeface="Verdana" panose="020B0604030504040204" pitchFamily="34" charset="0"/>
-                <a:ea typeface="Verdana" panose="020B0604030504040204" pitchFamily="34" charset="0"/>
-                <a:cs typeface="+mn-cs"/>
-              </a:rPr>
-              <a:t>I am still a learner. Apologize if I do any mistake.</a:t>
-            </a:r>
-          </a:p>
-          <a:p>
-            <a:pPr marL="628650" marR="0" lvl="1" indent="-171450" algn="l" defTabSz="914400" rtl="0" eaLnBrk="1" fontAlgn="auto" latinLnBrk="0" hangingPunct="1">
-              <a:lnSpc>
-                <a:spcPct val="150000"/>
-              </a:lnSpc>
-              <a:spcBef>
-                <a:spcPts val="0"/>
-              </a:spcBef>
-              <a:spcAft>
-                <a:spcPts val="0"/>
-              </a:spcAft>
-              <a:buClrTx/>
-              <a:buSzTx/>
-              <a:buFont typeface="Wingdings" panose="05000000000000000000" pitchFamily="2" charset="2"/>
-              <a:buChar char="Ø"/>
-              <a:tabLst/>
-              <a:defRPr/>
-            </a:pPr>
-            <a:r>
-              <a:rPr kumimoji="0" lang="en-US" sz="2000" b="0" i="0" u="none" strike="noStrike" kern="1200" cap="none" spc="0" normalizeH="0" baseline="0" noProof="0" dirty="0">
-                <a:ln>
-                  <a:noFill/>
-                </a:ln>
-                <a:solidFill>
-                  <a:srgbClr val="002060"/>
-                </a:solidFill>
-                <a:effectLst/>
-                <a:uLnTx/>
-                <a:uFillTx/>
-                <a:latin typeface="Verdana" panose="020B0604030504040204" pitchFamily="34" charset="0"/>
-                <a:ea typeface="Verdana" panose="020B0604030504040204" pitchFamily="34" charset="0"/>
-                <a:cs typeface="+mn-cs"/>
-              </a:rPr>
-              <a:t> All the sessions will be hands on.</a:t>
-            </a:r>
-          </a:p>
-          <a:p>
-            <a:pPr marL="628650" marR="0" lvl="1" indent="-171450" algn="l" defTabSz="914400" rtl="0" eaLnBrk="1" fontAlgn="auto" latinLnBrk="0" hangingPunct="1">
-              <a:lnSpc>
-                <a:spcPct val="150000"/>
-              </a:lnSpc>
-              <a:spcBef>
-                <a:spcPts val="0"/>
-              </a:spcBef>
-              <a:spcAft>
-                <a:spcPts val="0"/>
-              </a:spcAft>
-              <a:buClrTx/>
-              <a:buSzTx/>
-              <a:buFont typeface="Wingdings" panose="05000000000000000000" pitchFamily="2" charset="2"/>
-              <a:buChar char="Ø"/>
-              <a:tabLst/>
-              <a:defRPr/>
-            </a:pPr>
-            <a:r>
-              <a:rPr kumimoji="0" lang="en-US" sz="2000" b="0" i="0" u="none" strike="noStrike" kern="1200" cap="none" spc="0" normalizeH="0" baseline="0" noProof="0" dirty="0">
-                <a:ln>
-                  <a:noFill/>
-                </a:ln>
-                <a:solidFill>
-                  <a:srgbClr val="002060"/>
-                </a:solidFill>
-                <a:effectLst/>
-                <a:uLnTx/>
-                <a:uFillTx/>
-                <a:latin typeface="Verdana" panose="020B0604030504040204" pitchFamily="34" charset="0"/>
-                <a:ea typeface="Verdana" panose="020B0604030504040204" pitchFamily="34" charset="0"/>
-                <a:cs typeface="+mn-cs"/>
-              </a:rPr>
-              <a:t> Will have parking lots for queries and other topics.</a:t>
-            </a:r>
-          </a:p>
-          <a:p>
-            <a:pPr marL="628650" marR="0" lvl="1" indent="-171450" algn="l" defTabSz="914400" rtl="0" eaLnBrk="1" fontAlgn="auto" latinLnBrk="0" hangingPunct="1">
-              <a:lnSpc>
-                <a:spcPct val="150000"/>
-              </a:lnSpc>
-              <a:spcBef>
-                <a:spcPts val="0"/>
-              </a:spcBef>
-              <a:spcAft>
-                <a:spcPts val="0"/>
-              </a:spcAft>
-              <a:buClrTx/>
-              <a:buSzTx/>
-              <a:buFont typeface="Wingdings" panose="05000000000000000000" pitchFamily="2" charset="2"/>
-              <a:buChar char="Ø"/>
-              <a:tabLst/>
-              <a:defRPr/>
-            </a:pPr>
-            <a:r>
-              <a:rPr kumimoji="0" lang="en-US" sz="2000" b="0" i="0" u="none" strike="noStrike" kern="1200" cap="none" spc="0" normalizeH="0" baseline="0" noProof="0" dirty="0">
-                <a:ln>
-                  <a:noFill/>
-                </a:ln>
-                <a:solidFill>
-                  <a:srgbClr val="002060"/>
-                </a:solidFill>
-                <a:effectLst/>
-                <a:uLnTx/>
-                <a:uFillTx/>
-                <a:latin typeface="Verdana" panose="020B0604030504040204" pitchFamily="34" charset="0"/>
-                <a:ea typeface="Verdana" panose="020B0604030504040204" pitchFamily="34" charset="0"/>
-                <a:cs typeface="+mn-cs"/>
-              </a:rPr>
-              <a:t> Some of the concepts we will introduced and revisited in next sessions.</a:t>
-            </a:r>
-          </a:p>
-          <a:p>
-            <a:pPr marL="628650" marR="0" lvl="1" indent="-171450" algn="l" defTabSz="914400" rtl="0" eaLnBrk="1" fontAlgn="auto" latinLnBrk="0" hangingPunct="1">
-              <a:lnSpc>
-                <a:spcPct val="150000"/>
-              </a:lnSpc>
-              <a:spcBef>
-                <a:spcPts val="0"/>
-              </a:spcBef>
-              <a:spcAft>
-                <a:spcPts val="0"/>
-              </a:spcAft>
-              <a:buClrTx/>
-              <a:buSzTx/>
-              <a:buFont typeface="Wingdings" panose="05000000000000000000" pitchFamily="2" charset="2"/>
-              <a:buChar char="Ø"/>
-              <a:tabLst/>
-              <a:defRPr/>
-            </a:pPr>
-            <a:r>
-              <a:rPr kumimoji="0" lang="en-US" sz="2000" b="0" i="0" u="none" strike="noStrike" kern="1200" cap="none" spc="0" normalizeH="0" baseline="0" noProof="0" dirty="0">
-                <a:ln>
-                  <a:noFill/>
-                </a:ln>
-                <a:solidFill>
-                  <a:srgbClr val="002060"/>
-                </a:solidFill>
-                <a:effectLst/>
-                <a:uLnTx/>
-                <a:uFillTx/>
-                <a:latin typeface="Verdana" panose="020B0604030504040204" pitchFamily="34" charset="0"/>
-                <a:ea typeface="Verdana" panose="020B0604030504040204" pitchFamily="34" charset="0"/>
-                <a:cs typeface="+mn-cs"/>
-              </a:rPr>
-              <a:t> There are multiple ways to do, we will use one of the ways.</a:t>
-            </a:r>
-          </a:p>
-          <a:p>
-            <a:pPr marL="628650" marR="0" lvl="1" indent="-171450" algn="l" defTabSz="914400" rtl="0" eaLnBrk="1" fontAlgn="auto" latinLnBrk="0" hangingPunct="1">
-              <a:lnSpc>
-                <a:spcPct val="150000"/>
-              </a:lnSpc>
-              <a:spcBef>
-                <a:spcPts val="0"/>
-              </a:spcBef>
-              <a:spcAft>
-                <a:spcPts val="0"/>
-              </a:spcAft>
-              <a:buClrTx/>
-              <a:buSzTx/>
-              <a:buFont typeface="Wingdings" panose="05000000000000000000" pitchFamily="2" charset="2"/>
-              <a:buChar char="Ø"/>
-              <a:tabLst/>
-              <a:defRPr/>
-            </a:pPr>
-            <a:r>
-              <a:rPr kumimoji="0" lang="en-US" sz="2000" b="0" i="0" u="none" strike="noStrike" kern="1200" cap="none" spc="0" normalizeH="0" baseline="0" noProof="0" dirty="0">
-                <a:ln>
-                  <a:noFill/>
-                </a:ln>
-                <a:solidFill>
-                  <a:srgbClr val="002060"/>
-                </a:solidFill>
-                <a:effectLst/>
-                <a:uLnTx/>
-                <a:uFillTx/>
-                <a:latin typeface="Verdana" panose="020B0604030504040204" pitchFamily="34" charset="0"/>
-                <a:ea typeface="Verdana" panose="020B0604030504040204" pitchFamily="34" charset="0"/>
-                <a:cs typeface="+mn-cs"/>
-              </a:rPr>
-              <a:t> The focus was more on concepts and demos are kept simple. </a:t>
-            </a:r>
-          </a:p>
-        </p:txBody>
-      </p:sp>
-    </p:spTree>
-    <p:extLst>
-      <p:ext uri="{BB962C8B-B14F-4D97-AF65-F5344CB8AC3E}">
-        <p14:creationId xmlns:p14="http://schemas.microsoft.com/office/powerpoint/2010/main" val="933004240"/>
-      </p:ext>
-    </p:extLst>
-  </p:cSld>
-  <p:clrMapOvr>
-    <a:masterClrMapping/>
-  </p:clrMapOvr>
-</p:sld>
-</file>
-
 <file path=ppt/slides/slide3.xml><?xml version="1.0" encoding="utf-8"?>
 <p:sld xmlns:a="http://schemas.openxmlformats.org/drawingml/2006/main" xmlns:r="http://schemas.openxmlformats.org/officeDocument/2006/relationships" xmlns:p="http://schemas.openxmlformats.org/presentationml/2006/main">
   <p:cSld>
@@ -30387,6 +30500,1741 @@
 </file>
 
 <file path=ppt/slides/slide5.xml><?xml version="1.0" encoding="utf-8"?>
+<p:sld xmlns:a="http://schemas.openxmlformats.org/drawingml/2006/main" xmlns:r="http://schemas.openxmlformats.org/officeDocument/2006/relationships" xmlns:p="http://schemas.openxmlformats.org/presentationml/2006/main">
+  <p:cSld>
+    <p:spTree>
+      <p:nvGrpSpPr>
+        <p:cNvPr id="1" name=""/>
+        <p:cNvGrpSpPr/>
+        <p:nvPr/>
+      </p:nvGrpSpPr>
+      <p:grpSpPr>
+        <a:xfrm>
+          <a:off x="0" y="0"/>
+          <a:ext cx="0" cy="0"/>
+          <a:chOff x="0" y="0"/>
+          <a:chExt cx="0" cy="0"/>
+        </a:xfrm>
+      </p:grpSpPr>
+      <p:sp>
+        <p:nvSpPr>
+          <p:cNvPr id="4" name="Rectangle: Rounded Corners 3">
+            <a:extLst>
+              <a:ext uri="{FF2B5EF4-FFF2-40B4-BE49-F238E27FC236}">
+                <a16:creationId xmlns:a16="http://schemas.microsoft.com/office/drawing/2014/main" id="{FE81CCDF-2A60-7094-66C7-A21220D60019}"/>
+              </a:ext>
+            </a:extLst>
+          </p:cNvPr>
+          <p:cNvSpPr/>
+          <p:nvPr/>
+        </p:nvSpPr>
+        <p:spPr>
+          <a:xfrm>
+            <a:off x="1951352" y="1338606"/>
+            <a:ext cx="1696824" cy="1545996"/>
+          </a:xfrm>
+          <a:prstGeom prst="roundRect">
+            <a:avLst/>
+          </a:prstGeom>
+        </p:spPr>
+        <p:style>
+          <a:lnRef idx="2">
+            <a:schemeClr val="accent1">
+              <a:shade val="50000"/>
+            </a:schemeClr>
+          </a:lnRef>
+          <a:fillRef idx="1">
+            <a:schemeClr val="accent1"/>
+          </a:fillRef>
+          <a:effectRef idx="0">
+            <a:schemeClr val="accent1"/>
+          </a:effectRef>
+          <a:fontRef idx="minor">
+            <a:schemeClr val="lt1"/>
+          </a:fontRef>
+        </p:style>
+        <p:txBody>
+          <a:bodyPr rtlCol="0" anchor="ctr"/>
+          <a:lstStyle/>
+          <a:p>
+            <a:pPr algn="ctr"/>
+            <a:r>
+              <a:rPr lang="en-US" dirty="0"/>
+              <a:t>Admin </a:t>
+            </a:r>
+          </a:p>
+          <a:p>
+            <a:pPr algn="ctr"/>
+            <a:r>
+              <a:rPr lang="en-US" dirty="0"/>
+              <a:t>UI Browser</a:t>
+            </a:r>
+          </a:p>
+        </p:txBody>
+      </p:sp>
+      <p:sp>
+        <p:nvSpPr>
+          <p:cNvPr id="7" name="Rectangle 6">
+            <a:extLst>
+              <a:ext uri="{FF2B5EF4-FFF2-40B4-BE49-F238E27FC236}">
+                <a16:creationId xmlns:a16="http://schemas.microsoft.com/office/drawing/2014/main" id="{7BF524D1-67AF-C3FA-D260-7ADDDE43478D}"/>
+              </a:ext>
+            </a:extLst>
+          </p:cNvPr>
+          <p:cNvSpPr/>
+          <p:nvPr/>
+        </p:nvSpPr>
+        <p:spPr>
+          <a:xfrm>
+            <a:off x="7098384" y="4675695"/>
+            <a:ext cx="1696824" cy="1376314"/>
+          </a:xfrm>
+          <a:prstGeom prst="rect">
+            <a:avLst/>
+          </a:prstGeom>
+          <a:solidFill>
+            <a:srgbClr val="00B050"/>
+          </a:solidFill>
+        </p:spPr>
+        <p:style>
+          <a:lnRef idx="2">
+            <a:schemeClr val="accent1">
+              <a:shade val="50000"/>
+            </a:schemeClr>
+          </a:lnRef>
+          <a:fillRef idx="1">
+            <a:schemeClr val="accent1"/>
+          </a:fillRef>
+          <a:effectRef idx="0">
+            <a:schemeClr val="accent1"/>
+          </a:effectRef>
+          <a:fontRef idx="minor">
+            <a:schemeClr val="lt1"/>
+          </a:fontRef>
+        </p:style>
+        <p:txBody>
+          <a:bodyPr rtlCol="0" anchor="ctr"/>
+          <a:lstStyle/>
+          <a:p>
+            <a:pPr algn="ctr"/>
+            <a:r>
+              <a:rPr lang="en-US" dirty="0"/>
+              <a:t>Temporary Image Storage</a:t>
+            </a:r>
+          </a:p>
+        </p:txBody>
+      </p:sp>
+      <p:sp>
+        <p:nvSpPr>
+          <p:cNvPr id="8" name="Oval 7">
+            <a:extLst>
+              <a:ext uri="{FF2B5EF4-FFF2-40B4-BE49-F238E27FC236}">
+                <a16:creationId xmlns:a16="http://schemas.microsoft.com/office/drawing/2014/main" id="{2C82FADF-A01A-0F99-CC53-43788038F841}"/>
+              </a:ext>
+            </a:extLst>
+          </p:cNvPr>
+          <p:cNvSpPr/>
+          <p:nvPr/>
+        </p:nvSpPr>
+        <p:spPr>
+          <a:xfrm>
+            <a:off x="4645841" y="4732256"/>
+            <a:ext cx="1244338" cy="1263192"/>
+          </a:xfrm>
+          <a:prstGeom prst="ellipse">
+            <a:avLst/>
+          </a:prstGeom>
+        </p:spPr>
+        <p:style>
+          <a:lnRef idx="2">
+            <a:schemeClr val="accent1">
+              <a:shade val="50000"/>
+            </a:schemeClr>
+          </a:lnRef>
+          <a:fillRef idx="1">
+            <a:schemeClr val="accent1"/>
+          </a:fillRef>
+          <a:effectRef idx="0">
+            <a:schemeClr val="accent1"/>
+          </a:effectRef>
+          <a:fontRef idx="minor">
+            <a:schemeClr val="lt1"/>
+          </a:fontRef>
+        </p:style>
+        <p:txBody>
+          <a:bodyPr rtlCol="0" anchor="ctr"/>
+          <a:lstStyle/>
+          <a:p>
+            <a:pPr algn="ctr"/>
+            <a:r>
+              <a:rPr lang="en-US" dirty="0"/>
+              <a:t>Az </a:t>
+            </a:r>
+            <a:r>
+              <a:rPr lang="en-US" dirty="0" err="1"/>
+              <a:t>Func</a:t>
+            </a:r>
+            <a:endParaRPr lang="en-US" dirty="0"/>
+          </a:p>
+        </p:txBody>
+      </p:sp>
+      <p:sp>
+        <p:nvSpPr>
+          <p:cNvPr id="9" name="Rectangle: Rounded Corners 8">
+            <a:extLst>
+              <a:ext uri="{FF2B5EF4-FFF2-40B4-BE49-F238E27FC236}">
+                <a16:creationId xmlns:a16="http://schemas.microsoft.com/office/drawing/2014/main" id="{30514CA6-1564-9431-D321-9AD54BD26C28}"/>
+              </a:ext>
+            </a:extLst>
+          </p:cNvPr>
+          <p:cNvSpPr/>
+          <p:nvPr/>
+        </p:nvSpPr>
+        <p:spPr>
+          <a:xfrm>
+            <a:off x="10256362" y="5203598"/>
+            <a:ext cx="1809947" cy="1545996"/>
+          </a:xfrm>
+          <a:prstGeom prst="roundRect">
+            <a:avLst/>
+          </a:prstGeom>
+          <a:solidFill>
+            <a:srgbClr val="00B050"/>
+          </a:solidFill>
+        </p:spPr>
+        <p:style>
+          <a:lnRef idx="2">
+            <a:schemeClr val="accent1">
+              <a:shade val="50000"/>
+            </a:schemeClr>
+          </a:lnRef>
+          <a:fillRef idx="1">
+            <a:schemeClr val="accent1"/>
+          </a:fillRef>
+          <a:effectRef idx="0">
+            <a:schemeClr val="accent1"/>
+          </a:effectRef>
+          <a:fontRef idx="minor">
+            <a:schemeClr val="lt1"/>
+          </a:fontRef>
+        </p:style>
+        <p:txBody>
+          <a:bodyPr rtlCol="0" anchor="ctr"/>
+          <a:lstStyle/>
+          <a:p>
+            <a:pPr algn="ctr"/>
+            <a:r>
+              <a:rPr lang="en-US" dirty="0"/>
+              <a:t>Destination Blob Storage</a:t>
+            </a:r>
+          </a:p>
+        </p:txBody>
+      </p:sp>
+      <p:sp>
+        <p:nvSpPr>
+          <p:cNvPr id="10" name="Flowchart: Magnetic Disk 9">
+            <a:extLst>
+              <a:ext uri="{FF2B5EF4-FFF2-40B4-BE49-F238E27FC236}">
+                <a16:creationId xmlns:a16="http://schemas.microsoft.com/office/drawing/2014/main" id="{A0A94D4D-D2E1-EB77-7CB4-C6B0076BB627}"/>
+              </a:ext>
+            </a:extLst>
+          </p:cNvPr>
+          <p:cNvSpPr/>
+          <p:nvPr/>
+        </p:nvSpPr>
+        <p:spPr>
+          <a:xfrm>
+            <a:off x="9981410" y="593889"/>
+            <a:ext cx="1621411" cy="1998482"/>
+          </a:xfrm>
+          <a:prstGeom prst="flowChartMagneticDisk">
+            <a:avLst/>
+          </a:prstGeom>
+          <a:solidFill>
+            <a:srgbClr val="FFFF00"/>
+          </a:solidFill>
+        </p:spPr>
+        <p:style>
+          <a:lnRef idx="2">
+            <a:schemeClr val="accent1">
+              <a:shade val="50000"/>
+            </a:schemeClr>
+          </a:lnRef>
+          <a:fillRef idx="1">
+            <a:schemeClr val="accent1"/>
+          </a:fillRef>
+          <a:effectRef idx="0">
+            <a:schemeClr val="accent1"/>
+          </a:effectRef>
+          <a:fontRef idx="minor">
+            <a:schemeClr val="lt1"/>
+          </a:fontRef>
+        </p:style>
+        <p:txBody>
+          <a:bodyPr rtlCol="0" anchor="ctr"/>
+          <a:lstStyle/>
+          <a:p>
+            <a:pPr algn="ctr"/>
+            <a:r>
+              <a:rPr lang="en-US" b="1" dirty="0">
+                <a:solidFill>
+                  <a:srgbClr val="002060"/>
+                </a:solidFill>
+              </a:rPr>
+              <a:t>Mongo</a:t>
+            </a:r>
+          </a:p>
+          <a:p>
+            <a:pPr algn="ctr"/>
+            <a:r>
+              <a:rPr lang="en-US" b="1" dirty="0">
+                <a:solidFill>
+                  <a:srgbClr val="002060"/>
+                </a:solidFill>
+              </a:rPr>
+              <a:t>Db</a:t>
+            </a:r>
+          </a:p>
+        </p:txBody>
+      </p:sp>
+      <p:cxnSp>
+        <p:nvCxnSpPr>
+          <p:cNvPr id="13" name="Straight Connector 12">
+            <a:extLst>
+              <a:ext uri="{FF2B5EF4-FFF2-40B4-BE49-F238E27FC236}">
+                <a16:creationId xmlns:a16="http://schemas.microsoft.com/office/drawing/2014/main" id="{264D6AFA-9293-89B9-9436-691235D5B3BC}"/>
+              </a:ext>
+            </a:extLst>
+          </p:cNvPr>
+          <p:cNvCxnSpPr/>
+          <p:nvPr/>
+        </p:nvCxnSpPr>
+        <p:spPr>
+          <a:xfrm>
+            <a:off x="4257774" y="0"/>
+            <a:ext cx="0" cy="6858000"/>
+          </a:xfrm>
+          <a:prstGeom prst="line">
+            <a:avLst/>
+          </a:prstGeom>
+        </p:spPr>
+        <p:style>
+          <a:lnRef idx="3">
+            <a:schemeClr val="accent1"/>
+          </a:lnRef>
+          <a:fillRef idx="0">
+            <a:schemeClr val="accent1"/>
+          </a:fillRef>
+          <a:effectRef idx="2">
+            <a:schemeClr val="accent1"/>
+          </a:effectRef>
+          <a:fontRef idx="minor">
+            <a:schemeClr val="tx1"/>
+          </a:fontRef>
+        </p:style>
+      </p:cxnSp>
+      <p:sp>
+        <p:nvSpPr>
+          <p:cNvPr id="14" name="Smiley Face 13">
+            <a:extLst>
+              <a:ext uri="{FF2B5EF4-FFF2-40B4-BE49-F238E27FC236}">
+                <a16:creationId xmlns:a16="http://schemas.microsoft.com/office/drawing/2014/main" id="{FFFBB0E0-4786-DB97-5B76-61D69F66BEDF}"/>
+              </a:ext>
+            </a:extLst>
+          </p:cNvPr>
+          <p:cNvSpPr/>
+          <p:nvPr/>
+        </p:nvSpPr>
+        <p:spPr>
+          <a:xfrm>
+            <a:off x="414779" y="1602557"/>
+            <a:ext cx="1159492" cy="1197204"/>
+          </a:xfrm>
+          <a:prstGeom prst="smileyFace">
+            <a:avLst/>
+          </a:prstGeom>
+        </p:spPr>
+        <p:style>
+          <a:lnRef idx="2">
+            <a:schemeClr val="accent1">
+              <a:shade val="50000"/>
+            </a:schemeClr>
+          </a:lnRef>
+          <a:fillRef idx="1">
+            <a:schemeClr val="accent1"/>
+          </a:fillRef>
+          <a:effectRef idx="0">
+            <a:schemeClr val="accent1"/>
+          </a:effectRef>
+          <a:fontRef idx="minor">
+            <a:schemeClr val="lt1"/>
+          </a:fontRef>
+        </p:style>
+        <p:txBody>
+          <a:bodyPr rtlCol="0" anchor="ctr"/>
+          <a:lstStyle/>
+          <a:p>
+            <a:pPr algn="ctr"/>
+            <a:endParaRPr lang="en-US"/>
+          </a:p>
+        </p:txBody>
+      </p:sp>
+      <p:sp>
+        <p:nvSpPr>
+          <p:cNvPr id="15" name="Rectangle: Rounded Corners 14">
+            <a:extLst>
+              <a:ext uri="{FF2B5EF4-FFF2-40B4-BE49-F238E27FC236}">
+                <a16:creationId xmlns:a16="http://schemas.microsoft.com/office/drawing/2014/main" id="{406EAD9C-B975-3A57-05FE-18EE0F57BF66}"/>
+              </a:ext>
+            </a:extLst>
+          </p:cNvPr>
+          <p:cNvSpPr/>
+          <p:nvPr/>
+        </p:nvSpPr>
+        <p:spPr>
+          <a:xfrm>
+            <a:off x="4645841" y="697583"/>
+            <a:ext cx="1184633" cy="3007151"/>
+          </a:xfrm>
+          <a:prstGeom prst="roundRect">
+            <a:avLst/>
+          </a:prstGeom>
+        </p:spPr>
+        <p:style>
+          <a:lnRef idx="2">
+            <a:schemeClr val="accent1">
+              <a:shade val="50000"/>
+            </a:schemeClr>
+          </a:lnRef>
+          <a:fillRef idx="1">
+            <a:schemeClr val="accent1"/>
+          </a:fillRef>
+          <a:effectRef idx="0">
+            <a:schemeClr val="accent1"/>
+          </a:effectRef>
+          <a:fontRef idx="minor">
+            <a:schemeClr val="lt1"/>
+          </a:fontRef>
+        </p:style>
+        <p:txBody>
+          <a:bodyPr rtlCol="0" anchor="ctr"/>
+          <a:lstStyle/>
+          <a:p>
+            <a:pPr algn="ctr"/>
+            <a:r>
+              <a:rPr lang="en-US" dirty="0"/>
+              <a:t>API Gateway</a:t>
+            </a:r>
+          </a:p>
+        </p:txBody>
+      </p:sp>
+      <p:cxnSp>
+        <p:nvCxnSpPr>
+          <p:cNvPr id="17" name="Straight Arrow Connector 16">
+            <a:extLst>
+              <a:ext uri="{FF2B5EF4-FFF2-40B4-BE49-F238E27FC236}">
+                <a16:creationId xmlns:a16="http://schemas.microsoft.com/office/drawing/2014/main" id="{F792B729-5B7E-C96B-49D5-5CB9096E17E4}"/>
+              </a:ext>
+            </a:extLst>
+          </p:cNvPr>
+          <p:cNvCxnSpPr>
+            <a:stCxn id="4" idx="3"/>
+          </p:cNvCxnSpPr>
+          <p:nvPr/>
+        </p:nvCxnSpPr>
+        <p:spPr>
+          <a:xfrm>
+            <a:off x="3648176" y="2111604"/>
+            <a:ext cx="997665" cy="0"/>
+          </a:xfrm>
+          <a:prstGeom prst="straightConnector1">
+            <a:avLst/>
+          </a:prstGeom>
+          <a:ln>
+            <a:tailEnd type="triangle"/>
+          </a:ln>
+        </p:spPr>
+        <p:style>
+          <a:lnRef idx="1">
+            <a:schemeClr val="accent1"/>
+          </a:lnRef>
+          <a:fillRef idx="0">
+            <a:schemeClr val="accent1"/>
+          </a:fillRef>
+          <a:effectRef idx="0">
+            <a:schemeClr val="accent1"/>
+          </a:effectRef>
+          <a:fontRef idx="minor">
+            <a:schemeClr val="tx1"/>
+          </a:fontRef>
+        </p:style>
+      </p:cxnSp>
+      <p:cxnSp>
+        <p:nvCxnSpPr>
+          <p:cNvPr id="19" name="Straight Arrow Connector 18">
+            <a:extLst>
+              <a:ext uri="{FF2B5EF4-FFF2-40B4-BE49-F238E27FC236}">
+                <a16:creationId xmlns:a16="http://schemas.microsoft.com/office/drawing/2014/main" id="{A000E672-82FA-7C39-F989-FAA98BA3F396}"/>
+              </a:ext>
+            </a:extLst>
+          </p:cNvPr>
+          <p:cNvCxnSpPr>
+            <a:stCxn id="15" idx="2"/>
+          </p:cNvCxnSpPr>
+          <p:nvPr/>
+        </p:nvCxnSpPr>
+        <p:spPr>
+          <a:xfrm flipH="1">
+            <a:off x="5238157" y="3704734"/>
+            <a:ext cx="1" cy="1027522"/>
+          </a:xfrm>
+          <a:prstGeom prst="straightConnector1">
+            <a:avLst/>
+          </a:prstGeom>
+          <a:ln>
+            <a:tailEnd type="triangle"/>
+          </a:ln>
+        </p:spPr>
+        <p:style>
+          <a:lnRef idx="1">
+            <a:schemeClr val="accent1"/>
+          </a:lnRef>
+          <a:fillRef idx="0">
+            <a:schemeClr val="accent1"/>
+          </a:fillRef>
+          <a:effectRef idx="0">
+            <a:schemeClr val="accent1"/>
+          </a:effectRef>
+          <a:fontRef idx="minor">
+            <a:schemeClr val="tx1"/>
+          </a:fontRef>
+        </p:style>
+      </p:cxnSp>
+      <p:cxnSp>
+        <p:nvCxnSpPr>
+          <p:cNvPr id="21" name="Straight Arrow Connector 20">
+            <a:extLst>
+              <a:ext uri="{FF2B5EF4-FFF2-40B4-BE49-F238E27FC236}">
+                <a16:creationId xmlns:a16="http://schemas.microsoft.com/office/drawing/2014/main" id="{E454B2A4-58A9-1F4F-5687-10F5243DFAB8}"/>
+              </a:ext>
+            </a:extLst>
+          </p:cNvPr>
+          <p:cNvCxnSpPr>
+            <a:stCxn id="8" idx="6"/>
+            <a:endCxn id="7" idx="1"/>
+          </p:cNvCxnSpPr>
+          <p:nvPr/>
+        </p:nvCxnSpPr>
+        <p:spPr>
+          <a:xfrm>
+            <a:off x="5890179" y="5363852"/>
+            <a:ext cx="1208205" cy="0"/>
+          </a:xfrm>
+          <a:prstGeom prst="straightConnector1">
+            <a:avLst/>
+          </a:prstGeom>
+          <a:ln>
+            <a:tailEnd type="triangle"/>
+          </a:ln>
+        </p:spPr>
+        <p:style>
+          <a:lnRef idx="1">
+            <a:schemeClr val="accent1"/>
+          </a:lnRef>
+          <a:fillRef idx="0">
+            <a:schemeClr val="accent1"/>
+          </a:fillRef>
+          <a:effectRef idx="0">
+            <a:schemeClr val="accent1"/>
+          </a:effectRef>
+          <a:fontRef idx="minor">
+            <a:schemeClr val="tx1"/>
+          </a:fontRef>
+        </p:style>
+      </p:cxnSp>
+      <p:sp>
+        <p:nvSpPr>
+          <p:cNvPr id="3" name="Rectangle: Rounded Corners 2">
+            <a:extLst>
+              <a:ext uri="{FF2B5EF4-FFF2-40B4-BE49-F238E27FC236}">
+                <a16:creationId xmlns:a16="http://schemas.microsoft.com/office/drawing/2014/main" id="{3CA616FB-1EB7-0E62-B2CA-A6697DC29BF1}"/>
+              </a:ext>
+            </a:extLst>
+          </p:cNvPr>
+          <p:cNvSpPr/>
+          <p:nvPr/>
+        </p:nvSpPr>
+        <p:spPr>
+          <a:xfrm>
+            <a:off x="6953844" y="565610"/>
+            <a:ext cx="1184633" cy="3007151"/>
+          </a:xfrm>
+          <a:prstGeom prst="roundRect">
+            <a:avLst/>
+          </a:prstGeom>
+        </p:spPr>
+        <p:style>
+          <a:lnRef idx="2">
+            <a:schemeClr val="accent1">
+              <a:shade val="50000"/>
+            </a:schemeClr>
+          </a:lnRef>
+          <a:fillRef idx="1">
+            <a:schemeClr val="accent1"/>
+          </a:fillRef>
+          <a:effectRef idx="0">
+            <a:schemeClr val="accent1"/>
+          </a:effectRef>
+          <a:fontRef idx="minor">
+            <a:schemeClr val="lt1"/>
+          </a:fontRef>
+        </p:style>
+        <p:txBody>
+          <a:bodyPr rtlCol="0" anchor="ctr"/>
+          <a:lstStyle/>
+          <a:p>
+            <a:pPr algn="ctr"/>
+            <a:r>
+              <a:rPr lang="en-US" dirty="0"/>
+              <a:t>API Products</a:t>
+            </a:r>
+          </a:p>
+        </p:txBody>
+      </p:sp>
+      <p:sp>
+        <p:nvSpPr>
+          <p:cNvPr id="5" name="Oval 4">
+            <a:extLst>
+              <a:ext uri="{FF2B5EF4-FFF2-40B4-BE49-F238E27FC236}">
+                <a16:creationId xmlns:a16="http://schemas.microsoft.com/office/drawing/2014/main" id="{E6DD2D7F-6BBC-517F-CA0C-E25ABBEF351C}"/>
+              </a:ext>
+            </a:extLst>
+          </p:cNvPr>
+          <p:cNvSpPr/>
+          <p:nvPr/>
+        </p:nvSpPr>
+        <p:spPr>
+          <a:xfrm>
+            <a:off x="2413262" y="829558"/>
+            <a:ext cx="339356" cy="358219"/>
+          </a:xfrm>
+          <a:prstGeom prst="ellipse">
+            <a:avLst/>
+          </a:prstGeom>
+        </p:spPr>
+        <p:style>
+          <a:lnRef idx="2">
+            <a:schemeClr val="accent1">
+              <a:shade val="50000"/>
+            </a:schemeClr>
+          </a:lnRef>
+          <a:fillRef idx="1">
+            <a:schemeClr val="accent1"/>
+          </a:fillRef>
+          <a:effectRef idx="0">
+            <a:schemeClr val="accent1"/>
+          </a:effectRef>
+          <a:fontRef idx="minor">
+            <a:schemeClr val="lt1"/>
+          </a:fontRef>
+        </p:style>
+        <p:txBody>
+          <a:bodyPr rtlCol="0" anchor="ctr"/>
+          <a:lstStyle/>
+          <a:p>
+            <a:pPr algn="ctr"/>
+            <a:r>
+              <a:rPr lang="en-US" sz="1400" b="1" dirty="0">
+                <a:latin typeface="Verdana" panose="020B0604030504040204" pitchFamily="34" charset="0"/>
+                <a:ea typeface="Verdana" panose="020B0604030504040204" pitchFamily="34" charset="0"/>
+              </a:rPr>
+              <a:t>1</a:t>
+            </a:r>
+          </a:p>
+        </p:txBody>
+      </p:sp>
+      <p:sp>
+        <p:nvSpPr>
+          <p:cNvPr id="6" name="Oval 5">
+            <a:extLst>
+              <a:ext uri="{FF2B5EF4-FFF2-40B4-BE49-F238E27FC236}">
+                <a16:creationId xmlns:a16="http://schemas.microsoft.com/office/drawing/2014/main" id="{0092A288-D927-56D9-2848-AB82F105F73E}"/>
+              </a:ext>
+            </a:extLst>
+          </p:cNvPr>
+          <p:cNvSpPr/>
+          <p:nvPr/>
+        </p:nvSpPr>
+        <p:spPr>
+          <a:xfrm>
+            <a:off x="5049632" y="246668"/>
+            <a:ext cx="339356" cy="358219"/>
+          </a:xfrm>
+          <a:prstGeom prst="ellipse">
+            <a:avLst/>
+          </a:prstGeom>
+        </p:spPr>
+        <p:style>
+          <a:lnRef idx="2">
+            <a:schemeClr val="accent1">
+              <a:shade val="50000"/>
+            </a:schemeClr>
+          </a:lnRef>
+          <a:fillRef idx="1">
+            <a:schemeClr val="accent1"/>
+          </a:fillRef>
+          <a:effectRef idx="0">
+            <a:schemeClr val="accent1"/>
+          </a:effectRef>
+          <a:fontRef idx="minor">
+            <a:schemeClr val="lt1"/>
+          </a:fontRef>
+        </p:style>
+        <p:txBody>
+          <a:bodyPr rtlCol="0" anchor="ctr"/>
+          <a:lstStyle/>
+          <a:p>
+            <a:pPr algn="ctr"/>
+            <a:r>
+              <a:rPr lang="en-US" sz="1400" b="1" dirty="0">
+                <a:latin typeface="Verdana" panose="020B0604030504040204" pitchFamily="34" charset="0"/>
+                <a:ea typeface="Verdana" panose="020B0604030504040204" pitchFamily="34" charset="0"/>
+              </a:rPr>
+              <a:t>2</a:t>
+            </a:r>
+          </a:p>
+        </p:txBody>
+      </p:sp>
+      <p:sp>
+        <p:nvSpPr>
+          <p:cNvPr id="11" name="TextBox 10">
+            <a:extLst>
+              <a:ext uri="{FF2B5EF4-FFF2-40B4-BE49-F238E27FC236}">
+                <a16:creationId xmlns:a16="http://schemas.microsoft.com/office/drawing/2014/main" id="{45F38303-B7C8-02B3-08CA-CEBEE7F9ED70}"/>
+              </a:ext>
+            </a:extLst>
+          </p:cNvPr>
+          <p:cNvSpPr txBox="1"/>
+          <p:nvPr/>
+        </p:nvSpPr>
+        <p:spPr>
+          <a:xfrm>
+            <a:off x="5388988" y="208846"/>
+            <a:ext cx="2435260" cy="369332"/>
+          </a:xfrm>
+          <a:prstGeom prst="rect">
+            <a:avLst/>
+          </a:prstGeom>
+          <a:noFill/>
+        </p:spPr>
+        <p:txBody>
+          <a:bodyPr wrap="square" rtlCol="0">
+            <a:spAutoFit/>
+          </a:bodyPr>
+          <a:lstStyle/>
+          <a:p>
+            <a:r>
+              <a:rPr lang="en-US" dirty="0"/>
+              <a:t>Only Image Data</a:t>
+            </a:r>
+          </a:p>
+        </p:txBody>
+      </p:sp>
+      <p:sp>
+        <p:nvSpPr>
+          <p:cNvPr id="12" name="TextBox 11">
+            <a:extLst>
+              <a:ext uri="{FF2B5EF4-FFF2-40B4-BE49-F238E27FC236}">
+                <a16:creationId xmlns:a16="http://schemas.microsoft.com/office/drawing/2014/main" id="{F1D09116-952B-B7D4-D806-24D54A3515A1}"/>
+              </a:ext>
+            </a:extLst>
+          </p:cNvPr>
+          <p:cNvSpPr txBox="1"/>
+          <p:nvPr/>
+        </p:nvSpPr>
+        <p:spPr>
+          <a:xfrm>
+            <a:off x="2764418" y="813004"/>
+            <a:ext cx="2435260" cy="369332"/>
+          </a:xfrm>
+          <a:prstGeom prst="rect">
+            <a:avLst/>
+          </a:prstGeom>
+          <a:noFill/>
+        </p:spPr>
+        <p:txBody>
+          <a:bodyPr wrap="square" rtlCol="0">
+            <a:spAutoFit/>
+          </a:bodyPr>
+          <a:lstStyle/>
+          <a:p>
+            <a:r>
+              <a:rPr lang="en-US" dirty="0"/>
+              <a:t>Upload Image</a:t>
+            </a:r>
+          </a:p>
+        </p:txBody>
+      </p:sp>
+      <p:sp>
+        <p:nvSpPr>
+          <p:cNvPr id="16" name="Oval 15">
+            <a:extLst>
+              <a:ext uri="{FF2B5EF4-FFF2-40B4-BE49-F238E27FC236}">
+                <a16:creationId xmlns:a16="http://schemas.microsoft.com/office/drawing/2014/main" id="{698B39D5-10EB-AC05-D2BB-01FDE30E7097}"/>
+              </a:ext>
+            </a:extLst>
+          </p:cNvPr>
+          <p:cNvSpPr/>
+          <p:nvPr/>
+        </p:nvSpPr>
+        <p:spPr>
+          <a:xfrm>
+            <a:off x="5137607" y="6169961"/>
+            <a:ext cx="339356" cy="358219"/>
+          </a:xfrm>
+          <a:prstGeom prst="ellipse">
+            <a:avLst/>
+          </a:prstGeom>
+        </p:spPr>
+        <p:style>
+          <a:lnRef idx="2">
+            <a:schemeClr val="accent1">
+              <a:shade val="50000"/>
+            </a:schemeClr>
+          </a:lnRef>
+          <a:fillRef idx="1">
+            <a:schemeClr val="accent1"/>
+          </a:fillRef>
+          <a:effectRef idx="0">
+            <a:schemeClr val="accent1"/>
+          </a:effectRef>
+          <a:fontRef idx="minor">
+            <a:schemeClr val="lt1"/>
+          </a:fontRef>
+        </p:style>
+        <p:txBody>
+          <a:bodyPr rtlCol="0" anchor="ctr"/>
+          <a:lstStyle/>
+          <a:p>
+            <a:pPr algn="ctr"/>
+            <a:r>
+              <a:rPr lang="en-US" sz="1400" b="1" dirty="0">
+                <a:latin typeface="Verdana" panose="020B0604030504040204" pitchFamily="34" charset="0"/>
+                <a:ea typeface="Verdana" panose="020B0604030504040204" pitchFamily="34" charset="0"/>
+              </a:rPr>
+              <a:t>3</a:t>
+            </a:r>
+          </a:p>
+        </p:txBody>
+      </p:sp>
+      <p:sp>
+        <p:nvSpPr>
+          <p:cNvPr id="18" name="TextBox 17">
+            <a:extLst>
+              <a:ext uri="{FF2B5EF4-FFF2-40B4-BE49-F238E27FC236}">
+                <a16:creationId xmlns:a16="http://schemas.microsoft.com/office/drawing/2014/main" id="{4BE3AB22-CDFD-4255-AA28-6D0ABFA630C5}"/>
+              </a:ext>
+            </a:extLst>
+          </p:cNvPr>
+          <p:cNvSpPr txBox="1"/>
+          <p:nvPr/>
+        </p:nvSpPr>
+        <p:spPr>
+          <a:xfrm>
+            <a:off x="5516252" y="6130568"/>
+            <a:ext cx="2875183" cy="369332"/>
+          </a:xfrm>
+          <a:prstGeom prst="rect">
+            <a:avLst/>
+          </a:prstGeom>
+          <a:noFill/>
+        </p:spPr>
+        <p:txBody>
+          <a:bodyPr wrap="square" rtlCol="0">
+            <a:spAutoFit/>
+          </a:bodyPr>
+          <a:lstStyle/>
+          <a:p>
+            <a:r>
+              <a:rPr lang="en-US" dirty="0"/>
+              <a:t>Creates Image in Storage</a:t>
+            </a:r>
+          </a:p>
+        </p:txBody>
+      </p:sp>
+      <p:sp>
+        <p:nvSpPr>
+          <p:cNvPr id="20" name="Oval 19">
+            <a:extLst>
+              <a:ext uri="{FF2B5EF4-FFF2-40B4-BE49-F238E27FC236}">
+                <a16:creationId xmlns:a16="http://schemas.microsoft.com/office/drawing/2014/main" id="{CD134569-0F13-985E-A38C-ED8264227826}"/>
+              </a:ext>
+            </a:extLst>
+          </p:cNvPr>
+          <p:cNvSpPr/>
+          <p:nvPr/>
+        </p:nvSpPr>
+        <p:spPr>
+          <a:xfrm>
+            <a:off x="7198949" y="4217045"/>
+            <a:ext cx="339356" cy="358219"/>
+          </a:xfrm>
+          <a:prstGeom prst="ellipse">
+            <a:avLst/>
+          </a:prstGeom>
+        </p:spPr>
+        <p:style>
+          <a:lnRef idx="2">
+            <a:schemeClr val="accent1">
+              <a:shade val="50000"/>
+            </a:schemeClr>
+          </a:lnRef>
+          <a:fillRef idx="1">
+            <a:schemeClr val="accent1"/>
+          </a:fillRef>
+          <a:effectRef idx="0">
+            <a:schemeClr val="accent1"/>
+          </a:effectRef>
+          <a:fontRef idx="minor">
+            <a:schemeClr val="lt1"/>
+          </a:fontRef>
+        </p:style>
+        <p:txBody>
+          <a:bodyPr rtlCol="0" anchor="ctr"/>
+          <a:lstStyle/>
+          <a:p>
+            <a:pPr algn="ctr"/>
+            <a:r>
+              <a:rPr lang="en-US" sz="1400" b="1" dirty="0">
+                <a:latin typeface="Verdana" panose="020B0604030504040204" pitchFamily="34" charset="0"/>
+                <a:ea typeface="Verdana" panose="020B0604030504040204" pitchFamily="34" charset="0"/>
+              </a:rPr>
+              <a:t>4</a:t>
+            </a:r>
+          </a:p>
+        </p:txBody>
+      </p:sp>
+      <p:sp>
+        <p:nvSpPr>
+          <p:cNvPr id="22" name="TextBox 21">
+            <a:extLst>
+              <a:ext uri="{FF2B5EF4-FFF2-40B4-BE49-F238E27FC236}">
+                <a16:creationId xmlns:a16="http://schemas.microsoft.com/office/drawing/2014/main" id="{C875B211-CF69-3C0A-5849-9C6CB32371E3}"/>
+              </a:ext>
+            </a:extLst>
+          </p:cNvPr>
+          <p:cNvSpPr txBox="1"/>
+          <p:nvPr/>
+        </p:nvSpPr>
+        <p:spPr>
+          <a:xfrm>
+            <a:off x="7538306" y="4187079"/>
+            <a:ext cx="1696824" cy="369332"/>
+          </a:xfrm>
+          <a:prstGeom prst="rect">
+            <a:avLst/>
+          </a:prstGeom>
+          <a:noFill/>
+        </p:spPr>
+        <p:txBody>
+          <a:bodyPr wrap="square" rtlCol="0">
+            <a:spAutoFit/>
+          </a:bodyPr>
+          <a:lstStyle/>
+          <a:p>
+            <a:r>
+              <a:rPr lang="en-US" dirty="0"/>
+              <a:t>Image Created</a:t>
+            </a:r>
+          </a:p>
+        </p:txBody>
+      </p:sp>
+      <p:sp>
+        <p:nvSpPr>
+          <p:cNvPr id="23" name="Oval 22">
+            <a:extLst>
+              <a:ext uri="{FF2B5EF4-FFF2-40B4-BE49-F238E27FC236}">
+                <a16:creationId xmlns:a16="http://schemas.microsoft.com/office/drawing/2014/main" id="{C23CA662-1857-EDF4-3973-E088455A8F6C}"/>
+              </a:ext>
+            </a:extLst>
+          </p:cNvPr>
+          <p:cNvSpPr/>
+          <p:nvPr/>
+        </p:nvSpPr>
+        <p:spPr>
+          <a:xfrm>
+            <a:off x="2537400" y="3186259"/>
+            <a:ext cx="339356" cy="358219"/>
+          </a:xfrm>
+          <a:prstGeom prst="ellipse">
+            <a:avLst/>
+          </a:prstGeom>
+          <a:solidFill>
+            <a:schemeClr val="accent2">
+              <a:lumMod val="75000"/>
+            </a:schemeClr>
+          </a:solidFill>
+        </p:spPr>
+        <p:style>
+          <a:lnRef idx="2">
+            <a:schemeClr val="accent1">
+              <a:shade val="50000"/>
+            </a:schemeClr>
+          </a:lnRef>
+          <a:fillRef idx="1">
+            <a:schemeClr val="accent1"/>
+          </a:fillRef>
+          <a:effectRef idx="0">
+            <a:schemeClr val="accent1"/>
+          </a:effectRef>
+          <a:fontRef idx="minor">
+            <a:schemeClr val="lt1"/>
+          </a:fontRef>
+        </p:style>
+        <p:txBody>
+          <a:bodyPr rtlCol="0" anchor="ctr"/>
+          <a:lstStyle/>
+          <a:p>
+            <a:pPr algn="ctr"/>
+            <a:r>
+              <a:rPr lang="en-US" sz="1400" b="1" dirty="0">
+                <a:latin typeface="Verdana" panose="020B0604030504040204" pitchFamily="34" charset="0"/>
+                <a:ea typeface="Verdana" panose="020B0604030504040204" pitchFamily="34" charset="0"/>
+              </a:rPr>
+              <a:t>1</a:t>
+            </a:r>
+          </a:p>
+        </p:txBody>
+      </p:sp>
+      <p:sp>
+        <p:nvSpPr>
+          <p:cNvPr id="24" name="TextBox 23">
+            <a:extLst>
+              <a:ext uri="{FF2B5EF4-FFF2-40B4-BE49-F238E27FC236}">
+                <a16:creationId xmlns:a16="http://schemas.microsoft.com/office/drawing/2014/main" id="{33EE431E-2041-63CD-78BB-B5200989A66A}"/>
+              </a:ext>
+            </a:extLst>
+          </p:cNvPr>
+          <p:cNvSpPr txBox="1"/>
+          <p:nvPr/>
+        </p:nvSpPr>
+        <p:spPr>
+          <a:xfrm>
+            <a:off x="1754959" y="3544478"/>
+            <a:ext cx="2435260" cy="646331"/>
+          </a:xfrm>
+          <a:prstGeom prst="rect">
+            <a:avLst/>
+          </a:prstGeom>
+          <a:noFill/>
+        </p:spPr>
+        <p:txBody>
+          <a:bodyPr wrap="square" rtlCol="0">
+            <a:spAutoFit/>
+          </a:bodyPr>
+          <a:lstStyle/>
+          <a:p>
+            <a:r>
+              <a:rPr lang="en-US" dirty="0"/>
+              <a:t>Products DTO with Image GUID</a:t>
+            </a:r>
+          </a:p>
+        </p:txBody>
+      </p:sp>
+      <p:sp>
+        <p:nvSpPr>
+          <p:cNvPr id="25" name="Oval 24">
+            <a:extLst>
+              <a:ext uri="{FF2B5EF4-FFF2-40B4-BE49-F238E27FC236}">
+                <a16:creationId xmlns:a16="http://schemas.microsoft.com/office/drawing/2014/main" id="{746C00D7-027B-C748-C12E-473B5F442EAF}"/>
+              </a:ext>
+            </a:extLst>
+          </p:cNvPr>
+          <p:cNvSpPr/>
+          <p:nvPr/>
+        </p:nvSpPr>
+        <p:spPr>
+          <a:xfrm>
+            <a:off x="5879184" y="3180717"/>
+            <a:ext cx="339356" cy="358219"/>
+          </a:xfrm>
+          <a:prstGeom prst="ellipse">
+            <a:avLst/>
+          </a:prstGeom>
+          <a:solidFill>
+            <a:schemeClr val="accent2">
+              <a:lumMod val="75000"/>
+            </a:schemeClr>
+          </a:solidFill>
+        </p:spPr>
+        <p:style>
+          <a:lnRef idx="2">
+            <a:schemeClr val="accent1">
+              <a:shade val="50000"/>
+            </a:schemeClr>
+          </a:lnRef>
+          <a:fillRef idx="1">
+            <a:schemeClr val="accent1"/>
+          </a:fillRef>
+          <a:effectRef idx="0">
+            <a:schemeClr val="accent1"/>
+          </a:effectRef>
+          <a:fontRef idx="minor">
+            <a:schemeClr val="lt1"/>
+          </a:fontRef>
+        </p:style>
+        <p:txBody>
+          <a:bodyPr rtlCol="0" anchor="ctr"/>
+          <a:lstStyle/>
+          <a:p>
+            <a:pPr algn="ctr"/>
+            <a:r>
+              <a:rPr lang="en-US" sz="1400" b="1" dirty="0">
+                <a:latin typeface="Verdana" panose="020B0604030504040204" pitchFamily="34" charset="0"/>
+                <a:ea typeface="Verdana" panose="020B0604030504040204" pitchFamily="34" charset="0"/>
+              </a:rPr>
+              <a:t>2</a:t>
+            </a:r>
+          </a:p>
+        </p:txBody>
+      </p:sp>
+      <p:sp>
+        <p:nvSpPr>
+          <p:cNvPr id="26" name="Oval 25">
+            <a:extLst>
+              <a:ext uri="{FF2B5EF4-FFF2-40B4-BE49-F238E27FC236}">
+                <a16:creationId xmlns:a16="http://schemas.microsoft.com/office/drawing/2014/main" id="{21853EBE-7F75-8C45-0396-F06F9FD6FB3F}"/>
+              </a:ext>
+            </a:extLst>
+          </p:cNvPr>
+          <p:cNvSpPr/>
+          <p:nvPr/>
+        </p:nvSpPr>
+        <p:spPr>
+          <a:xfrm>
+            <a:off x="8322518" y="3070781"/>
+            <a:ext cx="339356" cy="358219"/>
+          </a:xfrm>
+          <a:prstGeom prst="ellipse">
+            <a:avLst/>
+          </a:prstGeom>
+          <a:solidFill>
+            <a:schemeClr val="accent2">
+              <a:lumMod val="75000"/>
+            </a:schemeClr>
+          </a:solidFill>
+        </p:spPr>
+        <p:style>
+          <a:lnRef idx="2">
+            <a:schemeClr val="accent1">
+              <a:shade val="50000"/>
+            </a:schemeClr>
+          </a:lnRef>
+          <a:fillRef idx="1">
+            <a:schemeClr val="accent1"/>
+          </a:fillRef>
+          <a:effectRef idx="0">
+            <a:schemeClr val="accent1"/>
+          </a:effectRef>
+          <a:fontRef idx="minor">
+            <a:schemeClr val="lt1"/>
+          </a:fontRef>
+        </p:style>
+        <p:txBody>
+          <a:bodyPr rtlCol="0" anchor="ctr"/>
+          <a:lstStyle/>
+          <a:p>
+            <a:pPr algn="ctr"/>
+            <a:r>
+              <a:rPr lang="en-US" sz="1400" b="1" dirty="0">
+                <a:latin typeface="Verdana" panose="020B0604030504040204" pitchFamily="34" charset="0"/>
+                <a:ea typeface="Verdana" panose="020B0604030504040204" pitchFamily="34" charset="0"/>
+              </a:rPr>
+              <a:t>3</a:t>
+            </a:r>
+          </a:p>
+        </p:txBody>
+      </p:sp>
+      <p:sp>
+        <p:nvSpPr>
+          <p:cNvPr id="27" name="Oval 26">
+            <a:extLst>
+              <a:ext uri="{FF2B5EF4-FFF2-40B4-BE49-F238E27FC236}">
+                <a16:creationId xmlns:a16="http://schemas.microsoft.com/office/drawing/2014/main" id="{38B5F783-7974-E4CE-9C10-8E9CCAD393E2}"/>
+              </a:ext>
+            </a:extLst>
+          </p:cNvPr>
+          <p:cNvSpPr/>
+          <p:nvPr/>
+        </p:nvSpPr>
+        <p:spPr>
+          <a:xfrm>
+            <a:off x="11701560" y="1611983"/>
+            <a:ext cx="339356" cy="358219"/>
+          </a:xfrm>
+          <a:prstGeom prst="ellipse">
+            <a:avLst/>
+          </a:prstGeom>
+          <a:solidFill>
+            <a:schemeClr val="accent2">
+              <a:lumMod val="75000"/>
+            </a:schemeClr>
+          </a:solidFill>
+        </p:spPr>
+        <p:style>
+          <a:lnRef idx="2">
+            <a:schemeClr val="accent1">
+              <a:shade val="50000"/>
+            </a:schemeClr>
+          </a:lnRef>
+          <a:fillRef idx="1">
+            <a:schemeClr val="accent1"/>
+          </a:fillRef>
+          <a:effectRef idx="0">
+            <a:schemeClr val="accent1"/>
+          </a:effectRef>
+          <a:fontRef idx="minor">
+            <a:schemeClr val="lt1"/>
+          </a:fontRef>
+        </p:style>
+        <p:txBody>
+          <a:bodyPr rtlCol="0" anchor="ctr"/>
+          <a:lstStyle/>
+          <a:p>
+            <a:pPr algn="ctr"/>
+            <a:r>
+              <a:rPr lang="en-US" sz="1400" b="1" dirty="0">
+                <a:latin typeface="Verdana" panose="020B0604030504040204" pitchFamily="34" charset="0"/>
+                <a:ea typeface="Verdana" panose="020B0604030504040204" pitchFamily="34" charset="0"/>
+              </a:rPr>
+              <a:t>4</a:t>
+            </a:r>
+          </a:p>
+        </p:txBody>
+      </p:sp>
+      <p:cxnSp>
+        <p:nvCxnSpPr>
+          <p:cNvPr id="30" name="Straight Arrow Connector 29">
+            <a:extLst>
+              <a:ext uri="{FF2B5EF4-FFF2-40B4-BE49-F238E27FC236}">
+                <a16:creationId xmlns:a16="http://schemas.microsoft.com/office/drawing/2014/main" id="{806EE8AA-FF34-1845-BBB3-9AE8B4D0677A}"/>
+              </a:ext>
+            </a:extLst>
+          </p:cNvPr>
+          <p:cNvCxnSpPr/>
+          <p:nvPr/>
+        </p:nvCxnSpPr>
+        <p:spPr>
+          <a:xfrm>
+            <a:off x="3648176" y="2394408"/>
+            <a:ext cx="997665" cy="0"/>
+          </a:xfrm>
+          <a:prstGeom prst="straightConnector1">
+            <a:avLst/>
+          </a:prstGeom>
+          <a:ln>
+            <a:solidFill>
+              <a:schemeClr val="accent2">
+                <a:lumMod val="75000"/>
+              </a:schemeClr>
+            </a:solidFill>
+            <a:tailEnd type="triangle"/>
+          </a:ln>
+        </p:spPr>
+        <p:style>
+          <a:lnRef idx="3">
+            <a:schemeClr val="accent2"/>
+          </a:lnRef>
+          <a:fillRef idx="0">
+            <a:schemeClr val="accent2"/>
+          </a:fillRef>
+          <a:effectRef idx="2">
+            <a:schemeClr val="accent2"/>
+          </a:effectRef>
+          <a:fontRef idx="minor">
+            <a:schemeClr val="tx1"/>
+          </a:fontRef>
+        </p:style>
+      </p:cxnSp>
+      <p:cxnSp>
+        <p:nvCxnSpPr>
+          <p:cNvPr id="31" name="Straight Arrow Connector 30">
+            <a:extLst>
+              <a:ext uri="{FF2B5EF4-FFF2-40B4-BE49-F238E27FC236}">
+                <a16:creationId xmlns:a16="http://schemas.microsoft.com/office/drawing/2014/main" id="{38A20139-4CF5-595E-56E8-AFB93CE756F3}"/>
+              </a:ext>
+            </a:extLst>
+          </p:cNvPr>
+          <p:cNvCxnSpPr>
+            <a:cxnSpLocks/>
+            <a:stCxn id="15" idx="3"/>
+          </p:cNvCxnSpPr>
+          <p:nvPr/>
+        </p:nvCxnSpPr>
+        <p:spPr>
+          <a:xfrm flipV="1">
+            <a:off x="5830474" y="1993770"/>
+            <a:ext cx="1123370" cy="207389"/>
+          </a:xfrm>
+          <a:prstGeom prst="straightConnector1">
+            <a:avLst/>
+          </a:prstGeom>
+          <a:ln>
+            <a:solidFill>
+              <a:schemeClr val="accent2">
+                <a:lumMod val="75000"/>
+              </a:schemeClr>
+            </a:solidFill>
+            <a:tailEnd type="triangle"/>
+          </a:ln>
+        </p:spPr>
+        <p:style>
+          <a:lnRef idx="3">
+            <a:schemeClr val="accent2"/>
+          </a:lnRef>
+          <a:fillRef idx="0">
+            <a:schemeClr val="accent2"/>
+          </a:fillRef>
+          <a:effectRef idx="2">
+            <a:schemeClr val="accent2"/>
+          </a:effectRef>
+          <a:fontRef idx="minor">
+            <a:schemeClr val="tx1"/>
+          </a:fontRef>
+        </p:style>
+      </p:cxnSp>
+      <p:cxnSp>
+        <p:nvCxnSpPr>
+          <p:cNvPr id="34" name="Straight Arrow Connector 33">
+            <a:extLst>
+              <a:ext uri="{FF2B5EF4-FFF2-40B4-BE49-F238E27FC236}">
+                <a16:creationId xmlns:a16="http://schemas.microsoft.com/office/drawing/2014/main" id="{0814023E-0B0F-86FD-4819-BCB6AF69A294}"/>
+              </a:ext>
+            </a:extLst>
+          </p:cNvPr>
+          <p:cNvCxnSpPr>
+            <a:cxnSpLocks/>
+            <a:endCxn id="10" idx="2"/>
+          </p:cNvCxnSpPr>
+          <p:nvPr/>
+        </p:nvCxnSpPr>
+        <p:spPr>
+          <a:xfrm flipV="1">
+            <a:off x="8138477" y="1593130"/>
+            <a:ext cx="1842933" cy="10998"/>
+          </a:xfrm>
+          <a:prstGeom prst="straightConnector1">
+            <a:avLst/>
+          </a:prstGeom>
+          <a:ln>
+            <a:solidFill>
+              <a:schemeClr val="accent2">
+                <a:lumMod val="75000"/>
+              </a:schemeClr>
+            </a:solidFill>
+            <a:tailEnd type="triangle"/>
+          </a:ln>
+        </p:spPr>
+        <p:style>
+          <a:lnRef idx="3">
+            <a:schemeClr val="accent2"/>
+          </a:lnRef>
+          <a:fillRef idx="0">
+            <a:schemeClr val="accent2"/>
+          </a:fillRef>
+          <a:effectRef idx="2">
+            <a:schemeClr val="accent2"/>
+          </a:effectRef>
+          <a:fontRef idx="minor">
+            <a:schemeClr val="tx1"/>
+          </a:fontRef>
+        </p:style>
+      </p:cxnSp>
+      <p:sp>
+        <p:nvSpPr>
+          <p:cNvPr id="38" name="Rectangle: Beveled 37">
+            <a:extLst>
+              <a:ext uri="{FF2B5EF4-FFF2-40B4-BE49-F238E27FC236}">
+                <a16:creationId xmlns:a16="http://schemas.microsoft.com/office/drawing/2014/main" id="{30032567-D4AC-54E0-BB0D-05BC4D8D64A8}"/>
+              </a:ext>
+            </a:extLst>
+          </p:cNvPr>
+          <p:cNvSpPr/>
+          <p:nvPr/>
+        </p:nvSpPr>
+        <p:spPr>
+          <a:xfrm>
+            <a:off x="9180918" y="5015296"/>
+            <a:ext cx="953686" cy="697585"/>
+          </a:xfrm>
+          <a:prstGeom prst="bevel">
+            <a:avLst/>
+          </a:prstGeom>
+          <a:solidFill>
+            <a:schemeClr val="accent4">
+              <a:lumMod val="75000"/>
+            </a:schemeClr>
+          </a:solidFill>
+        </p:spPr>
+        <p:style>
+          <a:lnRef idx="2">
+            <a:schemeClr val="accent1">
+              <a:shade val="50000"/>
+            </a:schemeClr>
+          </a:lnRef>
+          <a:fillRef idx="1">
+            <a:schemeClr val="accent1"/>
+          </a:fillRef>
+          <a:effectRef idx="0">
+            <a:schemeClr val="accent1"/>
+          </a:effectRef>
+          <a:fontRef idx="minor">
+            <a:schemeClr val="lt1"/>
+          </a:fontRef>
+        </p:style>
+        <p:txBody>
+          <a:bodyPr rtlCol="0" anchor="ctr"/>
+          <a:lstStyle/>
+          <a:p>
+            <a:pPr algn="ctr"/>
+            <a:r>
+              <a:rPr lang="en-US" sz="1200" b="1" dirty="0">
+                <a:latin typeface="Verdana" panose="020B0604030504040204" pitchFamily="34" charset="0"/>
+                <a:ea typeface="Verdana" panose="020B0604030504040204" pitchFamily="34" charset="0"/>
+              </a:rPr>
+              <a:t>Clean Up Job</a:t>
+            </a:r>
+          </a:p>
+        </p:txBody>
+      </p:sp>
+      <p:cxnSp>
+        <p:nvCxnSpPr>
+          <p:cNvPr id="40" name="Straight Arrow Connector 39">
+            <a:extLst>
+              <a:ext uri="{FF2B5EF4-FFF2-40B4-BE49-F238E27FC236}">
+                <a16:creationId xmlns:a16="http://schemas.microsoft.com/office/drawing/2014/main" id="{83243605-6F0F-8BB0-D24C-F0DE1879B8C2}"/>
+              </a:ext>
+            </a:extLst>
+          </p:cNvPr>
+          <p:cNvCxnSpPr>
+            <a:stCxn id="38" idx="4"/>
+            <a:endCxn id="7" idx="3"/>
+          </p:cNvCxnSpPr>
+          <p:nvPr/>
+        </p:nvCxnSpPr>
+        <p:spPr>
+          <a:xfrm flipH="1" flipV="1">
+            <a:off x="8795208" y="5363852"/>
+            <a:ext cx="385710" cy="237"/>
+          </a:xfrm>
+          <a:prstGeom prst="straightConnector1">
+            <a:avLst/>
+          </a:prstGeom>
+          <a:ln>
+            <a:tailEnd type="triangle"/>
+          </a:ln>
+        </p:spPr>
+        <p:style>
+          <a:lnRef idx="1">
+            <a:schemeClr val="accent1"/>
+          </a:lnRef>
+          <a:fillRef idx="0">
+            <a:schemeClr val="accent1"/>
+          </a:fillRef>
+          <a:effectRef idx="0">
+            <a:schemeClr val="accent1"/>
+          </a:effectRef>
+          <a:fontRef idx="minor">
+            <a:schemeClr val="tx1"/>
+          </a:fontRef>
+        </p:style>
+      </p:cxnSp>
+      <p:sp>
+        <p:nvSpPr>
+          <p:cNvPr id="42" name="Hexagon 41">
+            <a:extLst>
+              <a:ext uri="{FF2B5EF4-FFF2-40B4-BE49-F238E27FC236}">
+                <a16:creationId xmlns:a16="http://schemas.microsoft.com/office/drawing/2014/main" id="{DE44D164-78E2-7541-709D-B53D5DE4C700}"/>
+              </a:ext>
+            </a:extLst>
+          </p:cNvPr>
+          <p:cNvSpPr/>
+          <p:nvPr/>
+        </p:nvSpPr>
+        <p:spPr>
+          <a:xfrm>
+            <a:off x="10342780" y="3429000"/>
+            <a:ext cx="966255" cy="758079"/>
+          </a:xfrm>
+          <a:prstGeom prst="hexagon">
+            <a:avLst/>
+          </a:prstGeom>
+          <a:solidFill>
+            <a:srgbClr val="7030A0"/>
+          </a:solidFill>
+        </p:spPr>
+        <p:style>
+          <a:lnRef idx="2">
+            <a:schemeClr val="accent1">
+              <a:shade val="50000"/>
+            </a:schemeClr>
+          </a:lnRef>
+          <a:fillRef idx="1">
+            <a:schemeClr val="accent1"/>
+          </a:fillRef>
+          <a:effectRef idx="0">
+            <a:schemeClr val="accent1"/>
+          </a:effectRef>
+          <a:fontRef idx="minor">
+            <a:schemeClr val="lt1"/>
+          </a:fontRef>
+        </p:style>
+        <p:txBody>
+          <a:bodyPr rtlCol="0" anchor="ctr"/>
+          <a:lstStyle/>
+          <a:p>
+            <a:pPr algn="ctr"/>
+            <a:r>
+              <a:rPr lang="en-US" sz="1200" dirty="0">
+                <a:latin typeface="Verdana" panose="020B0604030504040204" pitchFamily="34" charset="0"/>
+                <a:ea typeface="Verdana" panose="020B0604030504040204" pitchFamily="34" charset="0"/>
+              </a:rPr>
+              <a:t>Rabbit MQ</a:t>
+            </a:r>
+          </a:p>
+        </p:txBody>
+      </p:sp>
+      <p:cxnSp>
+        <p:nvCxnSpPr>
+          <p:cNvPr id="44" name="Straight Arrow Connector 43">
+            <a:extLst>
+              <a:ext uri="{FF2B5EF4-FFF2-40B4-BE49-F238E27FC236}">
+                <a16:creationId xmlns:a16="http://schemas.microsoft.com/office/drawing/2014/main" id="{8A973CD5-BACA-0587-574B-FF61FA4C3B46}"/>
+              </a:ext>
+            </a:extLst>
+          </p:cNvPr>
+          <p:cNvCxnSpPr>
+            <a:stCxn id="10" idx="3"/>
+          </p:cNvCxnSpPr>
+          <p:nvPr/>
+        </p:nvCxnSpPr>
+        <p:spPr>
+          <a:xfrm>
+            <a:off x="10792116" y="2592371"/>
+            <a:ext cx="11002" cy="836629"/>
+          </a:xfrm>
+          <a:prstGeom prst="straightConnector1">
+            <a:avLst/>
+          </a:prstGeom>
+          <a:ln>
+            <a:tailEnd type="triangle"/>
+          </a:ln>
+        </p:spPr>
+        <p:style>
+          <a:lnRef idx="1">
+            <a:schemeClr val="accent1"/>
+          </a:lnRef>
+          <a:fillRef idx="0">
+            <a:schemeClr val="accent1"/>
+          </a:fillRef>
+          <a:effectRef idx="0">
+            <a:schemeClr val="accent1"/>
+          </a:effectRef>
+          <a:fontRef idx="minor">
+            <a:schemeClr val="tx1"/>
+          </a:fontRef>
+        </p:style>
+      </p:cxnSp>
+      <p:sp>
+        <p:nvSpPr>
+          <p:cNvPr id="46" name="Oval 45">
+            <a:extLst>
+              <a:ext uri="{FF2B5EF4-FFF2-40B4-BE49-F238E27FC236}">
+                <a16:creationId xmlns:a16="http://schemas.microsoft.com/office/drawing/2014/main" id="{24103BCA-347F-4552-CF6C-1A84C2B1FA00}"/>
+              </a:ext>
+            </a:extLst>
+          </p:cNvPr>
+          <p:cNvSpPr/>
+          <p:nvPr/>
+        </p:nvSpPr>
+        <p:spPr>
+          <a:xfrm>
+            <a:off x="10085120" y="4371745"/>
+            <a:ext cx="812274" cy="697585"/>
+          </a:xfrm>
+          <a:prstGeom prst="ellipse">
+            <a:avLst/>
+          </a:prstGeom>
+          <a:solidFill>
+            <a:srgbClr val="7030A0"/>
+          </a:solidFill>
+        </p:spPr>
+        <p:style>
+          <a:lnRef idx="2">
+            <a:schemeClr val="accent1">
+              <a:shade val="50000"/>
+            </a:schemeClr>
+          </a:lnRef>
+          <a:fillRef idx="1">
+            <a:schemeClr val="accent1"/>
+          </a:fillRef>
+          <a:effectRef idx="0">
+            <a:schemeClr val="accent1"/>
+          </a:effectRef>
+          <a:fontRef idx="minor">
+            <a:schemeClr val="lt1"/>
+          </a:fontRef>
+        </p:style>
+        <p:txBody>
+          <a:bodyPr rtlCol="0" anchor="ctr"/>
+          <a:lstStyle/>
+          <a:p>
+            <a:pPr algn="ctr"/>
+            <a:r>
+              <a:rPr lang="en-US" sz="900" b="1" dirty="0">
+                <a:latin typeface="Verdana" panose="020B0604030504040204" pitchFamily="34" charset="0"/>
+                <a:ea typeface="Verdana" panose="020B0604030504040204" pitchFamily="34" charset="0"/>
+              </a:rPr>
+              <a:t>Temp to </a:t>
+            </a:r>
+            <a:r>
+              <a:rPr lang="en-US" sz="900" b="1" dirty="0" err="1">
+                <a:latin typeface="Verdana" panose="020B0604030504040204" pitchFamily="34" charset="0"/>
+                <a:ea typeface="Verdana" panose="020B0604030504040204" pitchFamily="34" charset="0"/>
+              </a:rPr>
+              <a:t>Dest</a:t>
+            </a:r>
+            <a:endParaRPr lang="en-US" sz="900" b="1" dirty="0">
+              <a:latin typeface="Verdana" panose="020B0604030504040204" pitchFamily="34" charset="0"/>
+              <a:ea typeface="Verdana" panose="020B0604030504040204" pitchFamily="34" charset="0"/>
+            </a:endParaRPr>
+          </a:p>
+        </p:txBody>
+      </p:sp>
+      <p:sp>
+        <p:nvSpPr>
+          <p:cNvPr id="49" name="Oval 48">
+            <a:extLst>
+              <a:ext uri="{FF2B5EF4-FFF2-40B4-BE49-F238E27FC236}">
+                <a16:creationId xmlns:a16="http://schemas.microsoft.com/office/drawing/2014/main" id="{FA6172B3-CE39-3CE5-9080-A55EA93BFC98}"/>
+              </a:ext>
+            </a:extLst>
+          </p:cNvPr>
+          <p:cNvSpPr/>
+          <p:nvPr/>
+        </p:nvSpPr>
+        <p:spPr>
+          <a:xfrm>
+            <a:off x="10889287" y="2680088"/>
+            <a:ext cx="812273" cy="535751"/>
+          </a:xfrm>
+          <a:prstGeom prst="ellipse">
+            <a:avLst/>
+          </a:prstGeom>
+          <a:solidFill>
+            <a:srgbClr val="7030A0"/>
+          </a:solidFill>
+        </p:spPr>
+        <p:style>
+          <a:lnRef idx="2">
+            <a:schemeClr val="accent1">
+              <a:shade val="50000"/>
+            </a:schemeClr>
+          </a:lnRef>
+          <a:fillRef idx="1">
+            <a:schemeClr val="accent1"/>
+          </a:fillRef>
+          <a:effectRef idx="0">
+            <a:schemeClr val="accent1"/>
+          </a:effectRef>
+          <a:fontRef idx="minor">
+            <a:schemeClr val="lt1"/>
+          </a:fontRef>
+        </p:style>
+        <p:txBody>
+          <a:bodyPr rtlCol="0" anchor="ctr"/>
+          <a:lstStyle/>
+          <a:p>
+            <a:pPr algn="ctr"/>
+            <a:r>
+              <a:rPr lang="en-US" sz="1200" dirty="0">
+                <a:latin typeface="Verdana" panose="020B0604030504040204" pitchFamily="34" charset="0"/>
+                <a:ea typeface="Verdana" panose="020B0604030504040204" pitchFamily="34" charset="0"/>
+              </a:rPr>
+              <a:t>CD to Q</a:t>
+            </a:r>
+          </a:p>
+        </p:txBody>
+      </p:sp>
+      <p:sp>
+        <p:nvSpPr>
+          <p:cNvPr id="51" name="Oval 50">
+            <a:extLst>
+              <a:ext uri="{FF2B5EF4-FFF2-40B4-BE49-F238E27FC236}">
+                <a16:creationId xmlns:a16="http://schemas.microsoft.com/office/drawing/2014/main" id="{DAE4FFE9-5C51-FA24-C904-88A0941DAB02}"/>
+              </a:ext>
+            </a:extLst>
+          </p:cNvPr>
+          <p:cNvSpPr/>
+          <p:nvPr/>
+        </p:nvSpPr>
+        <p:spPr>
+          <a:xfrm>
+            <a:off x="10935103" y="4396154"/>
+            <a:ext cx="1131206" cy="697585"/>
+          </a:xfrm>
+          <a:prstGeom prst="ellipse">
+            <a:avLst/>
+          </a:prstGeom>
+          <a:solidFill>
+            <a:srgbClr val="7030A0"/>
+          </a:solidFill>
+        </p:spPr>
+        <p:style>
+          <a:lnRef idx="2">
+            <a:schemeClr val="accent1">
+              <a:shade val="50000"/>
+            </a:schemeClr>
+          </a:lnRef>
+          <a:fillRef idx="1">
+            <a:schemeClr val="accent1"/>
+          </a:fillRef>
+          <a:effectRef idx="0">
+            <a:schemeClr val="accent1"/>
+          </a:effectRef>
+          <a:fontRef idx="minor">
+            <a:schemeClr val="lt1"/>
+          </a:fontRef>
+        </p:style>
+        <p:txBody>
+          <a:bodyPr rtlCol="0" anchor="ctr"/>
+          <a:lstStyle/>
+          <a:p>
+            <a:pPr algn="ctr"/>
+            <a:r>
+              <a:rPr lang="en-US" sz="900" b="1" dirty="0">
+                <a:latin typeface="Verdana" panose="020B0604030504040204" pitchFamily="34" charset="0"/>
+                <a:ea typeface="Verdana" panose="020B0604030504040204" pitchFamily="34" charset="0"/>
+              </a:rPr>
+              <a:t>Orphan Removal</a:t>
+            </a:r>
+          </a:p>
+        </p:txBody>
+      </p:sp>
+    </p:spTree>
+    <p:extLst>
+      <p:ext uri="{BB962C8B-B14F-4D97-AF65-F5344CB8AC3E}">
+        <p14:creationId xmlns:p14="http://schemas.microsoft.com/office/powerpoint/2010/main" val="3487916676"/>
+      </p:ext>
+    </p:extLst>
+  </p:cSld>
+  <p:clrMapOvr>
+    <a:masterClrMapping/>
+  </p:clrMapOvr>
+</p:sld>
+</file>
+
+<file path=ppt/slides/slide6.xml><?xml version="1.0" encoding="utf-8"?>
 <p:sld xmlns:a="http://schemas.openxmlformats.org/drawingml/2006/main" xmlns:r="http://schemas.openxmlformats.org/officeDocument/2006/relationships" xmlns:p="http://schemas.openxmlformats.org/presentationml/2006/main">
   <p:cSld>
     <p:spTree>
@@ -36753,7 +38601,7 @@
 </p:sld>
 </file>
 
-<file path=ppt/slides/slide6.xml><?xml version="1.0" encoding="utf-8"?>
+<file path=ppt/slides/slide7.xml><?xml version="1.0" encoding="utf-8"?>
 <p:sld xmlns:a="http://schemas.openxmlformats.org/drawingml/2006/main" xmlns:r="http://schemas.openxmlformats.org/officeDocument/2006/relationships" xmlns:p="http://schemas.openxmlformats.org/presentationml/2006/main">
   <p:cSld>
     <p:spTree>
@@ -37176,7 +39024,7 @@
 </p:sld>
 </file>
 
-<file path=ppt/slides/slide7.xml><?xml version="1.0" encoding="utf-8"?>
+<file path=ppt/slides/slide8.xml><?xml version="1.0" encoding="utf-8"?>
 <p:sld xmlns:a="http://schemas.openxmlformats.org/drawingml/2006/main" xmlns:r="http://schemas.openxmlformats.org/officeDocument/2006/relationships" xmlns:p="http://schemas.openxmlformats.org/presentationml/2006/main">
   <p:cSld>
     <p:spTree>
@@ -37981,7 +39829,7 @@
 </p:sld>
 </file>
 
-<file path=ppt/slides/slide8.xml><?xml version="1.0" encoding="utf-8"?>
+<file path=ppt/slides/slide9.xml><?xml version="1.0" encoding="utf-8"?>
 <p:sld xmlns:a="http://schemas.openxmlformats.org/drawingml/2006/main" xmlns:r="http://schemas.openxmlformats.org/officeDocument/2006/relationships" xmlns:p="http://schemas.openxmlformats.org/presentationml/2006/main">
   <p:cSld>
     <p:bg>
@@ -38200,118 +40048,6 @@
     <p:extLst>
       <p:ext uri="{BB962C8B-B14F-4D97-AF65-F5344CB8AC3E}">
         <p14:creationId xmlns:p14="http://schemas.microsoft.com/office/powerpoint/2010/main" val="3083312806"/>
-      </p:ext>
-    </p:extLst>
-  </p:cSld>
-  <p:clrMapOvr>
-    <a:masterClrMapping/>
-  </p:clrMapOvr>
-</p:sld>
-</file>
-
-<file path=ppt/slides/slide9.xml><?xml version="1.0" encoding="utf-8"?>
-<p:sld xmlns:a="http://schemas.openxmlformats.org/drawingml/2006/main" xmlns:r="http://schemas.openxmlformats.org/officeDocument/2006/relationships" xmlns:p="http://schemas.openxmlformats.org/presentationml/2006/main">
-  <p:cSld>
-    <p:spTree>
-      <p:nvGrpSpPr>
-        <p:cNvPr id="1" name=""/>
-        <p:cNvGrpSpPr/>
-        <p:nvPr/>
-      </p:nvGrpSpPr>
-      <p:grpSpPr>
-        <a:xfrm>
-          <a:off x="0" y="0"/>
-          <a:ext cx="0" cy="0"/>
-          <a:chOff x="0" y="0"/>
-          <a:chExt cx="0" cy="0"/>
-        </a:xfrm>
-      </p:grpSpPr>
-      <p:pic>
-        <p:nvPicPr>
-          <p:cNvPr id="7" name="Picture 6" descr="Graphical user interface, text, application, website&#10;&#10;Description automatically generated">
-            <a:extLst>
-              <a:ext uri="{FF2B5EF4-FFF2-40B4-BE49-F238E27FC236}">
-                <a16:creationId xmlns:a16="http://schemas.microsoft.com/office/drawing/2014/main" id="{F7BE3A76-BBCA-C34D-3EFB-E1F5F764C4B3}"/>
-              </a:ext>
-            </a:extLst>
-          </p:cNvPr>
-          <p:cNvPicPr>
-            <a:picLocks noChangeAspect="1"/>
-          </p:cNvPicPr>
-          <p:nvPr/>
-        </p:nvPicPr>
-        <p:blipFill>
-          <a:blip r:embed="rId2">
-            <a:extLst>
-              <a:ext uri="{28A0092B-C50C-407E-A947-70E740481C1C}">
-                <a14:useLocalDpi xmlns:a14="http://schemas.microsoft.com/office/drawing/2010/main" val="0"/>
-              </a:ext>
-            </a:extLst>
-          </a:blip>
-          <a:stretch>
-            <a:fillRect/>
-          </a:stretch>
-        </p:blipFill>
-        <p:spPr>
-          <a:xfrm>
-            <a:off x="59303" y="4034672"/>
-            <a:ext cx="12073394" cy="2795047"/>
-          </a:xfrm>
-          <a:prstGeom prst="rect">
-            <a:avLst/>
-          </a:prstGeom>
-          <a:ln>
-            <a:solidFill>
-              <a:schemeClr val="accent1"/>
-            </a:solidFill>
-          </a:ln>
-        </p:spPr>
-      </p:pic>
-      <p:pic>
-        <p:nvPicPr>
-          <p:cNvPr id="11" name="Picture 10" descr="Text&#10;&#10;Description automatically generated">
-            <a:extLst>
-              <a:ext uri="{FF2B5EF4-FFF2-40B4-BE49-F238E27FC236}">
-                <a16:creationId xmlns:a16="http://schemas.microsoft.com/office/drawing/2014/main" id="{8C3514FA-6DEC-0D4D-BD0F-59806B7D3AC0}"/>
-              </a:ext>
-            </a:extLst>
-          </p:cNvPr>
-          <p:cNvPicPr>
-            <a:picLocks noChangeAspect="1"/>
-          </p:cNvPicPr>
-          <p:nvPr/>
-        </p:nvPicPr>
-        <p:blipFill>
-          <a:blip r:embed="rId3">
-            <a:extLst>
-              <a:ext uri="{28A0092B-C50C-407E-A947-70E740481C1C}">
-                <a14:useLocalDpi xmlns:a14="http://schemas.microsoft.com/office/drawing/2010/main" val="0"/>
-              </a:ext>
-            </a:extLst>
-          </a:blip>
-          <a:stretch>
-            <a:fillRect/>
-          </a:stretch>
-        </p:blipFill>
-        <p:spPr>
-          <a:xfrm>
-            <a:off x="49475" y="28281"/>
-            <a:ext cx="12099255" cy="3940404"/>
-          </a:xfrm>
-          <a:prstGeom prst="rect">
-            <a:avLst/>
-          </a:prstGeom>
-          <a:ln>
-            <a:solidFill>
-              <a:schemeClr val="accent1"/>
-            </a:solidFill>
-          </a:ln>
-        </p:spPr>
-      </p:pic>
-    </p:spTree>
-    <p:extLst>
-      <p:ext uri="{BB962C8B-B14F-4D97-AF65-F5344CB8AC3E}">
-        <p14:creationId xmlns:p14="http://schemas.microsoft.com/office/powerpoint/2010/main" val="1846930178"/>
       </p:ext>
     </p:extLst>
   </p:cSld>

</xml_diff>